<commit_message>
more details on manifest
</commit_message>
<xml_diff>
--- a/I've been doing some syncing.pptx
+++ b/I've been doing some syncing.pptx
@@ -238,7 +238,7 @@
             <a:fld id="{B44C3707-9531-4AFE-B668-174360EDF9A2}" type="datetimeFigureOut">
               <a:rPr lang="nl-NL" smtClean="0"/>
               <a:pPr/>
-              <a:t>5-7-2016</a:t>
+              <a:t>6-7-2016</a:t>
             </a:fld>
             <a:endParaRPr lang="nl-NL"/>
           </a:p>
@@ -786,7 +786,7 @@
                 </a:solidFill>
               </a:rPr>
               <a:pPr/>
-              <a:t>5-7-2016</a:t>
+              <a:t>6-7-2016</a:t>
             </a:fld>
             <a:endParaRPr lang="nl-NL">
               <a:solidFill>
@@ -1291,7 +1291,7 @@
                 </a:solidFill>
               </a:rPr>
               <a:pPr/>
-              <a:t>5-7-2016</a:t>
+              <a:t>6-7-2016</a:t>
             </a:fld>
             <a:endParaRPr lang="nl-NL">
               <a:solidFill>
@@ -1496,7 +1496,7 @@
                 </a:solidFill>
               </a:rPr>
               <a:pPr/>
-              <a:t>5-7-2016</a:t>
+              <a:t>6-7-2016</a:t>
             </a:fld>
             <a:endParaRPr lang="nl-NL">
               <a:solidFill>
@@ -1672,7 +1672,7 @@
                 </a:solidFill>
               </a:rPr>
               <a:pPr/>
-              <a:t>5-7-2016</a:t>
+              <a:t>6-7-2016</a:t>
             </a:fld>
             <a:endParaRPr lang="nl-NL">
               <a:solidFill>
@@ -2032,7 +2032,7 @@
                 </a:solidFill>
               </a:rPr>
               <a:pPr/>
-              <a:t>5-7-2016</a:t>
+              <a:t>6-7-2016</a:t>
             </a:fld>
             <a:endParaRPr lang="nl-NL">
               <a:solidFill>
@@ -2368,7 +2368,7 @@
                 </a:solidFill>
               </a:rPr>
               <a:pPr/>
-              <a:t>5-7-2016</a:t>
+              <a:t>6-7-2016</a:t>
             </a:fld>
             <a:endParaRPr lang="nl-NL">
               <a:solidFill>
@@ -2623,7 +2623,7 @@
                 </a:solidFill>
               </a:rPr>
               <a:pPr/>
-              <a:t>5-7-2016</a:t>
+              <a:t>6-7-2016</a:t>
             </a:fld>
             <a:endParaRPr lang="nl-NL">
               <a:solidFill>
@@ -2888,7 +2888,7 @@
                 </a:solidFill>
               </a:rPr>
               <a:pPr/>
-              <a:t>5-7-2016</a:t>
+              <a:t>6-7-2016</a:t>
             </a:fld>
             <a:endParaRPr lang="nl-NL">
               <a:solidFill>
@@ -3064,7 +3064,7 @@
                 </a:solidFill>
               </a:rPr>
               <a:pPr/>
-              <a:t>5-7-2016</a:t>
+              <a:t>6-7-2016</a:t>
             </a:fld>
             <a:endParaRPr lang="nl-NL">
               <a:solidFill>
@@ -4024,7 +4024,7 @@
                 </a:solidFill>
               </a:rPr>
               <a:pPr/>
-              <a:t>5-7-2016</a:t>
+              <a:t>6-7-2016</a:t>
             </a:fld>
             <a:endParaRPr lang="nl-NL">
               <a:solidFill>
@@ -4984,7 +4984,7 @@
                 </a:solidFill>
               </a:rPr>
               <a:pPr/>
-              <a:t>5-7-2016</a:t>
+              <a:t>6-7-2016</a:t>
             </a:fld>
             <a:endParaRPr lang="nl-NL">
               <a:solidFill>
@@ -6236,7 +6236,7 @@
                 </a:solidFill>
               </a:rPr>
               <a:pPr/>
-              <a:t>5-7-2016</a:t>
+              <a:t>6-7-2016</a:t>
             </a:fld>
             <a:endParaRPr lang="nl-NL">
               <a:solidFill>
@@ -7196,7 +7196,7 @@
                 </a:solidFill>
               </a:rPr>
               <a:pPr/>
-              <a:t>5-7-2016</a:t>
+              <a:t>6-7-2016</a:t>
             </a:fld>
             <a:endParaRPr lang="nl-NL">
               <a:solidFill>
@@ -8156,7 +8156,7 @@
                 </a:solidFill>
               </a:rPr>
               <a:pPr/>
-              <a:t>5-7-2016</a:t>
+              <a:t>6-7-2016</a:t>
             </a:fld>
             <a:endParaRPr lang="nl-NL">
               <a:solidFill>
@@ -9612,7 +9612,7 @@
                 </a:solidFill>
               </a:rPr>
               <a:pPr/>
-              <a:t>5-7-2016</a:t>
+              <a:t>6-7-2016</a:t>
             </a:fld>
             <a:endParaRPr lang="nl-NL">
               <a:solidFill>
@@ -9998,7 +9998,7 @@
             <a:fld id="{57C89201-1C23-4F2A-9964-CF3389FA3EB1}" type="datetimeFigureOut">
               <a:rPr lang="nl-NL" smtClean="0"/>
               <a:pPr/>
-              <a:t>5-7-2016</a:t>
+              <a:t>6-7-2016</a:t>
             </a:fld>
             <a:endParaRPr lang="nl-NL"/>
           </a:p>
@@ -10314,7 +10314,7 @@
             <a:fld id="{57C89201-1C23-4F2A-9964-CF3389FA3EB1}" type="datetimeFigureOut">
               <a:rPr lang="nl-NL" smtClean="0"/>
               <a:pPr/>
-              <a:t>5-7-2016</a:t>
+              <a:t>6-7-2016</a:t>
             </a:fld>
             <a:endParaRPr lang="nl-NL"/>
           </a:p>
@@ -10786,7 +10786,7 @@
             <a:fld id="{57C89201-1C23-4F2A-9964-CF3389FA3EB1}" type="datetimeFigureOut">
               <a:rPr lang="nl-NL" smtClean="0"/>
               <a:pPr/>
-              <a:t>5-7-2016</a:t>
+              <a:t>6-7-2016</a:t>
             </a:fld>
             <a:endParaRPr lang="nl-NL"/>
           </a:p>
@@ -11233,7 +11233,7 @@
                 </a:solidFill>
               </a:rPr>
               <a:pPr/>
-              <a:t>5-7-2016</a:t>
+              <a:t>6-7-2016</a:t>
             </a:fld>
             <a:endParaRPr lang="nl-NL">
               <a:solidFill>
@@ -11608,7 +11608,7 @@
                 </a:solidFill>
               </a:rPr>
               <a:pPr/>
-              <a:t>5-7-2016</a:t>
+              <a:t>6-7-2016</a:t>
             </a:fld>
             <a:endParaRPr lang="nl-NL">
               <a:solidFill>
@@ -11927,7 +11927,7 @@
                 </a:solidFill>
               </a:rPr>
               <a:pPr/>
-              <a:t>5-7-2016</a:t>
+              <a:t>6-7-2016</a:t>
             </a:fld>
             <a:endParaRPr lang="nl-NL">
               <a:solidFill>
@@ -12559,23 +12559,7 @@
                   <a:schemeClr val="tx1"/>
                 </a:solidFill>
               </a:rPr>
-              <a:t>I’ve </a:t>
-            </a:r>
-            <a:r>
-              <a:rPr lang="en-US" sz="4400" dirty="0" smtClean="0">
-                <a:solidFill>
-                  <a:schemeClr val="tx1"/>
-                </a:solidFill>
-              </a:rPr>
-              <a:t>been doing </a:t>
-            </a:r>
-            <a:r>
-              <a:rPr lang="en-US" sz="4400" dirty="0" smtClean="0">
-                <a:solidFill>
-                  <a:schemeClr val="tx1"/>
-                </a:solidFill>
-              </a:rPr>
-              <a:t>some syncing…</a:t>
+              <a:t>I’ve been doing some syncing…</a:t>
             </a:r>
             <a:endParaRPr lang="en-US" sz="4400" dirty="0">
               <a:solidFill>
@@ -13586,10 +13570,6 @@
                 </a:rPr>
                 <a:t> internet</a:t>
               </a:r>
-              <a:endParaRPr lang="en-US" sz="2000" dirty="0">
-                <a:latin typeface="MV Boli" panose="02000500030200090000" pitchFamily="2" charset="0"/>
-                <a:cs typeface="MV Boli" panose="02000500030200090000" pitchFamily="2" charset="0"/>
-              </a:endParaRPr>
             </a:p>
           </p:txBody>
         </p:sp>
@@ -15452,10 +15432,6 @@
                 </a:rPr>
                 <a:t> internet</a:t>
               </a:r>
-              <a:endParaRPr lang="en-US" sz="2000" dirty="0">
-                <a:latin typeface="MV Boli" panose="02000500030200090000" pitchFamily="2" charset="0"/>
-                <a:cs typeface="MV Boli" panose="02000500030200090000" pitchFamily="2" charset="0"/>
-              </a:endParaRPr>
             </a:p>
           </p:txBody>
         </p:sp>
@@ -16464,10 +16440,6 @@
                 </a:rPr>
                 <a:t> internet</a:t>
               </a:r>
-              <a:endParaRPr lang="en-US" sz="2000" dirty="0">
-                <a:latin typeface="MV Boli" panose="02000500030200090000" pitchFamily="2" charset="0"/>
-                <a:cs typeface="MV Boli" panose="02000500030200090000" pitchFamily="2" charset="0"/>
-              </a:endParaRPr>
             </a:p>
           </p:txBody>
         </p:sp>
@@ -16905,425 +16877,16 @@
                 </a:solidFill>
                 <a:latin typeface="Consolas" panose="020B0609020204030204" pitchFamily="49" charset="0"/>
               </a:rPr>
-              <a:t>"</a:t>
-            </a:r>
-            <a:br>
-              <a:rPr lang="en-US" altLang="en-US" sz="1600" dirty="0">
-                <a:solidFill>
-                  <a:srgbClr val="6A8759"/>
-                </a:solidFill>
-                <a:latin typeface="Consolas" panose="020B0609020204030204" pitchFamily="49" charset="0"/>
-              </a:rPr>
-            </a:br>
-            <a:r>
-              <a:rPr lang="en-US" altLang="en-US" sz="1600" dirty="0">
-                <a:solidFill>
-                  <a:srgbClr val="6A8759"/>
-                </a:solidFill>
-                <a:latin typeface="Consolas" panose="020B0609020204030204" pitchFamily="49" charset="0"/>
-              </a:rPr>
-              <a:t>    </a:t>
+              <a:t>" </a:t>
             </a:r>
             <a:r>
               <a:rPr lang="en-US" altLang="en-US" sz="1600" dirty="0" smtClean="0">
                 <a:solidFill>
-                  <a:srgbClr val="6A8759"/>
-                </a:solidFill>
-                <a:latin typeface="Consolas" panose="020B0609020204030204" pitchFamily="49" charset="0"/>
-              </a:rPr>
-              <a:t>                       </a:t>
-            </a:r>
-            <a:r>
-              <a:rPr lang="en-US" altLang="en-US" sz="1600" dirty="0" smtClean="0">
-                <a:solidFill>
                   <a:srgbClr val="E8BF6A"/>
                 </a:solidFill>
                 <a:latin typeface="Consolas" panose="020B0609020204030204" pitchFamily="49" charset="0"/>
               </a:rPr>
-              <a:t>&gt;</a:t>
-            </a:r>
-            <a:r>
-              <a:rPr lang="en-US" altLang="en-US" sz="1600" dirty="0">
-                <a:solidFill>
-                  <a:srgbClr val="E8BF6A"/>
-                </a:solidFill>
-                <a:latin typeface="Consolas" panose="020B0609020204030204" pitchFamily="49" charset="0"/>
-              </a:rPr>
-              <a:t/>
-            </a:r>
-            <a:br>
-              <a:rPr lang="en-US" altLang="en-US" sz="1600" dirty="0">
-                <a:solidFill>
-                  <a:srgbClr val="E8BF6A"/>
-                </a:solidFill>
-                <a:latin typeface="Consolas" panose="020B0609020204030204" pitchFamily="49" charset="0"/>
-              </a:rPr>
-            </a:br>
-            <a:endParaRPr lang="en-US" altLang="en-US" sz="1600" dirty="0" smtClean="0">
-              <a:solidFill>
-                <a:srgbClr val="808080"/>
-              </a:solidFill>
-              <a:latin typeface="Consolas" panose="020B0609020204030204" pitchFamily="49" charset="0"/>
-            </a:endParaRPr>
-          </a:p>
-          <a:p>
-            <a:pPr lvl="0" eaLnBrk="0" fontAlgn="base" hangingPunct="0">
-              <a:spcBef>
-                <a:spcPct val="0"/>
-              </a:spcBef>
-              <a:spcAft>
-                <a:spcPct val="0"/>
-              </a:spcAft>
-            </a:pPr>
-            <a:endParaRPr lang="en-US" altLang="en-US" sz="1600" dirty="0">
-              <a:solidFill>
-                <a:srgbClr val="808080"/>
-              </a:solidFill>
-              <a:latin typeface="Consolas" panose="020B0609020204030204" pitchFamily="49" charset="0"/>
-            </a:endParaRPr>
-          </a:p>
-          <a:p>
-            <a:pPr lvl="0" eaLnBrk="0" fontAlgn="base" hangingPunct="0">
-              <a:spcBef>
-                <a:spcPct val="0"/>
-              </a:spcBef>
-              <a:spcAft>
-                <a:spcPct val="0"/>
-              </a:spcAft>
-            </a:pPr>
-            <a:r>
-              <a:rPr lang="en-US" altLang="en-US" sz="1600" dirty="0" smtClean="0">
-                <a:solidFill>
-                  <a:srgbClr val="808080"/>
-                </a:solidFill>
-                <a:latin typeface="Consolas" panose="020B0609020204030204" pitchFamily="49" charset="0"/>
-              </a:rPr>
-              <a:t>    </a:t>
-            </a:r>
-            <a:r>
-              <a:rPr lang="en-US" altLang="en-US" sz="1600" dirty="0">
-                <a:solidFill>
-                  <a:srgbClr val="E8BF6A"/>
-                </a:solidFill>
-                <a:latin typeface="Consolas" panose="020B0609020204030204" pitchFamily="49" charset="0"/>
-              </a:rPr>
-              <a:t>&lt;intent-filter&gt;</a:t>
-            </a:r>
-            <a:br>
-              <a:rPr lang="en-US" altLang="en-US" sz="1600" dirty="0">
-                <a:solidFill>
-                  <a:srgbClr val="E8BF6A"/>
-                </a:solidFill>
-                <a:latin typeface="Consolas" panose="020B0609020204030204" pitchFamily="49" charset="0"/>
-              </a:rPr>
-            </a:br>
-            <a:r>
-              <a:rPr lang="en-US" altLang="en-US" sz="1600" dirty="0">
-                <a:solidFill>
-                  <a:srgbClr val="E8BF6A"/>
-                </a:solidFill>
-                <a:latin typeface="Consolas" panose="020B0609020204030204" pitchFamily="49" charset="0"/>
-              </a:rPr>
-              <a:t>        &lt;action </a:t>
-            </a:r>
-            <a:r>
-              <a:rPr lang="en-US" altLang="en-US" sz="1600" dirty="0" err="1">
-                <a:solidFill>
-                  <a:srgbClr val="9876AA"/>
-                </a:solidFill>
-                <a:latin typeface="Consolas" panose="020B0609020204030204" pitchFamily="49" charset="0"/>
-              </a:rPr>
-              <a:t>android</a:t>
-            </a:r>
-            <a:r>
-              <a:rPr lang="en-US" altLang="en-US" sz="1600" dirty="0" err="1">
-                <a:solidFill>
-                  <a:srgbClr val="BABABA"/>
-                </a:solidFill>
-                <a:latin typeface="Consolas" panose="020B0609020204030204" pitchFamily="49" charset="0"/>
-              </a:rPr>
-              <a:t>:name</a:t>
-            </a:r>
-            <a:r>
-              <a:rPr lang="en-US" altLang="en-US" sz="1600" dirty="0" smtClean="0">
-                <a:solidFill>
-                  <a:srgbClr val="BABABA"/>
-                </a:solidFill>
-                <a:latin typeface="Consolas" panose="020B0609020204030204" pitchFamily="49" charset="0"/>
-              </a:rPr>
-              <a:t>=</a:t>
-            </a:r>
-            <a:r>
-              <a:rPr lang="en-US" altLang="en-US" sz="1600" dirty="0">
-                <a:solidFill>
-                  <a:srgbClr val="6A8759"/>
-                </a:solidFill>
-                <a:latin typeface="Consolas" panose="020B0609020204030204" pitchFamily="49" charset="0"/>
-              </a:rPr>
-              <a:t>"                           </a:t>
-            </a:r>
-            <a:r>
-              <a:rPr lang="en-US" altLang="en-US" sz="1600" dirty="0" smtClean="0">
-                <a:solidFill>
-                  <a:srgbClr val="6A8759"/>
-                </a:solidFill>
-                <a:latin typeface="Consolas" panose="020B0609020204030204" pitchFamily="49" charset="0"/>
-              </a:rPr>
-              <a:t>"</a:t>
-            </a:r>
-            <a:r>
-              <a:rPr lang="en-US" altLang="en-US" sz="1600" dirty="0" smtClean="0">
-                <a:solidFill>
-                  <a:srgbClr val="E8BF6A"/>
-                </a:solidFill>
-                <a:latin typeface="Consolas" panose="020B0609020204030204" pitchFamily="49" charset="0"/>
-              </a:rPr>
               <a:t>/&gt;</a:t>
-            </a:r>
-            <a:r>
-              <a:rPr lang="en-US" altLang="en-US" sz="1600" dirty="0">
-                <a:solidFill>
-                  <a:srgbClr val="E8BF6A"/>
-                </a:solidFill>
-                <a:latin typeface="Consolas" panose="020B0609020204030204" pitchFamily="49" charset="0"/>
-              </a:rPr>
-              <a:t/>
-            </a:r>
-            <a:br>
-              <a:rPr lang="en-US" altLang="en-US" sz="1600" dirty="0">
-                <a:solidFill>
-                  <a:srgbClr val="E8BF6A"/>
-                </a:solidFill>
-                <a:latin typeface="Consolas" panose="020B0609020204030204" pitchFamily="49" charset="0"/>
-              </a:rPr>
-            </a:br>
-            <a:r>
-              <a:rPr lang="en-US" altLang="en-US" sz="1600" dirty="0">
-                <a:solidFill>
-                  <a:srgbClr val="E8BF6A"/>
-                </a:solidFill>
-                <a:latin typeface="Consolas" panose="020B0609020204030204" pitchFamily="49" charset="0"/>
-              </a:rPr>
-              <a:t>    &lt;/intent-filter&gt;</a:t>
-            </a:r>
-            <a:br>
-              <a:rPr lang="en-US" altLang="en-US" sz="1600" dirty="0">
-                <a:solidFill>
-                  <a:srgbClr val="E8BF6A"/>
-                </a:solidFill>
-                <a:latin typeface="Consolas" panose="020B0609020204030204" pitchFamily="49" charset="0"/>
-              </a:rPr>
-            </a:br>
-            <a:endParaRPr lang="en-US" altLang="en-US" sz="1600" dirty="0" smtClean="0">
-              <a:solidFill>
-                <a:srgbClr val="E8BF6A"/>
-              </a:solidFill>
-              <a:latin typeface="Consolas" panose="020B0609020204030204" pitchFamily="49" charset="0"/>
-            </a:endParaRPr>
-          </a:p>
-          <a:p>
-            <a:pPr lvl="0" eaLnBrk="0" fontAlgn="base" hangingPunct="0">
-              <a:spcBef>
-                <a:spcPct val="0"/>
-              </a:spcBef>
-              <a:spcAft>
-                <a:spcPct val="0"/>
-              </a:spcAft>
-            </a:pPr>
-            <a:r>
-              <a:rPr lang="en-US" altLang="en-US" sz="1600" dirty="0" smtClean="0">
-                <a:solidFill>
-                  <a:srgbClr val="808080"/>
-                </a:solidFill>
-                <a:latin typeface="Consolas" panose="020B0609020204030204" pitchFamily="49" charset="0"/>
-              </a:rPr>
-              <a:t>    </a:t>
-            </a:r>
-            <a:r>
-              <a:rPr lang="en-US" altLang="en-US" sz="1600" dirty="0">
-                <a:solidFill>
-                  <a:srgbClr val="E8BF6A"/>
-                </a:solidFill>
-                <a:latin typeface="Consolas" panose="020B0609020204030204" pitchFamily="49" charset="0"/>
-              </a:rPr>
-              <a:t>&lt;meta-data</a:t>
-            </a:r>
-            <a:br>
-              <a:rPr lang="en-US" altLang="en-US" sz="1600" dirty="0">
-                <a:solidFill>
-                  <a:srgbClr val="E8BF6A"/>
-                </a:solidFill>
-                <a:latin typeface="Consolas" panose="020B0609020204030204" pitchFamily="49" charset="0"/>
-              </a:rPr>
-            </a:br>
-            <a:r>
-              <a:rPr lang="en-US" altLang="en-US" sz="1600" dirty="0">
-                <a:solidFill>
-                  <a:srgbClr val="E8BF6A"/>
-                </a:solidFill>
-                <a:latin typeface="Consolas" panose="020B0609020204030204" pitchFamily="49" charset="0"/>
-              </a:rPr>
-              <a:t>        </a:t>
-            </a:r>
-            <a:r>
-              <a:rPr lang="en-US" altLang="en-US" sz="1600" dirty="0" err="1">
-                <a:solidFill>
-                  <a:srgbClr val="9876AA"/>
-                </a:solidFill>
-                <a:latin typeface="Consolas" panose="020B0609020204030204" pitchFamily="49" charset="0"/>
-              </a:rPr>
-              <a:t>android</a:t>
-            </a:r>
-            <a:r>
-              <a:rPr lang="en-US" altLang="en-US" sz="1600" dirty="0" err="1">
-                <a:solidFill>
-                  <a:srgbClr val="BABABA"/>
-                </a:solidFill>
-                <a:latin typeface="Consolas" panose="020B0609020204030204" pitchFamily="49" charset="0"/>
-              </a:rPr>
-              <a:t>:name</a:t>
-            </a:r>
-            <a:r>
-              <a:rPr lang="en-US" altLang="en-US" sz="1600" dirty="0" smtClean="0">
-                <a:solidFill>
-                  <a:srgbClr val="BABABA"/>
-                </a:solidFill>
-                <a:latin typeface="Consolas" panose="020B0609020204030204" pitchFamily="49" charset="0"/>
-              </a:rPr>
-              <a:t>=</a:t>
-            </a:r>
-            <a:r>
-              <a:rPr lang="en-US" altLang="en-US" sz="1600" dirty="0" smtClean="0">
-                <a:solidFill>
-                  <a:srgbClr val="6A8759"/>
-                </a:solidFill>
-                <a:latin typeface="Consolas" panose="020B0609020204030204" pitchFamily="49" charset="0"/>
-              </a:rPr>
-              <a:t>"                           </a:t>
-            </a:r>
-            <a:r>
-              <a:rPr lang="en-US" altLang="en-US" sz="1600" dirty="0" smtClean="0">
-                <a:solidFill>
-                  <a:srgbClr val="6A8759"/>
-                </a:solidFill>
-                <a:latin typeface="Consolas" panose="020B0609020204030204" pitchFamily="49" charset="0"/>
-              </a:rPr>
-              <a:t>"</a:t>
-            </a:r>
-            <a:r>
-              <a:rPr lang="en-US" altLang="en-US" sz="1600" dirty="0">
-                <a:solidFill>
-                  <a:srgbClr val="6A8759"/>
-                </a:solidFill>
-                <a:latin typeface="Consolas" panose="020B0609020204030204" pitchFamily="49" charset="0"/>
-              </a:rPr>
-              <a:t/>
-            </a:r>
-            <a:br>
-              <a:rPr lang="en-US" altLang="en-US" sz="1600" dirty="0">
-                <a:solidFill>
-                  <a:srgbClr val="6A8759"/>
-                </a:solidFill>
-                <a:latin typeface="Consolas" panose="020B0609020204030204" pitchFamily="49" charset="0"/>
-              </a:rPr>
-            </a:br>
-            <a:r>
-              <a:rPr lang="en-US" altLang="en-US" sz="1600" dirty="0">
-                <a:solidFill>
-                  <a:srgbClr val="6A8759"/>
-                </a:solidFill>
-                <a:latin typeface="Consolas" panose="020B0609020204030204" pitchFamily="49" charset="0"/>
-              </a:rPr>
-              <a:t>        </a:t>
-            </a:r>
-            <a:r>
-              <a:rPr lang="en-US" altLang="en-US" sz="1600" dirty="0" err="1">
-                <a:solidFill>
-                  <a:srgbClr val="9876AA"/>
-                </a:solidFill>
-                <a:latin typeface="Consolas" panose="020B0609020204030204" pitchFamily="49" charset="0"/>
-              </a:rPr>
-              <a:t>android</a:t>
-            </a:r>
-            <a:r>
-              <a:rPr lang="en-US" altLang="en-US" sz="1600" dirty="0" err="1">
-                <a:solidFill>
-                  <a:srgbClr val="BABABA"/>
-                </a:solidFill>
-                <a:latin typeface="Consolas" panose="020B0609020204030204" pitchFamily="49" charset="0"/>
-              </a:rPr>
-              <a:t>:resource</a:t>
-            </a:r>
-            <a:r>
-              <a:rPr lang="en-US" altLang="en-US" sz="1600" dirty="0" smtClean="0">
-                <a:solidFill>
-                  <a:srgbClr val="BABABA"/>
-                </a:solidFill>
-                <a:latin typeface="Consolas" panose="020B0609020204030204" pitchFamily="49" charset="0"/>
-              </a:rPr>
-              <a:t>=</a:t>
-            </a:r>
-            <a:r>
-              <a:rPr lang="en-US" altLang="en-US" sz="1600" dirty="0">
-                <a:solidFill>
-                  <a:srgbClr val="6A8759"/>
-                </a:solidFill>
-                <a:latin typeface="Consolas" panose="020B0609020204030204" pitchFamily="49" charset="0"/>
-              </a:rPr>
-              <a:t>"                </a:t>
-            </a:r>
-            <a:r>
-              <a:rPr lang="en-US" altLang="en-US" sz="1600" dirty="0" smtClean="0">
-                <a:solidFill>
-                  <a:srgbClr val="6A8759"/>
-                </a:solidFill>
-                <a:latin typeface="Consolas" panose="020B0609020204030204" pitchFamily="49" charset="0"/>
-              </a:rPr>
-              <a:t>"</a:t>
-            </a:r>
-            <a:r>
-              <a:rPr lang="en-US" altLang="en-US" sz="1600" dirty="0" smtClean="0">
-                <a:solidFill>
-                  <a:srgbClr val="E8BF6A"/>
-                </a:solidFill>
-                <a:latin typeface="Consolas" panose="020B0609020204030204" pitchFamily="49" charset="0"/>
-              </a:rPr>
-              <a:t>/&gt;</a:t>
-            </a:r>
-            <a:r>
-              <a:rPr lang="en-US" altLang="en-US" sz="1600" dirty="0">
-                <a:solidFill>
-                  <a:srgbClr val="E8BF6A"/>
-                </a:solidFill>
-                <a:latin typeface="Consolas" panose="020B0609020204030204" pitchFamily="49" charset="0"/>
-              </a:rPr>
-              <a:t/>
-            </a:r>
-            <a:br>
-              <a:rPr lang="en-US" altLang="en-US" sz="1600" dirty="0">
-                <a:solidFill>
-                  <a:srgbClr val="E8BF6A"/>
-                </a:solidFill>
-                <a:latin typeface="Consolas" panose="020B0609020204030204" pitchFamily="49" charset="0"/>
-              </a:rPr>
-            </a:br>
-            <a:r>
-              <a:rPr lang="en-US" altLang="en-US" sz="1600" dirty="0">
-                <a:solidFill>
-                  <a:srgbClr val="E8BF6A"/>
-                </a:solidFill>
-                <a:latin typeface="Consolas" panose="020B0609020204030204" pitchFamily="49" charset="0"/>
-              </a:rPr>
-              <a:t>&lt;/service</a:t>
-            </a:r>
-            <a:r>
-              <a:rPr lang="en-US" altLang="en-US" sz="1600" dirty="0" smtClean="0">
-                <a:solidFill>
-                  <a:srgbClr val="E8BF6A"/>
-                </a:solidFill>
-                <a:latin typeface="Consolas" panose="020B0609020204030204" pitchFamily="49" charset="0"/>
-              </a:rPr>
-              <a:t>&gt;</a:t>
             </a:r>
             <a:endParaRPr lang="en-US" altLang="en-US" sz="3600" dirty="0">
               <a:latin typeface="Consolas" panose="020B0609020204030204" pitchFamily="49" charset="0"/>
@@ -17627,6 +17190,604 @@
       </p:grpSpPr>
       <p:sp>
         <p:nvSpPr>
+          <p:cNvPr id="6" name="Rectangle 1"/>
+          <p:cNvSpPr>
+            <a:spLocks noChangeArrowheads="1"/>
+          </p:cNvSpPr>
+          <p:nvPr/>
+        </p:nvSpPr>
+        <p:spPr bwMode="auto">
+          <a:xfrm>
+            <a:off x="652500" y="2132856"/>
+            <a:ext cx="10887000" cy="4104456"/>
+          </a:xfrm>
+          <a:prstGeom prst="rect">
+            <a:avLst/>
+          </a:prstGeom>
+          <a:solidFill>
+            <a:srgbClr val="2B2B2B"/>
+          </a:solidFill>
+          <a:ln>
+            <a:noFill/>
+          </a:ln>
+          <a:effectLst/>
+          <a:extLst>
+            <a:ext uri="{91240B29-F687-4F45-9708-019B960494DF}">
+              <a14:hiddenLine xmlns:a14="http://schemas.microsoft.com/office/drawing/2010/main" w="9525">
+                <a:solidFill>
+                  <a:schemeClr val="tx1"/>
+                </a:solidFill>
+                <a:miter lim="800000"/>
+                <a:headEnd/>
+                <a:tailEnd/>
+              </a14:hiddenLine>
+            </a:ext>
+            <a:ext uri="{AF507438-7753-43E0-B8FC-AC1667EBCBE1}">
+              <a14:hiddenEffects xmlns:a14="http://schemas.microsoft.com/office/drawing/2010/main">
+                <a:effectLst>
+                  <a:outerShdw dist="35921" dir="2700000" algn="ctr" rotWithShape="0">
+                    <a:schemeClr val="bg2"/>
+                  </a:outerShdw>
+                </a:effectLst>
+              </a14:hiddenEffects>
+            </a:ext>
+          </a:extLst>
+        </p:spPr>
+        <p:txBody>
+          <a:bodyPr vert="horz" wrap="square" lIns="182880" tIns="182880" rIns="182880" bIns="182880" numCol="1" anchor="t" anchorCtr="0" compatLnSpc="1">
+            <a:prstTxWarp prst="textNoShape">
+              <a:avLst/>
+            </a:prstTxWarp>
+            <a:noAutofit/>
+          </a:bodyPr>
+          <a:lstStyle/>
+          <a:p>
+            <a:pPr lvl="0" eaLnBrk="0" fontAlgn="base" hangingPunct="0">
+              <a:spcBef>
+                <a:spcPct val="0"/>
+              </a:spcBef>
+              <a:spcAft>
+                <a:spcPct val="0"/>
+              </a:spcAft>
+            </a:pPr>
+            <a:endParaRPr lang="en-US" altLang="en-US" sz="1600" dirty="0" smtClean="0">
+              <a:solidFill>
+                <a:srgbClr val="808080"/>
+              </a:solidFill>
+              <a:latin typeface="Consolas" panose="020B0609020204030204" pitchFamily="49" charset="0"/>
+            </a:endParaRPr>
+          </a:p>
+          <a:p>
+            <a:pPr lvl="0" eaLnBrk="0" fontAlgn="base" hangingPunct="0">
+              <a:spcBef>
+                <a:spcPct val="0"/>
+              </a:spcBef>
+              <a:spcAft>
+                <a:spcPct val="0"/>
+              </a:spcAft>
+            </a:pPr>
+            <a:endParaRPr lang="en-US" altLang="en-US" sz="1600" dirty="0">
+              <a:solidFill>
+                <a:srgbClr val="808080"/>
+              </a:solidFill>
+              <a:latin typeface="Consolas" panose="020B0609020204030204" pitchFamily="49" charset="0"/>
+            </a:endParaRPr>
+          </a:p>
+          <a:p>
+            <a:pPr lvl="0" eaLnBrk="0" fontAlgn="base" hangingPunct="0">
+              <a:spcBef>
+                <a:spcPct val="0"/>
+              </a:spcBef>
+              <a:spcAft>
+                <a:spcPct val="0"/>
+              </a:spcAft>
+            </a:pPr>
+            <a:r>
+              <a:rPr lang="en-US" altLang="en-US" sz="1600" dirty="0" smtClean="0">
+                <a:solidFill>
+                  <a:srgbClr val="E8BF6A"/>
+                </a:solidFill>
+                <a:latin typeface="Consolas" panose="020B0609020204030204" pitchFamily="49" charset="0"/>
+              </a:rPr>
+              <a:t>&lt;</a:t>
+            </a:r>
+            <a:r>
+              <a:rPr lang="en-US" altLang="en-US" sz="1600" dirty="0">
+                <a:solidFill>
+                  <a:srgbClr val="E8BF6A"/>
+                </a:solidFill>
+                <a:latin typeface="Consolas" panose="020B0609020204030204" pitchFamily="49" charset="0"/>
+              </a:rPr>
+              <a:t>service</a:t>
+            </a:r>
+            <a:br>
+              <a:rPr lang="en-US" altLang="en-US" sz="1600" dirty="0">
+                <a:solidFill>
+                  <a:srgbClr val="E8BF6A"/>
+                </a:solidFill>
+                <a:latin typeface="Consolas" panose="020B0609020204030204" pitchFamily="49" charset="0"/>
+              </a:rPr>
+            </a:br>
+            <a:r>
+              <a:rPr lang="en-US" altLang="en-US" sz="1600" dirty="0">
+                <a:solidFill>
+                  <a:srgbClr val="E8BF6A"/>
+                </a:solidFill>
+                <a:latin typeface="Consolas" panose="020B0609020204030204" pitchFamily="49" charset="0"/>
+              </a:rPr>
+              <a:t>    </a:t>
+            </a:r>
+            <a:r>
+              <a:rPr lang="en-US" altLang="en-US" sz="1600" dirty="0" err="1">
+                <a:solidFill>
+                  <a:srgbClr val="9876AA"/>
+                </a:solidFill>
+                <a:latin typeface="Consolas" panose="020B0609020204030204" pitchFamily="49" charset="0"/>
+              </a:rPr>
+              <a:t>android</a:t>
+            </a:r>
+            <a:r>
+              <a:rPr lang="en-US" altLang="en-US" sz="1600" dirty="0" err="1">
+                <a:solidFill>
+                  <a:srgbClr val="BABABA"/>
+                </a:solidFill>
+                <a:latin typeface="Consolas" panose="020B0609020204030204" pitchFamily="49" charset="0"/>
+              </a:rPr>
+              <a:t>:name</a:t>
+            </a:r>
+            <a:r>
+              <a:rPr lang="en-US" altLang="en-US" sz="1600" dirty="0">
+                <a:solidFill>
+                  <a:srgbClr val="BABABA"/>
+                </a:solidFill>
+                <a:latin typeface="Consolas" panose="020B0609020204030204" pitchFamily="49" charset="0"/>
+              </a:rPr>
+              <a:t>=</a:t>
+            </a:r>
+            <a:r>
+              <a:rPr lang="en-US" altLang="en-US" sz="1600" dirty="0">
+                <a:solidFill>
+                  <a:srgbClr val="6A8759"/>
+                </a:solidFill>
+                <a:latin typeface="Consolas" panose="020B0609020204030204" pitchFamily="49" charset="0"/>
+              </a:rPr>
+              <a:t>".</a:t>
+            </a:r>
+            <a:r>
+              <a:rPr lang="en-US" altLang="en-US" sz="1600" dirty="0" err="1">
+                <a:solidFill>
+                  <a:srgbClr val="6A8759"/>
+                </a:solidFill>
+                <a:latin typeface="Consolas" panose="020B0609020204030204" pitchFamily="49" charset="0"/>
+              </a:rPr>
+              <a:t>sync.SyncService</a:t>
+            </a:r>
+            <a:r>
+              <a:rPr lang="en-US" altLang="en-US" sz="1600" dirty="0">
+                <a:solidFill>
+                  <a:srgbClr val="6A8759"/>
+                </a:solidFill>
+                <a:latin typeface="Consolas" panose="020B0609020204030204" pitchFamily="49" charset="0"/>
+              </a:rPr>
+              <a:t>"</a:t>
+            </a:r>
+            <a:br>
+              <a:rPr lang="en-US" altLang="en-US" sz="1600" dirty="0">
+                <a:solidFill>
+                  <a:srgbClr val="6A8759"/>
+                </a:solidFill>
+                <a:latin typeface="Consolas" panose="020B0609020204030204" pitchFamily="49" charset="0"/>
+              </a:rPr>
+            </a:br>
+            <a:r>
+              <a:rPr lang="en-US" altLang="en-US" sz="1600" dirty="0">
+                <a:solidFill>
+                  <a:srgbClr val="6A8759"/>
+                </a:solidFill>
+                <a:latin typeface="Consolas" panose="020B0609020204030204" pitchFamily="49" charset="0"/>
+              </a:rPr>
+              <a:t>    </a:t>
+            </a:r>
+            <a:r>
+              <a:rPr lang="en-US" altLang="en-US" sz="1600" dirty="0" smtClean="0">
+                <a:solidFill>
+                  <a:srgbClr val="6A8759"/>
+                </a:solidFill>
+                <a:latin typeface="Consolas" panose="020B0609020204030204" pitchFamily="49" charset="0"/>
+              </a:rPr>
+              <a:t>                       </a:t>
+            </a:r>
+            <a:r>
+              <a:rPr lang="en-US" altLang="en-US" sz="1600" dirty="0" smtClean="0">
+                <a:solidFill>
+                  <a:srgbClr val="E8BF6A"/>
+                </a:solidFill>
+                <a:latin typeface="Consolas" panose="020B0609020204030204" pitchFamily="49" charset="0"/>
+              </a:rPr>
+              <a:t>&gt;</a:t>
+            </a:r>
+            <a:r>
+              <a:rPr lang="en-US" altLang="en-US" sz="1600" dirty="0">
+                <a:solidFill>
+                  <a:srgbClr val="E8BF6A"/>
+                </a:solidFill>
+                <a:latin typeface="Consolas" panose="020B0609020204030204" pitchFamily="49" charset="0"/>
+              </a:rPr>
+              <a:t/>
+            </a:r>
+            <a:br>
+              <a:rPr lang="en-US" altLang="en-US" sz="1600" dirty="0">
+                <a:solidFill>
+                  <a:srgbClr val="E8BF6A"/>
+                </a:solidFill>
+                <a:latin typeface="Consolas" panose="020B0609020204030204" pitchFamily="49" charset="0"/>
+              </a:rPr>
+            </a:br>
+            <a:endParaRPr lang="en-US" altLang="en-US" sz="1600" dirty="0" smtClean="0">
+              <a:solidFill>
+                <a:srgbClr val="808080"/>
+              </a:solidFill>
+              <a:latin typeface="Consolas" panose="020B0609020204030204" pitchFamily="49" charset="0"/>
+            </a:endParaRPr>
+          </a:p>
+          <a:p>
+            <a:pPr lvl="0" eaLnBrk="0" fontAlgn="base" hangingPunct="0">
+              <a:spcBef>
+                <a:spcPct val="0"/>
+              </a:spcBef>
+              <a:spcAft>
+                <a:spcPct val="0"/>
+              </a:spcAft>
+            </a:pPr>
+            <a:endParaRPr lang="en-US" altLang="en-US" sz="1600" dirty="0">
+              <a:solidFill>
+                <a:srgbClr val="808080"/>
+              </a:solidFill>
+              <a:latin typeface="Consolas" panose="020B0609020204030204" pitchFamily="49" charset="0"/>
+            </a:endParaRPr>
+          </a:p>
+          <a:p>
+            <a:pPr lvl="0" eaLnBrk="0" fontAlgn="base" hangingPunct="0">
+              <a:spcBef>
+                <a:spcPct val="0"/>
+              </a:spcBef>
+              <a:spcAft>
+                <a:spcPct val="0"/>
+              </a:spcAft>
+            </a:pPr>
+            <a:r>
+              <a:rPr lang="en-US" altLang="en-US" sz="1600" dirty="0" smtClean="0">
+                <a:solidFill>
+                  <a:srgbClr val="808080"/>
+                </a:solidFill>
+                <a:latin typeface="Consolas" panose="020B0609020204030204" pitchFamily="49" charset="0"/>
+              </a:rPr>
+              <a:t>    </a:t>
+            </a:r>
+            <a:r>
+              <a:rPr lang="en-US" altLang="en-US" sz="1600" dirty="0">
+                <a:solidFill>
+                  <a:srgbClr val="E8BF6A"/>
+                </a:solidFill>
+                <a:latin typeface="Consolas" panose="020B0609020204030204" pitchFamily="49" charset="0"/>
+              </a:rPr>
+              <a:t>&lt;intent-filter&gt;</a:t>
+            </a:r>
+            <a:br>
+              <a:rPr lang="en-US" altLang="en-US" sz="1600" dirty="0">
+                <a:solidFill>
+                  <a:srgbClr val="E8BF6A"/>
+                </a:solidFill>
+                <a:latin typeface="Consolas" panose="020B0609020204030204" pitchFamily="49" charset="0"/>
+              </a:rPr>
+            </a:br>
+            <a:r>
+              <a:rPr lang="en-US" altLang="en-US" sz="1600" dirty="0">
+                <a:solidFill>
+                  <a:srgbClr val="E8BF6A"/>
+                </a:solidFill>
+                <a:latin typeface="Consolas" panose="020B0609020204030204" pitchFamily="49" charset="0"/>
+              </a:rPr>
+              <a:t>        &lt;action </a:t>
+            </a:r>
+            <a:r>
+              <a:rPr lang="en-US" altLang="en-US" sz="1600" dirty="0" err="1">
+                <a:solidFill>
+                  <a:srgbClr val="9876AA"/>
+                </a:solidFill>
+                <a:latin typeface="Consolas" panose="020B0609020204030204" pitchFamily="49" charset="0"/>
+              </a:rPr>
+              <a:t>android</a:t>
+            </a:r>
+            <a:r>
+              <a:rPr lang="en-US" altLang="en-US" sz="1600" dirty="0" err="1">
+                <a:solidFill>
+                  <a:srgbClr val="BABABA"/>
+                </a:solidFill>
+                <a:latin typeface="Consolas" panose="020B0609020204030204" pitchFamily="49" charset="0"/>
+              </a:rPr>
+              <a:t>:name</a:t>
+            </a:r>
+            <a:r>
+              <a:rPr lang="en-US" altLang="en-US" sz="1600" dirty="0" smtClean="0">
+                <a:solidFill>
+                  <a:srgbClr val="BABABA"/>
+                </a:solidFill>
+                <a:latin typeface="Consolas" panose="020B0609020204030204" pitchFamily="49" charset="0"/>
+              </a:rPr>
+              <a:t>=</a:t>
+            </a:r>
+            <a:r>
+              <a:rPr lang="en-US" altLang="en-US" sz="1600" dirty="0">
+                <a:solidFill>
+                  <a:srgbClr val="6A8759"/>
+                </a:solidFill>
+                <a:latin typeface="Consolas" panose="020B0609020204030204" pitchFamily="49" charset="0"/>
+              </a:rPr>
+              <a:t>"                           </a:t>
+            </a:r>
+            <a:r>
+              <a:rPr lang="en-US" altLang="en-US" sz="1600" dirty="0" smtClean="0">
+                <a:solidFill>
+                  <a:srgbClr val="6A8759"/>
+                </a:solidFill>
+                <a:latin typeface="Consolas" panose="020B0609020204030204" pitchFamily="49" charset="0"/>
+              </a:rPr>
+              <a:t>"</a:t>
+            </a:r>
+            <a:r>
+              <a:rPr lang="en-US" altLang="en-US" sz="1600" dirty="0" smtClean="0">
+                <a:solidFill>
+                  <a:srgbClr val="E8BF6A"/>
+                </a:solidFill>
+                <a:latin typeface="Consolas" panose="020B0609020204030204" pitchFamily="49" charset="0"/>
+              </a:rPr>
+              <a:t>/&gt;</a:t>
+            </a:r>
+            <a:r>
+              <a:rPr lang="en-US" altLang="en-US" sz="1600" dirty="0">
+                <a:solidFill>
+                  <a:srgbClr val="E8BF6A"/>
+                </a:solidFill>
+                <a:latin typeface="Consolas" panose="020B0609020204030204" pitchFamily="49" charset="0"/>
+              </a:rPr>
+              <a:t/>
+            </a:r>
+            <a:br>
+              <a:rPr lang="en-US" altLang="en-US" sz="1600" dirty="0">
+                <a:solidFill>
+                  <a:srgbClr val="E8BF6A"/>
+                </a:solidFill>
+                <a:latin typeface="Consolas" panose="020B0609020204030204" pitchFamily="49" charset="0"/>
+              </a:rPr>
+            </a:br>
+            <a:r>
+              <a:rPr lang="en-US" altLang="en-US" sz="1600" dirty="0">
+                <a:solidFill>
+                  <a:srgbClr val="E8BF6A"/>
+                </a:solidFill>
+                <a:latin typeface="Consolas" panose="020B0609020204030204" pitchFamily="49" charset="0"/>
+              </a:rPr>
+              <a:t>    &lt;/intent-filter&gt;</a:t>
+            </a:r>
+            <a:br>
+              <a:rPr lang="en-US" altLang="en-US" sz="1600" dirty="0">
+                <a:solidFill>
+                  <a:srgbClr val="E8BF6A"/>
+                </a:solidFill>
+                <a:latin typeface="Consolas" panose="020B0609020204030204" pitchFamily="49" charset="0"/>
+              </a:rPr>
+            </a:br>
+            <a:endParaRPr lang="en-US" altLang="en-US" sz="1600" dirty="0" smtClean="0">
+              <a:solidFill>
+                <a:srgbClr val="E8BF6A"/>
+              </a:solidFill>
+              <a:latin typeface="Consolas" panose="020B0609020204030204" pitchFamily="49" charset="0"/>
+            </a:endParaRPr>
+          </a:p>
+          <a:p>
+            <a:pPr lvl="0" eaLnBrk="0" fontAlgn="base" hangingPunct="0">
+              <a:spcBef>
+                <a:spcPct val="0"/>
+              </a:spcBef>
+              <a:spcAft>
+                <a:spcPct val="0"/>
+              </a:spcAft>
+            </a:pPr>
+            <a:r>
+              <a:rPr lang="en-US" altLang="en-US" sz="1600" dirty="0" smtClean="0">
+                <a:solidFill>
+                  <a:srgbClr val="808080"/>
+                </a:solidFill>
+                <a:latin typeface="Consolas" panose="020B0609020204030204" pitchFamily="49" charset="0"/>
+              </a:rPr>
+              <a:t>    </a:t>
+            </a:r>
+            <a:r>
+              <a:rPr lang="en-US" altLang="en-US" sz="1600" dirty="0">
+                <a:solidFill>
+                  <a:srgbClr val="E8BF6A"/>
+                </a:solidFill>
+                <a:latin typeface="Consolas" panose="020B0609020204030204" pitchFamily="49" charset="0"/>
+              </a:rPr>
+              <a:t>&lt;meta-data</a:t>
+            </a:r>
+            <a:br>
+              <a:rPr lang="en-US" altLang="en-US" sz="1600" dirty="0">
+                <a:solidFill>
+                  <a:srgbClr val="E8BF6A"/>
+                </a:solidFill>
+                <a:latin typeface="Consolas" panose="020B0609020204030204" pitchFamily="49" charset="0"/>
+              </a:rPr>
+            </a:br>
+            <a:r>
+              <a:rPr lang="en-US" altLang="en-US" sz="1600" dirty="0">
+                <a:solidFill>
+                  <a:srgbClr val="E8BF6A"/>
+                </a:solidFill>
+                <a:latin typeface="Consolas" panose="020B0609020204030204" pitchFamily="49" charset="0"/>
+              </a:rPr>
+              <a:t>        </a:t>
+            </a:r>
+            <a:r>
+              <a:rPr lang="en-US" altLang="en-US" sz="1600" dirty="0" err="1">
+                <a:solidFill>
+                  <a:srgbClr val="9876AA"/>
+                </a:solidFill>
+                <a:latin typeface="Consolas" panose="020B0609020204030204" pitchFamily="49" charset="0"/>
+              </a:rPr>
+              <a:t>android</a:t>
+            </a:r>
+            <a:r>
+              <a:rPr lang="en-US" altLang="en-US" sz="1600" dirty="0" err="1">
+                <a:solidFill>
+                  <a:srgbClr val="BABABA"/>
+                </a:solidFill>
+                <a:latin typeface="Consolas" panose="020B0609020204030204" pitchFamily="49" charset="0"/>
+              </a:rPr>
+              <a:t>:name</a:t>
+            </a:r>
+            <a:r>
+              <a:rPr lang="en-US" altLang="en-US" sz="1600" dirty="0" smtClean="0">
+                <a:solidFill>
+                  <a:srgbClr val="BABABA"/>
+                </a:solidFill>
+                <a:latin typeface="Consolas" panose="020B0609020204030204" pitchFamily="49" charset="0"/>
+              </a:rPr>
+              <a:t>=</a:t>
+            </a:r>
+            <a:r>
+              <a:rPr lang="en-US" altLang="en-US" sz="1600" dirty="0" smtClean="0">
+                <a:solidFill>
+                  <a:srgbClr val="6A8759"/>
+                </a:solidFill>
+                <a:latin typeface="Consolas" panose="020B0609020204030204" pitchFamily="49" charset="0"/>
+              </a:rPr>
+              <a:t>"                           "</a:t>
+            </a:r>
+            <a:r>
+              <a:rPr lang="en-US" altLang="en-US" sz="1600" dirty="0">
+                <a:solidFill>
+                  <a:srgbClr val="6A8759"/>
+                </a:solidFill>
+                <a:latin typeface="Consolas" panose="020B0609020204030204" pitchFamily="49" charset="0"/>
+              </a:rPr>
+              <a:t/>
+            </a:r>
+            <a:br>
+              <a:rPr lang="en-US" altLang="en-US" sz="1600" dirty="0">
+                <a:solidFill>
+                  <a:srgbClr val="6A8759"/>
+                </a:solidFill>
+                <a:latin typeface="Consolas" panose="020B0609020204030204" pitchFamily="49" charset="0"/>
+              </a:rPr>
+            </a:br>
+            <a:r>
+              <a:rPr lang="en-US" altLang="en-US" sz="1600" dirty="0">
+                <a:solidFill>
+                  <a:srgbClr val="6A8759"/>
+                </a:solidFill>
+                <a:latin typeface="Consolas" panose="020B0609020204030204" pitchFamily="49" charset="0"/>
+              </a:rPr>
+              <a:t>        </a:t>
+            </a:r>
+            <a:r>
+              <a:rPr lang="en-US" altLang="en-US" sz="1600" dirty="0" err="1">
+                <a:solidFill>
+                  <a:srgbClr val="9876AA"/>
+                </a:solidFill>
+                <a:latin typeface="Consolas" panose="020B0609020204030204" pitchFamily="49" charset="0"/>
+              </a:rPr>
+              <a:t>android</a:t>
+            </a:r>
+            <a:r>
+              <a:rPr lang="en-US" altLang="en-US" sz="1600" dirty="0" err="1">
+                <a:solidFill>
+                  <a:srgbClr val="BABABA"/>
+                </a:solidFill>
+                <a:latin typeface="Consolas" panose="020B0609020204030204" pitchFamily="49" charset="0"/>
+              </a:rPr>
+              <a:t>:resource</a:t>
+            </a:r>
+            <a:r>
+              <a:rPr lang="en-US" altLang="en-US" sz="1600" dirty="0" smtClean="0">
+                <a:solidFill>
+                  <a:srgbClr val="BABABA"/>
+                </a:solidFill>
+                <a:latin typeface="Consolas" panose="020B0609020204030204" pitchFamily="49" charset="0"/>
+              </a:rPr>
+              <a:t>=</a:t>
+            </a:r>
+            <a:r>
+              <a:rPr lang="en-US" altLang="en-US" sz="1600" dirty="0">
+                <a:solidFill>
+                  <a:srgbClr val="6A8759"/>
+                </a:solidFill>
+                <a:latin typeface="Consolas" panose="020B0609020204030204" pitchFamily="49" charset="0"/>
+              </a:rPr>
+              <a:t>"                </a:t>
+            </a:r>
+            <a:r>
+              <a:rPr lang="en-US" altLang="en-US" sz="1600" dirty="0" smtClean="0">
+                <a:solidFill>
+                  <a:srgbClr val="6A8759"/>
+                </a:solidFill>
+                <a:latin typeface="Consolas" panose="020B0609020204030204" pitchFamily="49" charset="0"/>
+              </a:rPr>
+              <a:t>"</a:t>
+            </a:r>
+            <a:r>
+              <a:rPr lang="en-US" altLang="en-US" sz="1600" dirty="0" smtClean="0">
+                <a:solidFill>
+                  <a:srgbClr val="E8BF6A"/>
+                </a:solidFill>
+                <a:latin typeface="Consolas" panose="020B0609020204030204" pitchFamily="49" charset="0"/>
+              </a:rPr>
+              <a:t>/&gt;</a:t>
+            </a:r>
+            <a:r>
+              <a:rPr lang="en-US" altLang="en-US" sz="1600" dirty="0">
+                <a:solidFill>
+                  <a:srgbClr val="E8BF6A"/>
+                </a:solidFill>
+                <a:latin typeface="Consolas" panose="020B0609020204030204" pitchFamily="49" charset="0"/>
+              </a:rPr>
+              <a:t/>
+            </a:r>
+            <a:br>
+              <a:rPr lang="en-US" altLang="en-US" sz="1600" dirty="0">
+                <a:solidFill>
+                  <a:srgbClr val="E8BF6A"/>
+                </a:solidFill>
+                <a:latin typeface="Consolas" panose="020B0609020204030204" pitchFamily="49" charset="0"/>
+              </a:rPr>
+            </a:br>
+            <a:r>
+              <a:rPr lang="en-US" altLang="en-US" sz="1600" dirty="0">
+                <a:solidFill>
+                  <a:srgbClr val="E8BF6A"/>
+                </a:solidFill>
+                <a:latin typeface="Consolas" panose="020B0609020204030204" pitchFamily="49" charset="0"/>
+              </a:rPr>
+              <a:t>&lt;/service</a:t>
+            </a:r>
+            <a:r>
+              <a:rPr lang="en-US" altLang="en-US" sz="1600" dirty="0" smtClean="0">
+                <a:solidFill>
+                  <a:srgbClr val="E8BF6A"/>
+                </a:solidFill>
+                <a:latin typeface="Consolas" panose="020B0609020204030204" pitchFamily="49" charset="0"/>
+              </a:rPr>
+              <a:t>&gt;</a:t>
+            </a:r>
+            <a:endParaRPr lang="en-US" altLang="en-US" sz="3600" dirty="0">
+              <a:latin typeface="Consolas" panose="020B0609020204030204" pitchFamily="49" charset="0"/>
+            </a:endParaRPr>
+          </a:p>
+        </p:txBody>
+      </p:sp>
+      <p:sp>
+        <p:nvSpPr>
           <p:cNvPr id="13" name="Rectangle 1"/>
           <p:cNvSpPr>
             <a:spLocks noChangeArrowheads="1"/>
@@ -17898,6 +18059,1217 @@
                 <a:latin typeface="Consolas" panose="020B0609020204030204" pitchFamily="49" charset="0"/>
               </a:rPr>
             </a:br>
+            <a:endParaRPr lang="en-US" altLang="en-US" sz="1600" dirty="0">
+              <a:solidFill>
+                <a:srgbClr val="808080"/>
+              </a:solidFill>
+              <a:latin typeface="Consolas" panose="020B0609020204030204" pitchFamily="49" charset="0"/>
+            </a:endParaRPr>
+          </a:p>
+          <a:p>
+            <a:pPr lvl="0" eaLnBrk="0" fontAlgn="base" hangingPunct="0">
+              <a:spcBef>
+                <a:spcPct val="0"/>
+              </a:spcBef>
+              <a:spcAft>
+                <a:spcPct val="0"/>
+              </a:spcAft>
+            </a:pPr>
+            <a:endParaRPr lang="en-US" altLang="en-US" sz="1600" dirty="0">
+              <a:solidFill>
+                <a:srgbClr val="808080"/>
+              </a:solidFill>
+              <a:latin typeface="Consolas" panose="020B0609020204030204" pitchFamily="49" charset="0"/>
+            </a:endParaRPr>
+          </a:p>
+          <a:p>
+            <a:pPr lvl="0" eaLnBrk="0" fontAlgn="base" hangingPunct="0">
+              <a:spcBef>
+                <a:spcPct val="0"/>
+              </a:spcBef>
+              <a:spcAft>
+                <a:spcPct val="0"/>
+              </a:spcAft>
+            </a:pPr>
+            <a:r>
+              <a:rPr lang="en-US" altLang="en-US" sz="1600" dirty="0">
+                <a:solidFill>
+                  <a:srgbClr val="808080"/>
+                </a:solidFill>
+                <a:latin typeface="Consolas" panose="020B0609020204030204" pitchFamily="49" charset="0"/>
+              </a:rPr>
+              <a:t>    </a:t>
+            </a:r>
+            <a:r>
+              <a:rPr lang="en-US" altLang="en-US" sz="1600" dirty="0">
+                <a:solidFill>
+                  <a:srgbClr val="E8BF6A"/>
+                </a:solidFill>
+                <a:latin typeface="Consolas" panose="020B0609020204030204" pitchFamily="49" charset="0"/>
+              </a:rPr>
+              <a:t>&lt;intent-filter&gt;</a:t>
+            </a:r>
+            <a:br>
+              <a:rPr lang="en-US" altLang="en-US" sz="1600" dirty="0">
+                <a:solidFill>
+                  <a:srgbClr val="E8BF6A"/>
+                </a:solidFill>
+                <a:latin typeface="Consolas" panose="020B0609020204030204" pitchFamily="49" charset="0"/>
+              </a:rPr>
+            </a:br>
+            <a:r>
+              <a:rPr lang="en-US" altLang="en-US" sz="1600" dirty="0">
+                <a:solidFill>
+                  <a:srgbClr val="E8BF6A"/>
+                </a:solidFill>
+                <a:latin typeface="Consolas" panose="020B0609020204030204" pitchFamily="49" charset="0"/>
+              </a:rPr>
+              <a:t>        &lt;action </a:t>
+            </a:r>
+            <a:r>
+              <a:rPr lang="en-US" altLang="en-US" sz="1600" dirty="0" err="1">
+                <a:solidFill>
+                  <a:srgbClr val="9876AA"/>
+                </a:solidFill>
+                <a:latin typeface="Consolas" panose="020B0609020204030204" pitchFamily="49" charset="0"/>
+              </a:rPr>
+              <a:t>android</a:t>
+            </a:r>
+            <a:r>
+              <a:rPr lang="en-US" altLang="en-US" sz="1600" dirty="0" err="1">
+                <a:solidFill>
+                  <a:srgbClr val="BABABA"/>
+                </a:solidFill>
+                <a:latin typeface="Consolas" panose="020B0609020204030204" pitchFamily="49" charset="0"/>
+              </a:rPr>
+              <a:t>:name</a:t>
+            </a:r>
+            <a:r>
+              <a:rPr lang="en-US" altLang="en-US" sz="1600" dirty="0">
+                <a:solidFill>
+                  <a:srgbClr val="BABABA"/>
+                </a:solidFill>
+                <a:latin typeface="Consolas" panose="020B0609020204030204" pitchFamily="49" charset="0"/>
+              </a:rPr>
+              <a:t>=</a:t>
+            </a:r>
+            <a:r>
+              <a:rPr lang="en-US" altLang="en-US" sz="1600" dirty="0">
+                <a:solidFill>
+                  <a:srgbClr val="6A8759"/>
+                </a:solidFill>
+                <a:latin typeface="Consolas" panose="020B0609020204030204" pitchFamily="49" charset="0"/>
+              </a:rPr>
+              <a:t>"                           "</a:t>
+            </a:r>
+            <a:r>
+              <a:rPr lang="en-US" altLang="en-US" sz="1600" dirty="0">
+                <a:solidFill>
+                  <a:srgbClr val="E8BF6A"/>
+                </a:solidFill>
+                <a:latin typeface="Consolas" panose="020B0609020204030204" pitchFamily="49" charset="0"/>
+              </a:rPr>
+              <a:t>/&gt;</a:t>
+            </a:r>
+            <a:br>
+              <a:rPr lang="en-US" altLang="en-US" sz="1600" dirty="0">
+                <a:solidFill>
+                  <a:srgbClr val="E8BF6A"/>
+                </a:solidFill>
+                <a:latin typeface="Consolas" panose="020B0609020204030204" pitchFamily="49" charset="0"/>
+              </a:rPr>
+            </a:br>
+            <a:r>
+              <a:rPr lang="en-US" altLang="en-US" sz="1600" dirty="0">
+                <a:solidFill>
+                  <a:srgbClr val="E8BF6A"/>
+                </a:solidFill>
+                <a:latin typeface="Consolas" panose="020B0609020204030204" pitchFamily="49" charset="0"/>
+              </a:rPr>
+              <a:t>    &lt;/intent-filter&gt;</a:t>
+            </a:r>
+            <a:br>
+              <a:rPr lang="en-US" altLang="en-US" sz="1600" dirty="0">
+                <a:solidFill>
+                  <a:srgbClr val="E8BF6A"/>
+                </a:solidFill>
+                <a:latin typeface="Consolas" panose="020B0609020204030204" pitchFamily="49" charset="0"/>
+              </a:rPr>
+            </a:br>
+            <a:endParaRPr lang="en-US" altLang="en-US" sz="1600" dirty="0">
+              <a:solidFill>
+                <a:srgbClr val="E8BF6A"/>
+              </a:solidFill>
+              <a:latin typeface="Consolas" panose="020B0609020204030204" pitchFamily="49" charset="0"/>
+            </a:endParaRPr>
+          </a:p>
+          <a:p>
+            <a:pPr lvl="0" eaLnBrk="0" fontAlgn="base" hangingPunct="0">
+              <a:spcBef>
+                <a:spcPct val="0"/>
+              </a:spcBef>
+              <a:spcAft>
+                <a:spcPct val="0"/>
+              </a:spcAft>
+            </a:pPr>
+            <a:r>
+              <a:rPr lang="en-US" altLang="en-US" sz="1600" dirty="0">
+                <a:solidFill>
+                  <a:srgbClr val="808080"/>
+                </a:solidFill>
+                <a:latin typeface="Consolas" panose="020B0609020204030204" pitchFamily="49" charset="0"/>
+              </a:rPr>
+              <a:t>    </a:t>
+            </a:r>
+            <a:r>
+              <a:rPr lang="en-US" altLang="en-US" sz="1600" dirty="0">
+                <a:solidFill>
+                  <a:srgbClr val="E8BF6A"/>
+                </a:solidFill>
+                <a:latin typeface="Consolas" panose="020B0609020204030204" pitchFamily="49" charset="0"/>
+              </a:rPr>
+              <a:t>&lt;meta-data</a:t>
+            </a:r>
+            <a:br>
+              <a:rPr lang="en-US" altLang="en-US" sz="1600" dirty="0">
+                <a:solidFill>
+                  <a:srgbClr val="E8BF6A"/>
+                </a:solidFill>
+                <a:latin typeface="Consolas" panose="020B0609020204030204" pitchFamily="49" charset="0"/>
+              </a:rPr>
+            </a:br>
+            <a:r>
+              <a:rPr lang="en-US" altLang="en-US" sz="1600" dirty="0">
+                <a:solidFill>
+                  <a:srgbClr val="E8BF6A"/>
+                </a:solidFill>
+                <a:latin typeface="Consolas" panose="020B0609020204030204" pitchFamily="49" charset="0"/>
+              </a:rPr>
+              <a:t>        </a:t>
+            </a:r>
+            <a:r>
+              <a:rPr lang="en-US" altLang="en-US" sz="1600" dirty="0" err="1">
+                <a:solidFill>
+                  <a:srgbClr val="9876AA"/>
+                </a:solidFill>
+                <a:latin typeface="Consolas" panose="020B0609020204030204" pitchFamily="49" charset="0"/>
+              </a:rPr>
+              <a:t>android</a:t>
+            </a:r>
+            <a:r>
+              <a:rPr lang="en-US" altLang="en-US" sz="1600" dirty="0" err="1">
+                <a:solidFill>
+                  <a:srgbClr val="BABABA"/>
+                </a:solidFill>
+                <a:latin typeface="Consolas" panose="020B0609020204030204" pitchFamily="49" charset="0"/>
+              </a:rPr>
+              <a:t>:name</a:t>
+            </a:r>
+            <a:r>
+              <a:rPr lang="en-US" altLang="en-US" sz="1600" dirty="0">
+                <a:solidFill>
+                  <a:srgbClr val="BABABA"/>
+                </a:solidFill>
+                <a:latin typeface="Consolas" panose="020B0609020204030204" pitchFamily="49" charset="0"/>
+              </a:rPr>
+              <a:t>=</a:t>
+            </a:r>
+            <a:r>
+              <a:rPr lang="en-US" altLang="en-US" sz="1600" dirty="0">
+                <a:solidFill>
+                  <a:srgbClr val="6A8759"/>
+                </a:solidFill>
+                <a:latin typeface="Consolas" panose="020B0609020204030204" pitchFamily="49" charset="0"/>
+              </a:rPr>
+              <a:t>"                           "</a:t>
+            </a:r>
+            <a:br>
+              <a:rPr lang="en-US" altLang="en-US" sz="1600" dirty="0">
+                <a:solidFill>
+                  <a:srgbClr val="6A8759"/>
+                </a:solidFill>
+                <a:latin typeface="Consolas" panose="020B0609020204030204" pitchFamily="49" charset="0"/>
+              </a:rPr>
+            </a:br>
+            <a:r>
+              <a:rPr lang="en-US" altLang="en-US" sz="1600" dirty="0">
+                <a:solidFill>
+                  <a:srgbClr val="6A8759"/>
+                </a:solidFill>
+                <a:latin typeface="Consolas" panose="020B0609020204030204" pitchFamily="49" charset="0"/>
+              </a:rPr>
+              <a:t>        </a:t>
+            </a:r>
+            <a:r>
+              <a:rPr lang="en-US" altLang="en-US" sz="1600" dirty="0" err="1">
+                <a:solidFill>
+                  <a:srgbClr val="9876AA"/>
+                </a:solidFill>
+                <a:latin typeface="Consolas" panose="020B0609020204030204" pitchFamily="49" charset="0"/>
+              </a:rPr>
+              <a:t>android</a:t>
+            </a:r>
+            <a:r>
+              <a:rPr lang="en-US" altLang="en-US" sz="1600" dirty="0" err="1">
+                <a:solidFill>
+                  <a:srgbClr val="BABABA"/>
+                </a:solidFill>
+                <a:latin typeface="Consolas" panose="020B0609020204030204" pitchFamily="49" charset="0"/>
+              </a:rPr>
+              <a:t>:resource</a:t>
+            </a:r>
+            <a:r>
+              <a:rPr lang="en-US" altLang="en-US" sz="1600" dirty="0">
+                <a:solidFill>
+                  <a:srgbClr val="BABABA"/>
+                </a:solidFill>
+                <a:latin typeface="Consolas" panose="020B0609020204030204" pitchFamily="49" charset="0"/>
+              </a:rPr>
+              <a:t>=</a:t>
+            </a:r>
+            <a:r>
+              <a:rPr lang="en-US" altLang="en-US" sz="1600" dirty="0">
+                <a:solidFill>
+                  <a:srgbClr val="6A8759"/>
+                </a:solidFill>
+                <a:latin typeface="Consolas" panose="020B0609020204030204" pitchFamily="49" charset="0"/>
+              </a:rPr>
+              <a:t>"                "</a:t>
+            </a:r>
+            <a:r>
+              <a:rPr lang="en-US" altLang="en-US" sz="1600" dirty="0">
+                <a:solidFill>
+                  <a:srgbClr val="E8BF6A"/>
+                </a:solidFill>
+                <a:latin typeface="Consolas" panose="020B0609020204030204" pitchFamily="49" charset="0"/>
+              </a:rPr>
+              <a:t>/&gt;</a:t>
+            </a:r>
+            <a:br>
+              <a:rPr lang="en-US" altLang="en-US" sz="1600" dirty="0">
+                <a:solidFill>
+                  <a:srgbClr val="E8BF6A"/>
+                </a:solidFill>
+                <a:latin typeface="Consolas" panose="020B0609020204030204" pitchFamily="49" charset="0"/>
+              </a:rPr>
+            </a:br>
+            <a:r>
+              <a:rPr lang="en-US" altLang="en-US" sz="1600" dirty="0">
+                <a:solidFill>
+                  <a:srgbClr val="E8BF6A"/>
+                </a:solidFill>
+                <a:latin typeface="Consolas" panose="020B0609020204030204" pitchFamily="49" charset="0"/>
+              </a:rPr>
+              <a:t>&lt;/service&gt;</a:t>
+            </a:r>
+            <a:endParaRPr lang="en-US" altLang="en-US" sz="3600" dirty="0">
+              <a:latin typeface="Consolas" panose="020B0609020204030204" pitchFamily="49" charset="0"/>
+            </a:endParaRPr>
+          </a:p>
+        </p:txBody>
+      </p:sp>
+      <p:sp>
+        <p:nvSpPr>
+          <p:cNvPr id="4" name="Rectangle 1"/>
+          <p:cNvSpPr>
+            <a:spLocks noChangeArrowheads="1"/>
+          </p:cNvSpPr>
+          <p:nvPr/>
+        </p:nvSpPr>
+        <p:spPr bwMode="auto">
+          <a:xfrm>
+            <a:off x="652500" y="2132856"/>
+            <a:ext cx="10887000" cy="4104456"/>
+          </a:xfrm>
+          <a:prstGeom prst="rect">
+            <a:avLst/>
+          </a:prstGeom>
+          <a:solidFill>
+            <a:srgbClr val="2B2B2B"/>
+          </a:solidFill>
+          <a:ln>
+            <a:noFill/>
+          </a:ln>
+          <a:effectLst/>
+          <a:extLst>
+            <a:ext uri="{91240B29-F687-4F45-9708-019B960494DF}">
+              <a14:hiddenLine xmlns:a14="http://schemas.microsoft.com/office/drawing/2010/main" w="9525">
+                <a:solidFill>
+                  <a:schemeClr val="tx1"/>
+                </a:solidFill>
+                <a:miter lim="800000"/>
+                <a:headEnd/>
+                <a:tailEnd/>
+              </a14:hiddenLine>
+            </a:ext>
+            <a:ext uri="{AF507438-7753-43E0-B8FC-AC1667EBCBE1}">
+              <a14:hiddenEffects xmlns:a14="http://schemas.microsoft.com/office/drawing/2010/main">
+                <a:effectLst>
+                  <a:outerShdw dist="35921" dir="2700000" algn="ctr" rotWithShape="0">
+                    <a:schemeClr val="bg2"/>
+                  </a:outerShdw>
+                </a:effectLst>
+              </a14:hiddenEffects>
+            </a:ext>
+          </a:extLst>
+        </p:spPr>
+        <p:txBody>
+          <a:bodyPr vert="horz" wrap="square" lIns="182880" tIns="182880" rIns="182880" bIns="182880" numCol="1" anchor="t" anchorCtr="0" compatLnSpc="1">
+            <a:prstTxWarp prst="textNoShape">
+              <a:avLst/>
+            </a:prstTxWarp>
+            <a:noAutofit/>
+          </a:bodyPr>
+          <a:lstStyle/>
+          <a:p>
+            <a:pPr lvl="0" eaLnBrk="0" fontAlgn="base" hangingPunct="0">
+              <a:spcBef>
+                <a:spcPct val="0"/>
+              </a:spcBef>
+              <a:spcAft>
+                <a:spcPct val="0"/>
+              </a:spcAft>
+            </a:pPr>
+            <a:r>
+              <a:rPr lang="en-US" altLang="en-US" sz="1600" dirty="0">
+                <a:solidFill>
+                  <a:srgbClr val="808080"/>
+                </a:solidFill>
+                <a:latin typeface="Consolas" panose="020B0609020204030204" pitchFamily="49" charset="0"/>
+              </a:rPr>
+              <a:t>&lt;!-- This service implements our </a:t>
+            </a:r>
+            <a:r>
+              <a:rPr lang="en-US" altLang="en-US" sz="1600" dirty="0" err="1">
+                <a:solidFill>
+                  <a:srgbClr val="808080"/>
+                </a:solidFill>
+                <a:latin typeface="Consolas" panose="020B0609020204030204" pitchFamily="49" charset="0"/>
+              </a:rPr>
+              <a:t>SyncAdapter</a:t>
+            </a:r>
+            <a:r>
+              <a:rPr lang="en-US" altLang="en-US" sz="1600" dirty="0">
+                <a:solidFill>
+                  <a:srgbClr val="808080"/>
+                </a:solidFill>
+                <a:latin typeface="Consolas" panose="020B0609020204030204" pitchFamily="49" charset="0"/>
+              </a:rPr>
+              <a:t>. It needs to be exported, so that the system</a:t>
+            </a:r>
+            <a:br>
+              <a:rPr lang="en-US" altLang="en-US" sz="1600" dirty="0">
+                <a:solidFill>
+                  <a:srgbClr val="808080"/>
+                </a:solidFill>
+                <a:latin typeface="Consolas" panose="020B0609020204030204" pitchFamily="49" charset="0"/>
+              </a:rPr>
+            </a:br>
+            <a:r>
+              <a:rPr lang="en-US" altLang="en-US" sz="1600" dirty="0" smtClean="0">
+                <a:solidFill>
+                  <a:srgbClr val="808080"/>
+                </a:solidFill>
+                <a:latin typeface="Consolas" panose="020B0609020204030204" pitchFamily="49" charset="0"/>
+              </a:rPr>
+              <a:t>     sync </a:t>
+            </a:r>
+            <a:r>
+              <a:rPr lang="en-US" altLang="en-US" sz="1600" dirty="0">
+                <a:solidFill>
+                  <a:srgbClr val="808080"/>
+                </a:solidFill>
+                <a:latin typeface="Consolas" panose="020B0609020204030204" pitchFamily="49" charset="0"/>
+              </a:rPr>
+              <a:t>framework can access it. --&gt;</a:t>
+            </a:r>
+            <a:br>
+              <a:rPr lang="en-US" altLang="en-US" sz="1600" dirty="0">
+                <a:solidFill>
+                  <a:srgbClr val="808080"/>
+                </a:solidFill>
+                <a:latin typeface="Consolas" panose="020B0609020204030204" pitchFamily="49" charset="0"/>
+              </a:rPr>
+            </a:br>
+            <a:r>
+              <a:rPr lang="en-US" altLang="en-US" sz="1600" dirty="0">
+                <a:solidFill>
+                  <a:srgbClr val="E8BF6A"/>
+                </a:solidFill>
+                <a:latin typeface="Consolas" panose="020B0609020204030204" pitchFamily="49" charset="0"/>
+              </a:rPr>
+              <a:t>&lt;service</a:t>
+            </a:r>
+            <a:br>
+              <a:rPr lang="en-US" altLang="en-US" sz="1600" dirty="0">
+                <a:solidFill>
+                  <a:srgbClr val="E8BF6A"/>
+                </a:solidFill>
+                <a:latin typeface="Consolas" panose="020B0609020204030204" pitchFamily="49" charset="0"/>
+              </a:rPr>
+            </a:br>
+            <a:r>
+              <a:rPr lang="en-US" altLang="en-US" sz="1600" dirty="0">
+                <a:solidFill>
+                  <a:srgbClr val="E8BF6A"/>
+                </a:solidFill>
+                <a:latin typeface="Consolas" panose="020B0609020204030204" pitchFamily="49" charset="0"/>
+              </a:rPr>
+              <a:t>    </a:t>
+            </a:r>
+            <a:r>
+              <a:rPr lang="en-US" altLang="en-US" sz="1600" dirty="0" err="1">
+                <a:solidFill>
+                  <a:srgbClr val="9876AA"/>
+                </a:solidFill>
+                <a:latin typeface="Consolas" panose="020B0609020204030204" pitchFamily="49" charset="0"/>
+              </a:rPr>
+              <a:t>android</a:t>
+            </a:r>
+            <a:r>
+              <a:rPr lang="en-US" altLang="en-US" sz="1600" dirty="0" err="1">
+                <a:solidFill>
+                  <a:srgbClr val="BABABA"/>
+                </a:solidFill>
+                <a:latin typeface="Consolas" panose="020B0609020204030204" pitchFamily="49" charset="0"/>
+              </a:rPr>
+              <a:t>:name</a:t>
+            </a:r>
+            <a:r>
+              <a:rPr lang="en-US" altLang="en-US" sz="1600" dirty="0">
+                <a:solidFill>
+                  <a:srgbClr val="BABABA"/>
+                </a:solidFill>
+                <a:latin typeface="Consolas" panose="020B0609020204030204" pitchFamily="49" charset="0"/>
+              </a:rPr>
+              <a:t>=</a:t>
+            </a:r>
+            <a:r>
+              <a:rPr lang="en-US" altLang="en-US" sz="1600" dirty="0">
+                <a:solidFill>
+                  <a:srgbClr val="6A8759"/>
+                </a:solidFill>
+                <a:latin typeface="Consolas" panose="020B0609020204030204" pitchFamily="49" charset="0"/>
+              </a:rPr>
+              <a:t>".</a:t>
+            </a:r>
+            <a:r>
+              <a:rPr lang="en-US" altLang="en-US" sz="1600" dirty="0" err="1">
+                <a:solidFill>
+                  <a:srgbClr val="6A8759"/>
+                </a:solidFill>
+                <a:latin typeface="Consolas" panose="020B0609020204030204" pitchFamily="49" charset="0"/>
+              </a:rPr>
+              <a:t>sync.SyncService</a:t>
+            </a:r>
+            <a:r>
+              <a:rPr lang="en-US" altLang="en-US" sz="1600" dirty="0">
+                <a:solidFill>
+                  <a:srgbClr val="6A8759"/>
+                </a:solidFill>
+                <a:latin typeface="Consolas" panose="020B0609020204030204" pitchFamily="49" charset="0"/>
+              </a:rPr>
+              <a:t>"</a:t>
+            </a:r>
+            <a:br>
+              <a:rPr lang="en-US" altLang="en-US" sz="1600" dirty="0">
+                <a:solidFill>
+                  <a:srgbClr val="6A8759"/>
+                </a:solidFill>
+                <a:latin typeface="Consolas" panose="020B0609020204030204" pitchFamily="49" charset="0"/>
+              </a:rPr>
+            </a:br>
+            <a:r>
+              <a:rPr lang="en-US" altLang="en-US" sz="1600" dirty="0">
+                <a:solidFill>
+                  <a:srgbClr val="6A8759"/>
+                </a:solidFill>
+                <a:latin typeface="Consolas" panose="020B0609020204030204" pitchFamily="49" charset="0"/>
+              </a:rPr>
+              <a:t>    </a:t>
+            </a:r>
+            <a:r>
+              <a:rPr lang="en-US" altLang="en-US" sz="1600" dirty="0" err="1">
+                <a:solidFill>
+                  <a:srgbClr val="9876AA"/>
+                </a:solidFill>
+                <a:latin typeface="Consolas" panose="020B0609020204030204" pitchFamily="49" charset="0"/>
+              </a:rPr>
+              <a:t>android</a:t>
+            </a:r>
+            <a:r>
+              <a:rPr lang="en-US" altLang="en-US" sz="1600" dirty="0" err="1">
+                <a:solidFill>
+                  <a:srgbClr val="BABABA"/>
+                </a:solidFill>
+                <a:latin typeface="Consolas" panose="020B0609020204030204" pitchFamily="49" charset="0"/>
+              </a:rPr>
+              <a:t>:exported</a:t>
+            </a:r>
+            <a:r>
+              <a:rPr lang="en-US" altLang="en-US" sz="1600" dirty="0">
+                <a:solidFill>
+                  <a:srgbClr val="BABABA"/>
+                </a:solidFill>
+                <a:latin typeface="Consolas" panose="020B0609020204030204" pitchFamily="49" charset="0"/>
+              </a:rPr>
+              <a:t>=</a:t>
+            </a:r>
+            <a:r>
+              <a:rPr lang="en-US" altLang="en-US" sz="1600" dirty="0">
+                <a:solidFill>
+                  <a:srgbClr val="6A8759"/>
+                </a:solidFill>
+                <a:latin typeface="Consolas" panose="020B0609020204030204" pitchFamily="49" charset="0"/>
+              </a:rPr>
+              <a:t>"true"</a:t>
+            </a:r>
+            <a:r>
+              <a:rPr lang="en-US" altLang="en-US" sz="1600" dirty="0">
+                <a:solidFill>
+                  <a:srgbClr val="E8BF6A"/>
+                </a:solidFill>
+                <a:latin typeface="Consolas" panose="020B0609020204030204" pitchFamily="49" charset="0"/>
+              </a:rPr>
+              <a:t>&gt;</a:t>
+            </a:r>
+            <a:br>
+              <a:rPr lang="en-US" altLang="en-US" sz="1600" dirty="0">
+                <a:solidFill>
+                  <a:srgbClr val="E8BF6A"/>
+                </a:solidFill>
+                <a:latin typeface="Consolas" panose="020B0609020204030204" pitchFamily="49" charset="0"/>
+              </a:rPr>
+            </a:br>
+            <a:r>
+              <a:rPr lang="en-US" altLang="en-US" sz="1600" dirty="0">
+                <a:solidFill>
+                  <a:srgbClr val="E8BF6A"/>
+                </a:solidFill>
+                <a:latin typeface="Consolas" panose="020B0609020204030204" pitchFamily="49" charset="0"/>
+              </a:rPr>
+              <a:t>    </a:t>
+            </a:r>
+            <a:r>
+              <a:rPr lang="en-US" altLang="en-US" sz="1600" dirty="0">
+                <a:solidFill>
+                  <a:srgbClr val="808080"/>
+                </a:solidFill>
+                <a:latin typeface="Consolas" panose="020B0609020204030204" pitchFamily="49" charset="0"/>
+              </a:rPr>
+              <a:t>&lt;!-- This intent filter is required. It allows the system to launch our sync service</a:t>
+            </a:r>
+            <a:br>
+              <a:rPr lang="en-US" altLang="en-US" sz="1600" dirty="0">
+                <a:solidFill>
+                  <a:srgbClr val="808080"/>
+                </a:solidFill>
+                <a:latin typeface="Consolas" panose="020B0609020204030204" pitchFamily="49" charset="0"/>
+              </a:rPr>
+            </a:br>
+            <a:r>
+              <a:rPr lang="en-US" altLang="en-US" sz="1600" dirty="0">
+                <a:solidFill>
+                  <a:srgbClr val="808080"/>
+                </a:solidFill>
+                <a:latin typeface="Consolas" panose="020B0609020204030204" pitchFamily="49" charset="0"/>
+              </a:rPr>
+              <a:t>    </a:t>
+            </a:r>
+            <a:r>
+              <a:rPr lang="en-US" altLang="en-US" sz="1600" dirty="0" smtClean="0">
+                <a:solidFill>
+                  <a:srgbClr val="808080"/>
+                </a:solidFill>
+                <a:latin typeface="Consolas" panose="020B0609020204030204" pitchFamily="49" charset="0"/>
+              </a:rPr>
+              <a:t>     as </a:t>
+            </a:r>
+            <a:r>
+              <a:rPr lang="en-US" altLang="en-US" sz="1600" dirty="0">
+                <a:solidFill>
+                  <a:srgbClr val="808080"/>
+                </a:solidFill>
+                <a:latin typeface="Consolas" panose="020B0609020204030204" pitchFamily="49" charset="0"/>
+              </a:rPr>
+              <a:t>needed. --&gt;</a:t>
+            </a:r>
+            <a:br>
+              <a:rPr lang="en-US" altLang="en-US" sz="1600" dirty="0">
+                <a:solidFill>
+                  <a:srgbClr val="808080"/>
+                </a:solidFill>
+                <a:latin typeface="Consolas" panose="020B0609020204030204" pitchFamily="49" charset="0"/>
+              </a:rPr>
+            </a:br>
+            <a:r>
+              <a:rPr lang="en-US" altLang="en-US" sz="1600" dirty="0">
+                <a:solidFill>
+                  <a:srgbClr val="808080"/>
+                </a:solidFill>
+                <a:latin typeface="Consolas" panose="020B0609020204030204" pitchFamily="49" charset="0"/>
+              </a:rPr>
+              <a:t>    </a:t>
+            </a:r>
+            <a:r>
+              <a:rPr lang="en-US" altLang="en-US" sz="1600" dirty="0">
+                <a:solidFill>
+                  <a:srgbClr val="E8BF6A"/>
+                </a:solidFill>
+                <a:latin typeface="Consolas" panose="020B0609020204030204" pitchFamily="49" charset="0"/>
+              </a:rPr>
+              <a:t>&lt;intent-filter&gt;</a:t>
+            </a:r>
+            <a:br>
+              <a:rPr lang="en-US" altLang="en-US" sz="1600" dirty="0">
+                <a:solidFill>
+                  <a:srgbClr val="E8BF6A"/>
+                </a:solidFill>
+                <a:latin typeface="Consolas" panose="020B0609020204030204" pitchFamily="49" charset="0"/>
+              </a:rPr>
+            </a:br>
+            <a:r>
+              <a:rPr lang="en-US" altLang="en-US" sz="1600" dirty="0">
+                <a:solidFill>
+                  <a:srgbClr val="E8BF6A"/>
+                </a:solidFill>
+                <a:latin typeface="Consolas" panose="020B0609020204030204" pitchFamily="49" charset="0"/>
+              </a:rPr>
+              <a:t>        &lt;action </a:t>
+            </a:r>
+            <a:r>
+              <a:rPr lang="en-US" altLang="en-US" sz="1600" dirty="0" err="1">
+                <a:solidFill>
+                  <a:srgbClr val="9876AA"/>
+                </a:solidFill>
+                <a:latin typeface="Consolas" panose="020B0609020204030204" pitchFamily="49" charset="0"/>
+              </a:rPr>
+              <a:t>android</a:t>
+            </a:r>
+            <a:r>
+              <a:rPr lang="en-US" altLang="en-US" sz="1600" dirty="0" err="1">
+                <a:solidFill>
+                  <a:srgbClr val="BABABA"/>
+                </a:solidFill>
+                <a:latin typeface="Consolas" panose="020B0609020204030204" pitchFamily="49" charset="0"/>
+              </a:rPr>
+              <a:t>:name</a:t>
+            </a:r>
+            <a:r>
+              <a:rPr lang="en-US" altLang="en-US" sz="1600" dirty="0">
+                <a:solidFill>
+                  <a:srgbClr val="BABABA"/>
+                </a:solidFill>
+                <a:latin typeface="Consolas" panose="020B0609020204030204" pitchFamily="49" charset="0"/>
+              </a:rPr>
+              <a:t>=</a:t>
+            </a:r>
+            <a:r>
+              <a:rPr lang="en-US" altLang="en-US" sz="1600" dirty="0">
+                <a:solidFill>
+                  <a:srgbClr val="6A8759"/>
+                </a:solidFill>
+                <a:latin typeface="Consolas" panose="020B0609020204030204" pitchFamily="49" charset="0"/>
+              </a:rPr>
+              <a:t>"</a:t>
+            </a:r>
+            <a:r>
+              <a:rPr lang="en-US" altLang="en-US" sz="1600" dirty="0" err="1">
+                <a:solidFill>
+                  <a:srgbClr val="6A8759"/>
+                </a:solidFill>
+                <a:latin typeface="Consolas" panose="020B0609020204030204" pitchFamily="49" charset="0"/>
+              </a:rPr>
+              <a:t>android.content.SyncAdapter</a:t>
+            </a:r>
+            <a:r>
+              <a:rPr lang="en-US" altLang="en-US" sz="1600" dirty="0">
+                <a:solidFill>
+                  <a:srgbClr val="6A8759"/>
+                </a:solidFill>
+                <a:latin typeface="Consolas" panose="020B0609020204030204" pitchFamily="49" charset="0"/>
+              </a:rPr>
+              <a:t>"</a:t>
+            </a:r>
+            <a:r>
+              <a:rPr lang="en-US" altLang="en-US" sz="1600" dirty="0">
+                <a:solidFill>
+                  <a:srgbClr val="E8BF6A"/>
+                </a:solidFill>
+                <a:latin typeface="Consolas" panose="020B0609020204030204" pitchFamily="49" charset="0"/>
+              </a:rPr>
+              <a:t>/&gt;</a:t>
+            </a:r>
+            <a:br>
+              <a:rPr lang="en-US" altLang="en-US" sz="1600" dirty="0">
+                <a:solidFill>
+                  <a:srgbClr val="E8BF6A"/>
+                </a:solidFill>
+                <a:latin typeface="Consolas" panose="020B0609020204030204" pitchFamily="49" charset="0"/>
+              </a:rPr>
+            </a:br>
+            <a:r>
+              <a:rPr lang="en-US" altLang="en-US" sz="1600" dirty="0">
+                <a:solidFill>
+                  <a:srgbClr val="E8BF6A"/>
+                </a:solidFill>
+                <a:latin typeface="Consolas" panose="020B0609020204030204" pitchFamily="49" charset="0"/>
+              </a:rPr>
+              <a:t>    &lt;/intent-filter&gt;</a:t>
+            </a:r>
+            <a:br>
+              <a:rPr lang="en-US" altLang="en-US" sz="1600" dirty="0">
+                <a:solidFill>
+                  <a:srgbClr val="E8BF6A"/>
+                </a:solidFill>
+                <a:latin typeface="Consolas" panose="020B0609020204030204" pitchFamily="49" charset="0"/>
+              </a:rPr>
+            </a:br>
+            <a:endParaRPr lang="en-US" altLang="en-US" sz="1600" dirty="0">
+              <a:solidFill>
+                <a:srgbClr val="E8BF6A"/>
+              </a:solidFill>
+              <a:latin typeface="Consolas" panose="020B0609020204030204" pitchFamily="49" charset="0"/>
+            </a:endParaRPr>
+          </a:p>
+          <a:p>
+            <a:pPr lvl="0" eaLnBrk="0" fontAlgn="base" hangingPunct="0">
+              <a:spcBef>
+                <a:spcPct val="0"/>
+              </a:spcBef>
+              <a:spcAft>
+                <a:spcPct val="0"/>
+              </a:spcAft>
+            </a:pPr>
+            <a:r>
+              <a:rPr lang="en-US" altLang="en-US" sz="1600" dirty="0">
+                <a:solidFill>
+                  <a:srgbClr val="808080"/>
+                </a:solidFill>
+                <a:latin typeface="Consolas" panose="020B0609020204030204" pitchFamily="49" charset="0"/>
+              </a:rPr>
+              <a:t>    </a:t>
+            </a:r>
+            <a:r>
+              <a:rPr lang="en-US" altLang="en-US" sz="1600" dirty="0">
+                <a:solidFill>
+                  <a:srgbClr val="E8BF6A"/>
+                </a:solidFill>
+                <a:latin typeface="Consolas" panose="020B0609020204030204" pitchFamily="49" charset="0"/>
+              </a:rPr>
+              <a:t>&lt;meta-data</a:t>
+            </a:r>
+            <a:br>
+              <a:rPr lang="en-US" altLang="en-US" sz="1600" dirty="0">
+                <a:solidFill>
+                  <a:srgbClr val="E8BF6A"/>
+                </a:solidFill>
+                <a:latin typeface="Consolas" panose="020B0609020204030204" pitchFamily="49" charset="0"/>
+              </a:rPr>
+            </a:br>
+            <a:r>
+              <a:rPr lang="en-US" altLang="en-US" sz="1600" dirty="0">
+                <a:solidFill>
+                  <a:srgbClr val="E8BF6A"/>
+                </a:solidFill>
+                <a:latin typeface="Consolas" panose="020B0609020204030204" pitchFamily="49" charset="0"/>
+              </a:rPr>
+              <a:t>        </a:t>
+            </a:r>
+            <a:r>
+              <a:rPr lang="en-US" altLang="en-US" sz="1600" dirty="0" err="1">
+                <a:solidFill>
+                  <a:srgbClr val="9876AA"/>
+                </a:solidFill>
+                <a:latin typeface="Consolas" panose="020B0609020204030204" pitchFamily="49" charset="0"/>
+              </a:rPr>
+              <a:t>android</a:t>
+            </a:r>
+            <a:r>
+              <a:rPr lang="en-US" altLang="en-US" sz="1600" dirty="0" err="1">
+                <a:solidFill>
+                  <a:srgbClr val="BABABA"/>
+                </a:solidFill>
+                <a:latin typeface="Consolas" panose="020B0609020204030204" pitchFamily="49" charset="0"/>
+              </a:rPr>
+              <a:t>:name</a:t>
+            </a:r>
+            <a:r>
+              <a:rPr lang="en-US" altLang="en-US" sz="1600" dirty="0">
+                <a:solidFill>
+                  <a:srgbClr val="BABABA"/>
+                </a:solidFill>
+                <a:latin typeface="Consolas" panose="020B0609020204030204" pitchFamily="49" charset="0"/>
+              </a:rPr>
+              <a:t>=</a:t>
+            </a:r>
+            <a:r>
+              <a:rPr lang="en-US" altLang="en-US" sz="1600" dirty="0">
+                <a:solidFill>
+                  <a:srgbClr val="6A8759"/>
+                </a:solidFill>
+                <a:latin typeface="Consolas" panose="020B0609020204030204" pitchFamily="49" charset="0"/>
+              </a:rPr>
+              <a:t>"                           "</a:t>
+            </a:r>
+            <a:br>
+              <a:rPr lang="en-US" altLang="en-US" sz="1600" dirty="0">
+                <a:solidFill>
+                  <a:srgbClr val="6A8759"/>
+                </a:solidFill>
+                <a:latin typeface="Consolas" panose="020B0609020204030204" pitchFamily="49" charset="0"/>
+              </a:rPr>
+            </a:br>
+            <a:r>
+              <a:rPr lang="en-US" altLang="en-US" sz="1600" dirty="0">
+                <a:solidFill>
+                  <a:srgbClr val="6A8759"/>
+                </a:solidFill>
+                <a:latin typeface="Consolas" panose="020B0609020204030204" pitchFamily="49" charset="0"/>
+              </a:rPr>
+              <a:t>        </a:t>
+            </a:r>
+            <a:r>
+              <a:rPr lang="en-US" altLang="en-US" sz="1600" dirty="0" err="1">
+                <a:solidFill>
+                  <a:srgbClr val="9876AA"/>
+                </a:solidFill>
+                <a:latin typeface="Consolas" panose="020B0609020204030204" pitchFamily="49" charset="0"/>
+              </a:rPr>
+              <a:t>android</a:t>
+            </a:r>
+            <a:r>
+              <a:rPr lang="en-US" altLang="en-US" sz="1600" dirty="0" err="1">
+                <a:solidFill>
+                  <a:srgbClr val="BABABA"/>
+                </a:solidFill>
+                <a:latin typeface="Consolas" panose="020B0609020204030204" pitchFamily="49" charset="0"/>
+              </a:rPr>
+              <a:t>:resource</a:t>
+            </a:r>
+            <a:r>
+              <a:rPr lang="en-US" altLang="en-US" sz="1600" dirty="0">
+                <a:solidFill>
+                  <a:srgbClr val="BABABA"/>
+                </a:solidFill>
+                <a:latin typeface="Consolas" panose="020B0609020204030204" pitchFamily="49" charset="0"/>
+              </a:rPr>
+              <a:t>=</a:t>
+            </a:r>
+            <a:r>
+              <a:rPr lang="en-US" altLang="en-US" sz="1600" dirty="0">
+                <a:solidFill>
+                  <a:srgbClr val="6A8759"/>
+                </a:solidFill>
+                <a:latin typeface="Consolas" panose="020B0609020204030204" pitchFamily="49" charset="0"/>
+              </a:rPr>
+              <a:t>"                "</a:t>
+            </a:r>
+            <a:r>
+              <a:rPr lang="en-US" altLang="en-US" sz="1600" dirty="0">
+                <a:solidFill>
+                  <a:srgbClr val="E8BF6A"/>
+                </a:solidFill>
+                <a:latin typeface="Consolas" panose="020B0609020204030204" pitchFamily="49" charset="0"/>
+              </a:rPr>
+              <a:t>/&gt;</a:t>
+            </a:r>
+            <a:br>
+              <a:rPr lang="en-US" altLang="en-US" sz="1600" dirty="0">
+                <a:solidFill>
+                  <a:srgbClr val="E8BF6A"/>
+                </a:solidFill>
+                <a:latin typeface="Consolas" panose="020B0609020204030204" pitchFamily="49" charset="0"/>
+              </a:rPr>
+            </a:br>
+            <a:r>
+              <a:rPr lang="en-US" altLang="en-US" sz="1600" dirty="0">
+                <a:solidFill>
+                  <a:srgbClr val="E8BF6A"/>
+                </a:solidFill>
+                <a:latin typeface="Consolas" panose="020B0609020204030204" pitchFamily="49" charset="0"/>
+              </a:rPr>
+              <a:t>&lt;/service&gt;</a:t>
+            </a:r>
+            <a:endParaRPr lang="en-US" altLang="en-US" sz="3600" dirty="0">
+              <a:latin typeface="Consolas" panose="020B0609020204030204" pitchFamily="49" charset="0"/>
+            </a:endParaRPr>
+          </a:p>
+        </p:txBody>
+      </p:sp>
+      <p:sp>
+        <p:nvSpPr>
+          <p:cNvPr id="5" name="Rectangle 1"/>
+          <p:cNvSpPr>
+            <a:spLocks noChangeArrowheads="1"/>
+          </p:cNvSpPr>
+          <p:nvPr/>
+        </p:nvSpPr>
+        <p:spPr bwMode="auto">
+          <a:xfrm>
+            <a:off x="652500" y="2132856"/>
+            <a:ext cx="10887000" cy="4104456"/>
+          </a:xfrm>
+          <a:prstGeom prst="rect">
+            <a:avLst/>
+          </a:prstGeom>
+          <a:solidFill>
+            <a:srgbClr val="2B2B2B"/>
+          </a:solidFill>
+          <a:ln>
+            <a:noFill/>
+          </a:ln>
+          <a:effectLst/>
+          <a:extLst>
+            <a:ext uri="{91240B29-F687-4F45-9708-019B960494DF}">
+              <a14:hiddenLine xmlns:a14="http://schemas.microsoft.com/office/drawing/2010/main" w="9525">
+                <a:solidFill>
+                  <a:schemeClr val="tx1"/>
+                </a:solidFill>
+                <a:miter lim="800000"/>
+                <a:headEnd/>
+                <a:tailEnd/>
+              </a14:hiddenLine>
+            </a:ext>
+            <a:ext uri="{AF507438-7753-43E0-B8FC-AC1667EBCBE1}">
+              <a14:hiddenEffects xmlns:a14="http://schemas.microsoft.com/office/drawing/2010/main">
+                <a:effectLst>
+                  <a:outerShdw dist="35921" dir="2700000" algn="ctr" rotWithShape="0">
+                    <a:schemeClr val="bg2"/>
+                  </a:outerShdw>
+                </a:effectLst>
+              </a14:hiddenEffects>
+            </a:ext>
+          </a:extLst>
+        </p:spPr>
+        <p:txBody>
+          <a:bodyPr vert="horz" wrap="square" lIns="182880" tIns="182880" rIns="182880" bIns="182880" numCol="1" anchor="t" anchorCtr="0" compatLnSpc="1">
+            <a:prstTxWarp prst="textNoShape">
+              <a:avLst/>
+            </a:prstTxWarp>
+            <a:noAutofit/>
+          </a:bodyPr>
+          <a:lstStyle/>
+          <a:p>
+            <a:pPr lvl="0" eaLnBrk="0" fontAlgn="base" hangingPunct="0">
+              <a:spcBef>
+                <a:spcPct val="0"/>
+              </a:spcBef>
+              <a:spcAft>
+                <a:spcPct val="0"/>
+              </a:spcAft>
+            </a:pPr>
+            <a:r>
+              <a:rPr lang="en-US" altLang="en-US" sz="1600" dirty="0">
+                <a:solidFill>
+                  <a:srgbClr val="808080"/>
+                </a:solidFill>
+                <a:latin typeface="Consolas" panose="020B0609020204030204" pitchFamily="49" charset="0"/>
+              </a:rPr>
+              <a:t>&lt;!-- This service implements our </a:t>
+            </a:r>
+            <a:r>
+              <a:rPr lang="en-US" altLang="en-US" sz="1600" dirty="0" err="1">
+                <a:solidFill>
+                  <a:srgbClr val="808080"/>
+                </a:solidFill>
+                <a:latin typeface="Consolas" panose="020B0609020204030204" pitchFamily="49" charset="0"/>
+              </a:rPr>
+              <a:t>SyncAdapter</a:t>
+            </a:r>
+            <a:r>
+              <a:rPr lang="en-US" altLang="en-US" sz="1600" dirty="0">
+                <a:solidFill>
+                  <a:srgbClr val="808080"/>
+                </a:solidFill>
+                <a:latin typeface="Consolas" panose="020B0609020204030204" pitchFamily="49" charset="0"/>
+              </a:rPr>
+              <a:t>. It needs to be exported, so that the system</a:t>
+            </a:r>
+            <a:br>
+              <a:rPr lang="en-US" altLang="en-US" sz="1600" dirty="0">
+                <a:solidFill>
+                  <a:srgbClr val="808080"/>
+                </a:solidFill>
+                <a:latin typeface="Consolas" panose="020B0609020204030204" pitchFamily="49" charset="0"/>
+              </a:rPr>
+            </a:br>
+            <a:r>
+              <a:rPr lang="en-US" altLang="en-US" sz="1600" dirty="0" smtClean="0">
+                <a:solidFill>
+                  <a:srgbClr val="808080"/>
+                </a:solidFill>
+                <a:latin typeface="Consolas" panose="020B0609020204030204" pitchFamily="49" charset="0"/>
+              </a:rPr>
+              <a:t>     sync </a:t>
+            </a:r>
+            <a:r>
+              <a:rPr lang="en-US" altLang="en-US" sz="1600" dirty="0">
+                <a:solidFill>
+                  <a:srgbClr val="808080"/>
+                </a:solidFill>
+                <a:latin typeface="Consolas" panose="020B0609020204030204" pitchFamily="49" charset="0"/>
+              </a:rPr>
+              <a:t>framework can access it. --&gt;</a:t>
+            </a:r>
+            <a:br>
+              <a:rPr lang="en-US" altLang="en-US" sz="1600" dirty="0">
+                <a:solidFill>
+                  <a:srgbClr val="808080"/>
+                </a:solidFill>
+                <a:latin typeface="Consolas" panose="020B0609020204030204" pitchFamily="49" charset="0"/>
+              </a:rPr>
+            </a:br>
+            <a:r>
+              <a:rPr lang="en-US" altLang="en-US" sz="1600" dirty="0">
+                <a:solidFill>
+                  <a:srgbClr val="E8BF6A"/>
+                </a:solidFill>
+                <a:latin typeface="Consolas" panose="020B0609020204030204" pitchFamily="49" charset="0"/>
+              </a:rPr>
+              <a:t>&lt;service</a:t>
+            </a:r>
+            <a:br>
+              <a:rPr lang="en-US" altLang="en-US" sz="1600" dirty="0">
+                <a:solidFill>
+                  <a:srgbClr val="E8BF6A"/>
+                </a:solidFill>
+                <a:latin typeface="Consolas" panose="020B0609020204030204" pitchFamily="49" charset="0"/>
+              </a:rPr>
+            </a:br>
+            <a:r>
+              <a:rPr lang="en-US" altLang="en-US" sz="1600" dirty="0">
+                <a:solidFill>
+                  <a:srgbClr val="E8BF6A"/>
+                </a:solidFill>
+                <a:latin typeface="Consolas" panose="020B0609020204030204" pitchFamily="49" charset="0"/>
+              </a:rPr>
+              <a:t>    </a:t>
+            </a:r>
+            <a:r>
+              <a:rPr lang="en-US" altLang="en-US" sz="1600" dirty="0" err="1">
+                <a:solidFill>
+                  <a:srgbClr val="9876AA"/>
+                </a:solidFill>
+                <a:latin typeface="Consolas" panose="020B0609020204030204" pitchFamily="49" charset="0"/>
+              </a:rPr>
+              <a:t>android</a:t>
+            </a:r>
+            <a:r>
+              <a:rPr lang="en-US" altLang="en-US" sz="1600" dirty="0" err="1">
+                <a:solidFill>
+                  <a:srgbClr val="BABABA"/>
+                </a:solidFill>
+                <a:latin typeface="Consolas" panose="020B0609020204030204" pitchFamily="49" charset="0"/>
+              </a:rPr>
+              <a:t>:name</a:t>
+            </a:r>
+            <a:r>
+              <a:rPr lang="en-US" altLang="en-US" sz="1600" dirty="0">
+                <a:solidFill>
+                  <a:srgbClr val="BABABA"/>
+                </a:solidFill>
+                <a:latin typeface="Consolas" panose="020B0609020204030204" pitchFamily="49" charset="0"/>
+              </a:rPr>
+              <a:t>=</a:t>
+            </a:r>
+            <a:r>
+              <a:rPr lang="en-US" altLang="en-US" sz="1600" dirty="0">
+                <a:solidFill>
+                  <a:srgbClr val="6A8759"/>
+                </a:solidFill>
+                <a:latin typeface="Consolas" panose="020B0609020204030204" pitchFamily="49" charset="0"/>
+              </a:rPr>
+              <a:t>".</a:t>
+            </a:r>
+            <a:r>
+              <a:rPr lang="en-US" altLang="en-US" sz="1600" dirty="0" err="1">
+                <a:solidFill>
+                  <a:srgbClr val="6A8759"/>
+                </a:solidFill>
+                <a:latin typeface="Consolas" panose="020B0609020204030204" pitchFamily="49" charset="0"/>
+              </a:rPr>
+              <a:t>sync.SyncService</a:t>
+            </a:r>
+            <a:r>
+              <a:rPr lang="en-US" altLang="en-US" sz="1600" dirty="0">
+                <a:solidFill>
+                  <a:srgbClr val="6A8759"/>
+                </a:solidFill>
+                <a:latin typeface="Consolas" panose="020B0609020204030204" pitchFamily="49" charset="0"/>
+              </a:rPr>
+              <a:t>"</a:t>
+            </a:r>
+            <a:br>
+              <a:rPr lang="en-US" altLang="en-US" sz="1600" dirty="0">
+                <a:solidFill>
+                  <a:srgbClr val="6A8759"/>
+                </a:solidFill>
+                <a:latin typeface="Consolas" panose="020B0609020204030204" pitchFamily="49" charset="0"/>
+              </a:rPr>
+            </a:br>
+            <a:r>
+              <a:rPr lang="en-US" altLang="en-US" sz="1600" dirty="0">
+                <a:solidFill>
+                  <a:srgbClr val="6A8759"/>
+                </a:solidFill>
+                <a:latin typeface="Consolas" panose="020B0609020204030204" pitchFamily="49" charset="0"/>
+              </a:rPr>
+              <a:t>    </a:t>
+            </a:r>
+            <a:r>
+              <a:rPr lang="en-US" altLang="en-US" sz="1600" dirty="0" err="1">
+                <a:solidFill>
+                  <a:srgbClr val="9876AA"/>
+                </a:solidFill>
+                <a:latin typeface="Consolas" panose="020B0609020204030204" pitchFamily="49" charset="0"/>
+              </a:rPr>
+              <a:t>android</a:t>
+            </a:r>
+            <a:r>
+              <a:rPr lang="en-US" altLang="en-US" sz="1600" dirty="0" err="1">
+                <a:solidFill>
+                  <a:srgbClr val="BABABA"/>
+                </a:solidFill>
+                <a:latin typeface="Consolas" panose="020B0609020204030204" pitchFamily="49" charset="0"/>
+              </a:rPr>
+              <a:t>:exported</a:t>
+            </a:r>
+            <a:r>
+              <a:rPr lang="en-US" altLang="en-US" sz="1600" dirty="0">
+                <a:solidFill>
+                  <a:srgbClr val="BABABA"/>
+                </a:solidFill>
+                <a:latin typeface="Consolas" panose="020B0609020204030204" pitchFamily="49" charset="0"/>
+              </a:rPr>
+              <a:t>=</a:t>
+            </a:r>
+            <a:r>
+              <a:rPr lang="en-US" altLang="en-US" sz="1600" dirty="0">
+                <a:solidFill>
+                  <a:srgbClr val="6A8759"/>
+                </a:solidFill>
+                <a:latin typeface="Consolas" panose="020B0609020204030204" pitchFamily="49" charset="0"/>
+              </a:rPr>
+              <a:t>"true"</a:t>
+            </a:r>
+            <a:r>
+              <a:rPr lang="en-US" altLang="en-US" sz="1600" dirty="0">
+                <a:solidFill>
+                  <a:srgbClr val="E8BF6A"/>
+                </a:solidFill>
+                <a:latin typeface="Consolas" panose="020B0609020204030204" pitchFamily="49" charset="0"/>
+              </a:rPr>
+              <a:t>&gt;</a:t>
+            </a:r>
+            <a:br>
+              <a:rPr lang="en-US" altLang="en-US" sz="1600" dirty="0">
+                <a:solidFill>
+                  <a:srgbClr val="E8BF6A"/>
+                </a:solidFill>
+                <a:latin typeface="Consolas" panose="020B0609020204030204" pitchFamily="49" charset="0"/>
+              </a:rPr>
+            </a:br>
             <a:r>
               <a:rPr lang="en-US" altLang="en-US" sz="1600" dirty="0">
                 <a:solidFill>
@@ -18383,9 +19755,196 @@
   <p:timing>
     <p:tnLst>
       <p:par>
-        <p:cTn id="1" dur="indefinite" restart="never" nodeType="tmRoot"/>
+        <p:cTn id="1" dur="indefinite" restart="never" nodeType="tmRoot">
+          <p:childTnLst>
+            <p:seq concurrent="1" nextAc="seek">
+              <p:cTn id="2" dur="indefinite" nodeType="mainSeq">
+                <p:childTnLst>
+                  <p:par>
+                    <p:cTn id="3" fill="hold">
+                      <p:stCondLst>
+                        <p:cond delay="indefinite"/>
+                      </p:stCondLst>
+                      <p:childTnLst>
+                        <p:par>
+                          <p:cTn id="4" fill="hold">
+                            <p:stCondLst>
+                              <p:cond delay="0"/>
+                            </p:stCondLst>
+                            <p:childTnLst>
+                              <p:par>
+                                <p:cTn id="5" presetID="22" presetClass="entr" presetSubtype="1" fill="hold" grpId="0" nodeType="clickEffect">
+                                  <p:stCondLst>
+                                    <p:cond delay="0"/>
+                                  </p:stCondLst>
+                                  <p:childTnLst>
+                                    <p:set>
+                                      <p:cBhvr>
+                                        <p:cTn id="6" dur="1" fill="hold">
+                                          <p:stCondLst>
+                                            <p:cond delay="0"/>
+                                          </p:stCondLst>
+                                        </p:cTn>
+                                        <p:tgtEl>
+                                          <p:spTgt spid="13"/>
+                                        </p:tgtEl>
+                                        <p:attrNameLst>
+                                          <p:attrName>style.visibility</p:attrName>
+                                        </p:attrNameLst>
+                                      </p:cBhvr>
+                                      <p:to>
+                                        <p:strVal val="visible"/>
+                                      </p:to>
+                                    </p:set>
+                                    <p:animEffect transition="in" filter="wipe(up)">
+                                      <p:cBhvr>
+                                        <p:cTn id="7" dur="500"/>
+                                        <p:tgtEl>
+                                          <p:spTgt spid="13"/>
+                                        </p:tgtEl>
+                                      </p:cBhvr>
+                                    </p:animEffect>
+                                  </p:childTnLst>
+                                </p:cTn>
+                              </p:par>
+                            </p:childTnLst>
+                          </p:cTn>
+                        </p:par>
+                      </p:childTnLst>
+                    </p:cTn>
+                  </p:par>
+                  <p:par>
+                    <p:cTn id="8" fill="hold">
+                      <p:stCondLst>
+                        <p:cond delay="indefinite"/>
+                      </p:stCondLst>
+                      <p:childTnLst>
+                        <p:par>
+                          <p:cTn id="9" fill="hold">
+                            <p:stCondLst>
+                              <p:cond delay="0"/>
+                            </p:stCondLst>
+                            <p:childTnLst>
+                              <p:par>
+                                <p:cTn id="10" presetID="22" presetClass="entr" presetSubtype="1" fill="hold" grpId="0" nodeType="clickEffect">
+                                  <p:stCondLst>
+                                    <p:cond delay="0"/>
+                                  </p:stCondLst>
+                                  <p:childTnLst>
+                                    <p:set>
+                                      <p:cBhvr>
+                                        <p:cTn id="11" dur="1" fill="hold">
+                                          <p:stCondLst>
+                                            <p:cond delay="0"/>
+                                          </p:stCondLst>
+                                        </p:cTn>
+                                        <p:tgtEl>
+                                          <p:spTgt spid="4"/>
+                                        </p:tgtEl>
+                                        <p:attrNameLst>
+                                          <p:attrName>style.visibility</p:attrName>
+                                        </p:attrNameLst>
+                                      </p:cBhvr>
+                                      <p:to>
+                                        <p:strVal val="visible"/>
+                                      </p:to>
+                                    </p:set>
+                                    <p:animEffect transition="in" filter="wipe(up)">
+                                      <p:cBhvr>
+                                        <p:cTn id="12" dur="500"/>
+                                        <p:tgtEl>
+                                          <p:spTgt spid="4"/>
+                                        </p:tgtEl>
+                                      </p:cBhvr>
+                                    </p:animEffect>
+                                  </p:childTnLst>
+                                </p:cTn>
+                              </p:par>
+                            </p:childTnLst>
+                          </p:cTn>
+                        </p:par>
+                      </p:childTnLst>
+                    </p:cTn>
+                  </p:par>
+                  <p:par>
+                    <p:cTn id="13" fill="hold">
+                      <p:stCondLst>
+                        <p:cond delay="indefinite"/>
+                      </p:stCondLst>
+                      <p:childTnLst>
+                        <p:par>
+                          <p:cTn id="14" fill="hold">
+                            <p:stCondLst>
+                              <p:cond delay="0"/>
+                            </p:stCondLst>
+                            <p:childTnLst>
+                              <p:par>
+                                <p:cTn id="15" presetID="22" presetClass="entr" presetSubtype="1" fill="hold" grpId="0" nodeType="clickEffect">
+                                  <p:stCondLst>
+                                    <p:cond delay="0"/>
+                                  </p:stCondLst>
+                                  <p:childTnLst>
+                                    <p:set>
+                                      <p:cBhvr>
+                                        <p:cTn id="16" dur="1" fill="hold">
+                                          <p:stCondLst>
+                                            <p:cond delay="0"/>
+                                          </p:stCondLst>
+                                        </p:cTn>
+                                        <p:tgtEl>
+                                          <p:spTgt spid="5"/>
+                                        </p:tgtEl>
+                                        <p:attrNameLst>
+                                          <p:attrName>style.visibility</p:attrName>
+                                        </p:attrNameLst>
+                                      </p:cBhvr>
+                                      <p:to>
+                                        <p:strVal val="visible"/>
+                                      </p:to>
+                                    </p:set>
+                                    <p:animEffect transition="in" filter="wipe(up)">
+                                      <p:cBhvr>
+                                        <p:cTn id="17" dur="500"/>
+                                        <p:tgtEl>
+                                          <p:spTgt spid="5"/>
+                                        </p:tgtEl>
+                                      </p:cBhvr>
+                                    </p:animEffect>
+                                  </p:childTnLst>
+                                </p:cTn>
+                              </p:par>
+                            </p:childTnLst>
+                          </p:cTn>
+                        </p:par>
+                      </p:childTnLst>
+                    </p:cTn>
+                  </p:par>
+                </p:childTnLst>
+              </p:cTn>
+              <p:prevCondLst>
+                <p:cond evt="onPrev" delay="0">
+                  <p:tgtEl>
+                    <p:sldTgt/>
+                  </p:tgtEl>
+                </p:cond>
+              </p:prevCondLst>
+              <p:nextCondLst>
+                <p:cond evt="onNext" delay="0">
+                  <p:tgtEl>
+                    <p:sldTgt/>
+                  </p:tgtEl>
+                </p:cond>
+              </p:nextCondLst>
+            </p:seq>
+          </p:childTnLst>
+        </p:cTn>
       </p:par>
     </p:tnLst>
+    <p:bldLst>
+      <p:bldP spid="13" grpId="0" animBg="1"/>
+      <p:bldP spid="4" grpId="0" animBg="1"/>
+      <p:bldP spid="5" grpId="0" animBg="1"/>
+    </p:bldLst>
   </p:timing>
 </p:sld>
 </file>
@@ -19297,13 +20856,13 @@
   <p:clrMapOvr>
     <a:masterClrMapping/>
   </p:clrMapOvr>
-  <mc:AlternateContent xmlns:mc="http://schemas.openxmlformats.org/markup-compatibility/2006">
-    <mc:Choice xmlns:p14="http://schemas.microsoft.com/office/powerpoint/2010/main" Requires="p14">
+  <mc:AlternateContent xmlns:mc="http://schemas.openxmlformats.org/markup-compatibility/2006" xmlns:p14="http://schemas.microsoft.com/office/powerpoint/2010/main">
+    <mc:Choice Requires="p14">
       <p:transition p14:dur="250">
         <p14:reveal/>
       </p:transition>
     </mc:Choice>
-    <mc:Fallback>
+    <mc:Fallback xmlns="">
       <p:transition>
         <p:fade/>
       </p:transition>
@@ -20250,13 +21809,13 @@
   <p:clrMapOvr>
     <a:masterClrMapping/>
   </p:clrMapOvr>
-  <mc:AlternateContent xmlns:mc="http://schemas.openxmlformats.org/markup-compatibility/2006">
-    <mc:Choice xmlns:p14="http://schemas.microsoft.com/office/powerpoint/2010/main" Requires="p14">
+  <mc:AlternateContent xmlns:mc="http://schemas.openxmlformats.org/markup-compatibility/2006" xmlns:p14="http://schemas.microsoft.com/office/powerpoint/2010/main">
+    <mc:Choice Requires="p14">
       <p:transition p14:dur="250">
         <p14:reveal/>
       </p:transition>
     </mc:Choice>
-    <mc:Fallback>
+    <mc:Fallback xmlns="">
       <p:transition>
         <p:fade/>
       </p:transition>
@@ -20310,13 +21869,25 @@
             </a:r>
             <a:r>
               <a:rPr lang="en-US" dirty="0" smtClean="0"/>
-              <a:t> class</a:t>
-            </a:r>
-          </a:p>
-          <a:p>
+              <a:t> </a:t>
+            </a:r>
             <a:r>
               <a:rPr lang="en-US" dirty="0" smtClean="0"/>
-              <a:t>Lifecycle</a:t>
+              <a:t>lives as long as the </a:t>
+            </a:r>
+            <a:r>
+              <a:rPr lang="en-US" dirty="0" err="1" smtClean="0"/>
+              <a:t>SyncAdapter</a:t>
+            </a:r>
+            <a:r>
+              <a:rPr lang="en-US" dirty="0" smtClean="0"/>
+              <a:t> is running</a:t>
+            </a:r>
+          </a:p>
+          <a:p>
+            <a:r>
+              <a:rPr lang="en-US" dirty="0" smtClean="0"/>
+              <a:t>Runs in its own thread</a:t>
             </a:r>
             <a:endParaRPr lang="en-US" dirty="0"/>
           </a:p>
@@ -21345,7 +22916,7 @@
         <p:spPr/>
         <p:txBody>
           <a:bodyPr>
-            <a:normAutofit fontScale="92500" lnSpcReduction="20000"/>
+            <a:normAutofit fontScale="92500" lnSpcReduction="10000"/>
           </a:bodyPr>
           <a:lstStyle/>
           <a:p>
@@ -22228,20 +23799,7 @@
                 <a:effectLst/>
                 <a:latin typeface="Consolas" panose="020B0609020204030204" pitchFamily="49" charset="0"/>
               </a:rPr>
-              <a:t>"false</a:t>
-            </a:r>
-            <a:r>
-              <a:rPr kumimoji="0" lang="en-US" altLang="en-US" sz="1600" b="0" i="0" u="none" strike="noStrike" cap="none" normalizeH="0" baseline="0" dirty="0" smtClean="0">
-                <a:ln>
-                  <a:noFill/>
-                </a:ln>
-                <a:solidFill>
-                  <a:srgbClr val="6A8759"/>
-                </a:solidFill>
-                <a:effectLst/>
-                <a:latin typeface="Consolas" panose="020B0609020204030204" pitchFamily="49" charset="0"/>
-              </a:rPr>
-              <a:t>"</a:t>
+              <a:t>"false"</a:t>
             </a:r>
             <a:r>
               <a:rPr kumimoji="0" lang="en-US" altLang="en-US" sz="1600" b="0" i="0" u="none" strike="noStrike" cap="none" normalizeH="0" baseline="0" dirty="0" smtClean="0">
@@ -25040,20 +26598,7 @@
                 <a:effectLst/>
                 <a:latin typeface="Consolas" panose="020B0609020204030204" pitchFamily="49" charset="0"/>
               </a:rPr>
-              <a:t>"false</a:t>
-            </a:r>
-            <a:r>
-              <a:rPr kumimoji="0" lang="en-US" altLang="en-US" sz="1600" b="0" i="0" u="none" strike="noStrike" cap="none" normalizeH="0" baseline="0" dirty="0" smtClean="0">
-                <a:ln>
-                  <a:noFill/>
-                </a:ln>
-                <a:solidFill>
-                  <a:srgbClr val="6A8759"/>
-                </a:solidFill>
-                <a:effectLst/>
-                <a:latin typeface="Consolas" panose="020B0609020204030204" pitchFamily="49" charset="0"/>
-              </a:rPr>
-              <a:t>"</a:t>
+              <a:t>"false"</a:t>
             </a:r>
             <a:r>
               <a:rPr kumimoji="0" lang="en-US" altLang="en-US" sz="1600" b="0" i="0" u="none" strike="noStrike" cap="none" normalizeH="0" baseline="0" dirty="0" smtClean="0">
@@ -27879,10 +29424,6 @@
                   </a:rPr>
                   <a:t> internet</a:t>
                 </a:r>
-                <a:endParaRPr lang="en-US" sz="2000" dirty="0">
-                  <a:latin typeface="MV Boli" panose="02000500030200090000" pitchFamily="2" charset="0"/>
-                  <a:cs typeface="MV Boli" panose="02000500030200090000" pitchFamily="2" charset="0"/>
-                </a:endParaRPr>
               </a:p>
             </p:txBody>
           </p:sp>
@@ -28113,7 +29654,6 @@
               <a:rPr lang="en-US" dirty="0" smtClean="0"/>
               <a:t>(Android Developers Blog)</a:t>
             </a:r>
-            <a:endParaRPr lang="en-US" dirty="0" smtClean="0"/>
           </a:p>
         </p:txBody>
       </p:sp>
@@ -29950,10 +31490,6 @@
                 </a:rPr>
                 <a:t> internet</a:t>
               </a:r>
-              <a:endParaRPr lang="en-US" sz="2000" dirty="0">
-                <a:latin typeface="MV Boli" panose="02000500030200090000" pitchFamily="2" charset="0"/>
-                <a:cs typeface="MV Boli" panose="02000500030200090000" pitchFamily="2" charset="0"/>
-              </a:endParaRPr>
             </a:p>
           </p:txBody>
         </p:sp>
@@ -30937,10 +32473,6 @@
                 </a:rPr>
                 <a:t> internet</a:t>
               </a:r>
-              <a:endParaRPr lang="en-US" sz="2000" dirty="0">
-                <a:latin typeface="MV Boli" panose="02000500030200090000" pitchFamily="2" charset="0"/>
-                <a:cs typeface="MV Boli" panose="02000500030200090000" pitchFamily="2" charset="0"/>
-              </a:endParaRPr>
             </a:p>
           </p:txBody>
         </p:sp>
@@ -31588,10 +33120,6 @@
                 </a:rPr>
                 <a:t> internet</a:t>
               </a:r>
-              <a:endParaRPr lang="en-US" sz="2000" dirty="0">
-                <a:latin typeface="MV Boli" panose="02000500030200090000" pitchFamily="2" charset="0"/>
-                <a:cs typeface="MV Boli" panose="02000500030200090000" pitchFamily="2" charset="0"/>
-              </a:endParaRPr>
             </a:p>
           </p:txBody>
         </p:sp>
@@ -32131,10 +33659,6 @@
                 </a:rPr>
                 <a:t> internet</a:t>
               </a:r>
-              <a:endParaRPr lang="en-US" sz="2000" dirty="0">
-                <a:latin typeface="MV Boli" panose="02000500030200090000" pitchFamily="2" charset="0"/>
-                <a:cs typeface="MV Boli" panose="02000500030200090000" pitchFamily="2" charset="0"/>
-              </a:endParaRPr>
             </a:p>
           </p:txBody>
         </p:sp>
@@ -33061,10 +34585,6 @@
                 </a:rPr>
                 <a:t> internet</a:t>
               </a:r>
-              <a:endParaRPr lang="en-US" sz="2000" dirty="0">
-                <a:latin typeface="MV Boli" panose="02000500030200090000" pitchFamily="2" charset="0"/>
-                <a:cs typeface="MV Boli" panose="02000500030200090000" pitchFamily="2" charset="0"/>
-              </a:endParaRPr>
             </a:p>
           </p:txBody>
         </p:sp>
@@ -34442,10 +35962,6 @@
                 </a:rPr>
                 <a:t> internet</a:t>
               </a:r>
-              <a:endParaRPr lang="en-US" sz="2000" dirty="0">
-                <a:latin typeface="MV Boli" panose="02000500030200090000" pitchFamily="2" charset="0"/>
-                <a:cs typeface="MV Boli" panose="02000500030200090000" pitchFamily="2" charset="0"/>
-              </a:endParaRPr>
             </a:p>
           </p:txBody>
         </p:sp>

</xml_diff>

<commit_message>
added recap further tweaks to animations
</commit_message>
<xml_diff>
--- a/I've been doing some syncing.pptx
+++ b/I've been doing some syncing.pptx
@@ -38,8 +38,8 @@
     <p:sldId id="312" r:id="rId29"/>
     <p:sldId id="338" r:id="rId30"/>
     <p:sldId id="337" r:id="rId31"/>
-    <p:sldId id="341" r:id="rId32"/>
-    <p:sldId id="339" r:id="rId33"/>
+    <p:sldId id="339" r:id="rId32"/>
+    <p:sldId id="341" r:id="rId33"/>
     <p:sldId id="310" r:id="rId34"/>
     <p:sldId id="326" r:id="rId35"/>
     <p:sldId id="327" r:id="rId36"/>
@@ -30053,805 +30053,6 @@
       </p:grpSpPr>
       <p:sp>
         <p:nvSpPr>
-          <p:cNvPr id="8" name="Rectangle 1"/>
-          <p:cNvSpPr>
-            <a:spLocks noChangeArrowheads="1"/>
-          </p:cNvSpPr>
-          <p:nvPr/>
-        </p:nvSpPr>
-        <p:spPr bwMode="auto">
-          <a:xfrm>
-            <a:off x="652500" y="2132856"/>
-            <a:ext cx="10887000" cy="4104456"/>
-          </a:xfrm>
-          <a:prstGeom prst="rect">
-            <a:avLst/>
-          </a:prstGeom>
-          <a:solidFill>
-            <a:srgbClr val="2B2B2B"/>
-          </a:solidFill>
-          <a:ln>
-            <a:noFill/>
-          </a:ln>
-          <a:effectLst/>
-          <a:extLst>
-            <a:ext uri="{91240B29-F687-4F45-9708-019B960494DF}">
-              <a14:hiddenLine xmlns:a14="http://schemas.microsoft.com/office/drawing/2010/main" w="9525">
-                <a:solidFill>
-                  <a:schemeClr val="tx1"/>
-                </a:solidFill>
-                <a:miter lim="800000"/>
-                <a:headEnd/>
-                <a:tailEnd/>
-              </a14:hiddenLine>
-            </a:ext>
-            <a:ext uri="{AF507438-7753-43E0-B8FC-AC1667EBCBE1}">
-              <a14:hiddenEffects xmlns:a14="http://schemas.microsoft.com/office/drawing/2010/main">
-                <a:effectLst>
-                  <a:outerShdw dist="35921" dir="2700000" algn="ctr" rotWithShape="0">
-                    <a:schemeClr val="bg2"/>
-                  </a:outerShdw>
-                </a:effectLst>
-              </a14:hiddenEffects>
-            </a:ext>
-          </a:extLst>
-        </p:spPr>
-        <p:txBody>
-          <a:bodyPr vert="horz" wrap="square" lIns="182880" tIns="182880" rIns="182880" bIns="182880" numCol="1" anchor="t" anchorCtr="0" compatLnSpc="1">
-            <a:prstTxWarp prst="textNoShape">
-              <a:avLst/>
-            </a:prstTxWarp>
-            <a:noAutofit/>
-          </a:bodyPr>
-          <a:lstStyle/>
-          <a:p>
-            <a:pPr eaLnBrk="0" fontAlgn="base" hangingPunct="0">
-              <a:spcBef>
-                <a:spcPct val="0"/>
-              </a:spcBef>
-              <a:spcAft>
-                <a:spcPct val="0"/>
-              </a:spcAft>
-            </a:pPr>
-            <a:r>
-              <a:rPr lang="en-US" altLang="en-US" sz="1600" dirty="0">
-                <a:solidFill>
-                  <a:srgbClr val="E8BF6A"/>
-                </a:solidFill>
-                <a:latin typeface="Consolas" panose="020B0609020204030204" pitchFamily="49" charset="0"/>
-              </a:rPr>
-              <a:t>&lt;account-authenticator</a:t>
-            </a:r>
-            <a:br>
-              <a:rPr lang="en-US" altLang="en-US" sz="1600" dirty="0">
-                <a:solidFill>
-                  <a:srgbClr val="E8BF6A"/>
-                </a:solidFill>
-                <a:latin typeface="Consolas" panose="020B0609020204030204" pitchFamily="49" charset="0"/>
-              </a:rPr>
-            </a:br>
-            <a:r>
-              <a:rPr lang="en-US" altLang="en-US" sz="1600" dirty="0">
-                <a:solidFill>
-                  <a:srgbClr val="E8BF6A"/>
-                </a:solidFill>
-                <a:latin typeface="Consolas" panose="020B0609020204030204" pitchFamily="49" charset="0"/>
-              </a:rPr>
-              <a:t>    </a:t>
-            </a:r>
-            <a:r>
-              <a:rPr lang="en-US" altLang="en-US" sz="1600" dirty="0" err="1">
-                <a:solidFill>
-                  <a:srgbClr val="BABABA"/>
-                </a:solidFill>
-                <a:latin typeface="Consolas" panose="020B0609020204030204" pitchFamily="49" charset="0"/>
-              </a:rPr>
-              <a:t>xmlns:</a:t>
-            </a:r>
-            <a:r>
-              <a:rPr lang="en-US" altLang="en-US" sz="1600" dirty="0" err="1">
-                <a:solidFill>
-                  <a:srgbClr val="9876AA"/>
-                </a:solidFill>
-                <a:latin typeface="Consolas" panose="020B0609020204030204" pitchFamily="49" charset="0"/>
-              </a:rPr>
-              <a:t>android</a:t>
-            </a:r>
-            <a:r>
-              <a:rPr lang="en-US" altLang="en-US" sz="1600" dirty="0">
-                <a:solidFill>
-                  <a:srgbClr val="BABABA"/>
-                </a:solidFill>
-                <a:latin typeface="Consolas" panose="020B0609020204030204" pitchFamily="49" charset="0"/>
-              </a:rPr>
-              <a:t>=</a:t>
-            </a:r>
-            <a:r>
-              <a:rPr lang="en-US" altLang="en-US" sz="1600" dirty="0">
-                <a:solidFill>
-                  <a:srgbClr val="6A8759"/>
-                </a:solidFill>
-                <a:latin typeface="Consolas" panose="020B0609020204030204" pitchFamily="49" charset="0"/>
-              </a:rPr>
-              <a:t>"http://schemas.android.com/</a:t>
-            </a:r>
-            <a:r>
-              <a:rPr lang="en-US" altLang="en-US" sz="1600" dirty="0" err="1">
-                <a:solidFill>
-                  <a:srgbClr val="6A8759"/>
-                </a:solidFill>
-                <a:latin typeface="Consolas" panose="020B0609020204030204" pitchFamily="49" charset="0"/>
-              </a:rPr>
-              <a:t>apk</a:t>
-            </a:r>
-            <a:r>
-              <a:rPr lang="en-US" altLang="en-US" sz="1600" dirty="0">
-                <a:solidFill>
-                  <a:srgbClr val="6A8759"/>
-                </a:solidFill>
-                <a:latin typeface="Consolas" panose="020B0609020204030204" pitchFamily="49" charset="0"/>
-              </a:rPr>
-              <a:t>/res/android"</a:t>
-            </a:r>
-            <a:br>
-              <a:rPr lang="en-US" altLang="en-US" sz="1600" dirty="0">
-                <a:solidFill>
-                  <a:srgbClr val="6A8759"/>
-                </a:solidFill>
-                <a:latin typeface="Consolas" panose="020B0609020204030204" pitchFamily="49" charset="0"/>
-              </a:rPr>
-            </a:br>
-            <a:r>
-              <a:rPr lang="en-US" altLang="en-US" sz="1600" dirty="0">
-                <a:solidFill>
-                  <a:srgbClr val="6A8759"/>
-                </a:solidFill>
-                <a:latin typeface="Consolas" panose="020B0609020204030204" pitchFamily="49" charset="0"/>
-              </a:rPr>
-              <a:t>    </a:t>
-            </a:r>
-            <a:r>
-              <a:rPr lang="en-US" altLang="en-US" sz="1600" dirty="0" err="1">
-                <a:solidFill>
-                  <a:srgbClr val="9876AA"/>
-                </a:solidFill>
-                <a:latin typeface="Consolas" panose="020B0609020204030204" pitchFamily="49" charset="0"/>
-              </a:rPr>
-              <a:t>android</a:t>
-            </a:r>
-            <a:r>
-              <a:rPr lang="en-US" altLang="en-US" sz="1600" dirty="0" err="1">
-                <a:solidFill>
-                  <a:srgbClr val="BABABA"/>
-                </a:solidFill>
-                <a:latin typeface="Consolas" panose="020B0609020204030204" pitchFamily="49" charset="0"/>
-              </a:rPr>
-              <a:t>:accountPreferences</a:t>
-            </a:r>
-            <a:r>
-              <a:rPr lang="en-US" altLang="en-US" sz="1600" dirty="0">
-                <a:solidFill>
-                  <a:srgbClr val="BABABA"/>
-                </a:solidFill>
-                <a:latin typeface="Consolas" panose="020B0609020204030204" pitchFamily="49" charset="0"/>
-              </a:rPr>
-              <a:t>=</a:t>
-            </a:r>
-            <a:r>
-              <a:rPr lang="en-US" altLang="en-US" sz="1600" dirty="0">
-                <a:solidFill>
-                  <a:srgbClr val="6A8759"/>
-                </a:solidFill>
-                <a:latin typeface="Consolas" panose="020B0609020204030204" pitchFamily="49" charset="0"/>
-              </a:rPr>
-              <a:t>"@xml/</a:t>
-            </a:r>
-            <a:r>
-              <a:rPr lang="en-US" altLang="en-US" sz="1600" dirty="0" err="1">
-                <a:solidFill>
-                  <a:srgbClr val="6A8759"/>
-                </a:solidFill>
-                <a:latin typeface="Consolas" panose="020B0609020204030204" pitchFamily="49" charset="0"/>
-              </a:rPr>
-              <a:t>account_preferences</a:t>
-            </a:r>
-            <a:r>
-              <a:rPr lang="en-US" altLang="en-US" sz="1600" dirty="0">
-                <a:solidFill>
-                  <a:srgbClr val="6A8759"/>
-                </a:solidFill>
-                <a:latin typeface="Consolas" panose="020B0609020204030204" pitchFamily="49" charset="0"/>
-              </a:rPr>
-              <a:t>"</a:t>
-            </a:r>
-            <a:br>
-              <a:rPr lang="en-US" altLang="en-US" sz="1600" dirty="0">
-                <a:solidFill>
-                  <a:srgbClr val="6A8759"/>
-                </a:solidFill>
-                <a:latin typeface="Consolas" panose="020B0609020204030204" pitchFamily="49" charset="0"/>
-              </a:rPr>
-            </a:br>
-            <a:r>
-              <a:rPr lang="en-US" altLang="en-US" sz="1600" dirty="0">
-                <a:solidFill>
-                  <a:srgbClr val="6A8759"/>
-                </a:solidFill>
-                <a:latin typeface="Consolas" panose="020B0609020204030204" pitchFamily="49" charset="0"/>
-              </a:rPr>
-              <a:t>    </a:t>
-            </a:r>
-            <a:r>
-              <a:rPr lang="en-US" altLang="en-US" sz="1600" dirty="0" err="1">
-                <a:solidFill>
-                  <a:srgbClr val="9876AA"/>
-                </a:solidFill>
-                <a:latin typeface="Consolas" panose="020B0609020204030204" pitchFamily="49" charset="0"/>
-              </a:rPr>
-              <a:t>android</a:t>
-            </a:r>
-            <a:r>
-              <a:rPr lang="en-US" altLang="en-US" sz="1600" dirty="0" err="1">
-                <a:solidFill>
-                  <a:srgbClr val="BABABA"/>
-                </a:solidFill>
-                <a:latin typeface="Consolas" panose="020B0609020204030204" pitchFamily="49" charset="0"/>
-              </a:rPr>
-              <a:t>:accountType</a:t>
-            </a:r>
-            <a:r>
-              <a:rPr lang="en-US" altLang="en-US" sz="1600" dirty="0">
-                <a:solidFill>
-                  <a:srgbClr val="BABABA"/>
-                </a:solidFill>
-                <a:latin typeface="Consolas" panose="020B0609020204030204" pitchFamily="49" charset="0"/>
-              </a:rPr>
-              <a:t>=</a:t>
-            </a:r>
-            <a:r>
-              <a:rPr lang="en-US" altLang="en-US" sz="1600" dirty="0">
-                <a:solidFill>
-                  <a:srgbClr val="6A8759"/>
-                </a:solidFill>
-                <a:latin typeface="Consolas" panose="020B0609020204030204" pitchFamily="49" charset="0"/>
-              </a:rPr>
-              <a:t>"</a:t>
-            </a:r>
-            <a:r>
-              <a:rPr lang="en-US" altLang="en-US" sz="1600" dirty="0" err="1">
-                <a:solidFill>
-                  <a:srgbClr val="6A8759"/>
-                </a:solidFill>
-                <a:latin typeface="Consolas" panose="020B0609020204030204" pitchFamily="49" charset="0"/>
-              </a:rPr>
-              <a:t>com.example.android.basicsyncadapter.account</a:t>
-            </a:r>
-            <a:r>
-              <a:rPr lang="en-US" altLang="en-US" sz="1600" dirty="0">
-                <a:solidFill>
-                  <a:srgbClr val="6A8759"/>
-                </a:solidFill>
-                <a:latin typeface="Consolas" panose="020B0609020204030204" pitchFamily="49" charset="0"/>
-              </a:rPr>
-              <a:t>"</a:t>
-            </a:r>
-            <a:br>
-              <a:rPr lang="en-US" altLang="en-US" sz="1600" dirty="0">
-                <a:solidFill>
-                  <a:srgbClr val="6A8759"/>
-                </a:solidFill>
-                <a:latin typeface="Consolas" panose="020B0609020204030204" pitchFamily="49" charset="0"/>
-              </a:rPr>
-            </a:br>
-            <a:r>
-              <a:rPr lang="en-US" altLang="en-US" sz="1600" dirty="0" smtClean="0">
-                <a:solidFill>
-                  <a:srgbClr val="6A8759"/>
-                </a:solidFill>
-                <a:latin typeface="Consolas" panose="020B0609020204030204" pitchFamily="49" charset="0"/>
-              </a:rPr>
-              <a:t>    </a:t>
-            </a:r>
-            <a:r>
-              <a:rPr lang="en-US" altLang="en-US" sz="1600" dirty="0" err="1">
-                <a:solidFill>
-                  <a:srgbClr val="9876AA"/>
-                </a:solidFill>
-                <a:latin typeface="Consolas" panose="020B0609020204030204" pitchFamily="49" charset="0"/>
-              </a:rPr>
-              <a:t>android</a:t>
-            </a:r>
-            <a:r>
-              <a:rPr lang="en-US" altLang="en-US" sz="1600" dirty="0" err="1">
-                <a:solidFill>
-                  <a:srgbClr val="BABABA"/>
-                </a:solidFill>
-                <a:latin typeface="Consolas" panose="020B0609020204030204" pitchFamily="49" charset="0"/>
-              </a:rPr>
-              <a:t>:label</a:t>
-            </a:r>
-            <a:r>
-              <a:rPr lang="en-US" altLang="en-US" sz="1600" dirty="0">
-                <a:solidFill>
-                  <a:srgbClr val="BABABA"/>
-                </a:solidFill>
-                <a:latin typeface="Consolas" panose="020B0609020204030204" pitchFamily="49" charset="0"/>
-              </a:rPr>
-              <a:t>=</a:t>
-            </a:r>
-            <a:r>
-              <a:rPr lang="en-US" altLang="en-US" sz="1600" dirty="0">
-                <a:solidFill>
-                  <a:srgbClr val="6A8759"/>
-                </a:solidFill>
-                <a:latin typeface="Consolas" panose="020B0609020204030204" pitchFamily="49" charset="0"/>
-              </a:rPr>
-              <a:t>"@</a:t>
-            </a:r>
-            <a:r>
-              <a:rPr lang="en-US" altLang="en-US" sz="1600" dirty="0" smtClean="0">
-                <a:solidFill>
-                  <a:srgbClr val="6A8759"/>
-                </a:solidFill>
-                <a:latin typeface="Consolas" panose="020B0609020204030204" pitchFamily="49" charset="0"/>
-              </a:rPr>
-              <a:t>string/</a:t>
-            </a:r>
-            <a:r>
-              <a:rPr lang="en-US" altLang="en-US" sz="1600" dirty="0" err="1" smtClean="0">
-                <a:solidFill>
-                  <a:srgbClr val="6A8759"/>
-                </a:solidFill>
-                <a:latin typeface="Consolas" panose="020B0609020204030204" pitchFamily="49" charset="0"/>
-              </a:rPr>
-              <a:t>app_name</a:t>
-            </a:r>
-            <a:r>
-              <a:rPr lang="en-US" altLang="en-US" sz="1600" dirty="0" smtClean="0">
-                <a:solidFill>
-                  <a:srgbClr val="6A8759"/>
-                </a:solidFill>
-                <a:latin typeface="Consolas" panose="020B0609020204030204" pitchFamily="49" charset="0"/>
-              </a:rPr>
-              <a:t>“</a:t>
-            </a:r>
-          </a:p>
-          <a:p>
-            <a:pPr eaLnBrk="0" fontAlgn="base" hangingPunct="0">
-              <a:spcBef>
-                <a:spcPct val="0"/>
-              </a:spcBef>
-              <a:spcAft>
-                <a:spcPct val="0"/>
-              </a:spcAft>
-            </a:pPr>
-            <a:r>
-              <a:rPr lang="en-US" altLang="en-US" sz="1600" dirty="0" smtClean="0">
-                <a:solidFill>
-                  <a:srgbClr val="6A8759"/>
-                </a:solidFill>
-                <a:latin typeface="Consolas" panose="020B0609020204030204" pitchFamily="49" charset="0"/>
-              </a:rPr>
-              <a:t>    </a:t>
-            </a:r>
-            <a:r>
-              <a:rPr lang="en-US" altLang="en-US" sz="1600" dirty="0" err="1">
-                <a:solidFill>
-                  <a:srgbClr val="9876AA"/>
-                </a:solidFill>
-                <a:latin typeface="Consolas" panose="020B0609020204030204" pitchFamily="49" charset="0"/>
-              </a:rPr>
-              <a:t>android</a:t>
-            </a:r>
-            <a:r>
-              <a:rPr lang="en-US" altLang="en-US" sz="1600" dirty="0" err="1">
-                <a:solidFill>
-                  <a:srgbClr val="BABABA"/>
-                </a:solidFill>
-                <a:latin typeface="Consolas" panose="020B0609020204030204" pitchFamily="49" charset="0"/>
-              </a:rPr>
-              <a:t>:icon</a:t>
-            </a:r>
-            <a:r>
-              <a:rPr lang="en-US" altLang="en-US" sz="1600" dirty="0">
-                <a:solidFill>
-                  <a:srgbClr val="BABABA"/>
-                </a:solidFill>
-                <a:latin typeface="Consolas" panose="020B0609020204030204" pitchFamily="49" charset="0"/>
-              </a:rPr>
-              <a:t>=</a:t>
-            </a:r>
-            <a:r>
-              <a:rPr lang="en-US" altLang="en-US" sz="1600" dirty="0">
-                <a:solidFill>
-                  <a:srgbClr val="6A8759"/>
-                </a:solidFill>
-                <a:latin typeface="Consolas" panose="020B0609020204030204" pitchFamily="49" charset="0"/>
-              </a:rPr>
-              <a:t>"@</a:t>
-            </a:r>
-            <a:r>
-              <a:rPr lang="en-US" altLang="en-US" sz="1600" dirty="0" err="1">
-                <a:solidFill>
-                  <a:srgbClr val="6A8759"/>
-                </a:solidFill>
-                <a:latin typeface="Consolas" panose="020B0609020204030204" pitchFamily="49" charset="0"/>
-              </a:rPr>
-              <a:t>drawable</a:t>
-            </a:r>
-            <a:r>
-              <a:rPr lang="en-US" altLang="en-US" sz="1600" dirty="0">
-                <a:solidFill>
-                  <a:srgbClr val="6A8759"/>
-                </a:solidFill>
-                <a:latin typeface="Consolas" panose="020B0609020204030204" pitchFamily="49" charset="0"/>
-              </a:rPr>
-              <a:t>/</a:t>
-            </a:r>
-            <a:r>
-              <a:rPr lang="en-US" altLang="en-US" sz="1600" dirty="0" err="1">
-                <a:solidFill>
-                  <a:srgbClr val="6A8759"/>
-                </a:solidFill>
-                <a:latin typeface="Consolas" panose="020B0609020204030204" pitchFamily="49" charset="0"/>
-              </a:rPr>
-              <a:t>ic_launcher</a:t>
-            </a:r>
-            <a:r>
-              <a:rPr lang="en-US" altLang="en-US" sz="1600" dirty="0" smtClean="0">
-                <a:solidFill>
-                  <a:srgbClr val="6A8759"/>
-                </a:solidFill>
-                <a:latin typeface="Consolas" panose="020B0609020204030204" pitchFamily="49" charset="0"/>
-              </a:rPr>
-              <a:t>"</a:t>
-            </a:r>
-            <a:br>
-              <a:rPr lang="en-US" altLang="en-US" sz="1600" dirty="0" smtClean="0">
-                <a:solidFill>
-                  <a:srgbClr val="6A8759"/>
-                </a:solidFill>
-                <a:latin typeface="Consolas" panose="020B0609020204030204" pitchFamily="49" charset="0"/>
-              </a:rPr>
-            </a:br>
-            <a:r>
-              <a:rPr lang="en-US" altLang="en-US" sz="1600" dirty="0" smtClean="0">
-                <a:solidFill>
-                  <a:srgbClr val="6A8759"/>
-                </a:solidFill>
-                <a:latin typeface="Consolas" panose="020B0609020204030204" pitchFamily="49" charset="0"/>
-              </a:rPr>
-              <a:t>    </a:t>
-            </a:r>
-            <a:r>
-              <a:rPr lang="en-US" altLang="en-US" sz="1600" dirty="0" err="1" smtClean="0">
-                <a:solidFill>
-                  <a:srgbClr val="9876AA"/>
-                </a:solidFill>
-                <a:latin typeface="Consolas" panose="020B0609020204030204" pitchFamily="49" charset="0"/>
-              </a:rPr>
-              <a:t>android</a:t>
-            </a:r>
-            <a:r>
-              <a:rPr lang="en-US" altLang="en-US" sz="1600" dirty="0" err="1" smtClean="0">
-                <a:solidFill>
-                  <a:srgbClr val="BABABA"/>
-                </a:solidFill>
-                <a:latin typeface="Consolas" panose="020B0609020204030204" pitchFamily="49" charset="0"/>
-              </a:rPr>
-              <a:t>:smallIcon</a:t>
-            </a:r>
-            <a:r>
-              <a:rPr lang="en-US" altLang="en-US" sz="1600" dirty="0">
-                <a:solidFill>
-                  <a:srgbClr val="BABABA"/>
-                </a:solidFill>
-                <a:latin typeface="Consolas" panose="020B0609020204030204" pitchFamily="49" charset="0"/>
-              </a:rPr>
-              <a:t>=</a:t>
-            </a:r>
-            <a:r>
-              <a:rPr lang="en-US" altLang="en-US" sz="1600" dirty="0">
-                <a:solidFill>
-                  <a:srgbClr val="6A8759"/>
-                </a:solidFill>
-                <a:latin typeface="Consolas" panose="020B0609020204030204" pitchFamily="49" charset="0"/>
-              </a:rPr>
-              <a:t>"@</a:t>
-            </a:r>
-            <a:r>
-              <a:rPr lang="en-US" altLang="en-US" sz="1600" dirty="0" err="1">
-                <a:solidFill>
-                  <a:srgbClr val="6A8759"/>
-                </a:solidFill>
-                <a:latin typeface="Consolas" panose="020B0609020204030204" pitchFamily="49" charset="0"/>
-              </a:rPr>
-              <a:t>drawable</a:t>
-            </a:r>
-            <a:r>
-              <a:rPr lang="en-US" altLang="en-US" sz="1600" dirty="0">
-                <a:solidFill>
-                  <a:srgbClr val="6A8759"/>
-                </a:solidFill>
-                <a:latin typeface="Consolas" panose="020B0609020204030204" pitchFamily="49" charset="0"/>
-              </a:rPr>
-              <a:t>/</a:t>
-            </a:r>
-            <a:r>
-              <a:rPr lang="en-US" altLang="en-US" sz="1600" dirty="0" err="1">
-                <a:solidFill>
-                  <a:srgbClr val="6A8759"/>
-                </a:solidFill>
-                <a:latin typeface="Consolas" panose="020B0609020204030204" pitchFamily="49" charset="0"/>
-              </a:rPr>
-              <a:t>ic_launcher</a:t>
-            </a:r>
-            <a:r>
-              <a:rPr lang="en-US" altLang="en-US" sz="1600" dirty="0">
-                <a:solidFill>
-                  <a:srgbClr val="6A8759"/>
-                </a:solidFill>
-                <a:latin typeface="Consolas" panose="020B0609020204030204" pitchFamily="49" charset="0"/>
-              </a:rPr>
-              <a:t>"</a:t>
-            </a:r>
-            <a:r>
-              <a:rPr lang="en-US" altLang="en-US" sz="1600" dirty="0">
-                <a:solidFill>
-                  <a:srgbClr val="E8BF6A"/>
-                </a:solidFill>
-                <a:latin typeface="Consolas" panose="020B0609020204030204" pitchFamily="49" charset="0"/>
-              </a:rPr>
-              <a:t>/&gt;</a:t>
-            </a:r>
-            <a:br>
-              <a:rPr lang="en-US" altLang="en-US" sz="1600" dirty="0">
-                <a:solidFill>
-                  <a:srgbClr val="E8BF6A"/>
-                </a:solidFill>
-                <a:latin typeface="Consolas" panose="020B0609020204030204" pitchFamily="49" charset="0"/>
-              </a:rPr>
-            </a:br>
-            <a:endParaRPr lang="en-US" altLang="en-US" sz="1600" dirty="0">
-              <a:latin typeface="Consolas" panose="020B0609020204030204" pitchFamily="49" charset="0"/>
-            </a:endParaRPr>
-          </a:p>
-          <a:p>
-            <a:pPr marL="0" marR="0" lvl="0" indent="0" algn="l" defTabSz="914400" rtl="0" eaLnBrk="0" fontAlgn="base" latinLnBrk="0" hangingPunct="0">
-              <a:lnSpc>
-                <a:spcPct val="100000"/>
-              </a:lnSpc>
-              <a:spcBef>
-                <a:spcPct val="0"/>
-              </a:spcBef>
-              <a:spcAft>
-                <a:spcPct val="0"/>
-              </a:spcAft>
-              <a:buClrTx/>
-              <a:buSzTx/>
-              <a:buFontTx/>
-              <a:buNone/>
-              <a:tabLst/>
-            </a:pPr>
-            <a:endParaRPr kumimoji="0" lang="en-US" altLang="en-US" sz="1600" b="0" i="0" u="none" strike="noStrike" cap="none" normalizeH="0" baseline="0" dirty="0" smtClean="0">
-              <a:ln>
-                <a:noFill/>
-              </a:ln>
-              <a:solidFill>
-                <a:schemeClr val="tx1"/>
-              </a:solidFill>
-              <a:effectLst/>
-              <a:latin typeface="Consolas" panose="020B0609020204030204" pitchFamily="49" charset="0"/>
-            </a:endParaRPr>
-          </a:p>
-        </p:txBody>
-      </p:sp>
-      <p:sp>
-        <p:nvSpPr>
-          <p:cNvPr id="9" name="TextBox 8"/>
-          <p:cNvSpPr txBox="1"/>
-          <p:nvPr/>
-        </p:nvSpPr>
-        <p:spPr>
-          <a:xfrm>
-            <a:off x="652500" y="1556792"/>
-            <a:ext cx="10887000" cy="461665"/>
-          </a:xfrm>
-          <a:prstGeom prst="rect">
-            <a:avLst/>
-          </a:prstGeom>
-          <a:noFill/>
-        </p:spPr>
-        <p:txBody>
-          <a:bodyPr wrap="square" rtlCol="0">
-            <a:spAutoFit/>
-          </a:bodyPr>
-          <a:lstStyle/>
-          <a:p>
-            <a:r>
-              <a:rPr lang="en-US" sz="2400" dirty="0" smtClean="0">
-                <a:solidFill>
-                  <a:schemeClr val="bg1"/>
-                </a:solidFill>
-                <a:latin typeface="Consolas" panose="020B0609020204030204" pitchFamily="49" charset="0"/>
-              </a:rPr>
-              <a:t>res/xml/syncadapter.xml</a:t>
-            </a:r>
-            <a:endParaRPr lang="en-US" sz="2400" dirty="0">
-              <a:solidFill>
-                <a:schemeClr val="bg1"/>
-              </a:solidFill>
-              <a:latin typeface="Consolas" panose="020B0609020204030204" pitchFamily="49" charset="0"/>
-            </a:endParaRPr>
-          </a:p>
-        </p:txBody>
-      </p:sp>
-    </p:spTree>
-    <p:extLst>
-      <p:ext uri="{BB962C8B-B14F-4D97-AF65-F5344CB8AC3E}">
-        <p14:creationId xmlns:p14="http://schemas.microsoft.com/office/powerpoint/2010/main" val="717921531"/>
-      </p:ext>
-    </p:extLst>
-  </p:cSld>
-  <p:clrMapOvr>
-    <a:masterClrMapping/>
-  </p:clrMapOvr>
-  <mc:AlternateContent xmlns:mc="http://schemas.openxmlformats.org/markup-compatibility/2006" xmlns:p14="http://schemas.microsoft.com/office/powerpoint/2010/main">
-    <mc:Choice Requires="p14">
-      <p:transition p14:dur="250">
-        <p14:reveal/>
-      </p:transition>
-    </mc:Choice>
-    <mc:Fallback xmlns="">
-      <p:transition>
-        <p:fade/>
-      </p:transition>
-    </mc:Fallback>
-  </mc:AlternateContent>
-  <p:timing>
-    <p:tnLst>
-      <p:par>
-        <p:cTn id="1" dur="indefinite" restart="never" nodeType="tmRoot">
-          <p:childTnLst>
-            <p:seq concurrent="1" nextAc="seek">
-              <p:cTn id="2" dur="indefinite" nodeType="mainSeq">
-                <p:childTnLst>
-                  <p:par>
-                    <p:cTn id="3" fill="hold">
-                      <p:stCondLst>
-                        <p:cond delay="indefinite"/>
-                      </p:stCondLst>
-                      <p:childTnLst>
-                        <p:par>
-                          <p:cTn id="4" fill="hold">
-                            <p:stCondLst>
-                              <p:cond delay="0"/>
-                            </p:stCondLst>
-                            <p:childTnLst>
-                              <p:par>
-                                <p:cTn id="5" presetID="10" presetClass="entr" presetSubtype="0" fill="hold" grpId="0" nodeType="clickEffect">
-                                  <p:stCondLst>
-                                    <p:cond delay="0"/>
-                                  </p:stCondLst>
-                                  <p:childTnLst>
-                                    <p:set>
-                                      <p:cBhvr>
-                                        <p:cTn id="6" dur="1" fill="hold">
-                                          <p:stCondLst>
-                                            <p:cond delay="0"/>
-                                          </p:stCondLst>
-                                        </p:cTn>
-                                        <p:tgtEl>
-                                          <p:spTgt spid="9"/>
-                                        </p:tgtEl>
-                                        <p:attrNameLst>
-                                          <p:attrName>style.visibility</p:attrName>
-                                        </p:attrNameLst>
-                                      </p:cBhvr>
-                                      <p:to>
-                                        <p:strVal val="visible"/>
-                                      </p:to>
-                                    </p:set>
-                                    <p:animEffect transition="in" filter="fade">
-                                      <p:cBhvr>
-                                        <p:cTn id="7" dur="300"/>
-                                        <p:tgtEl>
-                                          <p:spTgt spid="9"/>
-                                        </p:tgtEl>
-                                      </p:cBhvr>
-                                    </p:animEffect>
-                                  </p:childTnLst>
-                                </p:cTn>
-                              </p:par>
-                              <p:par>
-                                <p:cTn id="8" presetID="10" presetClass="entr" presetSubtype="0" fill="hold" grpId="0" nodeType="withEffect">
-                                  <p:stCondLst>
-                                    <p:cond delay="200"/>
-                                  </p:stCondLst>
-                                  <p:childTnLst>
-                                    <p:set>
-                                      <p:cBhvr>
-                                        <p:cTn id="9" dur="1" fill="hold">
-                                          <p:stCondLst>
-                                            <p:cond delay="0"/>
-                                          </p:stCondLst>
-                                        </p:cTn>
-                                        <p:tgtEl>
-                                          <p:spTgt spid="8"/>
-                                        </p:tgtEl>
-                                        <p:attrNameLst>
-                                          <p:attrName>style.visibility</p:attrName>
-                                        </p:attrNameLst>
-                                      </p:cBhvr>
-                                      <p:to>
-                                        <p:strVal val="visible"/>
-                                      </p:to>
-                                    </p:set>
-                                    <p:animEffect transition="in" filter="fade">
-                                      <p:cBhvr>
-                                        <p:cTn id="10" dur="300"/>
-                                        <p:tgtEl>
-                                          <p:spTgt spid="8"/>
-                                        </p:tgtEl>
-                                      </p:cBhvr>
-                                    </p:animEffect>
-                                  </p:childTnLst>
-                                </p:cTn>
-                              </p:par>
-                            </p:childTnLst>
-                          </p:cTn>
-                        </p:par>
-                      </p:childTnLst>
-                    </p:cTn>
-                  </p:par>
-                </p:childTnLst>
-              </p:cTn>
-              <p:prevCondLst>
-                <p:cond evt="onPrev" delay="0">
-                  <p:tgtEl>
-                    <p:sldTgt/>
-                  </p:tgtEl>
-                </p:cond>
-              </p:prevCondLst>
-              <p:nextCondLst>
-                <p:cond evt="onNext" delay="0">
-                  <p:tgtEl>
-                    <p:sldTgt/>
-                  </p:tgtEl>
-                </p:cond>
-              </p:nextCondLst>
-            </p:seq>
-          </p:childTnLst>
-        </p:cTn>
-      </p:par>
-    </p:tnLst>
-    <p:bldLst>
-      <p:bldP spid="8" grpId="0" animBg="1"/>
-      <p:bldP spid="9" grpId="0"/>
-    </p:bldLst>
-  </p:timing>
-</p:sld>
-</file>
-
-<file path=ppt/slides/slide32.xml><?xml version="1.0" encoding="utf-8"?>
-<p:sld xmlns:a="http://schemas.openxmlformats.org/drawingml/2006/main" xmlns:r="http://schemas.openxmlformats.org/officeDocument/2006/relationships" xmlns:p="http://schemas.openxmlformats.org/presentationml/2006/main">
-  <p:cSld>
-    <p:spTree>
-      <p:nvGrpSpPr>
-        <p:cNvPr id="1" name=""/>
-        <p:cNvGrpSpPr/>
-        <p:nvPr/>
-      </p:nvGrpSpPr>
-      <p:grpSpPr>
-        <a:xfrm>
-          <a:off x="0" y="0"/>
-          <a:ext cx="0" cy="0"/>
-          <a:chOff x="0" y="0"/>
-          <a:chExt cx="0" cy="0"/>
-        </a:xfrm>
-      </p:grpSpPr>
-      <p:sp>
-        <p:nvSpPr>
           <p:cNvPr id="5" name="Rectangle 1"/>
           <p:cNvSpPr>
             <a:spLocks noChangeArrowheads="1"/>
@@ -31817,6 +31018,808 @@
     </p:tnLst>
     <p:bldLst>
       <p:bldP spid="8" grpId="0" animBg="1"/>
+    </p:bldLst>
+  </p:timing>
+</p:sld>
+</file>
+
+<file path=ppt/slides/slide32.xml><?xml version="1.0" encoding="utf-8"?>
+<p:sld xmlns:a="http://schemas.openxmlformats.org/drawingml/2006/main" xmlns:r="http://schemas.openxmlformats.org/officeDocument/2006/relationships" xmlns:p="http://schemas.openxmlformats.org/presentationml/2006/main">
+  <p:cSld>
+    <p:spTree>
+      <p:nvGrpSpPr>
+        <p:cNvPr id="1" name=""/>
+        <p:cNvGrpSpPr/>
+        <p:nvPr/>
+      </p:nvGrpSpPr>
+      <p:grpSpPr>
+        <a:xfrm>
+          <a:off x="0" y="0"/>
+          <a:ext cx="0" cy="0"/>
+          <a:chOff x="0" y="0"/>
+          <a:chExt cx="0" cy="0"/>
+        </a:xfrm>
+      </p:grpSpPr>
+      <p:sp>
+        <p:nvSpPr>
+          <p:cNvPr id="8" name="Rectangle 1"/>
+          <p:cNvSpPr>
+            <a:spLocks noChangeArrowheads="1"/>
+          </p:cNvSpPr>
+          <p:nvPr/>
+        </p:nvSpPr>
+        <p:spPr bwMode="auto">
+          <a:xfrm>
+            <a:off x="652500" y="2132856"/>
+            <a:ext cx="10887000" cy="4104456"/>
+          </a:xfrm>
+          <a:prstGeom prst="rect">
+            <a:avLst/>
+          </a:prstGeom>
+          <a:solidFill>
+            <a:srgbClr val="2B2B2B"/>
+          </a:solidFill>
+          <a:ln>
+            <a:noFill/>
+          </a:ln>
+          <a:effectLst/>
+          <a:extLst>
+            <a:ext uri="{91240B29-F687-4F45-9708-019B960494DF}">
+              <a14:hiddenLine xmlns:a14="http://schemas.microsoft.com/office/drawing/2010/main" w="9525">
+                <a:solidFill>
+                  <a:schemeClr val="tx1"/>
+                </a:solidFill>
+                <a:miter lim="800000"/>
+                <a:headEnd/>
+                <a:tailEnd/>
+              </a14:hiddenLine>
+            </a:ext>
+            <a:ext uri="{AF507438-7753-43E0-B8FC-AC1667EBCBE1}">
+              <a14:hiddenEffects xmlns:a14="http://schemas.microsoft.com/office/drawing/2010/main">
+                <a:effectLst>
+                  <a:outerShdw dist="35921" dir="2700000" algn="ctr" rotWithShape="0">
+                    <a:schemeClr val="bg2"/>
+                  </a:outerShdw>
+                </a:effectLst>
+              </a14:hiddenEffects>
+            </a:ext>
+          </a:extLst>
+        </p:spPr>
+        <p:txBody>
+          <a:bodyPr vert="horz" wrap="square" lIns="182880" tIns="182880" rIns="182880" bIns="182880" numCol="1" anchor="t" anchorCtr="0" compatLnSpc="1">
+            <a:prstTxWarp prst="textNoShape">
+              <a:avLst/>
+            </a:prstTxWarp>
+            <a:noAutofit/>
+          </a:bodyPr>
+          <a:lstStyle/>
+          <a:p>
+            <a:pPr eaLnBrk="0" fontAlgn="base" hangingPunct="0">
+              <a:spcBef>
+                <a:spcPct val="0"/>
+              </a:spcBef>
+              <a:spcAft>
+                <a:spcPct val="0"/>
+              </a:spcAft>
+            </a:pPr>
+            <a:r>
+              <a:rPr lang="en-US" altLang="en-US" sz="1600" dirty="0">
+                <a:solidFill>
+                  <a:srgbClr val="E8BF6A"/>
+                </a:solidFill>
+                <a:latin typeface="Consolas" panose="020B0609020204030204" pitchFamily="49" charset="0"/>
+              </a:rPr>
+              <a:t>&lt;account-authenticator</a:t>
+            </a:r>
+            <a:br>
+              <a:rPr lang="en-US" altLang="en-US" sz="1600" dirty="0">
+                <a:solidFill>
+                  <a:srgbClr val="E8BF6A"/>
+                </a:solidFill>
+                <a:latin typeface="Consolas" panose="020B0609020204030204" pitchFamily="49" charset="0"/>
+              </a:rPr>
+            </a:br>
+            <a:r>
+              <a:rPr lang="en-US" altLang="en-US" sz="1600" dirty="0">
+                <a:solidFill>
+                  <a:srgbClr val="E8BF6A"/>
+                </a:solidFill>
+                <a:latin typeface="Consolas" panose="020B0609020204030204" pitchFamily="49" charset="0"/>
+              </a:rPr>
+              <a:t>    </a:t>
+            </a:r>
+            <a:r>
+              <a:rPr lang="en-US" altLang="en-US" sz="1600" dirty="0" err="1">
+                <a:solidFill>
+                  <a:srgbClr val="BABABA"/>
+                </a:solidFill>
+                <a:latin typeface="Consolas" panose="020B0609020204030204" pitchFamily="49" charset="0"/>
+              </a:rPr>
+              <a:t>xmlns:</a:t>
+            </a:r>
+            <a:r>
+              <a:rPr lang="en-US" altLang="en-US" sz="1600" dirty="0" err="1">
+                <a:solidFill>
+                  <a:srgbClr val="9876AA"/>
+                </a:solidFill>
+                <a:latin typeface="Consolas" panose="020B0609020204030204" pitchFamily="49" charset="0"/>
+              </a:rPr>
+              <a:t>android</a:t>
+            </a:r>
+            <a:r>
+              <a:rPr lang="en-US" altLang="en-US" sz="1600" dirty="0">
+                <a:solidFill>
+                  <a:srgbClr val="BABABA"/>
+                </a:solidFill>
+                <a:latin typeface="Consolas" panose="020B0609020204030204" pitchFamily="49" charset="0"/>
+              </a:rPr>
+              <a:t>=</a:t>
+            </a:r>
+            <a:r>
+              <a:rPr lang="en-US" altLang="en-US" sz="1600" dirty="0">
+                <a:solidFill>
+                  <a:srgbClr val="6A8759"/>
+                </a:solidFill>
+                <a:latin typeface="Consolas" panose="020B0609020204030204" pitchFamily="49" charset="0"/>
+              </a:rPr>
+              <a:t>"http://schemas.android.com/</a:t>
+            </a:r>
+            <a:r>
+              <a:rPr lang="en-US" altLang="en-US" sz="1600" dirty="0" err="1">
+                <a:solidFill>
+                  <a:srgbClr val="6A8759"/>
+                </a:solidFill>
+                <a:latin typeface="Consolas" panose="020B0609020204030204" pitchFamily="49" charset="0"/>
+              </a:rPr>
+              <a:t>apk</a:t>
+            </a:r>
+            <a:r>
+              <a:rPr lang="en-US" altLang="en-US" sz="1600" dirty="0">
+                <a:solidFill>
+                  <a:srgbClr val="6A8759"/>
+                </a:solidFill>
+                <a:latin typeface="Consolas" panose="020B0609020204030204" pitchFamily="49" charset="0"/>
+              </a:rPr>
+              <a:t>/res/android"</a:t>
+            </a:r>
+            <a:br>
+              <a:rPr lang="en-US" altLang="en-US" sz="1600" dirty="0">
+                <a:solidFill>
+                  <a:srgbClr val="6A8759"/>
+                </a:solidFill>
+                <a:latin typeface="Consolas" panose="020B0609020204030204" pitchFamily="49" charset="0"/>
+              </a:rPr>
+            </a:br>
+            <a:r>
+              <a:rPr lang="en-US" altLang="en-US" sz="1600" dirty="0">
+                <a:solidFill>
+                  <a:srgbClr val="6A8759"/>
+                </a:solidFill>
+                <a:latin typeface="Consolas" panose="020B0609020204030204" pitchFamily="49" charset="0"/>
+              </a:rPr>
+              <a:t>    </a:t>
+            </a:r>
+            <a:r>
+              <a:rPr lang="en-US" altLang="en-US" sz="1600" dirty="0" err="1">
+                <a:solidFill>
+                  <a:srgbClr val="9876AA"/>
+                </a:solidFill>
+                <a:latin typeface="Consolas" panose="020B0609020204030204" pitchFamily="49" charset="0"/>
+              </a:rPr>
+              <a:t>android</a:t>
+            </a:r>
+            <a:r>
+              <a:rPr lang="en-US" altLang="en-US" sz="1600" dirty="0" err="1">
+                <a:solidFill>
+                  <a:srgbClr val="BABABA"/>
+                </a:solidFill>
+                <a:latin typeface="Consolas" panose="020B0609020204030204" pitchFamily="49" charset="0"/>
+              </a:rPr>
+              <a:t>:accountPreferences</a:t>
+            </a:r>
+            <a:r>
+              <a:rPr lang="en-US" altLang="en-US" sz="1600" dirty="0">
+                <a:solidFill>
+                  <a:srgbClr val="BABABA"/>
+                </a:solidFill>
+                <a:latin typeface="Consolas" panose="020B0609020204030204" pitchFamily="49" charset="0"/>
+              </a:rPr>
+              <a:t>=</a:t>
+            </a:r>
+            <a:r>
+              <a:rPr lang="en-US" altLang="en-US" sz="1600" dirty="0">
+                <a:solidFill>
+                  <a:srgbClr val="6A8759"/>
+                </a:solidFill>
+                <a:latin typeface="Consolas" panose="020B0609020204030204" pitchFamily="49" charset="0"/>
+              </a:rPr>
+              <a:t>"@xml/</a:t>
+            </a:r>
+            <a:r>
+              <a:rPr lang="en-US" altLang="en-US" sz="1600" dirty="0" err="1">
+                <a:solidFill>
+                  <a:srgbClr val="6A8759"/>
+                </a:solidFill>
+                <a:latin typeface="Consolas" panose="020B0609020204030204" pitchFamily="49" charset="0"/>
+              </a:rPr>
+              <a:t>account_preferences</a:t>
+            </a:r>
+            <a:r>
+              <a:rPr lang="en-US" altLang="en-US" sz="1600" dirty="0">
+                <a:solidFill>
+                  <a:srgbClr val="6A8759"/>
+                </a:solidFill>
+                <a:latin typeface="Consolas" panose="020B0609020204030204" pitchFamily="49" charset="0"/>
+              </a:rPr>
+              <a:t>"</a:t>
+            </a:r>
+            <a:br>
+              <a:rPr lang="en-US" altLang="en-US" sz="1600" dirty="0">
+                <a:solidFill>
+                  <a:srgbClr val="6A8759"/>
+                </a:solidFill>
+                <a:latin typeface="Consolas" panose="020B0609020204030204" pitchFamily="49" charset="0"/>
+              </a:rPr>
+            </a:br>
+            <a:r>
+              <a:rPr lang="en-US" altLang="en-US" sz="1600" dirty="0">
+                <a:solidFill>
+                  <a:srgbClr val="6A8759"/>
+                </a:solidFill>
+                <a:latin typeface="Consolas" panose="020B0609020204030204" pitchFamily="49" charset="0"/>
+              </a:rPr>
+              <a:t>    </a:t>
+            </a:r>
+            <a:r>
+              <a:rPr lang="en-US" altLang="en-US" sz="1600" dirty="0" err="1">
+                <a:solidFill>
+                  <a:srgbClr val="9876AA"/>
+                </a:solidFill>
+                <a:latin typeface="Consolas" panose="020B0609020204030204" pitchFamily="49" charset="0"/>
+              </a:rPr>
+              <a:t>android</a:t>
+            </a:r>
+            <a:r>
+              <a:rPr lang="en-US" altLang="en-US" sz="1600" dirty="0" err="1">
+                <a:solidFill>
+                  <a:srgbClr val="BABABA"/>
+                </a:solidFill>
+                <a:latin typeface="Consolas" panose="020B0609020204030204" pitchFamily="49" charset="0"/>
+              </a:rPr>
+              <a:t>:accountType</a:t>
+            </a:r>
+            <a:r>
+              <a:rPr lang="en-US" altLang="en-US" sz="1600" dirty="0">
+                <a:solidFill>
+                  <a:srgbClr val="BABABA"/>
+                </a:solidFill>
+                <a:latin typeface="Consolas" panose="020B0609020204030204" pitchFamily="49" charset="0"/>
+              </a:rPr>
+              <a:t>=</a:t>
+            </a:r>
+            <a:r>
+              <a:rPr lang="en-US" altLang="en-US" sz="1600" dirty="0">
+                <a:solidFill>
+                  <a:srgbClr val="6A8759"/>
+                </a:solidFill>
+                <a:latin typeface="Consolas" panose="020B0609020204030204" pitchFamily="49" charset="0"/>
+              </a:rPr>
+              <a:t>"</a:t>
+            </a:r>
+            <a:r>
+              <a:rPr lang="en-US" altLang="en-US" sz="1600" dirty="0" err="1">
+                <a:solidFill>
+                  <a:srgbClr val="6A8759"/>
+                </a:solidFill>
+                <a:latin typeface="Consolas" panose="020B0609020204030204" pitchFamily="49" charset="0"/>
+              </a:rPr>
+              <a:t>com.example.android.basicsyncadapter.account</a:t>
+            </a:r>
+            <a:r>
+              <a:rPr lang="en-US" altLang="en-US" sz="1600" dirty="0">
+                <a:solidFill>
+                  <a:srgbClr val="6A8759"/>
+                </a:solidFill>
+                <a:latin typeface="Consolas" panose="020B0609020204030204" pitchFamily="49" charset="0"/>
+              </a:rPr>
+              <a:t>"</a:t>
+            </a:r>
+            <a:br>
+              <a:rPr lang="en-US" altLang="en-US" sz="1600" dirty="0">
+                <a:solidFill>
+                  <a:srgbClr val="6A8759"/>
+                </a:solidFill>
+                <a:latin typeface="Consolas" panose="020B0609020204030204" pitchFamily="49" charset="0"/>
+              </a:rPr>
+            </a:br>
+            <a:r>
+              <a:rPr lang="en-US" altLang="en-US" sz="1600" dirty="0" smtClean="0">
+                <a:solidFill>
+                  <a:srgbClr val="6A8759"/>
+                </a:solidFill>
+                <a:latin typeface="Consolas" panose="020B0609020204030204" pitchFamily="49" charset="0"/>
+              </a:rPr>
+              <a:t>    </a:t>
+            </a:r>
+            <a:r>
+              <a:rPr lang="en-US" altLang="en-US" sz="1600" dirty="0" err="1">
+                <a:solidFill>
+                  <a:srgbClr val="9876AA"/>
+                </a:solidFill>
+                <a:latin typeface="Consolas" panose="020B0609020204030204" pitchFamily="49" charset="0"/>
+              </a:rPr>
+              <a:t>android</a:t>
+            </a:r>
+            <a:r>
+              <a:rPr lang="en-US" altLang="en-US" sz="1600" dirty="0" err="1">
+                <a:solidFill>
+                  <a:srgbClr val="BABABA"/>
+                </a:solidFill>
+                <a:latin typeface="Consolas" panose="020B0609020204030204" pitchFamily="49" charset="0"/>
+              </a:rPr>
+              <a:t>:label</a:t>
+            </a:r>
+            <a:r>
+              <a:rPr lang="en-US" altLang="en-US" sz="1600" dirty="0">
+                <a:solidFill>
+                  <a:srgbClr val="BABABA"/>
+                </a:solidFill>
+                <a:latin typeface="Consolas" panose="020B0609020204030204" pitchFamily="49" charset="0"/>
+              </a:rPr>
+              <a:t>=</a:t>
+            </a:r>
+            <a:r>
+              <a:rPr lang="en-US" altLang="en-US" sz="1600" dirty="0">
+                <a:solidFill>
+                  <a:srgbClr val="6A8759"/>
+                </a:solidFill>
+                <a:latin typeface="Consolas" panose="020B0609020204030204" pitchFamily="49" charset="0"/>
+              </a:rPr>
+              <a:t>"@</a:t>
+            </a:r>
+            <a:r>
+              <a:rPr lang="en-US" altLang="en-US" sz="1600" dirty="0" smtClean="0">
+                <a:solidFill>
+                  <a:srgbClr val="6A8759"/>
+                </a:solidFill>
+                <a:latin typeface="Consolas" panose="020B0609020204030204" pitchFamily="49" charset="0"/>
+              </a:rPr>
+              <a:t>string/</a:t>
+            </a:r>
+            <a:r>
+              <a:rPr lang="en-US" altLang="en-US" sz="1600" dirty="0" err="1" smtClean="0">
+                <a:solidFill>
+                  <a:srgbClr val="6A8759"/>
+                </a:solidFill>
+                <a:latin typeface="Consolas" panose="020B0609020204030204" pitchFamily="49" charset="0"/>
+              </a:rPr>
+              <a:t>app_name</a:t>
+            </a:r>
+            <a:r>
+              <a:rPr lang="en-US" altLang="en-US" sz="1600" dirty="0" smtClean="0">
+                <a:solidFill>
+                  <a:srgbClr val="6A8759"/>
+                </a:solidFill>
+                <a:latin typeface="Consolas" panose="020B0609020204030204" pitchFamily="49" charset="0"/>
+              </a:rPr>
+              <a:t>“</a:t>
+            </a:r>
+          </a:p>
+          <a:p>
+            <a:pPr eaLnBrk="0" fontAlgn="base" hangingPunct="0">
+              <a:spcBef>
+                <a:spcPct val="0"/>
+              </a:spcBef>
+              <a:spcAft>
+                <a:spcPct val="0"/>
+              </a:spcAft>
+            </a:pPr>
+            <a:r>
+              <a:rPr lang="en-US" altLang="en-US" sz="1600" dirty="0" smtClean="0">
+                <a:solidFill>
+                  <a:srgbClr val="6A8759"/>
+                </a:solidFill>
+                <a:latin typeface="Consolas" panose="020B0609020204030204" pitchFamily="49" charset="0"/>
+              </a:rPr>
+              <a:t>    </a:t>
+            </a:r>
+            <a:r>
+              <a:rPr lang="en-US" altLang="en-US" sz="1600" dirty="0" err="1">
+                <a:solidFill>
+                  <a:srgbClr val="9876AA"/>
+                </a:solidFill>
+                <a:latin typeface="Consolas" panose="020B0609020204030204" pitchFamily="49" charset="0"/>
+              </a:rPr>
+              <a:t>android</a:t>
+            </a:r>
+            <a:r>
+              <a:rPr lang="en-US" altLang="en-US" sz="1600" dirty="0" err="1">
+                <a:solidFill>
+                  <a:srgbClr val="BABABA"/>
+                </a:solidFill>
+                <a:latin typeface="Consolas" panose="020B0609020204030204" pitchFamily="49" charset="0"/>
+              </a:rPr>
+              <a:t>:icon</a:t>
+            </a:r>
+            <a:r>
+              <a:rPr lang="en-US" altLang="en-US" sz="1600" dirty="0">
+                <a:solidFill>
+                  <a:srgbClr val="BABABA"/>
+                </a:solidFill>
+                <a:latin typeface="Consolas" panose="020B0609020204030204" pitchFamily="49" charset="0"/>
+              </a:rPr>
+              <a:t>=</a:t>
+            </a:r>
+            <a:r>
+              <a:rPr lang="en-US" altLang="en-US" sz="1600" dirty="0">
+                <a:solidFill>
+                  <a:srgbClr val="6A8759"/>
+                </a:solidFill>
+                <a:latin typeface="Consolas" panose="020B0609020204030204" pitchFamily="49" charset="0"/>
+              </a:rPr>
+              <a:t>"@</a:t>
+            </a:r>
+            <a:r>
+              <a:rPr lang="en-US" altLang="en-US" sz="1600" dirty="0" err="1">
+                <a:solidFill>
+                  <a:srgbClr val="6A8759"/>
+                </a:solidFill>
+                <a:latin typeface="Consolas" panose="020B0609020204030204" pitchFamily="49" charset="0"/>
+              </a:rPr>
+              <a:t>drawable</a:t>
+            </a:r>
+            <a:r>
+              <a:rPr lang="en-US" altLang="en-US" sz="1600" dirty="0">
+                <a:solidFill>
+                  <a:srgbClr val="6A8759"/>
+                </a:solidFill>
+                <a:latin typeface="Consolas" panose="020B0609020204030204" pitchFamily="49" charset="0"/>
+              </a:rPr>
+              <a:t>/</a:t>
+            </a:r>
+            <a:r>
+              <a:rPr lang="en-US" altLang="en-US" sz="1600" dirty="0" err="1">
+                <a:solidFill>
+                  <a:srgbClr val="6A8759"/>
+                </a:solidFill>
+                <a:latin typeface="Consolas" panose="020B0609020204030204" pitchFamily="49" charset="0"/>
+              </a:rPr>
+              <a:t>ic_launcher</a:t>
+            </a:r>
+            <a:r>
+              <a:rPr lang="en-US" altLang="en-US" sz="1600" dirty="0" smtClean="0">
+                <a:solidFill>
+                  <a:srgbClr val="6A8759"/>
+                </a:solidFill>
+                <a:latin typeface="Consolas" panose="020B0609020204030204" pitchFamily="49" charset="0"/>
+              </a:rPr>
+              <a:t>"</a:t>
+            </a:r>
+            <a:br>
+              <a:rPr lang="en-US" altLang="en-US" sz="1600" dirty="0" smtClean="0">
+                <a:solidFill>
+                  <a:srgbClr val="6A8759"/>
+                </a:solidFill>
+                <a:latin typeface="Consolas" panose="020B0609020204030204" pitchFamily="49" charset="0"/>
+              </a:rPr>
+            </a:br>
+            <a:r>
+              <a:rPr lang="en-US" altLang="en-US" sz="1600" dirty="0" smtClean="0">
+                <a:solidFill>
+                  <a:srgbClr val="6A8759"/>
+                </a:solidFill>
+                <a:latin typeface="Consolas" panose="020B0609020204030204" pitchFamily="49" charset="0"/>
+              </a:rPr>
+              <a:t>    </a:t>
+            </a:r>
+            <a:r>
+              <a:rPr lang="en-US" altLang="en-US" sz="1600" dirty="0" err="1" smtClean="0">
+                <a:solidFill>
+                  <a:srgbClr val="9876AA"/>
+                </a:solidFill>
+                <a:latin typeface="Consolas" panose="020B0609020204030204" pitchFamily="49" charset="0"/>
+              </a:rPr>
+              <a:t>android</a:t>
+            </a:r>
+            <a:r>
+              <a:rPr lang="en-US" altLang="en-US" sz="1600" dirty="0" err="1" smtClean="0">
+                <a:solidFill>
+                  <a:srgbClr val="BABABA"/>
+                </a:solidFill>
+                <a:latin typeface="Consolas" panose="020B0609020204030204" pitchFamily="49" charset="0"/>
+              </a:rPr>
+              <a:t>:smallIcon</a:t>
+            </a:r>
+            <a:r>
+              <a:rPr lang="en-US" altLang="en-US" sz="1600" dirty="0">
+                <a:solidFill>
+                  <a:srgbClr val="BABABA"/>
+                </a:solidFill>
+                <a:latin typeface="Consolas" panose="020B0609020204030204" pitchFamily="49" charset="0"/>
+              </a:rPr>
+              <a:t>=</a:t>
+            </a:r>
+            <a:r>
+              <a:rPr lang="en-US" altLang="en-US" sz="1600" dirty="0">
+                <a:solidFill>
+                  <a:srgbClr val="6A8759"/>
+                </a:solidFill>
+                <a:latin typeface="Consolas" panose="020B0609020204030204" pitchFamily="49" charset="0"/>
+              </a:rPr>
+              <a:t>"@</a:t>
+            </a:r>
+            <a:r>
+              <a:rPr lang="en-US" altLang="en-US" sz="1600" dirty="0" err="1">
+                <a:solidFill>
+                  <a:srgbClr val="6A8759"/>
+                </a:solidFill>
+                <a:latin typeface="Consolas" panose="020B0609020204030204" pitchFamily="49" charset="0"/>
+              </a:rPr>
+              <a:t>drawable</a:t>
+            </a:r>
+            <a:r>
+              <a:rPr lang="en-US" altLang="en-US" sz="1600" dirty="0">
+                <a:solidFill>
+                  <a:srgbClr val="6A8759"/>
+                </a:solidFill>
+                <a:latin typeface="Consolas" panose="020B0609020204030204" pitchFamily="49" charset="0"/>
+              </a:rPr>
+              <a:t>/</a:t>
+            </a:r>
+            <a:r>
+              <a:rPr lang="en-US" altLang="en-US" sz="1600" dirty="0" err="1">
+                <a:solidFill>
+                  <a:srgbClr val="6A8759"/>
+                </a:solidFill>
+                <a:latin typeface="Consolas" panose="020B0609020204030204" pitchFamily="49" charset="0"/>
+              </a:rPr>
+              <a:t>ic_launcher</a:t>
+            </a:r>
+            <a:r>
+              <a:rPr lang="en-US" altLang="en-US" sz="1600" dirty="0">
+                <a:solidFill>
+                  <a:srgbClr val="6A8759"/>
+                </a:solidFill>
+                <a:latin typeface="Consolas" panose="020B0609020204030204" pitchFamily="49" charset="0"/>
+              </a:rPr>
+              <a:t>"</a:t>
+            </a:r>
+            <a:r>
+              <a:rPr lang="en-US" altLang="en-US" sz="1600" dirty="0">
+                <a:solidFill>
+                  <a:srgbClr val="E8BF6A"/>
+                </a:solidFill>
+                <a:latin typeface="Consolas" panose="020B0609020204030204" pitchFamily="49" charset="0"/>
+              </a:rPr>
+              <a:t>/&gt;</a:t>
+            </a:r>
+            <a:br>
+              <a:rPr lang="en-US" altLang="en-US" sz="1600" dirty="0">
+                <a:solidFill>
+                  <a:srgbClr val="E8BF6A"/>
+                </a:solidFill>
+                <a:latin typeface="Consolas" panose="020B0609020204030204" pitchFamily="49" charset="0"/>
+              </a:rPr>
+            </a:br>
+            <a:endParaRPr lang="en-US" altLang="en-US" sz="1600" dirty="0">
+              <a:latin typeface="Consolas" panose="020B0609020204030204" pitchFamily="49" charset="0"/>
+            </a:endParaRPr>
+          </a:p>
+          <a:p>
+            <a:pPr marL="0" marR="0" lvl="0" indent="0" algn="l" defTabSz="914400" rtl="0" eaLnBrk="0" fontAlgn="base" latinLnBrk="0" hangingPunct="0">
+              <a:lnSpc>
+                <a:spcPct val="100000"/>
+              </a:lnSpc>
+              <a:spcBef>
+                <a:spcPct val="0"/>
+              </a:spcBef>
+              <a:spcAft>
+                <a:spcPct val="0"/>
+              </a:spcAft>
+              <a:buClrTx/>
+              <a:buSzTx/>
+              <a:buFontTx/>
+              <a:buNone/>
+              <a:tabLst/>
+            </a:pPr>
+            <a:endParaRPr kumimoji="0" lang="en-US" altLang="en-US" sz="1600" b="0" i="0" u="none" strike="noStrike" cap="none" normalizeH="0" baseline="0" dirty="0" smtClean="0">
+              <a:ln>
+                <a:noFill/>
+              </a:ln>
+              <a:solidFill>
+                <a:schemeClr val="tx1"/>
+              </a:solidFill>
+              <a:effectLst/>
+              <a:latin typeface="Consolas" panose="020B0609020204030204" pitchFamily="49" charset="0"/>
+            </a:endParaRPr>
+          </a:p>
+        </p:txBody>
+      </p:sp>
+      <p:sp>
+        <p:nvSpPr>
+          <p:cNvPr id="9" name="TextBox 8"/>
+          <p:cNvSpPr txBox="1"/>
+          <p:nvPr/>
+        </p:nvSpPr>
+        <p:spPr>
+          <a:xfrm>
+            <a:off x="652500" y="1556792"/>
+            <a:ext cx="10887000" cy="461665"/>
+          </a:xfrm>
+          <a:prstGeom prst="rect">
+            <a:avLst/>
+          </a:prstGeom>
+          <a:noFill/>
+        </p:spPr>
+        <p:txBody>
+          <a:bodyPr wrap="square" rtlCol="0">
+            <a:spAutoFit/>
+          </a:bodyPr>
+          <a:lstStyle/>
+          <a:p>
+            <a:r>
+              <a:rPr lang="en-US" sz="2400" dirty="0" smtClean="0">
+                <a:solidFill>
+                  <a:schemeClr val="bg1"/>
+                </a:solidFill>
+                <a:latin typeface="Consolas" panose="020B0609020204030204" pitchFamily="49" charset="0"/>
+              </a:rPr>
+              <a:t>res/xml/syncadapter.xml</a:t>
+            </a:r>
+            <a:endParaRPr lang="en-US" sz="2400" dirty="0">
+              <a:solidFill>
+                <a:schemeClr val="bg1"/>
+              </a:solidFill>
+              <a:latin typeface="Consolas" panose="020B0609020204030204" pitchFamily="49" charset="0"/>
+            </a:endParaRPr>
+          </a:p>
+        </p:txBody>
+      </p:sp>
+    </p:spTree>
+    <p:extLst>
+      <p:ext uri="{BB962C8B-B14F-4D97-AF65-F5344CB8AC3E}">
+        <p14:creationId xmlns:p14="http://schemas.microsoft.com/office/powerpoint/2010/main" val="717921531"/>
+      </p:ext>
+    </p:extLst>
+  </p:cSld>
+  <p:clrMapOvr>
+    <a:masterClrMapping/>
+  </p:clrMapOvr>
+  <mc:AlternateContent xmlns:mc="http://schemas.openxmlformats.org/markup-compatibility/2006" xmlns:p14="http://schemas.microsoft.com/office/powerpoint/2010/main">
+    <mc:Choice Requires="p14">
+      <p:transition p14:dur="250">
+        <p14:reveal/>
+      </p:transition>
+    </mc:Choice>
+    <mc:Fallback xmlns="">
+      <p:transition>
+        <p:fade/>
+      </p:transition>
+    </mc:Fallback>
+  </mc:AlternateContent>
+  <p:timing>
+    <p:tnLst>
+      <p:par>
+        <p:cTn id="1" dur="indefinite" restart="never" nodeType="tmRoot">
+          <p:childTnLst>
+            <p:seq concurrent="1" nextAc="seek">
+              <p:cTn id="2" dur="indefinite" nodeType="mainSeq">
+                <p:childTnLst>
+                  <p:par>
+                    <p:cTn id="3" fill="hold">
+                      <p:stCondLst>
+                        <p:cond delay="indefinite"/>
+                        <p:cond evt="onBegin" delay="0">
+                          <p:tn val="2"/>
+                        </p:cond>
+                      </p:stCondLst>
+                      <p:childTnLst>
+                        <p:par>
+                          <p:cTn id="4" fill="hold">
+                            <p:stCondLst>
+                              <p:cond delay="0"/>
+                            </p:stCondLst>
+                            <p:childTnLst>
+                              <p:par>
+                                <p:cTn id="5" presetID="10" presetClass="entr" presetSubtype="0" fill="hold" grpId="0" nodeType="withEffect">
+                                  <p:stCondLst>
+                                    <p:cond delay="0"/>
+                                  </p:stCondLst>
+                                  <p:childTnLst>
+                                    <p:set>
+                                      <p:cBhvr>
+                                        <p:cTn id="6" dur="1" fill="hold">
+                                          <p:stCondLst>
+                                            <p:cond delay="0"/>
+                                          </p:stCondLst>
+                                        </p:cTn>
+                                        <p:tgtEl>
+                                          <p:spTgt spid="9"/>
+                                        </p:tgtEl>
+                                        <p:attrNameLst>
+                                          <p:attrName>style.visibility</p:attrName>
+                                        </p:attrNameLst>
+                                      </p:cBhvr>
+                                      <p:to>
+                                        <p:strVal val="visible"/>
+                                      </p:to>
+                                    </p:set>
+                                    <p:animEffect transition="in" filter="fade">
+                                      <p:cBhvr>
+                                        <p:cTn id="7" dur="300"/>
+                                        <p:tgtEl>
+                                          <p:spTgt spid="9"/>
+                                        </p:tgtEl>
+                                      </p:cBhvr>
+                                    </p:animEffect>
+                                  </p:childTnLst>
+                                </p:cTn>
+                              </p:par>
+                              <p:par>
+                                <p:cTn id="8" presetID="10" presetClass="entr" presetSubtype="0" fill="hold" grpId="0" nodeType="withEffect">
+                                  <p:stCondLst>
+                                    <p:cond delay="200"/>
+                                  </p:stCondLst>
+                                  <p:childTnLst>
+                                    <p:set>
+                                      <p:cBhvr>
+                                        <p:cTn id="9" dur="1" fill="hold">
+                                          <p:stCondLst>
+                                            <p:cond delay="0"/>
+                                          </p:stCondLst>
+                                        </p:cTn>
+                                        <p:tgtEl>
+                                          <p:spTgt spid="8"/>
+                                        </p:tgtEl>
+                                        <p:attrNameLst>
+                                          <p:attrName>style.visibility</p:attrName>
+                                        </p:attrNameLst>
+                                      </p:cBhvr>
+                                      <p:to>
+                                        <p:strVal val="visible"/>
+                                      </p:to>
+                                    </p:set>
+                                    <p:animEffect transition="in" filter="fade">
+                                      <p:cBhvr>
+                                        <p:cTn id="10" dur="300"/>
+                                        <p:tgtEl>
+                                          <p:spTgt spid="8"/>
+                                        </p:tgtEl>
+                                      </p:cBhvr>
+                                    </p:animEffect>
+                                  </p:childTnLst>
+                                </p:cTn>
+                              </p:par>
+                            </p:childTnLst>
+                          </p:cTn>
+                        </p:par>
+                      </p:childTnLst>
+                    </p:cTn>
+                  </p:par>
+                </p:childTnLst>
+              </p:cTn>
+              <p:prevCondLst>
+                <p:cond evt="onPrev" delay="0">
+                  <p:tgtEl>
+                    <p:sldTgt/>
+                  </p:tgtEl>
+                </p:cond>
+              </p:prevCondLst>
+              <p:nextCondLst>
+                <p:cond evt="onNext" delay="0">
+                  <p:tgtEl>
+                    <p:sldTgt/>
+                  </p:tgtEl>
+                </p:cond>
+              </p:nextCondLst>
+            </p:seq>
+          </p:childTnLst>
+        </p:cTn>
+      </p:par>
+    </p:tnLst>
+    <p:bldLst>
+      <p:bldP spid="8" grpId="0" animBg="1"/>
+      <p:bldP spid="9" grpId="0"/>
     </p:bldLst>
   </p:timing>
 </p:sld>
@@ -34193,6 +34196,9 @@
                     <p:cTn id="3" fill="hold">
                       <p:stCondLst>
                         <p:cond delay="indefinite"/>
+                        <p:cond evt="onBegin" delay="0">
+                          <p:tn val="2"/>
+                        </p:cond>
                       </p:stCondLst>
                       <p:childTnLst>
                         <p:par>
@@ -34202,7 +34208,7 @@
                             </p:stCondLst>
                             <p:childTnLst>
                               <p:par>
-                                <p:cTn id="5" presetID="10" presetClass="entr" presetSubtype="0" fill="hold" grpId="0" nodeType="clickEffect">
+                                <p:cTn id="5" presetID="10" presetClass="entr" presetSubtype="0" fill="hold" grpId="0" nodeType="withEffect">
                                   <p:stCondLst>
                                     <p:cond delay="0"/>
                                   </p:stCondLst>
@@ -35392,9 +35398,18 @@
   <p:clrMapOvr>
     <a:masterClrMapping/>
   </p:clrMapOvr>
-  <p:transition spd="slow">
-    <p:fade thruBlk="1"/>
-  </p:transition>
+  <mc:AlternateContent xmlns:mc="http://schemas.openxmlformats.org/markup-compatibility/2006">
+    <mc:Choice xmlns:p14="http://schemas.microsoft.com/office/powerpoint/2010/main" Requires="p14">
+      <p:transition p14:dur="250">
+        <p14:reveal/>
+      </p:transition>
+    </mc:Choice>
+    <mc:Fallback>
+      <p:transition>
+        <p:fade/>
+      </p:transition>
+    </mc:Fallback>
+  </mc:AlternateContent>
   <p:timing>
     <p:tnLst>
       <p:par>
@@ -40733,7 +40748,7 @@
           </a:prstGeom>
           <a:solidFill>
             <a:srgbClr val="2B2B2B">
-              <a:alpha val="60000"/>
+              <a:alpha val="70000"/>
             </a:srgbClr>
           </a:solidFill>
           <a:ln>
@@ -41325,7 +41340,12 @@
             <p:ph idx="1"/>
           </p:nvPr>
         </p:nvSpPr>
-        <p:spPr/>
+        <p:spPr>
+          <a:xfrm>
+            <a:off x="609600" y="2420888"/>
+            <a:ext cx="10972800" cy="3705276"/>
+          </a:xfrm>
+        </p:spPr>
         <p:txBody>
           <a:bodyPr/>
           <a:lstStyle/>
@@ -41344,17 +41364,19 @@
             </a:pPr>
             <a:r>
               <a:rPr lang="en-US" dirty="0" smtClean="0"/>
-              <a:t>Usually a username or email</a:t>
-            </a:r>
+              <a:t>Usually a username or </a:t>
+            </a:r>
+            <a:r>
+              <a:rPr lang="en-US" dirty="0" smtClean="0"/>
+              <a:t>email</a:t>
+            </a:r>
+            <a:endParaRPr lang="en-US" dirty="0" smtClean="0"/>
           </a:p>
           <a:p>
             <a:pPr marL="0" indent="0">
-              <a:buNone/>
-            </a:pPr>
-            <a:endParaRPr lang="en-US" dirty="0" smtClean="0"/>
-          </a:p>
-          <a:p>
-            <a:pPr marL="0" indent="0">
+              <a:spcBef>
+                <a:spcPts val="3000"/>
+              </a:spcBef>
               <a:buNone/>
             </a:pPr>
             <a:r>
@@ -41391,6 +41413,134 @@
               <a:t>accounts</a:t>
             </a:r>
             <a:endParaRPr lang="en-US" dirty="0"/>
+          </a:p>
+        </p:txBody>
+      </p:sp>
+      <p:sp>
+        <p:nvSpPr>
+          <p:cNvPr id="4" name="Rectangle 1"/>
+          <p:cNvSpPr>
+            <a:spLocks noChangeArrowheads="1"/>
+          </p:cNvSpPr>
+          <p:nvPr/>
+        </p:nvSpPr>
+        <p:spPr bwMode="auto">
+          <a:xfrm>
+            <a:off x="652500" y="1700808"/>
+            <a:ext cx="10887000" cy="648072"/>
+          </a:xfrm>
+          <a:prstGeom prst="rect">
+            <a:avLst/>
+          </a:prstGeom>
+          <a:solidFill>
+            <a:srgbClr val="2B2B2B"/>
+          </a:solidFill>
+          <a:ln>
+            <a:noFill/>
+          </a:ln>
+          <a:effectLst/>
+          <a:extLst/>
+        </p:spPr>
+        <p:txBody>
+          <a:bodyPr vert="horz" wrap="square" lIns="182880" tIns="182880" rIns="182880" bIns="182880" numCol="1" anchor="t" anchorCtr="0" compatLnSpc="1">
+            <a:prstTxWarp prst="textNoShape">
+              <a:avLst/>
+            </a:prstTxWarp>
+            <a:noAutofit/>
+          </a:bodyPr>
+          <a:lstStyle/>
+          <a:p>
+            <a:pPr lvl="0" eaLnBrk="0" fontAlgn="base" hangingPunct="0">
+              <a:spcBef>
+                <a:spcPct val="0"/>
+              </a:spcBef>
+              <a:spcAft>
+                <a:spcPct val="0"/>
+              </a:spcAft>
+            </a:pPr>
+            <a:r>
+              <a:rPr lang="en-US" altLang="en-US" sz="1600" dirty="0" smtClean="0">
+                <a:solidFill>
+                  <a:srgbClr val="CC7832"/>
+                </a:solidFill>
+                <a:latin typeface="Consolas" panose="020B0609020204030204" pitchFamily="49" charset="0"/>
+                <a:cs typeface="Courier New" panose="02070309020205020404" pitchFamily="49" charset="0"/>
+              </a:rPr>
+              <a:t>return </a:t>
+            </a:r>
+            <a:r>
+              <a:rPr lang="en-US" altLang="en-US" sz="1600" dirty="0" smtClean="0">
+                <a:solidFill>
+                  <a:srgbClr val="CC7832"/>
+                </a:solidFill>
+                <a:latin typeface="Consolas" panose="020B0609020204030204" pitchFamily="49" charset="0"/>
+                <a:cs typeface="Courier New" panose="02070309020205020404" pitchFamily="49" charset="0"/>
+              </a:rPr>
+              <a:t>new </a:t>
+            </a:r>
+            <a:r>
+              <a:rPr lang="en-US" altLang="en-US" sz="1600" dirty="0" smtClean="0">
+                <a:solidFill>
+                  <a:srgbClr val="A9B7C6"/>
+                </a:solidFill>
+                <a:latin typeface="Consolas" panose="020B0609020204030204" pitchFamily="49" charset="0"/>
+                <a:cs typeface="Courier New" panose="02070309020205020404" pitchFamily="49" charset="0"/>
+              </a:rPr>
+              <a:t>Account(</a:t>
+            </a:r>
+            <a:r>
+              <a:rPr lang="en-US" altLang="en-US" sz="1600" dirty="0" err="1" smtClean="0">
+                <a:solidFill>
+                  <a:srgbClr val="A9B7C6"/>
+                </a:solidFill>
+                <a:latin typeface="Consolas" panose="020B0609020204030204" pitchFamily="49" charset="0"/>
+                <a:cs typeface="Courier New" panose="02070309020205020404" pitchFamily="49" charset="0"/>
+              </a:rPr>
+              <a:t>accountName</a:t>
+            </a:r>
+            <a:r>
+              <a:rPr lang="en-US" altLang="en-US" sz="1600" dirty="0" smtClean="0">
+                <a:solidFill>
+                  <a:srgbClr val="CC7832"/>
+                </a:solidFill>
+                <a:latin typeface="Consolas" panose="020B0609020204030204" pitchFamily="49" charset="0"/>
+                <a:cs typeface="Courier New" panose="02070309020205020404" pitchFamily="49" charset="0"/>
+              </a:rPr>
+              <a:t>, </a:t>
+            </a:r>
+            <a:r>
+              <a:rPr lang="en-US" altLang="en-US" sz="1600" i="1" dirty="0" smtClean="0">
+                <a:solidFill>
+                  <a:srgbClr val="A9B7C6"/>
+                </a:solidFill>
+                <a:latin typeface="Consolas" panose="020B0609020204030204" pitchFamily="49" charset="0"/>
+                <a:cs typeface="Courier New" panose="02070309020205020404" pitchFamily="49" charset="0"/>
+              </a:rPr>
+              <a:t>ACCOUNT_TYPE</a:t>
+            </a:r>
+            <a:r>
+              <a:rPr lang="en-US" altLang="en-US" sz="1600" dirty="0" smtClean="0">
+                <a:solidFill>
+                  <a:srgbClr val="A9B7C6"/>
+                </a:solidFill>
+                <a:latin typeface="Consolas" panose="020B0609020204030204" pitchFamily="49" charset="0"/>
+                <a:cs typeface="Courier New" panose="02070309020205020404" pitchFamily="49" charset="0"/>
+              </a:rPr>
+              <a:t>)</a:t>
+            </a:r>
+            <a:r>
+              <a:rPr lang="en-US" altLang="en-US" sz="1600" dirty="0" smtClean="0">
+                <a:solidFill>
+                  <a:srgbClr val="CC7832"/>
+                </a:solidFill>
+                <a:latin typeface="Consolas" panose="020B0609020204030204" pitchFamily="49" charset="0"/>
+                <a:cs typeface="Courier New" panose="02070309020205020404" pitchFamily="49" charset="0"/>
+              </a:rPr>
+              <a:t>;</a:t>
+            </a:r>
+            <a:endParaRPr lang="en-US" altLang="en-US" sz="4000" dirty="0">
+              <a:latin typeface="Consolas" panose="020B0609020204030204" pitchFamily="49" charset="0"/>
+            </a:endParaRPr>
           </a:p>
         </p:txBody>
       </p:sp>
@@ -41673,13 +41823,10 @@
               <a:t>extending </a:t>
             </a:r>
             <a:r>
-              <a:rPr lang="en-US" dirty="0" err="1"/>
+              <a:rPr lang="en-US" dirty="0" err="1" smtClean="0"/>
               <a:t>AbstractThreadedSyncAdapter</a:t>
             </a:r>
-            <a:r>
-              <a:rPr lang="en-US" dirty="0"/>
-              <a:t>.</a:t>
-            </a:r>
+            <a:endParaRPr lang="en-US" dirty="0"/>
           </a:p>
           <a:p>
             <a:pPr lvl="1"/>
@@ -41688,31 +41835,95 @@
               <a:t>Create </a:t>
             </a:r>
             <a:r>
+              <a:rPr lang="en-US" dirty="0" smtClean="0"/>
+              <a:t>two </a:t>
+            </a:r>
+            <a:r>
               <a:rPr lang="en-US" dirty="0"/>
-              <a:t>a bound Service which the OS uses to initiate a sync.</a:t>
-            </a:r>
+              <a:t>bound </a:t>
+            </a:r>
+            <a:r>
+              <a:rPr lang="en-US" dirty="0" smtClean="0"/>
+              <a:t>Services </a:t>
+            </a:r>
+            <a:r>
+              <a:rPr lang="en-US" dirty="0"/>
+              <a:t>which the OS </a:t>
+            </a:r>
+            <a:r>
+              <a:rPr lang="en-US" dirty="0" smtClean="0"/>
+              <a:t>uses:</a:t>
+            </a:r>
+          </a:p>
+          <a:p>
+            <a:pPr lvl="2"/>
+            <a:r>
+              <a:rPr lang="en-US" dirty="0" smtClean="0"/>
+              <a:t>One</a:t>
+            </a:r>
+            <a:r>
+              <a:rPr lang="en-US" dirty="0" smtClean="0"/>
+              <a:t> </a:t>
+            </a:r>
+            <a:r>
+              <a:rPr lang="en-US" dirty="0"/>
+              <a:t>to initiate a </a:t>
+            </a:r>
+            <a:r>
+              <a:rPr lang="en-US" dirty="0" smtClean="0"/>
+              <a:t>sync</a:t>
+            </a:r>
+            <a:endParaRPr lang="en-US" dirty="0"/>
+          </a:p>
+          <a:p>
+            <a:pPr lvl="2"/>
+            <a:r>
+              <a:rPr lang="en-US" dirty="0" smtClean="0"/>
+              <a:t>One to authenticate an account</a:t>
+            </a:r>
+          </a:p>
+          <a:p>
+            <a:pPr lvl="2"/>
+            <a:r>
+              <a:rPr lang="en-US" dirty="0" smtClean="0"/>
+              <a:t>Declare them in the app manifest</a:t>
+            </a:r>
+            <a:endParaRPr lang="en-US" dirty="0"/>
           </a:p>
           <a:p>
             <a:pPr lvl="1"/>
             <a:r>
               <a:rPr lang="en-US" dirty="0" smtClean="0"/>
-              <a:t>Define </a:t>
+              <a:t>Define in XML </a:t>
             </a:r>
             <a:r>
               <a:rPr lang="en-US" dirty="0"/>
-              <a:t>the sync adapter properties in an XML resource file.</a:t>
-            </a:r>
-          </a:p>
-          <a:p>
-            <a:pPr lvl="1"/>
-            <a:r>
-              <a:rPr lang="en-US" smtClean="0"/>
-              <a:t>Declare </a:t>
+              <a:t>resource </a:t>
+            </a:r>
+            <a:r>
+              <a:rPr lang="en-US" dirty="0" smtClean="0"/>
+              <a:t>files:</a:t>
+            </a:r>
+          </a:p>
+          <a:p>
+            <a:pPr lvl="2"/>
+            <a:r>
+              <a:rPr lang="en-US" dirty="0" smtClean="0"/>
+              <a:t>The </a:t>
             </a:r>
             <a:r>
               <a:rPr lang="en-US" dirty="0"/>
-              <a:t>the bound Service in the app manifest.</a:t>
-            </a:r>
+              <a:t>sync adapter properties</a:t>
+            </a:r>
+            <a:endParaRPr lang="en-US" dirty="0"/>
+          </a:p>
+          <a:p>
+            <a:pPr lvl="2"/>
+            <a:r>
+              <a:rPr lang="en-US" dirty="0" smtClean="0"/>
+              <a:t>The account authenticator properties</a:t>
+            </a:r>
+            <a:endParaRPr lang="en-US" dirty="0"/>
           </a:p>
         </p:txBody>
       </p:sp>

</xml_diff>

<commit_message>
super last minute typo fixes!
</commit_message>
<xml_diff>
--- a/I've been doing some syncing.pptx
+++ b/I've been doing some syncing.pptx
@@ -5,7 +5,7 @@
     <p:sldMasterId id="2147483660" r:id="rId1"/>
   </p:sldMasterIdLst>
   <p:notesMasterIdLst>
-    <p:notesMasterId r:id="rId50"/>
+    <p:notesMasterId r:id="rId51"/>
   </p:notesMasterIdLst>
   <p:sldIdLst>
     <p:sldId id="315" r:id="rId2"/>
@@ -54,8 +54,9 @@
     <p:sldId id="342" r:id="rId45"/>
     <p:sldId id="336" r:id="rId46"/>
     <p:sldId id="343" r:id="rId47"/>
-    <p:sldId id="293" r:id="rId48"/>
-    <p:sldId id="344" r:id="rId49"/>
+    <p:sldId id="345" r:id="rId48"/>
+    <p:sldId id="293" r:id="rId49"/>
+    <p:sldId id="344" r:id="rId50"/>
   </p:sldIdLst>
   <p:sldSz cx="12192000" cy="6858000"/>
   <p:notesSz cx="6858000" cy="9144000"/>
@@ -21972,18 +21973,9 @@
   <p:clrMapOvr>
     <a:masterClrMapping/>
   </p:clrMapOvr>
-  <mc:AlternateContent xmlns:mc="http://schemas.openxmlformats.org/markup-compatibility/2006" xmlns:p14="http://schemas.microsoft.com/office/powerpoint/2010/main">
-    <mc:Choice Requires="p14">
-      <p:transition p14:dur="250">
-        <p14:reveal/>
-      </p:transition>
-    </mc:Choice>
-    <mc:Fallback xmlns="">
-      <p:transition>
-        <p:fade/>
-      </p:transition>
-    </mc:Fallback>
-  </mc:AlternateContent>
+  <p:transition spd="slow">
+    <p:wipe dir="u"/>
+  </p:transition>
   <p:timing>
     <p:tnLst>
       <p:par>
@@ -31953,7 +31945,7 @@
                 </a:solidFill>
                 <a:latin typeface="Consolas" panose="020B0609020204030204" pitchFamily="49" charset="0"/>
               </a:rPr>
-              <a:t>res/xml/syncadapter.xml</a:t>
+              <a:t>res/xml/authenticator.xml</a:t>
             </a:r>
             <a:endParaRPr lang="en-US" sz="2400" dirty="0">
               <a:solidFill>
@@ -43626,6 +43618,89 @@
 </file>
 
 <file path=ppt/slides/slide47.xml><?xml version="1.0" encoding="utf-8"?>
+<p:sld xmlns:a="http://schemas.openxmlformats.org/drawingml/2006/main" xmlns:r="http://schemas.openxmlformats.org/officeDocument/2006/relationships" xmlns:p="http://schemas.openxmlformats.org/presentationml/2006/main">
+  <p:cSld>
+    <p:spTree>
+      <p:nvGrpSpPr>
+        <p:cNvPr id="1" name=""/>
+        <p:cNvGrpSpPr/>
+        <p:nvPr/>
+      </p:nvGrpSpPr>
+      <p:grpSpPr>
+        <a:xfrm>
+          <a:off x="0" y="0"/>
+          <a:ext cx="0" cy="0"/>
+          <a:chOff x="0" y="0"/>
+          <a:chExt cx="0" cy="0"/>
+        </a:xfrm>
+      </p:grpSpPr>
+      <p:sp>
+        <p:nvSpPr>
+          <p:cNvPr id="2" name="TextBox 1"/>
+          <p:cNvSpPr txBox="1"/>
+          <p:nvPr/>
+        </p:nvSpPr>
+        <p:spPr>
+          <a:xfrm>
+            <a:off x="1847528" y="3136613"/>
+            <a:ext cx="8496944" cy="584775"/>
+          </a:xfrm>
+          <a:prstGeom prst="rect">
+            <a:avLst/>
+          </a:prstGeom>
+          <a:noFill/>
+        </p:spPr>
+        <p:txBody>
+          <a:bodyPr wrap="square" rtlCol="0">
+            <a:spAutoFit/>
+          </a:bodyPr>
+          <a:lstStyle/>
+          <a:p>
+            <a:pPr algn="ctr"/>
+            <a:r>
+              <a:rPr lang="en-US" sz="3200" b="1" dirty="0">
+                <a:solidFill>
+                  <a:schemeClr val="bg1"/>
+                </a:solidFill>
+              </a:rPr>
+              <a:t>https://github.com/Pixplicity/sync-demo</a:t>
+            </a:r>
+          </a:p>
+        </p:txBody>
+      </p:sp>
+    </p:spTree>
+    <p:extLst>
+      <p:ext uri="{BB962C8B-B14F-4D97-AF65-F5344CB8AC3E}">
+        <p14:creationId xmlns:p14="http://schemas.microsoft.com/office/powerpoint/2010/main" val="3917868066"/>
+      </p:ext>
+    </p:extLst>
+  </p:cSld>
+  <p:clrMapOvr>
+    <a:masterClrMapping/>
+  </p:clrMapOvr>
+  <mc:AlternateContent xmlns:mc="http://schemas.openxmlformats.org/markup-compatibility/2006" xmlns:p14="http://schemas.microsoft.com/office/powerpoint/2010/main">
+    <mc:Choice Requires="p14">
+      <p:transition p14:dur="250">
+        <p14:reveal/>
+      </p:transition>
+    </mc:Choice>
+    <mc:Fallback xmlns="">
+      <p:transition>
+        <p:fade/>
+      </p:transition>
+    </mc:Fallback>
+  </mc:AlternateContent>
+  <p:timing>
+    <p:tnLst>
+      <p:par>
+        <p:cTn id="1" dur="indefinite" restart="never" nodeType="tmRoot"/>
+      </p:par>
+    </p:tnLst>
+  </p:timing>
+</p:sld>
+</file>
+
+<file path=ppt/slides/slide48.xml><?xml version="1.0" encoding="utf-8"?>
 <p:sld xmlns:a="http://schemas.openxmlformats.org/drawingml/2006/main" xmlns:r="http://schemas.openxmlformats.org/officeDocument/2006/relationships" xmlns:p="http://schemas.openxmlformats.org/presentationml/2006/main" show="0">
   <p:cSld>
     <p:spTree>
@@ -43786,7 +43861,7 @@
 </p:sld>
 </file>
 
-<file path=ppt/slides/slide48.xml><?xml version="1.0" encoding="utf-8"?>
+<file path=ppt/slides/slide49.xml><?xml version="1.0" encoding="utf-8"?>
 <p:sld xmlns:a="http://schemas.openxmlformats.org/drawingml/2006/main" xmlns:r="http://schemas.openxmlformats.org/officeDocument/2006/relationships" xmlns:p="http://schemas.openxmlformats.org/presentationml/2006/main">
   <p:cSld>
     <p:spTree>

</xml_diff>

<commit_message>
super last minute extra slide, why the hell not
</commit_message>
<xml_diff>
--- a/I've been doing some syncing.pptx
+++ b/I've been doing some syncing.pptx
@@ -5,7 +5,7 @@
     <p:sldMasterId id="2147483660" r:id="rId1"/>
   </p:sldMasterIdLst>
   <p:notesMasterIdLst>
-    <p:notesMasterId r:id="rId51"/>
+    <p:notesMasterId r:id="rId52"/>
   </p:notesMasterIdLst>
   <p:sldIdLst>
     <p:sldId id="315" r:id="rId2"/>
@@ -45,18 +45,19 @@
     <p:sldId id="327" r:id="rId36"/>
     <p:sldId id="330" r:id="rId37"/>
     <p:sldId id="331" r:id="rId38"/>
-    <p:sldId id="316" r:id="rId39"/>
-    <p:sldId id="317" r:id="rId40"/>
-    <p:sldId id="318" r:id="rId41"/>
-    <p:sldId id="322" r:id="rId42"/>
-    <p:sldId id="292" r:id="rId43"/>
-    <p:sldId id="324" r:id="rId44"/>
-    <p:sldId id="342" r:id="rId45"/>
-    <p:sldId id="336" r:id="rId46"/>
-    <p:sldId id="343" r:id="rId47"/>
-    <p:sldId id="345" r:id="rId48"/>
-    <p:sldId id="293" r:id="rId49"/>
-    <p:sldId id="344" r:id="rId50"/>
+    <p:sldId id="347" r:id="rId39"/>
+    <p:sldId id="316" r:id="rId40"/>
+    <p:sldId id="317" r:id="rId41"/>
+    <p:sldId id="318" r:id="rId42"/>
+    <p:sldId id="322" r:id="rId43"/>
+    <p:sldId id="292" r:id="rId44"/>
+    <p:sldId id="324" r:id="rId45"/>
+    <p:sldId id="342" r:id="rId46"/>
+    <p:sldId id="336" r:id="rId47"/>
+    <p:sldId id="343" r:id="rId48"/>
+    <p:sldId id="345" r:id="rId49"/>
+    <p:sldId id="293" r:id="rId50"/>
+    <p:sldId id="344" r:id="rId51"/>
   </p:sldIdLst>
   <p:sldSz cx="12192000" cy="6858000"/>
   <p:notesSz cx="6858000" cy="9144000"/>
@@ -570,6 +571,91 @@
           <a:bodyPr/>
           <a:lstStyle/>
           <a:p>
+            <a:endParaRPr lang="en-US" dirty="0"/>
+          </a:p>
+        </p:txBody>
+      </p:sp>
+      <p:sp>
+        <p:nvSpPr>
+          <p:cNvPr id="4" name="Slide Number Placeholder 3"/>
+          <p:cNvSpPr>
+            <a:spLocks noGrp="1"/>
+          </p:cNvSpPr>
+          <p:nvPr>
+            <p:ph type="sldNum" sz="quarter" idx="10"/>
+          </p:nvPr>
+        </p:nvSpPr>
+        <p:spPr/>
+        <p:txBody>
+          <a:bodyPr/>
+          <a:lstStyle/>
+          <a:p>
+            <a:fld id="{375B649D-962F-434C-B1D1-0A0101E8CDA0}" type="slidenum">
+              <a:rPr lang="nl-NL" smtClean="0"/>
+              <a:pPr/>
+              <a:t>37</a:t>
+            </a:fld>
+            <a:endParaRPr lang="nl-NL"/>
+          </a:p>
+        </p:txBody>
+      </p:sp>
+    </p:spTree>
+    <p:extLst>
+      <p:ext uri="{BB962C8B-B14F-4D97-AF65-F5344CB8AC3E}">
+        <p14:creationId xmlns:p14="http://schemas.microsoft.com/office/powerpoint/2010/main" val="3491890786"/>
+      </p:ext>
+    </p:extLst>
+  </p:cSld>
+  <p:clrMapOvr>
+    <a:masterClrMapping/>
+  </p:clrMapOvr>
+</p:notes>
+</file>
+
+<file path=ppt/notesSlides/notesSlide2.xml><?xml version="1.0" encoding="utf-8"?>
+<p:notes xmlns:a="http://schemas.openxmlformats.org/drawingml/2006/main" xmlns:r="http://schemas.openxmlformats.org/officeDocument/2006/relationships" xmlns:p="http://schemas.openxmlformats.org/presentationml/2006/main">
+  <p:cSld>
+    <p:spTree>
+      <p:nvGrpSpPr>
+        <p:cNvPr id="1" name=""/>
+        <p:cNvGrpSpPr/>
+        <p:nvPr/>
+      </p:nvGrpSpPr>
+      <p:grpSpPr>
+        <a:xfrm>
+          <a:off x="0" y="0"/>
+          <a:ext cx="0" cy="0"/>
+          <a:chOff x="0" y="0"/>
+          <a:chExt cx="0" cy="0"/>
+        </a:xfrm>
+      </p:grpSpPr>
+      <p:sp>
+        <p:nvSpPr>
+          <p:cNvPr id="2" name="Slide Image Placeholder 1"/>
+          <p:cNvSpPr>
+            <a:spLocks noGrp="1" noRot="1" noChangeAspect="1"/>
+          </p:cNvSpPr>
+          <p:nvPr>
+            <p:ph type="sldImg"/>
+          </p:nvPr>
+        </p:nvSpPr>
+        <p:spPr/>
+      </p:sp>
+      <p:sp>
+        <p:nvSpPr>
+          <p:cNvPr id="3" name="Notes Placeholder 2"/>
+          <p:cNvSpPr>
+            <a:spLocks noGrp="1"/>
+          </p:cNvSpPr>
+          <p:nvPr>
+            <p:ph type="body" idx="1"/>
+          </p:nvPr>
+        </p:nvSpPr>
+        <p:spPr/>
+        <p:txBody>
+          <a:bodyPr/>
+          <a:lstStyle/>
+          <a:p>
             <a:pPr marL="0" marR="0" indent="0" algn="l" defTabSz="914400" rtl="0" eaLnBrk="1" fontAlgn="auto" latinLnBrk="0" hangingPunct="1">
               <a:lnSpc>
                 <a:spcPct val="100000"/>
@@ -796,7 +882,7 @@
             <a:fld id="{375B649D-962F-434C-B1D1-0A0101E8CDA0}" type="slidenum">
               <a:rPr lang="nl-NL" smtClean="0"/>
               <a:pPr/>
-              <a:t>40</a:t>
+              <a:t>41</a:t>
             </a:fld>
             <a:endParaRPr lang="nl-NL"/>
           </a:p>
@@ -35817,6 +35903,361 @@
           <a:p>
             <a:r>
               <a:rPr lang="en-US" dirty="0" smtClean="0"/>
+              <a:t>Syncing periodically</a:t>
+            </a:r>
+            <a:endParaRPr lang="en-US" dirty="0"/>
+          </a:p>
+        </p:txBody>
+      </p:sp>
+      <p:sp>
+        <p:nvSpPr>
+          <p:cNvPr id="4" name="Rectangle 1"/>
+          <p:cNvSpPr>
+            <a:spLocks noChangeArrowheads="1"/>
+          </p:cNvSpPr>
+          <p:nvPr/>
+        </p:nvSpPr>
+        <p:spPr bwMode="auto">
+          <a:xfrm>
+            <a:off x="652500" y="3068960"/>
+            <a:ext cx="10887000" cy="859234"/>
+          </a:xfrm>
+          <a:prstGeom prst="rect">
+            <a:avLst/>
+          </a:prstGeom>
+          <a:solidFill>
+            <a:srgbClr val="2B2B2B"/>
+          </a:solidFill>
+          <a:ln>
+            <a:noFill/>
+          </a:ln>
+          <a:effectLst/>
+          <a:extLst>
+            <a:ext uri="{91240B29-F687-4F45-9708-019B960494DF}">
+              <a14:hiddenLine xmlns:a14="http://schemas.microsoft.com/office/drawing/2010/main" w="9525">
+                <a:solidFill>
+                  <a:schemeClr val="tx1"/>
+                </a:solidFill>
+                <a:miter lim="800000"/>
+                <a:headEnd/>
+                <a:tailEnd/>
+              </a14:hiddenLine>
+            </a:ext>
+            <a:ext uri="{AF507438-7753-43E0-B8FC-AC1667EBCBE1}">
+              <a14:hiddenEffects xmlns:a14="http://schemas.microsoft.com/office/drawing/2010/main">
+                <a:effectLst>
+                  <a:outerShdw dist="35921" dir="2700000" algn="ctr" rotWithShape="0">
+                    <a:schemeClr val="bg2"/>
+                  </a:outerShdw>
+                </a:effectLst>
+              </a14:hiddenEffects>
+            </a:ext>
+          </a:extLst>
+        </p:spPr>
+        <p:txBody>
+          <a:bodyPr vert="horz" wrap="square" lIns="182880" tIns="182880" rIns="182880" bIns="182880" numCol="1" anchor="t" anchorCtr="0" compatLnSpc="1">
+            <a:prstTxWarp prst="textNoShape">
+              <a:avLst/>
+            </a:prstTxWarp>
+            <a:noAutofit/>
+          </a:bodyPr>
+          <a:lstStyle/>
+          <a:p>
+            <a:pPr lvl="0" eaLnBrk="0" fontAlgn="base" hangingPunct="0">
+              <a:spcBef>
+                <a:spcPct val="0"/>
+              </a:spcBef>
+              <a:spcAft>
+                <a:spcPct val="0"/>
+              </a:spcAft>
+            </a:pPr>
+            <a:r>
+              <a:rPr lang="en-US" altLang="en-US" sz="1600" dirty="0" err="1">
+                <a:solidFill>
+                  <a:srgbClr val="A9B7C6"/>
+                </a:solidFill>
+                <a:latin typeface="Consolas" panose="020B0609020204030204" pitchFamily="49" charset="0"/>
+              </a:rPr>
+              <a:t>ContentResolver.</a:t>
+            </a:r>
+            <a:r>
+              <a:rPr lang="en-US" altLang="en-US" sz="1600" i="1" dirty="0" err="1">
+                <a:solidFill>
+                  <a:srgbClr val="A9B7C6"/>
+                </a:solidFill>
+                <a:latin typeface="Consolas" panose="020B0609020204030204" pitchFamily="49" charset="0"/>
+              </a:rPr>
+              <a:t>addPeriodicSync</a:t>
+            </a:r>
+            <a:r>
+              <a:rPr lang="en-US" altLang="en-US" sz="1600" dirty="0">
+                <a:solidFill>
+                  <a:srgbClr val="A9B7C6"/>
+                </a:solidFill>
+                <a:latin typeface="Consolas" panose="020B0609020204030204" pitchFamily="49" charset="0"/>
+              </a:rPr>
+              <a:t>(</a:t>
+            </a:r>
+            <a:br>
+              <a:rPr lang="en-US" altLang="en-US" sz="1600" dirty="0">
+                <a:solidFill>
+                  <a:srgbClr val="A9B7C6"/>
+                </a:solidFill>
+                <a:latin typeface="Consolas" panose="020B0609020204030204" pitchFamily="49" charset="0"/>
+              </a:rPr>
+            </a:br>
+            <a:r>
+              <a:rPr lang="en-US" altLang="en-US" sz="1600" dirty="0">
+                <a:solidFill>
+                  <a:srgbClr val="A9B7C6"/>
+                </a:solidFill>
+                <a:latin typeface="Consolas" panose="020B0609020204030204" pitchFamily="49" charset="0"/>
+              </a:rPr>
+              <a:t>        account</a:t>
+            </a:r>
+            <a:r>
+              <a:rPr lang="en-US" altLang="en-US" sz="1600" dirty="0">
+                <a:solidFill>
+                  <a:srgbClr val="CC7832"/>
+                </a:solidFill>
+                <a:latin typeface="Consolas" panose="020B0609020204030204" pitchFamily="49" charset="0"/>
+              </a:rPr>
+              <a:t>, </a:t>
+            </a:r>
+            <a:r>
+              <a:rPr lang="en-US" altLang="en-US" sz="1600" i="1" dirty="0" smtClean="0">
+                <a:solidFill>
+                  <a:srgbClr val="9876AA"/>
+                </a:solidFill>
+                <a:latin typeface="Consolas" panose="020B0609020204030204" pitchFamily="49" charset="0"/>
+              </a:rPr>
+              <a:t>CONTENT_AUTHORITY</a:t>
+            </a:r>
+            <a:r>
+              <a:rPr lang="en-US" altLang="en-US" sz="1600" dirty="0">
+                <a:solidFill>
+                  <a:srgbClr val="CC7832"/>
+                </a:solidFill>
+                <a:latin typeface="Consolas" panose="020B0609020204030204" pitchFamily="49" charset="0"/>
+              </a:rPr>
+              <a:t>, new </a:t>
+            </a:r>
+            <a:r>
+              <a:rPr lang="en-US" altLang="en-US" sz="1600" dirty="0">
+                <a:solidFill>
+                  <a:srgbClr val="A9B7C6"/>
+                </a:solidFill>
+                <a:latin typeface="Consolas" panose="020B0609020204030204" pitchFamily="49" charset="0"/>
+              </a:rPr>
+              <a:t>Bundle()</a:t>
+            </a:r>
+            <a:r>
+              <a:rPr lang="en-US" altLang="en-US" sz="1600" dirty="0">
+                <a:solidFill>
+                  <a:srgbClr val="CC7832"/>
+                </a:solidFill>
+                <a:latin typeface="Consolas" panose="020B0609020204030204" pitchFamily="49" charset="0"/>
+              </a:rPr>
+              <a:t>, </a:t>
+            </a:r>
+            <a:r>
+              <a:rPr lang="en-US" altLang="en-US" sz="1600" dirty="0" err="1" smtClean="0">
+                <a:solidFill>
+                  <a:srgbClr val="A9B7C6"/>
+                </a:solidFill>
+                <a:latin typeface="Consolas" panose="020B0609020204030204" pitchFamily="49" charset="0"/>
+              </a:rPr>
+              <a:t>pollFrequencyInSeconds</a:t>
+            </a:r>
+            <a:r>
+              <a:rPr lang="en-US" altLang="en-US" sz="1600" dirty="0" smtClean="0">
+                <a:solidFill>
+                  <a:srgbClr val="A9B7C6"/>
+                </a:solidFill>
+                <a:latin typeface="Consolas" panose="020B0609020204030204" pitchFamily="49" charset="0"/>
+              </a:rPr>
+              <a:t>)</a:t>
+            </a:r>
+            <a:r>
+              <a:rPr lang="en-US" altLang="en-US" sz="1600" dirty="0" smtClean="0">
+                <a:solidFill>
+                  <a:srgbClr val="CC7832"/>
+                </a:solidFill>
+                <a:latin typeface="Consolas" panose="020B0609020204030204" pitchFamily="49" charset="0"/>
+              </a:rPr>
+              <a:t>;</a:t>
+            </a:r>
+            <a:r>
+              <a:rPr lang="en-US" altLang="en-US" sz="1600" dirty="0">
+                <a:solidFill>
+                  <a:srgbClr val="CC7832"/>
+                </a:solidFill>
+                <a:latin typeface="Consolas" panose="020B0609020204030204" pitchFamily="49" charset="0"/>
+              </a:rPr>
+              <a:t/>
+            </a:r>
+            <a:br>
+              <a:rPr lang="en-US" altLang="en-US" sz="1600" dirty="0">
+                <a:solidFill>
+                  <a:srgbClr val="CC7832"/>
+                </a:solidFill>
+                <a:latin typeface="Consolas" panose="020B0609020204030204" pitchFamily="49" charset="0"/>
+              </a:rPr>
+            </a:br>
+            <a:endParaRPr lang="en-US" altLang="en-US" sz="3600" dirty="0">
+              <a:latin typeface="Consolas" panose="020B0609020204030204" pitchFamily="49" charset="0"/>
+            </a:endParaRPr>
+          </a:p>
+        </p:txBody>
+      </p:sp>
+    </p:spTree>
+    <p:extLst>
+      <p:ext uri="{BB962C8B-B14F-4D97-AF65-F5344CB8AC3E}">
+        <p14:creationId xmlns:p14="http://schemas.microsoft.com/office/powerpoint/2010/main" val="3635834839"/>
+      </p:ext>
+    </p:extLst>
+  </p:cSld>
+  <p:clrMapOvr>
+    <a:masterClrMapping/>
+  </p:clrMapOvr>
+  <mc:AlternateContent xmlns:mc="http://schemas.openxmlformats.org/markup-compatibility/2006">
+    <mc:Choice xmlns:p14="http://schemas.microsoft.com/office/powerpoint/2010/main" Requires="p14">
+      <p:transition p14:dur="250">
+        <p14:reveal/>
+      </p:transition>
+    </mc:Choice>
+    <mc:Fallback>
+      <p:transition>
+        <p:fade/>
+      </p:transition>
+    </mc:Fallback>
+  </mc:AlternateContent>
+  <p:timing>
+    <p:tnLst>
+      <p:par>
+        <p:cTn id="1" dur="indefinite" restart="never" nodeType="tmRoot">
+          <p:childTnLst>
+            <p:seq concurrent="1" nextAc="seek">
+              <p:cTn id="2" dur="indefinite" nodeType="mainSeq">
+                <p:childTnLst>
+                  <p:par>
+                    <p:cTn id="3" fill="hold">
+                      <p:stCondLst>
+                        <p:cond delay="indefinite"/>
+                        <p:cond evt="onBegin" delay="0">
+                          <p:tn val="2"/>
+                        </p:cond>
+                      </p:stCondLst>
+                      <p:childTnLst>
+                        <p:par>
+                          <p:cTn id="4" fill="hold">
+                            <p:stCondLst>
+                              <p:cond delay="0"/>
+                            </p:stCondLst>
+                            <p:childTnLst>
+                              <p:par>
+                                <p:cTn id="5" presetID="10" presetClass="entr" presetSubtype="0" fill="hold" grpId="0" nodeType="withEffect">
+                                  <p:stCondLst>
+                                    <p:cond delay="200"/>
+                                  </p:stCondLst>
+                                  <p:childTnLst>
+                                    <p:set>
+                                      <p:cBhvr>
+                                        <p:cTn id="6" dur="1" fill="hold">
+                                          <p:stCondLst>
+                                            <p:cond delay="0"/>
+                                          </p:stCondLst>
+                                        </p:cTn>
+                                        <p:tgtEl>
+                                          <p:spTgt spid="4"/>
+                                        </p:tgtEl>
+                                        <p:attrNameLst>
+                                          <p:attrName>style.visibility</p:attrName>
+                                        </p:attrNameLst>
+                                      </p:cBhvr>
+                                      <p:to>
+                                        <p:strVal val="visible"/>
+                                      </p:to>
+                                    </p:set>
+                                    <p:animEffect transition="in" filter="fade">
+                                      <p:cBhvr>
+                                        <p:cTn id="7" dur="300"/>
+                                        <p:tgtEl>
+                                          <p:spTgt spid="4"/>
+                                        </p:tgtEl>
+                                      </p:cBhvr>
+                                    </p:animEffect>
+                                  </p:childTnLst>
+                                </p:cTn>
+                              </p:par>
+                            </p:childTnLst>
+                          </p:cTn>
+                        </p:par>
+                      </p:childTnLst>
+                    </p:cTn>
+                  </p:par>
+                </p:childTnLst>
+              </p:cTn>
+              <p:prevCondLst>
+                <p:cond evt="onPrev" delay="0">
+                  <p:tgtEl>
+                    <p:sldTgt/>
+                  </p:tgtEl>
+                </p:cond>
+              </p:prevCondLst>
+              <p:nextCondLst>
+                <p:cond evt="onNext" delay="0">
+                  <p:tgtEl>
+                    <p:sldTgt/>
+                  </p:tgtEl>
+                </p:cond>
+              </p:nextCondLst>
+            </p:seq>
+          </p:childTnLst>
+        </p:cTn>
+      </p:par>
+    </p:tnLst>
+    <p:bldLst>
+      <p:bldP spid="4" grpId="0" animBg="1"/>
+    </p:bldLst>
+  </p:timing>
+</p:sld>
+</file>
+
+<file path=ppt/slides/slide39.xml><?xml version="1.0" encoding="utf-8"?>
+<p:sld xmlns:a="http://schemas.openxmlformats.org/drawingml/2006/main" xmlns:r="http://schemas.openxmlformats.org/officeDocument/2006/relationships" xmlns:p="http://schemas.openxmlformats.org/presentationml/2006/main">
+  <p:cSld>
+    <p:spTree>
+      <p:nvGrpSpPr>
+        <p:cNvPr id="1" name=""/>
+        <p:cNvGrpSpPr/>
+        <p:nvPr/>
+      </p:nvGrpSpPr>
+      <p:grpSpPr>
+        <a:xfrm>
+          <a:off x="0" y="0"/>
+          <a:ext cx="0" cy="0"/>
+          <a:chOff x="0" y="0"/>
+          <a:chExt cx="0" cy="0"/>
+        </a:xfrm>
+      </p:grpSpPr>
+      <p:sp>
+        <p:nvSpPr>
+          <p:cNvPr id="2" name="Title 1"/>
+          <p:cNvSpPr>
+            <a:spLocks noGrp="1"/>
+          </p:cNvSpPr>
+          <p:nvPr>
+            <p:ph type="title"/>
+          </p:nvPr>
+        </p:nvSpPr>
+        <p:spPr/>
+        <p:txBody>
+          <a:bodyPr/>
+          <a:lstStyle/>
+          <a:p>
+            <a:r>
+              <a:rPr lang="en-US" dirty="0" smtClean="0"/>
               <a:t>Do I need a </a:t>
             </a:r>
             <a:r>
@@ -37524,1116 +37965,6 @@
         <p:cTn id="1" dur="indefinite" restart="never" nodeType="tmRoot"/>
       </p:par>
     </p:tnLst>
-  </p:timing>
-</p:sld>
-</file>
-
-<file path=ppt/slides/slide39.xml><?xml version="1.0" encoding="utf-8"?>
-<p:sld xmlns:a="http://schemas.openxmlformats.org/drawingml/2006/main" xmlns:r="http://schemas.openxmlformats.org/officeDocument/2006/relationships" xmlns:p="http://schemas.openxmlformats.org/presentationml/2006/main">
-  <p:cSld>
-    <p:spTree>
-      <p:nvGrpSpPr>
-        <p:cNvPr id="1" name=""/>
-        <p:cNvGrpSpPr/>
-        <p:nvPr/>
-      </p:nvGrpSpPr>
-      <p:grpSpPr>
-        <a:xfrm>
-          <a:off x="0" y="0"/>
-          <a:ext cx="0" cy="0"/>
-          <a:chOff x="0" y="0"/>
-          <a:chExt cx="0" cy="0"/>
-        </a:xfrm>
-      </p:grpSpPr>
-      <p:sp>
-        <p:nvSpPr>
-          <p:cNvPr id="2" name="Title 1"/>
-          <p:cNvSpPr>
-            <a:spLocks noGrp="1"/>
-          </p:cNvSpPr>
-          <p:nvPr>
-            <p:ph type="title"/>
-          </p:nvPr>
-        </p:nvSpPr>
-        <p:spPr/>
-        <p:txBody>
-          <a:bodyPr/>
-          <a:lstStyle/>
-          <a:p>
-            <a:r>
-              <a:rPr lang="en-US" dirty="0" smtClean="0"/>
-              <a:t>Do I need a </a:t>
-            </a:r>
-            <a:r>
-              <a:rPr lang="en-US" dirty="0" err="1" smtClean="0"/>
-              <a:t>ContentProvider</a:t>
-            </a:r>
-            <a:r>
-              <a:rPr lang="en-US" dirty="0" smtClean="0"/>
-              <a:t>?</a:t>
-            </a:r>
-            <a:endParaRPr lang="en-US" dirty="0"/>
-          </a:p>
-        </p:txBody>
-      </p:sp>
-      <p:sp>
-        <p:nvSpPr>
-          <p:cNvPr id="3" name="Content Placeholder 2"/>
-          <p:cNvSpPr>
-            <a:spLocks noGrp="1"/>
-          </p:cNvSpPr>
-          <p:nvPr>
-            <p:ph idx="1"/>
-          </p:nvPr>
-        </p:nvSpPr>
-        <p:spPr/>
-        <p:txBody>
-          <a:bodyPr/>
-          <a:lstStyle/>
-          <a:p>
-            <a:pPr marL="0" indent="0">
-              <a:buNone/>
-            </a:pPr>
-            <a:r>
-              <a:rPr lang="en-US" dirty="0" smtClean="0"/>
-              <a:t>Yes… but </a:t>
-            </a:r>
-            <a:r>
-              <a:rPr lang="en-US" dirty="0"/>
-              <a:t>it doesn’t need to do anything.</a:t>
-            </a:r>
-          </a:p>
-          <a:p>
-            <a:pPr marL="0" indent="0">
-              <a:buNone/>
-            </a:pPr>
-            <a:endParaRPr lang="en-US" dirty="0" smtClean="0"/>
-          </a:p>
-        </p:txBody>
-      </p:sp>
-      <p:sp>
-        <p:nvSpPr>
-          <p:cNvPr id="7" name="Rectangle 1"/>
-          <p:cNvSpPr>
-            <a:spLocks noChangeArrowheads="1"/>
-          </p:cNvSpPr>
-          <p:nvPr/>
-        </p:nvSpPr>
-        <p:spPr bwMode="auto">
-          <a:xfrm>
-            <a:off x="652500" y="2348880"/>
-            <a:ext cx="10887000" cy="4104456"/>
-          </a:xfrm>
-          <a:prstGeom prst="rect">
-            <a:avLst/>
-          </a:prstGeom>
-          <a:solidFill>
-            <a:srgbClr val="2B2B2B"/>
-          </a:solidFill>
-          <a:ln>
-            <a:noFill/>
-          </a:ln>
-          <a:effectLst/>
-          <a:extLst/>
-        </p:spPr>
-        <p:txBody>
-          <a:bodyPr vert="horz" wrap="square" lIns="182880" tIns="182880" rIns="182880" bIns="182880" numCol="1" anchor="t" anchorCtr="0" compatLnSpc="1">
-            <a:prstTxWarp prst="textNoShape">
-              <a:avLst/>
-            </a:prstTxWarp>
-            <a:noAutofit/>
-          </a:bodyPr>
-          <a:lstStyle/>
-          <a:p>
-            <a:pPr lvl="0" eaLnBrk="0" fontAlgn="base" hangingPunct="0">
-              <a:spcBef>
-                <a:spcPct val="0"/>
-              </a:spcBef>
-              <a:spcAft>
-                <a:spcPct val="0"/>
-              </a:spcAft>
-            </a:pPr>
-            <a:r>
-              <a:rPr lang="en-US" altLang="en-US" sz="1600" dirty="0">
-                <a:solidFill>
-                  <a:srgbClr val="CC7832"/>
-                </a:solidFill>
-                <a:latin typeface="Consolas" panose="020B0609020204030204" pitchFamily="49" charset="0"/>
-                <a:cs typeface="Courier New" panose="02070309020205020404" pitchFamily="49" charset="0"/>
-              </a:rPr>
-              <a:t>public class </a:t>
-            </a:r>
-            <a:r>
-              <a:rPr lang="en-US" altLang="en-US" sz="1600" dirty="0" err="1">
-                <a:solidFill>
-                  <a:srgbClr val="A9B7C6"/>
-                </a:solidFill>
-                <a:latin typeface="Consolas" panose="020B0609020204030204" pitchFamily="49" charset="0"/>
-                <a:cs typeface="Courier New" panose="02070309020205020404" pitchFamily="49" charset="0"/>
-              </a:rPr>
-              <a:t>DummyProvider</a:t>
-            </a:r>
-            <a:r>
-              <a:rPr lang="en-US" altLang="en-US" sz="1600" dirty="0">
-                <a:solidFill>
-                  <a:srgbClr val="A9B7C6"/>
-                </a:solidFill>
-                <a:latin typeface="Consolas" panose="020B0609020204030204" pitchFamily="49" charset="0"/>
-                <a:cs typeface="Courier New" panose="02070309020205020404" pitchFamily="49" charset="0"/>
-              </a:rPr>
-              <a:t> </a:t>
-            </a:r>
-            <a:r>
-              <a:rPr lang="en-US" altLang="en-US" sz="1600" dirty="0">
-                <a:solidFill>
-                  <a:srgbClr val="CC7832"/>
-                </a:solidFill>
-                <a:latin typeface="Consolas" panose="020B0609020204030204" pitchFamily="49" charset="0"/>
-                <a:cs typeface="Courier New" panose="02070309020205020404" pitchFamily="49" charset="0"/>
-              </a:rPr>
-              <a:t>extends </a:t>
-            </a:r>
-            <a:r>
-              <a:rPr lang="en-US" altLang="en-US" sz="1600" dirty="0" err="1">
-                <a:solidFill>
-                  <a:srgbClr val="A9B7C6"/>
-                </a:solidFill>
-                <a:latin typeface="Consolas" panose="020B0609020204030204" pitchFamily="49" charset="0"/>
-                <a:cs typeface="Courier New" panose="02070309020205020404" pitchFamily="49" charset="0"/>
-              </a:rPr>
-              <a:t>ContentProvider</a:t>
-            </a:r>
-            <a:r>
-              <a:rPr lang="en-US" altLang="en-US" sz="1600" dirty="0">
-                <a:solidFill>
-                  <a:srgbClr val="A9B7C6"/>
-                </a:solidFill>
-                <a:latin typeface="Consolas" panose="020B0609020204030204" pitchFamily="49" charset="0"/>
-                <a:cs typeface="Courier New" panose="02070309020205020404" pitchFamily="49" charset="0"/>
-              </a:rPr>
-              <a:t> {</a:t>
-            </a:r>
-            <a:br>
-              <a:rPr lang="en-US" altLang="en-US" sz="1600" dirty="0">
-                <a:solidFill>
-                  <a:srgbClr val="A9B7C6"/>
-                </a:solidFill>
-                <a:latin typeface="Consolas" panose="020B0609020204030204" pitchFamily="49" charset="0"/>
-                <a:cs typeface="Courier New" panose="02070309020205020404" pitchFamily="49" charset="0"/>
-              </a:rPr>
-            </a:br>
-            <a:r>
-              <a:rPr lang="en-US" altLang="en-US" sz="1600" dirty="0">
-                <a:solidFill>
-                  <a:srgbClr val="A9B7C6"/>
-                </a:solidFill>
-                <a:latin typeface="Consolas" panose="020B0609020204030204" pitchFamily="49" charset="0"/>
-                <a:cs typeface="Courier New" panose="02070309020205020404" pitchFamily="49" charset="0"/>
-              </a:rPr>
-              <a:t/>
-            </a:r>
-            <a:br>
-              <a:rPr lang="en-US" altLang="en-US" sz="1600" dirty="0">
-                <a:solidFill>
-                  <a:srgbClr val="A9B7C6"/>
-                </a:solidFill>
-                <a:latin typeface="Consolas" panose="020B0609020204030204" pitchFamily="49" charset="0"/>
-                <a:cs typeface="Courier New" panose="02070309020205020404" pitchFamily="49" charset="0"/>
-              </a:rPr>
-            </a:br>
-            <a:r>
-              <a:rPr lang="en-US" altLang="en-US" sz="1600" dirty="0">
-                <a:solidFill>
-                  <a:srgbClr val="A9B7C6"/>
-                </a:solidFill>
-                <a:latin typeface="Consolas" panose="020B0609020204030204" pitchFamily="49" charset="0"/>
-                <a:cs typeface="Courier New" panose="02070309020205020404" pitchFamily="49" charset="0"/>
-              </a:rPr>
-              <a:t>    </a:t>
-            </a:r>
-            <a:r>
-              <a:rPr lang="en-US" altLang="en-US" sz="1600" dirty="0">
-                <a:solidFill>
-                  <a:srgbClr val="BBB529"/>
-                </a:solidFill>
-                <a:latin typeface="Consolas" panose="020B0609020204030204" pitchFamily="49" charset="0"/>
-                <a:cs typeface="Courier New" panose="02070309020205020404" pitchFamily="49" charset="0"/>
-              </a:rPr>
-              <a:t>@</a:t>
-            </a:r>
-            <a:r>
-              <a:rPr lang="en-US" altLang="en-US" sz="1600" dirty="0" smtClean="0">
-                <a:solidFill>
-                  <a:srgbClr val="BBB529"/>
-                </a:solidFill>
-                <a:latin typeface="Consolas" panose="020B0609020204030204" pitchFamily="49" charset="0"/>
-                <a:cs typeface="Courier New" panose="02070309020205020404" pitchFamily="49" charset="0"/>
-              </a:rPr>
-              <a:t>Override </a:t>
-            </a:r>
-            <a:r>
-              <a:rPr lang="en-US" altLang="en-US" sz="1600" dirty="0" smtClean="0">
-                <a:solidFill>
-                  <a:srgbClr val="CC7832"/>
-                </a:solidFill>
-                <a:latin typeface="Consolas" panose="020B0609020204030204" pitchFamily="49" charset="0"/>
-                <a:cs typeface="Courier New" panose="02070309020205020404" pitchFamily="49" charset="0"/>
-              </a:rPr>
-              <a:t>public </a:t>
-            </a:r>
-            <a:r>
-              <a:rPr lang="en-US" altLang="en-US" sz="1600" dirty="0" err="1">
-                <a:solidFill>
-                  <a:srgbClr val="CC7832"/>
-                </a:solidFill>
-                <a:latin typeface="Consolas" panose="020B0609020204030204" pitchFamily="49" charset="0"/>
-                <a:cs typeface="Courier New" panose="02070309020205020404" pitchFamily="49" charset="0"/>
-              </a:rPr>
-              <a:t>boolean</a:t>
-            </a:r>
-            <a:r>
-              <a:rPr lang="en-US" altLang="en-US" sz="1600" dirty="0">
-                <a:solidFill>
-                  <a:srgbClr val="CC7832"/>
-                </a:solidFill>
-                <a:latin typeface="Consolas" panose="020B0609020204030204" pitchFamily="49" charset="0"/>
-                <a:cs typeface="Courier New" panose="02070309020205020404" pitchFamily="49" charset="0"/>
-              </a:rPr>
-              <a:t> </a:t>
-            </a:r>
-            <a:r>
-              <a:rPr lang="en-US" altLang="en-US" sz="1600" dirty="0" err="1">
-                <a:solidFill>
-                  <a:srgbClr val="FFC66D"/>
-                </a:solidFill>
-                <a:latin typeface="Consolas" panose="020B0609020204030204" pitchFamily="49" charset="0"/>
-                <a:cs typeface="Courier New" panose="02070309020205020404" pitchFamily="49" charset="0"/>
-              </a:rPr>
-              <a:t>onCreate</a:t>
-            </a:r>
-            <a:r>
-              <a:rPr lang="en-US" altLang="en-US" sz="1600" dirty="0">
-                <a:solidFill>
-                  <a:srgbClr val="A9B7C6"/>
-                </a:solidFill>
-                <a:latin typeface="Consolas" panose="020B0609020204030204" pitchFamily="49" charset="0"/>
-                <a:cs typeface="Courier New" panose="02070309020205020404" pitchFamily="49" charset="0"/>
-              </a:rPr>
-              <a:t>() { </a:t>
-            </a:r>
-            <a:r>
-              <a:rPr lang="en-US" altLang="en-US" sz="1600" dirty="0">
-                <a:solidFill>
-                  <a:srgbClr val="CC7832"/>
-                </a:solidFill>
-                <a:latin typeface="Consolas" panose="020B0609020204030204" pitchFamily="49" charset="0"/>
-                <a:cs typeface="Courier New" panose="02070309020205020404" pitchFamily="49" charset="0"/>
-              </a:rPr>
-              <a:t>return false; </a:t>
-            </a:r>
-            <a:r>
-              <a:rPr lang="en-US" altLang="en-US" sz="1600" dirty="0">
-                <a:solidFill>
-                  <a:srgbClr val="A9B7C6"/>
-                </a:solidFill>
-                <a:latin typeface="Consolas" panose="020B0609020204030204" pitchFamily="49" charset="0"/>
-                <a:cs typeface="Courier New" panose="02070309020205020404" pitchFamily="49" charset="0"/>
-              </a:rPr>
-              <a:t>}</a:t>
-            </a:r>
-            <a:br>
-              <a:rPr lang="en-US" altLang="en-US" sz="1600" dirty="0">
-                <a:solidFill>
-                  <a:srgbClr val="A9B7C6"/>
-                </a:solidFill>
-                <a:latin typeface="Consolas" panose="020B0609020204030204" pitchFamily="49" charset="0"/>
-                <a:cs typeface="Courier New" panose="02070309020205020404" pitchFamily="49" charset="0"/>
-              </a:rPr>
-            </a:br>
-            <a:r>
-              <a:rPr lang="en-US" altLang="en-US" sz="1600" dirty="0">
-                <a:solidFill>
-                  <a:srgbClr val="A9B7C6"/>
-                </a:solidFill>
-                <a:latin typeface="Consolas" panose="020B0609020204030204" pitchFamily="49" charset="0"/>
-                <a:cs typeface="Courier New" panose="02070309020205020404" pitchFamily="49" charset="0"/>
-              </a:rPr>
-              <a:t/>
-            </a:r>
-            <a:br>
-              <a:rPr lang="en-US" altLang="en-US" sz="1600" dirty="0">
-                <a:solidFill>
-                  <a:srgbClr val="A9B7C6"/>
-                </a:solidFill>
-                <a:latin typeface="Consolas" panose="020B0609020204030204" pitchFamily="49" charset="0"/>
-                <a:cs typeface="Courier New" panose="02070309020205020404" pitchFamily="49" charset="0"/>
-              </a:rPr>
-            </a:br>
-            <a:r>
-              <a:rPr lang="en-US" altLang="en-US" sz="1600" dirty="0">
-                <a:solidFill>
-                  <a:srgbClr val="A9B7C6"/>
-                </a:solidFill>
-                <a:latin typeface="Consolas" panose="020B0609020204030204" pitchFamily="49" charset="0"/>
-                <a:cs typeface="Courier New" panose="02070309020205020404" pitchFamily="49" charset="0"/>
-              </a:rPr>
-              <a:t>    </a:t>
-            </a:r>
-            <a:r>
-              <a:rPr lang="en-US" altLang="en-US" sz="1600" dirty="0">
-                <a:solidFill>
-                  <a:srgbClr val="BBB529"/>
-                </a:solidFill>
-                <a:latin typeface="Consolas" panose="020B0609020204030204" pitchFamily="49" charset="0"/>
-                <a:cs typeface="Courier New" panose="02070309020205020404" pitchFamily="49" charset="0"/>
-              </a:rPr>
-              <a:t>@</a:t>
-            </a:r>
-            <a:r>
-              <a:rPr lang="en-US" altLang="en-US" sz="1600" dirty="0" smtClean="0">
-                <a:solidFill>
-                  <a:srgbClr val="BBB529"/>
-                </a:solidFill>
-                <a:latin typeface="Consolas" panose="020B0609020204030204" pitchFamily="49" charset="0"/>
-                <a:cs typeface="Courier New" panose="02070309020205020404" pitchFamily="49" charset="0"/>
-              </a:rPr>
-              <a:t>Override </a:t>
-            </a:r>
-            <a:r>
-              <a:rPr lang="en-US" altLang="en-US" sz="1600" dirty="0" smtClean="0">
-                <a:solidFill>
-                  <a:srgbClr val="CC7832"/>
-                </a:solidFill>
-                <a:latin typeface="Consolas" panose="020B0609020204030204" pitchFamily="49" charset="0"/>
-                <a:cs typeface="Courier New" panose="02070309020205020404" pitchFamily="49" charset="0"/>
-              </a:rPr>
-              <a:t>public </a:t>
-            </a:r>
-            <a:r>
-              <a:rPr lang="en-US" altLang="en-US" sz="1600" dirty="0" err="1">
-                <a:solidFill>
-                  <a:srgbClr val="CC7832"/>
-                </a:solidFill>
-                <a:latin typeface="Consolas" panose="020B0609020204030204" pitchFamily="49" charset="0"/>
-                <a:cs typeface="Courier New" panose="02070309020205020404" pitchFamily="49" charset="0"/>
-              </a:rPr>
-              <a:t>int</a:t>
-            </a:r>
-            <a:r>
-              <a:rPr lang="en-US" altLang="en-US" sz="1600" dirty="0">
-                <a:solidFill>
-                  <a:srgbClr val="CC7832"/>
-                </a:solidFill>
-                <a:latin typeface="Consolas" panose="020B0609020204030204" pitchFamily="49" charset="0"/>
-                <a:cs typeface="Courier New" panose="02070309020205020404" pitchFamily="49" charset="0"/>
-              </a:rPr>
-              <a:t> </a:t>
-            </a:r>
-            <a:r>
-              <a:rPr lang="en-US" altLang="en-US" sz="1600" dirty="0">
-                <a:solidFill>
-                  <a:srgbClr val="FFC66D"/>
-                </a:solidFill>
-                <a:latin typeface="Consolas" panose="020B0609020204030204" pitchFamily="49" charset="0"/>
-                <a:cs typeface="Courier New" panose="02070309020205020404" pitchFamily="49" charset="0"/>
-              </a:rPr>
-              <a:t>delete</a:t>
-            </a:r>
-            <a:r>
-              <a:rPr lang="en-US" altLang="en-US" sz="1600" dirty="0">
-                <a:solidFill>
-                  <a:srgbClr val="A9B7C6"/>
-                </a:solidFill>
-                <a:latin typeface="Consolas" panose="020B0609020204030204" pitchFamily="49" charset="0"/>
-                <a:cs typeface="Courier New" panose="02070309020205020404" pitchFamily="49" charset="0"/>
-              </a:rPr>
-              <a:t>(...) { </a:t>
-            </a:r>
-            <a:r>
-              <a:rPr lang="en-US" altLang="en-US" sz="1600" dirty="0">
-                <a:solidFill>
-                  <a:srgbClr val="CC7832"/>
-                </a:solidFill>
-                <a:latin typeface="Consolas" panose="020B0609020204030204" pitchFamily="49" charset="0"/>
-                <a:cs typeface="Courier New" panose="02070309020205020404" pitchFamily="49" charset="0"/>
-              </a:rPr>
-              <a:t>return </a:t>
-            </a:r>
-            <a:r>
-              <a:rPr lang="en-US" altLang="en-US" sz="1600" dirty="0">
-                <a:solidFill>
-                  <a:srgbClr val="6897BB"/>
-                </a:solidFill>
-                <a:latin typeface="Consolas" panose="020B0609020204030204" pitchFamily="49" charset="0"/>
-                <a:cs typeface="Courier New" panose="02070309020205020404" pitchFamily="49" charset="0"/>
-              </a:rPr>
-              <a:t>0</a:t>
-            </a:r>
-            <a:r>
-              <a:rPr lang="en-US" altLang="en-US" sz="1600" dirty="0">
-                <a:solidFill>
-                  <a:srgbClr val="CC7832"/>
-                </a:solidFill>
-                <a:latin typeface="Consolas" panose="020B0609020204030204" pitchFamily="49" charset="0"/>
-                <a:cs typeface="Courier New" panose="02070309020205020404" pitchFamily="49" charset="0"/>
-              </a:rPr>
-              <a:t>; </a:t>
-            </a:r>
-            <a:r>
-              <a:rPr lang="en-US" altLang="en-US" sz="1600" dirty="0">
-                <a:solidFill>
-                  <a:srgbClr val="A9B7C6"/>
-                </a:solidFill>
-                <a:latin typeface="Consolas" panose="020B0609020204030204" pitchFamily="49" charset="0"/>
-                <a:cs typeface="Courier New" panose="02070309020205020404" pitchFamily="49" charset="0"/>
-              </a:rPr>
-              <a:t>}</a:t>
-            </a:r>
-            <a:br>
-              <a:rPr lang="en-US" altLang="en-US" sz="1600" dirty="0">
-                <a:solidFill>
-                  <a:srgbClr val="A9B7C6"/>
-                </a:solidFill>
-                <a:latin typeface="Consolas" panose="020B0609020204030204" pitchFamily="49" charset="0"/>
-                <a:cs typeface="Courier New" panose="02070309020205020404" pitchFamily="49" charset="0"/>
-              </a:rPr>
-            </a:br>
-            <a:r>
-              <a:rPr lang="en-US" altLang="en-US" sz="1600" dirty="0">
-                <a:solidFill>
-                  <a:srgbClr val="A9B7C6"/>
-                </a:solidFill>
-                <a:latin typeface="Consolas" panose="020B0609020204030204" pitchFamily="49" charset="0"/>
-                <a:cs typeface="Courier New" panose="02070309020205020404" pitchFamily="49" charset="0"/>
-              </a:rPr>
-              <a:t/>
-            </a:r>
-            <a:br>
-              <a:rPr lang="en-US" altLang="en-US" sz="1600" dirty="0">
-                <a:solidFill>
-                  <a:srgbClr val="A9B7C6"/>
-                </a:solidFill>
-                <a:latin typeface="Consolas" panose="020B0609020204030204" pitchFamily="49" charset="0"/>
-                <a:cs typeface="Courier New" panose="02070309020205020404" pitchFamily="49" charset="0"/>
-              </a:rPr>
-            </a:br>
-            <a:r>
-              <a:rPr lang="en-US" altLang="en-US" sz="1600" dirty="0">
-                <a:solidFill>
-                  <a:srgbClr val="A9B7C6"/>
-                </a:solidFill>
-                <a:latin typeface="Consolas" panose="020B0609020204030204" pitchFamily="49" charset="0"/>
-                <a:cs typeface="Courier New" panose="02070309020205020404" pitchFamily="49" charset="0"/>
-              </a:rPr>
-              <a:t>    </a:t>
-            </a:r>
-            <a:r>
-              <a:rPr lang="en-US" altLang="en-US" sz="1600" dirty="0">
-                <a:solidFill>
-                  <a:srgbClr val="BBB529"/>
-                </a:solidFill>
-                <a:latin typeface="Consolas" panose="020B0609020204030204" pitchFamily="49" charset="0"/>
-                <a:cs typeface="Courier New" panose="02070309020205020404" pitchFamily="49" charset="0"/>
-              </a:rPr>
-              <a:t>@</a:t>
-            </a:r>
-            <a:r>
-              <a:rPr lang="en-US" altLang="en-US" sz="1600" dirty="0" smtClean="0">
-                <a:solidFill>
-                  <a:srgbClr val="BBB529"/>
-                </a:solidFill>
-                <a:latin typeface="Consolas" panose="020B0609020204030204" pitchFamily="49" charset="0"/>
-                <a:cs typeface="Courier New" panose="02070309020205020404" pitchFamily="49" charset="0"/>
-              </a:rPr>
-              <a:t>Override </a:t>
-            </a:r>
-            <a:r>
-              <a:rPr lang="en-US" altLang="en-US" sz="1600" dirty="0" smtClean="0">
-                <a:solidFill>
-                  <a:srgbClr val="CC7832"/>
-                </a:solidFill>
-                <a:latin typeface="Consolas" panose="020B0609020204030204" pitchFamily="49" charset="0"/>
-                <a:cs typeface="Courier New" panose="02070309020205020404" pitchFamily="49" charset="0"/>
-              </a:rPr>
-              <a:t>public </a:t>
-            </a:r>
-            <a:r>
-              <a:rPr lang="en-US" altLang="en-US" sz="1600" dirty="0">
-                <a:solidFill>
-                  <a:srgbClr val="A9B7C6"/>
-                </a:solidFill>
-                <a:latin typeface="Consolas" panose="020B0609020204030204" pitchFamily="49" charset="0"/>
-                <a:cs typeface="Courier New" panose="02070309020205020404" pitchFamily="49" charset="0"/>
-              </a:rPr>
-              <a:t>String </a:t>
-            </a:r>
-            <a:r>
-              <a:rPr lang="en-US" altLang="en-US" sz="1600" dirty="0" err="1">
-                <a:solidFill>
-                  <a:srgbClr val="FFC66D"/>
-                </a:solidFill>
-                <a:latin typeface="Consolas" panose="020B0609020204030204" pitchFamily="49" charset="0"/>
-                <a:cs typeface="Courier New" panose="02070309020205020404" pitchFamily="49" charset="0"/>
-              </a:rPr>
-              <a:t>getType</a:t>
-            </a:r>
-            <a:r>
-              <a:rPr lang="en-US" altLang="en-US" sz="1600" dirty="0">
-                <a:solidFill>
-                  <a:srgbClr val="A9B7C6"/>
-                </a:solidFill>
-                <a:latin typeface="Consolas" panose="020B0609020204030204" pitchFamily="49" charset="0"/>
-                <a:cs typeface="Courier New" panose="02070309020205020404" pitchFamily="49" charset="0"/>
-              </a:rPr>
-              <a:t>(...) { </a:t>
-            </a:r>
-            <a:r>
-              <a:rPr lang="en-US" altLang="en-US" sz="1600" dirty="0">
-                <a:solidFill>
-                  <a:srgbClr val="CC7832"/>
-                </a:solidFill>
-                <a:latin typeface="Consolas" panose="020B0609020204030204" pitchFamily="49" charset="0"/>
-                <a:cs typeface="Courier New" panose="02070309020205020404" pitchFamily="49" charset="0"/>
-              </a:rPr>
-              <a:t>return null; </a:t>
-            </a:r>
-            <a:r>
-              <a:rPr lang="en-US" altLang="en-US" sz="1600" dirty="0">
-                <a:solidFill>
-                  <a:srgbClr val="A9B7C6"/>
-                </a:solidFill>
-                <a:latin typeface="Consolas" panose="020B0609020204030204" pitchFamily="49" charset="0"/>
-                <a:cs typeface="Courier New" panose="02070309020205020404" pitchFamily="49" charset="0"/>
-              </a:rPr>
-              <a:t>}</a:t>
-            </a:r>
-            <a:br>
-              <a:rPr lang="en-US" altLang="en-US" sz="1600" dirty="0">
-                <a:solidFill>
-                  <a:srgbClr val="A9B7C6"/>
-                </a:solidFill>
-                <a:latin typeface="Consolas" panose="020B0609020204030204" pitchFamily="49" charset="0"/>
-                <a:cs typeface="Courier New" panose="02070309020205020404" pitchFamily="49" charset="0"/>
-              </a:rPr>
-            </a:br>
-            <a:r>
-              <a:rPr lang="en-US" altLang="en-US" sz="1600" dirty="0">
-                <a:solidFill>
-                  <a:srgbClr val="A9B7C6"/>
-                </a:solidFill>
-                <a:latin typeface="Consolas" panose="020B0609020204030204" pitchFamily="49" charset="0"/>
-                <a:cs typeface="Courier New" panose="02070309020205020404" pitchFamily="49" charset="0"/>
-              </a:rPr>
-              <a:t/>
-            </a:r>
-            <a:br>
-              <a:rPr lang="en-US" altLang="en-US" sz="1600" dirty="0">
-                <a:solidFill>
-                  <a:srgbClr val="A9B7C6"/>
-                </a:solidFill>
-                <a:latin typeface="Consolas" panose="020B0609020204030204" pitchFamily="49" charset="0"/>
-                <a:cs typeface="Courier New" panose="02070309020205020404" pitchFamily="49" charset="0"/>
-              </a:rPr>
-            </a:br>
-            <a:r>
-              <a:rPr lang="en-US" altLang="en-US" sz="1600" dirty="0">
-                <a:solidFill>
-                  <a:srgbClr val="A9B7C6"/>
-                </a:solidFill>
-                <a:latin typeface="Consolas" panose="020B0609020204030204" pitchFamily="49" charset="0"/>
-                <a:cs typeface="Courier New" panose="02070309020205020404" pitchFamily="49" charset="0"/>
-              </a:rPr>
-              <a:t>    </a:t>
-            </a:r>
-            <a:r>
-              <a:rPr lang="en-US" altLang="en-US" sz="1600" dirty="0">
-                <a:solidFill>
-                  <a:srgbClr val="BBB529"/>
-                </a:solidFill>
-                <a:latin typeface="Consolas" panose="020B0609020204030204" pitchFamily="49" charset="0"/>
-                <a:cs typeface="Courier New" panose="02070309020205020404" pitchFamily="49" charset="0"/>
-              </a:rPr>
-              <a:t>@</a:t>
-            </a:r>
-            <a:r>
-              <a:rPr lang="en-US" altLang="en-US" sz="1600" dirty="0" smtClean="0">
-                <a:solidFill>
-                  <a:srgbClr val="BBB529"/>
-                </a:solidFill>
-                <a:latin typeface="Consolas" panose="020B0609020204030204" pitchFamily="49" charset="0"/>
-                <a:cs typeface="Courier New" panose="02070309020205020404" pitchFamily="49" charset="0"/>
-              </a:rPr>
-              <a:t>Override </a:t>
-            </a:r>
-            <a:r>
-              <a:rPr lang="en-US" altLang="en-US" sz="1600" dirty="0" smtClean="0">
-                <a:solidFill>
-                  <a:srgbClr val="CC7832"/>
-                </a:solidFill>
-                <a:latin typeface="Consolas" panose="020B0609020204030204" pitchFamily="49" charset="0"/>
-                <a:cs typeface="Courier New" panose="02070309020205020404" pitchFamily="49" charset="0"/>
-              </a:rPr>
-              <a:t>public </a:t>
-            </a:r>
-            <a:r>
-              <a:rPr lang="en-US" altLang="en-US" sz="1600" dirty="0">
-                <a:solidFill>
-                  <a:srgbClr val="A9B7C6"/>
-                </a:solidFill>
-                <a:latin typeface="Consolas" panose="020B0609020204030204" pitchFamily="49" charset="0"/>
-                <a:cs typeface="Courier New" panose="02070309020205020404" pitchFamily="49" charset="0"/>
-              </a:rPr>
-              <a:t>Uri </a:t>
-            </a:r>
-            <a:r>
-              <a:rPr lang="en-US" altLang="en-US" sz="1600" dirty="0">
-                <a:solidFill>
-                  <a:srgbClr val="FFC66D"/>
-                </a:solidFill>
-                <a:latin typeface="Consolas" panose="020B0609020204030204" pitchFamily="49" charset="0"/>
-                <a:cs typeface="Courier New" panose="02070309020205020404" pitchFamily="49" charset="0"/>
-              </a:rPr>
-              <a:t>insert</a:t>
-            </a:r>
-            <a:r>
-              <a:rPr lang="en-US" altLang="en-US" sz="1600" dirty="0">
-                <a:solidFill>
-                  <a:srgbClr val="A9B7C6"/>
-                </a:solidFill>
-                <a:latin typeface="Consolas" panose="020B0609020204030204" pitchFamily="49" charset="0"/>
-                <a:cs typeface="Courier New" panose="02070309020205020404" pitchFamily="49" charset="0"/>
-              </a:rPr>
-              <a:t>(...) { </a:t>
-            </a:r>
-            <a:r>
-              <a:rPr lang="en-US" altLang="en-US" sz="1600" dirty="0">
-                <a:solidFill>
-                  <a:srgbClr val="CC7832"/>
-                </a:solidFill>
-                <a:latin typeface="Consolas" panose="020B0609020204030204" pitchFamily="49" charset="0"/>
-                <a:cs typeface="Courier New" panose="02070309020205020404" pitchFamily="49" charset="0"/>
-              </a:rPr>
-              <a:t>return null; </a:t>
-            </a:r>
-            <a:r>
-              <a:rPr lang="en-US" altLang="en-US" sz="1600" dirty="0">
-                <a:solidFill>
-                  <a:srgbClr val="A9B7C6"/>
-                </a:solidFill>
-                <a:latin typeface="Consolas" panose="020B0609020204030204" pitchFamily="49" charset="0"/>
-                <a:cs typeface="Courier New" panose="02070309020205020404" pitchFamily="49" charset="0"/>
-              </a:rPr>
-              <a:t>}</a:t>
-            </a:r>
-            <a:br>
-              <a:rPr lang="en-US" altLang="en-US" sz="1600" dirty="0">
-                <a:solidFill>
-                  <a:srgbClr val="A9B7C6"/>
-                </a:solidFill>
-                <a:latin typeface="Consolas" panose="020B0609020204030204" pitchFamily="49" charset="0"/>
-                <a:cs typeface="Courier New" panose="02070309020205020404" pitchFamily="49" charset="0"/>
-              </a:rPr>
-            </a:br>
-            <a:r>
-              <a:rPr lang="en-US" altLang="en-US" sz="1600" dirty="0">
-                <a:solidFill>
-                  <a:srgbClr val="A9B7C6"/>
-                </a:solidFill>
-                <a:latin typeface="Consolas" panose="020B0609020204030204" pitchFamily="49" charset="0"/>
-                <a:cs typeface="Courier New" panose="02070309020205020404" pitchFamily="49" charset="0"/>
-              </a:rPr>
-              <a:t/>
-            </a:r>
-            <a:br>
-              <a:rPr lang="en-US" altLang="en-US" sz="1600" dirty="0">
-                <a:solidFill>
-                  <a:srgbClr val="A9B7C6"/>
-                </a:solidFill>
-                <a:latin typeface="Consolas" panose="020B0609020204030204" pitchFamily="49" charset="0"/>
-                <a:cs typeface="Courier New" panose="02070309020205020404" pitchFamily="49" charset="0"/>
-              </a:rPr>
-            </a:br>
-            <a:r>
-              <a:rPr lang="en-US" altLang="en-US" sz="1600" dirty="0">
-                <a:solidFill>
-                  <a:srgbClr val="A9B7C6"/>
-                </a:solidFill>
-                <a:latin typeface="Consolas" panose="020B0609020204030204" pitchFamily="49" charset="0"/>
-                <a:cs typeface="Courier New" panose="02070309020205020404" pitchFamily="49" charset="0"/>
-              </a:rPr>
-              <a:t>    </a:t>
-            </a:r>
-            <a:r>
-              <a:rPr lang="en-US" altLang="en-US" sz="1600" dirty="0">
-                <a:solidFill>
-                  <a:srgbClr val="BBB529"/>
-                </a:solidFill>
-                <a:latin typeface="Consolas" panose="020B0609020204030204" pitchFamily="49" charset="0"/>
-                <a:cs typeface="Courier New" panose="02070309020205020404" pitchFamily="49" charset="0"/>
-              </a:rPr>
-              <a:t>@</a:t>
-            </a:r>
-            <a:r>
-              <a:rPr lang="en-US" altLang="en-US" sz="1600" dirty="0" smtClean="0">
-                <a:solidFill>
-                  <a:srgbClr val="BBB529"/>
-                </a:solidFill>
-                <a:latin typeface="Consolas" panose="020B0609020204030204" pitchFamily="49" charset="0"/>
-                <a:cs typeface="Courier New" panose="02070309020205020404" pitchFamily="49" charset="0"/>
-              </a:rPr>
-              <a:t>Override </a:t>
-            </a:r>
-            <a:r>
-              <a:rPr lang="en-US" altLang="en-US" sz="1600" dirty="0" smtClean="0">
-                <a:solidFill>
-                  <a:srgbClr val="CC7832"/>
-                </a:solidFill>
-                <a:latin typeface="Consolas" panose="020B0609020204030204" pitchFamily="49" charset="0"/>
-                <a:cs typeface="Courier New" panose="02070309020205020404" pitchFamily="49" charset="0"/>
-              </a:rPr>
-              <a:t>public </a:t>
-            </a:r>
-            <a:r>
-              <a:rPr lang="en-US" altLang="en-US" sz="1600" dirty="0">
-                <a:solidFill>
-                  <a:srgbClr val="A9B7C6"/>
-                </a:solidFill>
-                <a:latin typeface="Consolas" panose="020B0609020204030204" pitchFamily="49" charset="0"/>
-                <a:cs typeface="Courier New" panose="02070309020205020404" pitchFamily="49" charset="0"/>
-              </a:rPr>
-              <a:t>Cursor </a:t>
-            </a:r>
-            <a:r>
-              <a:rPr lang="en-US" altLang="en-US" sz="1600" dirty="0">
-                <a:solidFill>
-                  <a:srgbClr val="FFC66D"/>
-                </a:solidFill>
-                <a:latin typeface="Consolas" panose="020B0609020204030204" pitchFamily="49" charset="0"/>
-                <a:cs typeface="Courier New" panose="02070309020205020404" pitchFamily="49" charset="0"/>
-              </a:rPr>
-              <a:t>query</a:t>
-            </a:r>
-            <a:r>
-              <a:rPr lang="en-US" altLang="en-US" sz="1600" dirty="0">
-                <a:solidFill>
-                  <a:srgbClr val="A9B7C6"/>
-                </a:solidFill>
-                <a:latin typeface="Consolas" panose="020B0609020204030204" pitchFamily="49" charset="0"/>
-                <a:cs typeface="Courier New" panose="02070309020205020404" pitchFamily="49" charset="0"/>
-              </a:rPr>
-              <a:t>(...) { </a:t>
-            </a:r>
-            <a:r>
-              <a:rPr lang="en-US" altLang="en-US" sz="1600" dirty="0">
-                <a:solidFill>
-                  <a:srgbClr val="CC7832"/>
-                </a:solidFill>
-                <a:latin typeface="Consolas" panose="020B0609020204030204" pitchFamily="49" charset="0"/>
-                <a:cs typeface="Courier New" panose="02070309020205020404" pitchFamily="49" charset="0"/>
-              </a:rPr>
-              <a:t>return null; </a:t>
-            </a:r>
-            <a:r>
-              <a:rPr lang="en-US" altLang="en-US" sz="1600" dirty="0">
-                <a:solidFill>
-                  <a:srgbClr val="A9B7C6"/>
-                </a:solidFill>
-                <a:latin typeface="Consolas" panose="020B0609020204030204" pitchFamily="49" charset="0"/>
-                <a:cs typeface="Courier New" panose="02070309020205020404" pitchFamily="49" charset="0"/>
-              </a:rPr>
-              <a:t>}</a:t>
-            </a:r>
-            <a:br>
-              <a:rPr lang="en-US" altLang="en-US" sz="1600" dirty="0">
-                <a:solidFill>
-                  <a:srgbClr val="A9B7C6"/>
-                </a:solidFill>
-                <a:latin typeface="Consolas" panose="020B0609020204030204" pitchFamily="49" charset="0"/>
-                <a:cs typeface="Courier New" panose="02070309020205020404" pitchFamily="49" charset="0"/>
-              </a:rPr>
-            </a:br>
-            <a:r>
-              <a:rPr lang="en-US" altLang="en-US" sz="1600" dirty="0">
-                <a:solidFill>
-                  <a:srgbClr val="A9B7C6"/>
-                </a:solidFill>
-                <a:latin typeface="Consolas" panose="020B0609020204030204" pitchFamily="49" charset="0"/>
-                <a:cs typeface="Courier New" panose="02070309020205020404" pitchFamily="49" charset="0"/>
-              </a:rPr>
-              <a:t/>
-            </a:r>
-            <a:br>
-              <a:rPr lang="en-US" altLang="en-US" sz="1600" dirty="0">
-                <a:solidFill>
-                  <a:srgbClr val="A9B7C6"/>
-                </a:solidFill>
-                <a:latin typeface="Consolas" panose="020B0609020204030204" pitchFamily="49" charset="0"/>
-                <a:cs typeface="Courier New" panose="02070309020205020404" pitchFamily="49" charset="0"/>
-              </a:rPr>
-            </a:br>
-            <a:r>
-              <a:rPr lang="en-US" altLang="en-US" sz="1600" dirty="0">
-                <a:solidFill>
-                  <a:srgbClr val="A9B7C6"/>
-                </a:solidFill>
-                <a:latin typeface="Consolas" panose="020B0609020204030204" pitchFamily="49" charset="0"/>
-                <a:cs typeface="Courier New" panose="02070309020205020404" pitchFamily="49" charset="0"/>
-              </a:rPr>
-              <a:t>    </a:t>
-            </a:r>
-            <a:r>
-              <a:rPr lang="en-US" altLang="en-US" sz="1600" dirty="0">
-                <a:solidFill>
-                  <a:srgbClr val="BBB529"/>
-                </a:solidFill>
-                <a:latin typeface="Consolas" panose="020B0609020204030204" pitchFamily="49" charset="0"/>
-                <a:cs typeface="Courier New" panose="02070309020205020404" pitchFamily="49" charset="0"/>
-              </a:rPr>
-              <a:t>@</a:t>
-            </a:r>
-            <a:r>
-              <a:rPr lang="en-US" altLang="en-US" sz="1600" dirty="0" smtClean="0">
-                <a:solidFill>
-                  <a:srgbClr val="BBB529"/>
-                </a:solidFill>
-                <a:latin typeface="Consolas" panose="020B0609020204030204" pitchFamily="49" charset="0"/>
-                <a:cs typeface="Courier New" panose="02070309020205020404" pitchFamily="49" charset="0"/>
-              </a:rPr>
-              <a:t>Override </a:t>
-            </a:r>
-            <a:r>
-              <a:rPr lang="en-US" altLang="en-US" sz="1600" dirty="0" smtClean="0">
-                <a:solidFill>
-                  <a:srgbClr val="CC7832"/>
-                </a:solidFill>
-                <a:latin typeface="Consolas" panose="020B0609020204030204" pitchFamily="49" charset="0"/>
-                <a:cs typeface="Courier New" panose="02070309020205020404" pitchFamily="49" charset="0"/>
-              </a:rPr>
-              <a:t>public </a:t>
-            </a:r>
-            <a:r>
-              <a:rPr lang="en-US" altLang="en-US" sz="1600" dirty="0" err="1">
-                <a:solidFill>
-                  <a:srgbClr val="CC7832"/>
-                </a:solidFill>
-                <a:latin typeface="Consolas" panose="020B0609020204030204" pitchFamily="49" charset="0"/>
-                <a:cs typeface="Courier New" panose="02070309020205020404" pitchFamily="49" charset="0"/>
-              </a:rPr>
-              <a:t>int</a:t>
-            </a:r>
-            <a:r>
-              <a:rPr lang="en-US" altLang="en-US" sz="1600" dirty="0">
-                <a:solidFill>
-                  <a:srgbClr val="CC7832"/>
-                </a:solidFill>
-                <a:latin typeface="Consolas" panose="020B0609020204030204" pitchFamily="49" charset="0"/>
-                <a:cs typeface="Courier New" panose="02070309020205020404" pitchFamily="49" charset="0"/>
-              </a:rPr>
-              <a:t> </a:t>
-            </a:r>
-            <a:r>
-              <a:rPr lang="en-US" altLang="en-US" sz="1600" dirty="0">
-                <a:solidFill>
-                  <a:srgbClr val="FFC66D"/>
-                </a:solidFill>
-                <a:latin typeface="Consolas" panose="020B0609020204030204" pitchFamily="49" charset="0"/>
-                <a:cs typeface="Courier New" panose="02070309020205020404" pitchFamily="49" charset="0"/>
-              </a:rPr>
-              <a:t>update</a:t>
-            </a:r>
-            <a:r>
-              <a:rPr lang="en-US" altLang="en-US" sz="1600" dirty="0">
-                <a:solidFill>
-                  <a:srgbClr val="A9B7C6"/>
-                </a:solidFill>
-                <a:latin typeface="Consolas" panose="020B0609020204030204" pitchFamily="49" charset="0"/>
-                <a:cs typeface="Courier New" panose="02070309020205020404" pitchFamily="49" charset="0"/>
-              </a:rPr>
-              <a:t>(...) { </a:t>
-            </a:r>
-            <a:r>
-              <a:rPr lang="en-US" altLang="en-US" sz="1600" dirty="0">
-                <a:solidFill>
-                  <a:srgbClr val="CC7832"/>
-                </a:solidFill>
-                <a:latin typeface="Consolas" panose="020B0609020204030204" pitchFamily="49" charset="0"/>
-                <a:cs typeface="Courier New" panose="02070309020205020404" pitchFamily="49" charset="0"/>
-              </a:rPr>
-              <a:t>return </a:t>
-            </a:r>
-            <a:r>
-              <a:rPr lang="en-US" altLang="en-US" sz="1600" dirty="0">
-                <a:solidFill>
-                  <a:srgbClr val="6897BB"/>
-                </a:solidFill>
-                <a:latin typeface="Consolas" panose="020B0609020204030204" pitchFamily="49" charset="0"/>
-                <a:cs typeface="Courier New" panose="02070309020205020404" pitchFamily="49" charset="0"/>
-              </a:rPr>
-              <a:t>0</a:t>
-            </a:r>
-            <a:r>
-              <a:rPr lang="en-US" altLang="en-US" sz="1600" dirty="0">
-                <a:solidFill>
-                  <a:srgbClr val="CC7832"/>
-                </a:solidFill>
-                <a:latin typeface="Consolas" panose="020B0609020204030204" pitchFamily="49" charset="0"/>
-                <a:cs typeface="Courier New" panose="02070309020205020404" pitchFamily="49" charset="0"/>
-              </a:rPr>
-              <a:t>; </a:t>
-            </a:r>
-            <a:r>
-              <a:rPr lang="en-US" altLang="en-US" sz="1600" dirty="0" smtClean="0">
-                <a:solidFill>
-                  <a:srgbClr val="A9B7C6"/>
-                </a:solidFill>
-                <a:latin typeface="Consolas" panose="020B0609020204030204" pitchFamily="49" charset="0"/>
-                <a:cs typeface="Courier New" panose="02070309020205020404" pitchFamily="49" charset="0"/>
-              </a:rPr>
-              <a:t>}</a:t>
-            </a:r>
-          </a:p>
-          <a:p>
-            <a:pPr lvl="0" eaLnBrk="0" fontAlgn="base" hangingPunct="0">
-              <a:spcBef>
-                <a:spcPct val="0"/>
-              </a:spcBef>
-              <a:spcAft>
-                <a:spcPct val="0"/>
-              </a:spcAft>
-            </a:pPr>
-            <a:r>
-              <a:rPr lang="en-US" altLang="en-US" sz="1600" dirty="0">
-                <a:solidFill>
-                  <a:srgbClr val="A9B7C6"/>
-                </a:solidFill>
-                <a:latin typeface="Consolas" panose="020B0609020204030204" pitchFamily="49" charset="0"/>
-                <a:cs typeface="Courier New" panose="02070309020205020404" pitchFamily="49" charset="0"/>
-              </a:rPr>
-              <a:t/>
-            </a:r>
-            <a:br>
-              <a:rPr lang="en-US" altLang="en-US" sz="1600" dirty="0">
-                <a:solidFill>
-                  <a:srgbClr val="A9B7C6"/>
-                </a:solidFill>
-                <a:latin typeface="Consolas" panose="020B0609020204030204" pitchFamily="49" charset="0"/>
-                <a:cs typeface="Courier New" panose="02070309020205020404" pitchFamily="49" charset="0"/>
-              </a:rPr>
-            </a:br>
-            <a:r>
-              <a:rPr lang="en-US" altLang="en-US" sz="1600" dirty="0">
-                <a:solidFill>
-                  <a:srgbClr val="A9B7C6"/>
-                </a:solidFill>
-                <a:latin typeface="Consolas" panose="020B0609020204030204" pitchFamily="49" charset="0"/>
-                <a:cs typeface="Courier New" panose="02070309020205020404" pitchFamily="49" charset="0"/>
-              </a:rPr>
-              <a:t>}</a:t>
-            </a:r>
-            <a:endParaRPr lang="en-US" altLang="en-US" sz="4000" dirty="0">
-              <a:latin typeface="Consolas" panose="020B0609020204030204" pitchFamily="49" charset="0"/>
-            </a:endParaRPr>
-          </a:p>
-        </p:txBody>
-      </p:sp>
-    </p:spTree>
-    <p:extLst>
-      <p:ext uri="{BB962C8B-B14F-4D97-AF65-F5344CB8AC3E}">
-        <p14:creationId xmlns:p14="http://schemas.microsoft.com/office/powerpoint/2010/main" val="209947340"/>
-      </p:ext>
-    </p:extLst>
-  </p:cSld>
-  <p:clrMapOvr>
-    <a:masterClrMapping/>
-  </p:clrMapOvr>
-  <p:transition spd="slow">
-    <p:wipe dir="r"/>
-  </p:transition>
-  <p:timing>
-    <p:tnLst>
-      <p:par>
-        <p:cTn id="1" dur="indefinite" restart="never" nodeType="tmRoot">
-          <p:childTnLst>
-            <p:seq concurrent="1" nextAc="seek">
-              <p:cTn id="2" dur="indefinite" nodeType="mainSeq">
-                <p:childTnLst>
-                  <p:par>
-                    <p:cTn id="3" fill="hold">
-                      <p:stCondLst>
-                        <p:cond delay="indefinite"/>
-                      </p:stCondLst>
-                      <p:childTnLst>
-                        <p:par>
-                          <p:cTn id="4" fill="hold">
-                            <p:stCondLst>
-                              <p:cond delay="0"/>
-                            </p:stCondLst>
-                            <p:childTnLst>
-                              <p:par>
-                                <p:cTn id="5" presetID="10" presetClass="entr" presetSubtype="0" fill="hold" grpId="0" nodeType="clickEffect">
-                                  <p:stCondLst>
-                                    <p:cond delay="0"/>
-                                  </p:stCondLst>
-                                  <p:childTnLst>
-                                    <p:set>
-                                      <p:cBhvr>
-                                        <p:cTn id="6" dur="1" fill="hold">
-                                          <p:stCondLst>
-                                            <p:cond delay="0"/>
-                                          </p:stCondLst>
-                                        </p:cTn>
-                                        <p:tgtEl>
-                                          <p:spTgt spid="7"/>
-                                        </p:tgtEl>
-                                        <p:attrNameLst>
-                                          <p:attrName>style.visibility</p:attrName>
-                                        </p:attrNameLst>
-                                      </p:cBhvr>
-                                      <p:to>
-                                        <p:strVal val="visible"/>
-                                      </p:to>
-                                    </p:set>
-                                    <p:animEffect transition="in" filter="fade">
-                                      <p:cBhvr>
-                                        <p:cTn id="7" dur="300"/>
-                                        <p:tgtEl>
-                                          <p:spTgt spid="7"/>
-                                        </p:tgtEl>
-                                      </p:cBhvr>
-                                    </p:animEffect>
-                                  </p:childTnLst>
-                                </p:cTn>
-                              </p:par>
-                            </p:childTnLst>
-                          </p:cTn>
-                        </p:par>
-                      </p:childTnLst>
-                    </p:cTn>
-                  </p:par>
-                </p:childTnLst>
-              </p:cTn>
-              <p:prevCondLst>
-                <p:cond evt="onPrev" delay="0">
-                  <p:tgtEl>
-                    <p:sldTgt/>
-                  </p:tgtEl>
-                </p:cond>
-              </p:prevCondLst>
-              <p:nextCondLst>
-                <p:cond evt="onNext" delay="0">
-                  <p:tgtEl>
-                    <p:sldTgt/>
-                  </p:tgtEl>
-                </p:cond>
-              </p:nextCondLst>
-            </p:seq>
-          </p:childTnLst>
-        </p:cTn>
-      </p:par>
-    </p:tnLst>
-    <p:bldLst>
-      <p:bldP spid="7" grpId="0" animBg="1"/>
-    </p:bldLst>
   </p:timing>
 </p:sld>
 </file>
@@ -40133,6 +39464,1116 @@
       </p:grpSpPr>
       <p:sp>
         <p:nvSpPr>
+          <p:cNvPr id="2" name="Title 1"/>
+          <p:cNvSpPr>
+            <a:spLocks noGrp="1"/>
+          </p:cNvSpPr>
+          <p:nvPr>
+            <p:ph type="title"/>
+          </p:nvPr>
+        </p:nvSpPr>
+        <p:spPr/>
+        <p:txBody>
+          <a:bodyPr/>
+          <a:lstStyle/>
+          <a:p>
+            <a:r>
+              <a:rPr lang="en-US" dirty="0" smtClean="0"/>
+              <a:t>Do I need a </a:t>
+            </a:r>
+            <a:r>
+              <a:rPr lang="en-US" dirty="0" err="1" smtClean="0"/>
+              <a:t>ContentProvider</a:t>
+            </a:r>
+            <a:r>
+              <a:rPr lang="en-US" dirty="0" smtClean="0"/>
+              <a:t>?</a:t>
+            </a:r>
+            <a:endParaRPr lang="en-US" dirty="0"/>
+          </a:p>
+        </p:txBody>
+      </p:sp>
+      <p:sp>
+        <p:nvSpPr>
+          <p:cNvPr id="3" name="Content Placeholder 2"/>
+          <p:cNvSpPr>
+            <a:spLocks noGrp="1"/>
+          </p:cNvSpPr>
+          <p:nvPr>
+            <p:ph idx="1"/>
+          </p:nvPr>
+        </p:nvSpPr>
+        <p:spPr/>
+        <p:txBody>
+          <a:bodyPr/>
+          <a:lstStyle/>
+          <a:p>
+            <a:pPr marL="0" indent="0">
+              <a:buNone/>
+            </a:pPr>
+            <a:r>
+              <a:rPr lang="en-US" dirty="0" smtClean="0"/>
+              <a:t>Yes… but </a:t>
+            </a:r>
+            <a:r>
+              <a:rPr lang="en-US" dirty="0"/>
+              <a:t>it doesn’t need to do anything.</a:t>
+            </a:r>
+          </a:p>
+          <a:p>
+            <a:pPr marL="0" indent="0">
+              <a:buNone/>
+            </a:pPr>
+            <a:endParaRPr lang="en-US" dirty="0" smtClean="0"/>
+          </a:p>
+        </p:txBody>
+      </p:sp>
+      <p:sp>
+        <p:nvSpPr>
+          <p:cNvPr id="7" name="Rectangle 1"/>
+          <p:cNvSpPr>
+            <a:spLocks noChangeArrowheads="1"/>
+          </p:cNvSpPr>
+          <p:nvPr/>
+        </p:nvSpPr>
+        <p:spPr bwMode="auto">
+          <a:xfrm>
+            <a:off x="652500" y="2348880"/>
+            <a:ext cx="10887000" cy="4104456"/>
+          </a:xfrm>
+          <a:prstGeom prst="rect">
+            <a:avLst/>
+          </a:prstGeom>
+          <a:solidFill>
+            <a:srgbClr val="2B2B2B"/>
+          </a:solidFill>
+          <a:ln>
+            <a:noFill/>
+          </a:ln>
+          <a:effectLst/>
+          <a:extLst/>
+        </p:spPr>
+        <p:txBody>
+          <a:bodyPr vert="horz" wrap="square" lIns="182880" tIns="182880" rIns="182880" bIns="182880" numCol="1" anchor="t" anchorCtr="0" compatLnSpc="1">
+            <a:prstTxWarp prst="textNoShape">
+              <a:avLst/>
+            </a:prstTxWarp>
+            <a:noAutofit/>
+          </a:bodyPr>
+          <a:lstStyle/>
+          <a:p>
+            <a:pPr lvl="0" eaLnBrk="0" fontAlgn="base" hangingPunct="0">
+              <a:spcBef>
+                <a:spcPct val="0"/>
+              </a:spcBef>
+              <a:spcAft>
+                <a:spcPct val="0"/>
+              </a:spcAft>
+            </a:pPr>
+            <a:r>
+              <a:rPr lang="en-US" altLang="en-US" sz="1600" dirty="0">
+                <a:solidFill>
+                  <a:srgbClr val="CC7832"/>
+                </a:solidFill>
+                <a:latin typeface="Consolas" panose="020B0609020204030204" pitchFamily="49" charset="0"/>
+                <a:cs typeface="Courier New" panose="02070309020205020404" pitchFamily="49" charset="0"/>
+              </a:rPr>
+              <a:t>public class </a:t>
+            </a:r>
+            <a:r>
+              <a:rPr lang="en-US" altLang="en-US" sz="1600" dirty="0" err="1">
+                <a:solidFill>
+                  <a:srgbClr val="A9B7C6"/>
+                </a:solidFill>
+                <a:latin typeface="Consolas" panose="020B0609020204030204" pitchFamily="49" charset="0"/>
+                <a:cs typeface="Courier New" panose="02070309020205020404" pitchFamily="49" charset="0"/>
+              </a:rPr>
+              <a:t>DummyProvider</a:t>
+            </a:r>
+            <a:r>
+              <a:rPr lang="en-US" altLang="en-US" sz="1600" dirty="0">
+                <a:solidFill>
+                  <a:srgbClr val="A9B7C6"/>
+                </a:solidFill>
+                <a:latin typeface="Consolas" panose="020B0609020204030204" pitchFamily="49" charset="0"/>
+                <a:cs typeface="Courier New" panose="02070309020205020404" pitchFamily="49" charset="0"/>
+              </a:rPr>
+              <a:t> </a:t>
+            </a:r>
+            <a:r>
+              <a:rPr lang="en-US" altLang="en-US" sz="1600" dirty="0">
+                <a:solidFill>
+                  <a:srgbClr val="CC7832"/>
+                </a:solidFill>
+                <a:latin typeface="Consolas" panose="020B0609020204030204" pitchFamily="49" charset="0"/>
+                <a:cs typeface="Courier New" panose="02070309020205020404" pitchFamily="49" charset="0"/>
+              </a:rPr>
+              <a:t>extends </a:t>
+            </a:r>
+            <a:r>
+              <a:rPr lang="en-US" altLang="en-US" sz="1600" dirty="0" err="1">
+                <a:solidFill>
+                  <a:srgbClr val="A9B7C6"/>
+                </a:solidFill>
+                <a:latin typeface="Consolas" panose="020B0609020204030204" pitchFamily="49" charset="0"/>
+                <a:cs typeface="Courier New" panose="02070309020205020404" pitchFamily="49" charset="0"/>
+              </a:rPr>
+              <a:t>ContentProvider</a:t>
+            </a:r>
+            <a:r>
+              <a:rPr lang="en-US" altLang="en-US" sz="1600" dirty="0">
+                <a:solidFill>
+                  <a:srgbClr val="A9B7C6"/>
+                </a:solidFill>
+                <a:latin typeface="Consolas" panose="020B0609020204030204" pitchFamily="49" charset="0"/>
+                <a:cs typeface="Courier New" panose="02070309020205020404" pitchFamily="49" charset="0"/>
+              </a:rPr>
+              <a:t> {</a:t>
+            </a:r>
+            <a:br>
+              <a:rPr lang="en-US" altLang="en-US" sz="1600" dirty="0">
+                <a:solidFill>
+                  <a:srgbClr val="A9B7C6"/>
+                </a:solidFill>
+                <a:latin typeface="Consolas" panose="020B0609020204030204" pitchFamily="49" charset="0"/>
+                <a:cs typeface="Courier New" panose="02070309020205020404" pitchFamily="49" charset="0"/>
+              </a:rPr>
+            </a:br>
+            <a:r>
+              <a:rPr lang="en-US" altLang="en-US" sz="1600" dirty="0">
+                <a:solidFill>
+                  <a:srgbClr val="A9B7C6"/>
+                </a:solidFill>
+                <a:latin typeface="Consolas" panose="020B0609020204030204" pitchFamily="49" charset="0"/>
+                <a:cs typeface="Courier New" panose="02070309020205020404" pitchFamily="49" charset="0"/>
+              </a:rPr>
+              <a:t/>
+            </a:r>
+            <a:br>
+              <a:rPr lang="en-US" altLang="en-US" sz="1600" dirty="0">
+                <a:solidFill>
+                  <a:srgbClr val="A9B7C6"/>
+                </a:solidFill>
+                <a:latin typeface="Consolas" panose="020B0609020204030204" pitchFamily="49" charset="0"/>
+                <a:cs typeface="Courier New" panose="02070309020205020404" pitchFamily="49" charset="0"/>
+              </a:rPr>
+            </a:br>
+            <a:r>
+              <a:rPr lang="en-US" altLang="en-US" sz="1600" dirty="0">
+                <a:solidFill>
+                  <a:srgbClr val="A9B7C6"/>
+                </a:solidFill>
+                <a:latin typeface="Consolas" panose="020B0609020204030204" pitchFamily="49" charset="0"/>
+                <a:cs typeface="Courier New" panose="02070309020205020404" pitchFamily="49" charset="0"/>
+              </a:rPr>
+              <a:t>    </a:t>
+            </a:r>
+            <a:r>
+              <a:rPr lang="en-US" altLang="en-US" sz="1600" dirty="0">
+                <a:solidFill>
+                  <a:srgbClr val="BBB529"/>
+                </a:solidFill>
+                <a:latin typeface="Consolas" panose="020B0609020204030204" pitchFamily="49" charset="0"/>
+                <a:cs typeface="Courier New" panose="02070309020205020404" pitchFamily="49" charset="0"/>
+              </a:rPr>
+              <a:t>@</a:t>
+            </a:r>
+            <a:r>
+              <a:rPr lang="en-US" altLang="en-US" sz="1600" dirty="0" smtClean="0">
+                <a:solidFill>
+                  <a:srgbClr val="BBB529"/>
+                </a:solidFill>
+                <a:latin typeface="Consolas" panose="020B0609020204030204" pitchFamily="49" charset="0"/>
+                <a:cs typeface="Courier New" panose="02070309020205020404" pitchFamily="49" charset="0"/>
+              </a:rPr>
+              <a:t>Override </a:t>
+            </a:r>
+            <a:r>
+              <a:rPr lang="en-US" altLang="en-US" sz="1600" dirty="0" smtClean="0">
+                <a:solidFill>
+                  <a:srgbClr val="CC7832"/>
+                </a:solidFill>
+                <a:latin typeface="Consolas" panose="020B0609020204030204" pitchFamily="49" charset="0"/>
+                <a:cs typeface="Courier New" panose="02070309020205020404" pitchFamily="49" charset="0"/>
+              </a:rPr>
+              <a:t>public </a:t>
+            </a:r>
+            <a:r>
+              <a:rPr lang="en-US" altLang="en-US" sz="1600" dirty="0" err="1">
+                <a:solidFill>
+                  <a:srgbClr val="CC7832"/>
+                </a:solidFill>
+                <a:latin typeface="Consolas" panose="020B0609020204030204" pitchFamily="49" charset="0"/>
+                <a:cs typeface="Courier New" panose="02070309020205020404" pitchFamily="49" charset="0"/>
+              </a:rPr>
+              <a:t>boolean</a:t>
+            </a:r>
+            <a:r>
+              <a:rPr lang="en-US" altLang="en-US" sz="1600" dirty="0">
+                <a:solidFill>
+                  <a:srgbClr val="CC7832"/>
+                </a:solidFill>
+                <a:latin typeface="Consolas" panose="020B0609020204030204" pitchFamily="49" charset="0"/>
+                <a:cs typeface="Courier New" panose="02070309020205020404" pitchFamily="49" charset="0"/>
+              </a:rPr>
+              <a:t> </a:t>
+            </a:r>
+            <a:r>
+              <a:rPr lang="en-US" altLang="en-US" sz="1600" dirty="0" err="1">
+                <a:solidFill>
+                  <a:srgbClr val="FFC66D"/>
+                </a:solidFill>
+                <a:latin typeface="Consolas" panose="020B0609020204030204" pitchFamily="49" charset="0"/>
+                <a:cs typeface="Courier New" panose="02070309020205020404" pitchFamily="49" charset="0"/>
+              </a:rPr>
+              <a:t>onCreate</a:t>
+            </a:r>
+            <a:r>
+              <a:rPr lang="en-US" altLang="en-US" sz="1600" dirty="0">
+                <a:solidFill>
+                  <a:srgbClr val="A9B7C6"/>
+                </a:solidFill>
+                <a:latin typeface="Consolas" panose="020B0609020204030204" pitchFamily="49" charset="0"/>
+                <a:cs typeface="Courier New" panose="02070309020205020404" pitchFamily="49" charset="0"/>
+              </a:rPr>
+              <a:t>() { </a:t>
+            </a:r>
+            <a:r>
+              <a:rPr lang="en-US" altLang="en-US" sz="1600" dirty="0">
+                <a:solidFill>
+                  <a:srgbClr val="CC7832"/>
+                </a:solidFill>
+                <a:latin typeface="Consolas" panose="020B0609020204030204" pitchFamily="49" charset="0"/>
+                <a:cs typeface="Courier New" panose="02070309020205020404" pitchFamily="49" charset="0"/>
+              </a:rPr>
+              <a:t>return false; </a:t>
+            </a:r>
+            <a:r>
+              <a:rPr lang="en-US" altLang="en-US" sz="1600" dirty="0">
+                <a:solidFill>
+                  <a:srgbClr val="A9B7C6"/>
+                </a:solidFill>
+                <a:latin typeface="Consolas" panose="020B0609020204030204" pitchFamily="49" charset="0"/>
+                <a:cs typeface="Courier New" panose="02070309020205020404" pitchFamily="49" charset="0"/>
+              </a:rPr>
+              <a:t>}</a:t>
+            </a:r>
+            <a:br>
+              <a:rPr lang="en-US" altLang="en-US" sz="1600" dirty="0">
+                <a:solidFill>
+                  <a:srgbClr val="A9B7C6"/>
+                </a:solidFill>
+                <a:latin typeface="Consolas" panose="020B0609020204030204" pitchFamily="49" charset="0"/>
+                <a:cs typeface="Courier New" panose="02070309020205020404" pitchFamily="49" charset="0"/>
+              </a:rPr>
+            </a:br>
+            <a:r>
+              <a:rPr lang="en-US" altLang="en-US" sz="1600" dirty="0">
+                <a:solidFill>
+                  <a:srgbClr val="A9B7C6"/>
+                </a:solidFill>
+                <a:latin typeface="Consolas" panose="020B0609020204030204" pitchFamily="49" charset="0"/>
+                <a:cs typeface="Courier New" panose="02070309020205020404" pitchFamily="49" charset="0"/>
+              </a:rPr>
+              <a:t/>
+            </a:r>
+            <a:br>
+              <a:rPr lang="en-US" altLang="en-US" sz="1600" dirty="0">
+                <a:solidFill>
+                  <a:srgbClr val="A9B7C6"/>
+                </a:solidFill>
+                <a:latin typeface="Consolas" panose="020B0609020204030204" pitchFamily="49" charset="0"/>
+                <a:cs typeface="Courier New" panose="02070309020205020404" pitchFamily="49" charset="0"/>
+              </a:rPr>
+            </a:br>
+            <a:r>
+              <a:rPr lang="en-US" altLang="en-US" sz="1600" dirty="0">
+                <a:solidFill>
+                  <a:srgbClr val="A9B7C6"/>
+                </a:solidFill>
+                <a:latin typeface="Consolas" panose="020B0609020204030204" pitchFamily="49" charset="0"/>
+                <a:cs typeface="Courier New" panose="02070309020205020404" pitchFamily="49" charset="0"/>
+              </a:rPr>
+              <a:t>    </a:t>
+            </a:r>
+            <a:r>
+              <a:rPr lang="en-US" altLang="en-US" sz="1600" dirty="0">
+                <a:solidFill>
+                  <a:srgbClr val="BBB529"/>
+                </a:solidFill>
+                <a:latin typeface="Consolas" panose="020B0609020204030204" pitchFamily="49" charset="0"/>
+                <a:cs typeface="Courier New" panose="02070309020205020404" pitchFamily="49" charset="0"/>
+              </a:rPr>
+              <a:t>@</a:t>
+            </a:r>
+            <a:r>
+              <a:rPr lang="en-US" altLang="en-US" sz="1600" dirty="0" smtClean="0">
+                <a:solidFill>
+                  <a:srgbClr val="BBB529"/>
+                </a:solidFill>
+                <a:latin typeface="Consolas" panose="020B0609020204030204" pitchFamily="49" charset="0"/>
+                <a:cs typeface="Courier New" panose="02070309020205020404" pitchFamily="49" charset="0"/>
+              </a:rPr>
+              <a:t>Override </a:t>
+            </a:r>
+            <a:r>
+              <a:rPr lang="en-US" altLang="en-US" sz="1600" dirty="0" smtClean="0">
+                <a:solidFill>
+                  <a:srgbClr val="CC7832"/>
+                </a:solidFill>
+                <a:latin typeface="Consolas" panose="020B0609020204030204" pitchFamily="49" charset="0"/>
+                <a:cs typeface="Courier New" panose="02070309020205020404" pitchFamily="49" charset="0"/>
+              </a:rPr>
+              <a:t>public </a:t>
+            </a:r>
+            <a:r>
+              <a:rPr lang="en-US" altLang="en-US" sz="1600" dirty="0" err="1">
+                <a:solidFill>
+                  <a:srgbClr val="CC7832"/>
+                </a:solidFill>
+                <a:latin typeface="Consolas" panose="020B0609020204030204" pitchFamily="49" charset="0"/>
+                <a:cs typeface="Courier New" panose="02070309020205020404" pitchFamily="49" charset="0"/>
+              </a:rPr>
+              <a:t>int</a:t>
+            </a:r>
+            <a:r>
+              <a:rPr lang="en-US" altLang="en-US" sz="1600" dirty="0">
+                <a:solidFill>
+                  <a:srgbClr val="CC7832"/>
+                </a:solidFill>
+                <a:latin typeface="Consolas" panose="020B0609020204030204" pitchFamily="49" charset="0"/>
+                <a:cs typeface="Courier New" panose="02070309020205020404" pitchFamily="49" charset="0"/>
+              </a:rPr>
+              <a:t> </a:t>
+            </a:r>
+            <a:r>
+              <a:rPr lang="en-US" altLang="en-US" sz="1600" dirty="0">
+                <a:solidFill>
+                  <a:srgbClr val="FFC66D"/>
+                </a:solidFill>
+                <a:latin typeface="Consolas" panose="020B0609020204030204" pitchFamily="49" charset="0"/>
+                <a:cs typeface="Courier New" panose="02070309020205020404" pitchFamily="49" charset="0"/>
+              </a:rPr>
+              <a:t>delete</a:t>
+            </a:r>
+            <a:r>
+              <a:rPr lang="en-US" altLang="en-US" sz="1600" dirty="0">
+                <a:solidFill>
+                  <a:srgbClr val="A9B7C6"/>
+                </a:solidFill>
+                <a:latin typeface="Consolas" panose="020B0609020204030204" pitchFamily="49" charset="0"/>
+                <a:cs typeface="Courier New" panose="02070309020205020404" pitchFamily="49" charset="0"/>
+              </a:rPr>
+              <a:t>(...) { </a:t>
+            </a:r>
+            <a:r>
+              <a:rPr lang="en-US" altLang="en-US" sz="1600" dirty="0">
+                <a:solidFill>
+                  <a:srgbClr val="CC7832"/>
+                </a:solidFill>
+                <a:latin typeface="Consolas" panose="020B0609020204030204" pitchFamily="49" charset="0"/>
+                <a:cs typeface="Courier New" panose="02070309020205020404" pitchFamily="49" charset="0"/>
+              </a:rPr>
+              <a:t>return </a:t>
+            </a:r>
+            <a:r>
+              <a:rPr lang="en-US" altLang="en-US" sz="1600" dirty="0">
+                <a:solidFill>
+                  <a:srgbClr val="6897BB"/>
+                </a:solidFill>
+                <a:latin typeface="Consolas" panose="020B0609020204030204" pitchFamily="49" charset="0"/>
+                <a:cs typeface="Courier New" panose="02070309020205020404" pitchFamily="49" charset="0"/>
+              </a:rPr>
+              <a:t>0</a:t>
+            </a:r>
+            <a:r>
+              <a:rPr lang="en-US" altLang="en-US" sz="1600" dirty="0">
+                <a:solidFill>
+                  <a:srgbClr val="CC7832"/>
+                </a:solidFill>
+                <a:latin typeface="Consolas" panose="020B0609020204030204" pitchFamily="49" charset="0"/>
+                <a:cs typeface="Courier New" panose="02070309020205020404" pitchFamily="49" charset="0"/>
+              </a:rPr>
+              <a:t>; </a:t>
+            </a:r>
+            <a:r>
+              <a:rPr lang="en-US" altLang="en-US" sz="1600" dirty="0">
+                <a:solidFill>
+                  <a:srgbClr val="A9B7C6"/>
+                </a:solidFill>
+                <a:latin typeface="Consolas" panose="020B0609020204030204" pitchFamily="49" charset="0"/>
+                <a:cs typeface="Courier New" panose="02070309020205020404" pitchFamily="49" charset="0"/>
+              </a:rPr>
+              <a:t>}</a:t>
+            </a:r>
+            <a:br>
+              <a:rPr lang="en-US" altLang="en-US" sz="1600" dirty="0">
+                <a:solidFill>
+                  <a:srgbClr val="A9B7C6"/>
+                </a:solidFill>
+                <a:latin typeface="Consolas" panose="020B0609020204030204" pitchFamily="49" charset="0"/>
+                <a:cs typeface="Courier New" panose="02070309020205020404" pitchFamily="49" charset="0"/>
+              </a:rPr>
+            </a:br>
+            <a:r>
+              <a:rPr lang="en-US" altLang="en-US" sz="1600" dirty="0">
+                <a:solidFill>
+                  <a:srgbClr val="A9B7C6"/>
+                </a:solidFill>
+                <a:latin typeface="Consolas" panose="020B0609020204030204" pitchFamily="49" charset="0"/>
+                <a:cs typeface="Courier New" panose="02070309020205020404" pitchFamily="49" charset="0"/>
+              </a:rPr>
+              <a:t/>
+            </a:r>
+            <a:br>
+              <a:rPr lang="en-US" altLang="en-US" sz="1600" dirty="0">
+                <a:solidFill>
+                  <a:srgbClr val="A9B7C6"/>
+                </a:solidFill>
+                <a:latin typeface="Consolas" panose="020B0609020204030204" pitchFamily="49" charset="0"/>
+                <a:cs typeface="Courier New" panose="02070309020205020404" pitchFamily="49" charset="0"/>
+              </a:rPr>
+            </a:br>
+            <a:r>
+              <a:rPr lang="en-US" altLang="en-US" sz="1600" dirty="0">
+                <a:solidFill>
+                  <a:srgbClr val="A9B7C6"/>
+                </a:solidFill>
+                <a:latin typeface="Consolas" panose="020B0609020204030204" pitchFamily="49" charset="0"/>
+                <a:cs typeface="Courier New" panose="02070309020205020404" pitchFamily="49" charset="0"/>
+              </a:rPr>
+              <a:t>    </a:t>
+            </a:r>
+            <a:r>
+              <a:rPr lang="en-US" altLang="en-US" sz="1600" dirty="0">
+                <a:solidFill>
+                  <a:srgbClr val="BBB529"/>
+                </a:solidFill>
+                <a:latin typeface="Consolas" panose="020B0609020204030204" pitchFamily="49" charset="0"/>
+                <a:cs typeface="Courier New" panose="02070309020205020404" pitchFamily="49" charset="0"/>
+              </a:rPr>
+              <a:t>@</a:t>
+            </a:r>
+            <a:r>
+              <a:rPr lang="en-US" altLang="en-US" sz="1600" dirty="0" smtClean="0">
+                <a:solidFill>
+                  <a:srgbClr val="BBB529"/>
+                </a:solidFill>
+                <a:latin typeface="Consolas" panose="020B0609020204030204" pitchFamily="49" charset="0"/>
+                <a:cs typeface="Courier New" panose="02070309020205020404" pitchFamily="49" charset="0"/>
+              </a:rPr>
+              <a:t>Override </a:t>
+            </a:r>
+            <a:r>
+              <a:rPr lang="en-US" altLang="en-US" sz="1600" dirty="0" smtClean="0">
+                <a:solidFill>
+                  <a:srgbClr val="CC7832"/>
+                </a:solidFill>
+                <a:latin typeface="Consolas" panose="020B0609020204030204" pitchFamily="49" charset="0"/>
+                <a:cs typeface="Courier New" panose="02070309020205020404" pitchFamily="49" charset="0"/>
+              </a:rPr>
+              <a:t>public </a:t>
+            </a:r>
+            <a:r>
+              <a:rPr lang="en-US" altLang="en-US" sz="1600" dirty="0">
+                <a:solidFill>
+                  <a:srgbClr val="A9B7C6"/>
+                </a:solidFill>
+                <a:latin typeface="Consolas" panose="020B0609020204030204" pitchFamily="49" charset="0"/>
+                <a:cs typeface="Courier New" panose="02070309020205020404" pitchFamily="49" charset="0"/>
+              </a:rPr>
+              <a:t>String </a:t>
+            </a:r>
+            <a:r>
+              <a:rPr lang="en-US" altLang="en-US" sz="1600" dirty="0" err="1">
+                <a:solidFill>
+                  <a:srgbClr val="FFC66D"/>
+                </a:solidFill>
+                <a:latin typeface="Consolas" panose="020B0609020204030204" pitchFamily="49" charset="0"/>
+                <a:cs typeface="Courier New" panose="02070309020205020404" pitchFamily="49" charset="0"/>
+              </a:rPr>
+              <a:t>getType</a:t>
+            </a:r>
+            <a:r>
+              <a:rPr lang="en-US" altLang="en-US" sz="1600" dirty="0">
+                <a:solidFill>
+                  <a:srgbClr val="A9B7C6"/>
+                </a:solidFill>
+                <a:latin typeface="Consolas" panose="020B0609020204030204" pitchFamily="49" charset="0"/>
+                <a:cs typeface="Courier New" panose="02070309020205020404" pitchFamily="49" charset="0"/>
+              </a:rPr>
+              <a:t>(...) { </a:t>
+            </a:r>
+            <a:r>
+              <a:rPr lang="en-US" altLang="en-US" sz="1600" dirty="0">
+                <a:solidFill>
+                  <a:srgbClr val="CC7832"/>
+                </a:solidFill>
+                <a:latin typeface="Consolas" panose="020B0609020204030204" pitchFamily="49" charset="0"/>
+                <a:cs typeface="Courier New" panose="02070309020205020404" pitchFamily="49" charset="0"/>
+              </a:rPr>
+              <a:t>return null; </a:t>
+            </a:r>
+            <a:r>
+              <a:rPr lang="en-US" altLang="en-US" sz="1600" dirty="0">
+                <a:solidFill>
+                  <a:srgbClr val="A9B7C6"/>
+                </a:solidFill>
+                <a:latin typeface="Consolas" panose="020B0609020204030204" pitchFamily="49" charset="0"/>
+                <a:cs typeface="Courier New" panose="02070309020205020404" pitchFamily="49" charset="0"/>
+              </a:rPr>
+              <a:t>}</a:t>
+            </a:r>
+            <a:br>
+              <a:rPr lang="en-US" altLang="en-US" sz="1600" dirty="0">
+                <a:solidFill>
+                  <a:srgbClr val="A9B7C6"/>
+                </a:solidFill>
+                <a:latin typeface="Consolas" panose="020B0609020204030204" pitchFamily="49" charset="0"/>
+                <a:cs typeface="Courier New" panose="02070309020205020404" pitchFamily="49" charset="0"/>
+              </a:rPr>
+            </a:br>
+            <a:r>
+              <a:rPr lang="en-US" altLang="en-US" sz="1600" dirty="0">
+                <a:solidFill>
+                  <a:srgbClr val="A9B7C6"/>
+                </a:solidFill>
+                <a:latin typeface="Consolas" panose="020B0609020204030204" pitchFamily="49" charset="0"/>
+                <a:cs typeface="Courier New" panose="02070309020205020404" pitchFamily="49" charset="0"/>
+              </a:rPr>
+              <a:t/>
+            </a:r>
+            <a:br>
+              <a:rPr lang="en-US" altLang="en-US" sz="1600" dirty="0">
+                <a:solidFill>
+                  <a:srgbClr val="A9B7C6"/>
+                </a:solidFill>
+                <a:latin typeface="Consolas" panose="020B0609020204030204" pitchFamily="49" charset="0"/>
+                <a:cs typeface="Courier New" panose="02070309020205020404" pitchFamily="49" charset="0"/>
+              </a:rPr>
+            </a:br>
+            <a:r>
+              <a:rPr lang="en-US" altLang="en-US" sz="1600" dirty="0">
+                <a:solidFill>
+                  <a:srgbClr val="A9B7C6"/>
+                </a:solidFill>
+                <a:latin typeface="Consolas" panose="020B0609020204030204" pitchFamily="49" charset="0"/>
+                <a:cs typeface="Courier New" panose="02070309020205020404" pitchFamily="49" charset="0"/>
+              </a:rPr>
+              <a:t>    </a:t>
+            </a:r>
+            <a:r>
+              <a:rPr lang="en-US" altLang="en-US" sz="1600" dirty="0">
+                <a:solidFill>
+                  <a:srgbClr val="BBB529"/>
+                </a:solidFill>
+                <a:latin typeface="Consolas" panose="020B0609020204030204" pitchFamily="49" charset="0"/>
+                <a:cs typeface="Courier New" panose="02070309020205020404" pitchFamily="49" charset="0"/>
+              </a:rPr>
+              <a:t>@</a:t>
+            </a:r>
+            <a:r>
+              <a:rPr lang="en-US" altLang="en-US" sz="1600" dirty="0" smtClean="0">
+                <a:solidFill>
+                  <a:srgbClr val="BBB529"/>
+                </a:solidFill>
+                <a:latin typeface="Consolas" panose="020B0609020204030204" pitchFamily="49" charset="0"/>
+                <a:cs typeface="Courier New" panose="02070309020205020404" pitchFamily="49" charset="0"/>
+              </a:rPr>
+              <a:t>Override </a:t>
+            </a:r>
+            <a:r>
+              <a:rPr lang="en-US" altLang="en-US" sz="1600" dirty="0" smtClean="0">
+                <a:solidFill>
+                  <a:srgbClr val="CC7832"/>
+                </a:solidFill>
+                <a:latin typeface="Consolas" panose="020B0609020204030204" pitchFamily="49" charset="0"/>
+                <a:cs typeface="Courier New" panose="02070309020205020404" pitchFamily="49" charset="0"/>
+              </a:rPr>
+              <a:t>public </a:t>
+            </a:r>
+            <a:r>
+              <a:rPr lang="en-US" altLang="en-US" sz="1600" dirty="0">
+                <a:solidFill>
+                  <a:srgbClr val="A9B7C6"/>
+                </a:solidFill>
+                <a:latin typeface="Consolas" panose="020B0609020204030204" pitchFamily="49" charset="0"/>
+                <a:cs typeface="Courier New" panose="02070309020205020404" pitchFamily="49" charset="0"/>
+              </a:rPr>
+              <a:t>Uri </a:t>
+            </a:r>
+            <a:r>
+              <a:rPr lang="en-US" altLang="en-US" sz="1600" dirty="0">
+                <a:solidFill>
+                  <a:srgbClr val="FFC66D"/>
+                </a:solidFill>
+                <a:latin typeface="Consolas" panose="020B0609020204030204" pitchFamily="49" charset="0"/>
+                <a:cs typeface="Courier New" panose="02070309020205020404" pitchFamily="49" charset="0"/>
+              </a:rPr>
+              <a:t>insert</a:t>
+            </a:r>
+            <a:r>
+              <a:rPr lang="en-US" altLang="en-US" sz="1600" dirty="0">
+                <a:solidFill>
+                  <a:srgbClr val="A9B7C6"/>
+                </a:solidFill>
+                <a:latin typeface="Consolas" panose="020B0609020204030204" pitchFamily="49" charset="0"/>
+                <a:cs typeface="Courier New" panose="02070309020205020404" pitchFamily="49" charset="0"/>
+              </a:rPr>
+              <a:t>(...) { </a:t>
+            </a:r>
+            <a:r>
+              <a:rPr lang="en-US" altLang="en-US" sz="1600" dirty="0">
+                <a:solidFill>
+                  <a:srgbClr val="CC7832"/>
+                </a:solidFill>
+                <a:latin typeface="Consolas" panose="020B0609020204030204" pitchFamily="49" charset="0"/>
+                <a:cs typeface="Courier New" panose="02070309020205020404" pitchFamily="49" charset="0"/>
+              </a:rPr>
+              <a:t>return null; </a:t>
+            </a:r>
+            <a:r>
+              <a:rPr lang="en-US" altLang="en-US" sz="1600" dirty="0">
+                <a:solidFill>
+                  <a:srgbClr val="A9B7C6"/>
+                </a:solidFill>
+                <a:latin typeface="Consolas" panose="020B0609020204030204" pitchFamily="49" charset="0"/>
+                <a:cs typeface="Courier New" panose="02070309020205020404" pitchFamily="49" charset="0"/>
+              </a:rPr>
+              <a:t>}</a:t>
+            </a:r>
+            <a:br>
+              <a:rPr lang="en-US" altLang="en-US" sz="1600" dirty="0">
+                <a:solidFill>
+                  <a:srgbClr val="A9B7C6"/>
+                </a:solidFill>
+                <a:latin typeface="Consolas" panose="020B0609020204030204" pitchFamily="49" charset="0"/>
+                <a:cs typeface="Courier New" panose="02070309020205020404" pitchFamily="49" charset="0"/>
+              </a:rPr>
+            </a:br>
+            <a:r>
+              <a:rPr lang="en-US" altLang="en-US" sz="1600" dirty="0">
+                <a:solidFill>
+                  <a:srgbClr val="A9B7C6"/>
+                </a:solidFill>
+                <a:latin typeface="Consolas" panose="020B0609020204030204" pitchFamily="49" charset="0"/>
+                <a:cs typeface="Courier New" panose="02070309020205020404" pitchFamily="49" charset="0"/>
+              </a:rPr>
+              <a:t/>
+            </a:r>
+            <a:br>
+              <a:rPr lang="en-US" altLang="en-US" sz="1600" dirty="0">
+                <a:solidFill>
+                  <a:srgbClr val="A9B7C6"/>
+                </a:solidFill>
+                <a:latin typeface="Consolas" panose="020B0609020204030204" pitchFamily="49" charset="0"/>
+                <a:cs typeface="Courier New" panose="02070309020205020404" pitchFamily="49" charset="0"/>
+              </a:rPr>
+            </a:br>
+            <a:r>
+              <a:rPr lang="en-US" altLang="en-US" sz="1600" dirty="0">
+                <a:solidFill>
+                  <a:srgbClr val="A9B7C6"/>
+                </a:solidFill>
+                <a:latin typeface="Consolas" panose="020B0609020204030204" pitchFamily="49" charset="0"/>
+                <a:cs typeface="Courier New" panose="02070309020205020404" pitchFamily="49" charset="0"/>
+              </a:rPr>
+              <a:t>    </a:t>
+            </a:r>
+            <a:r>
+              <a:rPr lang="en-US" altLang="en-US" sz="1600" dirty="0">
+                <a:solidFill>
+                  <a:srgbClr val="BBB529"/>
+                </a:solidFill>
+                <a:latin typeface="Consolas" panose="020B0609020204030204" pitchFamily="49" charset="0"/>
+                <a:cs typeface="Courier New" panose="02070309020205020404" pitchFamily="49" charset="0"/>
+              </a:rPr>
+              <a:t>@</a:t>
+            </a:r>
+            <a:r>
+              <a:rPr lang="en-US" altLang="en-US" sz="1600" dirty="0" smtClean="0">
+                <a:solidFill>
+                  <a:srgbClr val="BBB529"/>
+                </a:solidFill>
+                <a:latin typeface="Consolas" panose="020B0609020204030204" pitchFamily="49" charset="0"/>
+                <a:cs typeface="Courier New" panose="02070309020205020404" pitchFamily="49" charset="0"/>
+              </a:rPr>
+              <a:t>Override </a:t>
+            </a:r>
+            <a:r>
+              <a:rPr lang="en-US" altLang="en-US" sz="1600" dirty="0" smtClean="0">
+                <a:solidFill>
+                  <a:srgbClr val="CC7832"/>
+                </a:solidFill>
+                <a:latin typeface="Consolas" panose="020B0609020204030204" pitchFamily="49" charset="0"/>
+                <a:cs typeface="Courier New" panose="02070309020205020404" pitchFamily="49" charset="0"/>
+              </a:rPr>
+              <a:t>public </a:t>
+            </a:r>
+            <a:r>
+              <a:rPr lang="en-US" altLang="en-US" sz="1600" dirty="0">
+                <a:solidFill>
+                  <a:srgbClr val="A9B7C6"/>
+                </a:solidFill>
+                <a:latin typeface="Consolas" panose="020B0609020204030204" pitchFamily="49" charset="0"/>
+                <a:cs typeface="Courier New" panose="02070309020205020404" pitchFamily="49" charset="0"/>
+              </a:rPr>
+              <a:t>Cursor </a:t>
+            </a:r>
+            <a:r>
+              <a:rPr lang="en-US" altLang="en-US" sz="1600" dirty="0">
+                <a:solidFill>
+                  <a:srgbClr val="FFC66D"/>
+                </a:solidFill>
+                <a:latin typeface="Consolas" panose="020B0609020204030204" pitchFamily="49" charset="0"/>
+                <a:cs typeface="Courier New" panose="02070309020205020404" pitchFamily="49" charset="0"/>
+              </a:rPr>
+              <a:t>query</a:t>
+            </a:r>
+            <a:r>
+              <a:rPr lang="en-US" altLang="en-US" sz="1600" dirty="0">
+                <a:solidFill>
+                  <a:srgbClr val="A9B7C6"/>
+                </a:solidFill>
+                <a:latin typeface="Consolas" panose="020B0609020204030204" pitchFamily="49" charset="0"/>
+                <a:cs typeface="Courier New" panose="02070309020205020404" pitchFamily="49" charset="0"/>
+              </a:rPr>
+              <a:t>(...) { </a:t>
+            </a:r>
+            <a:r>
+              <a:rPr lang="en-US" altLang="en-US" sz="1600" dirty="0">
+                <a:solidFill>
+                  <a:srgbClr val="CC7832"/>
+                </a:solidFill>
+                <a:latin typeface="Consolas" panose="020B0609020204030204" pitchFamily="49" charset="0"/>
+                <a:cs typeface="Courier New" panose="02070309020205020404" pitchFamily="49" charset="0"/>
+              </a:rPr>
+              <a:t>return null; </a:t>
+            </a:r>
+            <a:r>
+              <a:rPr lang="en-US" altLang="en-US" sz="1600" dirty="0">
+                <a:solidFill>
+                  <a:srgbClr val="A9B7C6"/>
+                </a:solidFill>
+                <a:latin typeface="Consolas" panose="020B0609020204030204" pitchFamily="49" charset="0"/>
+                <a:cs typeface="Courier New" panose="02070309020205020404" pitchFamily="49" charset="0"/>
+              </a:rPr>
+              <a:t>}</a:t>
+            </a:r>
+            <a:br>
+              <a:rPr lang="en-US" altLang="en-US" sz="1600" dirty="0">
+                <a:solidFill>
+                  <a:srgbClr val="A9B7C6"/>
+                </a:solidFill>
+                <a:latin typeface="Consolas" panose="020B0609020204030204" pitchFamily="49" charset="0"/>
+                <a:cs typeface="Courier New" panose="02070309020205020404" pitchFamily="49" charset="0"/>
+              </a:rPr>
+            </a:br>
+            <a:r>
+              <a:rPr lang="en-US" altLang="en-US" sz="1600" dirty="0">
+                <a:solidFill>
+                  <a:srgbClr val="A9B7C6"/>
+                </a:solidFill>
+                <a:latin typeface="Consolas" panose="020B0609020204030204" pitchFamily="49" charset="0"/>
+                <a:cs typeface="Courier New" panose="02070309020205020404" pitchFamily="49" charset="0"/>
+              </a:rPr>
+              <a:t/>
+            </a:r>
+            <a:br>
+              <a:rPr lang="en-US" altLang="en-US" sz="1600" dirty="0">
+                <a:solidFill>
+                  <a:srgbClr val="A9B7C6"/>
+                </a:solidFill>
+                <a:latin typeface="Consolas" panose="020B0609020204030204" pitchFamily="49" charset="0"/>
+                <a:cs typeface="Courier New" panose="02070309020205020404" pitchFamily="49" charset="0"/>
+              </a:rPr>
+            </a:br>
+            <a:r>
+              <a:rPr lang="en-US" altLang="en-US" sz="1600" dirty="0">
+                <a:solidFill>
+                  <a:srgbClr val="A9B7C6"/>
+                </a:solidFill>
+                <a:latin typeface="Consolas" panose="020B0609020204030204" pitchFamily="49" charset="0"/>
+                <a:cs typeface="Courier New" panose="02070309020205020404" pitchFamily="49" charset="0"/>
+              </a:rPr>
+              <a:t>    </a:t>
+            </a:r>
+            <a:r>
+              <a:rPr lang="en-US" altLang="en-US" sz="1600" dirty="0">
+                <a:solidFill>
+                  <a:srgbClr val="BBB529"/>
+                </a:solidFill>
+                <a:latin typeface="Consolas" panose="020B0609020204030204" pitchFamily="49" charset="0"/>
+                <a:cs typeface="Courier New" panose="02070309020205020404" pitchFamily="49" charset="0"/>
+              </a:rPr>
+              <a:t>@</a:t>
+            </a:r>
+            <a:r>
+              <a:rPr lang="en-US" altLang="en-US" sz="1600" dirty="0" smtClean="0">
+                <a:solidFill>
+                  <a:srgbClr val="BBB529"/>
+                </a:solidFill>
+                <a:latin typeface="Consolas" panose="020B0609020204030204" pitchFamily="49" charset="0"/>
+                <a:cs typeface="Courier New" panose="02070309020205020404" pitchFamily="49" charset="0"/>
+              </a:rPr>
+              <a:t>Override </a:t>
+            </a:r>
+            <a:r>
+              <a:rPr lang="en-US" altLang="en-US" sz="1600" dirty="0" smtClean="0">
+                <a:solidFill>
+                  <a:srgbClr val="CC7832"/>
+                </a:solidFill>
+                <a:latin typeface="Consolas" panose="020B0609020204030204" pitchFamily="49" charset="0"/>
+                <a:cs typeface="Courier New" panose="02070309020205020404" pitchFamily="49" charset="0"/>
+              </a:rPr>
+              <a:t>public </a:t>
+            </a:r>
+            <a:r>
+              <a:rPr lang="en-US" altLang="en-US" sz="1600" dirty="0" err="1">
+                <a:solidFill>
+                  <a:srgbClr val="CC7832"/>
+                </a:solidFill>
+                <a:latin typeface="Consolas" panose="020B0609020204030204" pitchFamily="49" charset="0"/>
+                <a:cs typeface="Courier New" panose="02070309020205020404" pitchFamily="49" charset="0"/>
+              </a:rPr>
+              <a:t>int</a:t>
+            </a:r>
+            <a:r>
+              <a:rPr lang="en-US" altLang="en-US" sz="1600" dirty="0">
+                <a:solidFill>
+                  <a:srgbClr val="CC7832"/>
+                </a:solidFill>
+                <a:latin typeface="Consolas" panose="020B0609020204030204" pitchFamily="49" charset="0"/>
+                <a:cs typeface="Courier New" panose="02070309020205020404" pitchFamily="49" charset="0"/>
+              </a:rPr>
+              <a:t> </a:t>
+            </a:r>
+            <a:r>
+              <a:rPr lang="en-US" altLang="en-US" sz="1600" dirty="0">
+                <a:solidFill>
+                  <a:srgbClr val="FFC66D"/>
+                </a:solidFill>
+                <a:latin typeface="Consolas" panose="020B0609020204030204" pitchFamily="49" charset="0"/>
+                <a:cs typeface="Courier New" panose="02070309020205020404" pitchFamily="49" charset="0"/>
+              </a:rPr>
+              <a:t>update</a:t>
+            </a:r>
+            <a:r>
+              <a:rPr lang="en-US" altLang="en-US" sz="1600" dirty="0">
+                <a:solidFill>
+                  <a:srgbClr val="A9B7C6"/>
+                </a:solidFill>
+                <a:latin typeface="Consolas" panose="020B0609020204030204" pitchFamily="49" charset="0"/>
+                <a:cs typeface="Courier New" panose="02070309020205020404" pitchFamily="49" charset="0"/>
+              </a:rPr>
+              <a:t>(...) { </a:t>
+            </a:r>
+            <a:r>
+              <a:rPr lang="en-US" altLang="en-US" sz="1600" dirty="0">
+                <a:solidFill>
+                  <a:srgbClr val="CC7832"/>
+                </a:solidFill>
+                <a:latin typeface="Consolas" panose="020B0609020204030204" pitchFamily="49" charset="0"/>
+                <a:cs typeface="Courier New" panose="02070309020205020404" pitchFamily="49" charset="0"/>
+              </a:rPr>
+              <a:t>return </a:t>
+            </a:r>
+            <a:r>
+              <a:rPr lang="en-US" altLang="en-US" sz="1600" dirty="0">
+                <a:solidFill>
+                  <a:srgbClr val="6897BB"/>
+                </a:solidFill>
+                <a:latin typeface="Consolas" panose="020B0609020204030204" pitchFamily="49" charset="0"/>
+                <a:cs typeface="Courier New" panose="02070309020205020404" pitchFamily="49" charset="0"/>
+              </a:rPr>
+              <a:t>0</a:t>
+            </a:r>
+            <a:r>
+              <a:rPr lang="en-US" altLang="en-US" sz="1600" dirty="0">
+                <a:solidFill>
+                  <a:srgbClr val="CC7832"/>
+                </a:solidFill>
+                <a:latin typeface="Consolas" panose="020B0609020204030204" pitchFamily="49" charset="0"/>
+                <a:cs typeface="Courier New" panose="02070309020205020404" pitchFamily="49" charset="0"/>
+              </a:rPr>
+              <a:t>; </a:t>
+            </a:r>
+            <a:r>
+              <a:rPr lang="en-US" altLang="en-US" sz="1600" dirty="0" smtClean="0">
+                <a:solidFill>
+                  <a:srgbClr val="A9B7C6"/>
+                </a:solidFill>
+                <a:latin typeface="Consolas" panose="020B0609020204030204" pitchFamily="49" charset="0"/>
+                <a:cs typeface="Courier New" panose="02070309020205020404" pitchFamily="49" charset="0"/>
+              </a:rPr>
+              <a:t>}</a:t>
+            </a:r>
+          </a:p>
+          <a:p>
+            <a:pPr lvl="0" eaLnBrk="0" fontAlgn="base" hangingPunct="0">
+              <a:spcBef>
+                <a:spcPct val="0"/>
+              </a:spcBef>
+              <a:spcAft>
+                <a:spcPct val="0"/>
+              </a:spcAft>
+            </a:pPr>
+            <a:r>
+              <a:rPr lang="en-US" altLang="en-US" sz="1600" dirty="0">
+                <a:solidFill>
+                  <a:srgbClr val="A9B7C6"/>
+                </a:solidFill>
+                <a:latin typeface="Consolas" panose="020B0609020204030204" pitchFamily="49" charset="0"/>
+                <a:cs typeface="Courier New" panose="02070309020205020404" pitchFamily="49" charset="0"/>
+              </a:rPr>
+              <a:t/>
+            </a:r>
+            <a:br>
+              <a:rPr lang="en-US" altLang="en-US" sz="1600" dirty="0">
+                <a:solidFill>
+                  <a:srgbClr val="A9B7C6"/>
+                </a:solidFill>
+                <a:latin typeface="Consolas" panose="020B0609020204030204" pitchFamily="49" charset="0"/>
+                <a:cs typeface="Courier New" panose="02070309020205020404" pitchFamily="49" charset="0"/>
+              </a:rPr>
+            </a:br>
+            <a:r>
+              <a:rPr lang="en-US" altLang="en-US" sz="1600" dirty="0">
+                <a:solidFill>
+                  <a:srgbClr val="A9B7C6"/>
+                </a:solidFill>
+                <a:latin typeface="Consolas" panose="020B0609020204030204" pitchFamily="49" charset="0"/>
+                <a:cs typeface="Courier New" panose="02070309020205020404" pitchFamily="49" charset="0"/>
+              </a:rPr>
+              <a:t>}</a:t>
+            </a:r>
+            <a:endParaRPr lang="en-US" altLang="en-US" sz="4000" dirty="0">
+              <a:latin typeface="Consolas" panose="020B0609020204030204" pitchFamily="49" charset="0"/>
+            </a:endParaRPr>
+          </a:p>
+        </p:txBody>
+      </p:sp>
+    </p:spTree>
+    <p:extLst>
+      <p:ext uri="{BB962C8B-B14F-4D97-AF65-F5344CB8AC3E}">
+        <p14:creationId xmlns:p14="http://schemas.microsoft.com/office/powerpoint/2010/main" val="209947340"/>
+      </p:ext>
+    </p:extLst>
+  </p:cSld>
+  <p:clrMapOvr>
+    <a:masterClrMapping/>
+  </p:clrMapOvr>
+  <p:transition spd="slow">
+    <p:wipe dir="r"/>
+  </p:transition>
+  <p:timing>
+    <p:tnLst>
+      <p:par>
+        <p:cTn id="1" dur="indefinite" restart="never" nodeType="tmRoot">
+          <p:childTnLst>
+            <p:seq concurrent="1" nextAc="seek">
+              <p:cTn id="2" dur="indefinite" nodeType="mainSeq">
+                <p:childTnLst>
+                  <p:par>
+                    <p:cTn id="3" fill="hold">
+                      <p:stCondLst>
+                        <p:cond delay="indefinite"/>
+                      </p:stCondLst>
+                      <p:childTnLst>
+                        <p:par>
+                          <p:cTn id="4" fill="hold">
+                            <p:stCondLst>
+                              <p:cond delay="0"/>
+                            </p:stCondLst>
+                            <p:childTnLst>
+                              <p:par>
+                                <p:cTn id="5" presetID="10" presetClass="entr" presetSubtype="0" fill="hold" grpId="0" nodeType="clickEffect">
+                                  <p:stCondLst>
+                                    <p:cond delay="0"/>
+                                  </p:stCondLst>
+                                  <p:childTnLst>
+                                    <p:set>
+                                      <p:cBhvr>
+                                        <p:cTn id="6" dur="1" fill="hold">
+                                          <p:stCondLst>
+                                            <p:cond delay="0"/>
+                                          </p:stCondLst>
+                                        </p:cTn>
+                                        <p:tgtEl>
+                                          <p:spTgt spid="7"/>
+                                        </p:tgtEl>
+                                        <p:attrNameLst>
+                                          <p:attrName>style.visibility</p:attrName>
+                                        </p:attrNameLst>
+                                      </p:cBhvr>
+                                      <p:to>
+                                        <p:strVal val="visible"/>
+                                      </p:to>
+                                    </p:set>
+                                    <p:animEffect transition="in" filter="fade">
+                                      <p:cBhvr>
+                                        <p:cTn id="7" dur="300"/>
+                                        <p:tgtEl>
+                                          <p:spTgt spid="7"/>
+                                        </p:tgtEl>
+                                      </p:cBhvr>
+                                    </p:animEffect>
+                                  </p:childTnLst>
+                                </p:cTn>
+                              </p:par>
+                            </p:childTnLst>
+                          </p:cTn>
+                        </p:par>
+                      </p:childTnLst>
+                    </p:cTn>
+                  </p:par>
+                </p:childTnLst>
+              </p:cTn>
+              <p:prevCondLst>
+                <p:cond evt="onPrev" delay="0">
+                  <p:tgtEl>
+                    <p:sldTgt/>
+                  </p:tgtEl>
+                </p:cond>
+              </p:prevCondLst>
+              <p:nextCondLst>
+                <p:cond evt="onNext" delay="0">
+                  <p:tgtEl>
+                    <p:sldTgt/>
+                  </p:tgtEl>
+                </p:cond>
+              </p:nextCondLst>
+            </p:seq>
+          </p:childTnLst>
+        </p:cTn>
+      </p:par>
+    </p:tnLst>
+    <p:bldLst>
+      <p:bldP spid="7" grpId="0" animBg="1"/>
+    </p:bldLst>
+  </p:timing>
+</p:sld>
+</file>
+
+<file path=ppt/slides/slide41.xml><?xml version="1.0" encoding="utf-8"?>
+<p:sld xmlns:a="http://schemas.openxmlformats.org/drawingml/2006/main" xmlns:r="http://schemas.openxmlformats.org/officeDocument/2006/relationships" xmlns:p="http://schemas.openxmlformats.org/presentationml/2006/main">
+  <p:cSld>
+    <p:spTree>
+      <p:nvGrpSpPr>
+        <p:cNvPr id="1" name=""/>
+        <p:cNvGrpSpPr/>
+        <p:nvPr/>
+      </p:nvGrpSpPr>
+      <p:grpSpPr>
+        <a:xfrm>
+          <a:off x="0" y="0"/>
+          <a:ext cx="0" cy="0"/>
+          <a:chOff x="0" y="0"/>
+          <a:chExt cx="0" cy="0"/>
+        </a:xfrm>
+      </p:grpSpPr>
+      <p:sp>
+        <p:nvSpPr>
           <p:cNvPr id="4" name="Rectangle 1"/>
           <p:cNvSpPr>
             <a:spLocks noChangeArrowheads="1"/>
@@ -41520,292 +41961,6 @@
     <p:extLst>
       <p:ext uri="{BB962C8B-B14F-4D97-AF65-F5344CB8AC3E}">
         <p14:creationId xmlns:p14="http://schemas.microsoft.com/office/powerpoint/2010/main" val="4116638235"/>
-      </p:ext>
-    </p:extLst>
-  </p:cSld>
-  <p:clrMapOvr>
-    <a:masterClrMapping/>
-  </p:clrMapOvr>
-  <mc:AlternateContent xmlns:mc="http://schemas.openxmlformats.org/markup-compatibility/2006" xmlns:p14="http://schemas.microsoft.com/office/powerpoint/2010/main">
-    <mc:Choice Requires="p14">
-      <p:transition p14:dur="250">
-        <p14:reveal/>
-      </p:transition>
-    </mc:Choice>
-    <mc:Fallback xmlns="">
-      <p:transition>
-        <p:fade/>
-      </p:transition>
-    </mc:Fallback>
-  </mc:AlternateContent>
-  <p:timing>
-    <p:tnLst>
-      <p:par>
-        <p:cTn id="1" dur="indefinite" restart="never" nodeType="tmRoot"/>
-      </p:par>
-    </p:tnLst>
-  </p:timing>
-</p:sld>
-</file>
-
-<file path=ppt/slides/slide41.xml><?xml version="1.0" encoding="utf-8"?>
-<p:sld xmlns:a="http://schemas.openxmlformats.org/drawingml/2006/main" xmlns:r="http://schemas.openxmlformats.org/officeDocument/2006/relationships" xmlns:p="http://schemas.openxmlformats.org/presentationml/2006/main">
-  <p:cSld>
-    <p:spTree>
-      <p:nvGrpSpPr>
-        <p:cNvPr id="1" name=""/>
-        <p:cNvGrpSpPr/>
-        <p:nvPr/>
-      </p:nvGrpSpPr>
-      <p:grpSpPr>
-        <a:xfrm>
-          <a:off x="0" y="0"/>
-          <a:ext cx="0" cy="0"/>
-          <a:chOff x="0" y="0"/>
-          <a:chExt cx="0" cy="0"/>
-        </a:xfrm>
-      </p:grpSpPr>
-      <p:sp>
-        <p:nvSpPr>
-          <p:cNvPr id="2" name="Title 1"/>
-          <p:cNvSpPr>
-            <a:spLocks noGrp="1"/>
-          </p:cNvSpPr>
-          <p:nvPr>
-            <p:ph type="title"/>
-          </p:nvPr>
-        </p:nvSpPr>
-        <p:spPr/>
-        <p:txBody>
-          <a:bodyPr/>
-          <a:lstStyle/>
-          <a:p>
-            <a:r>
-              <a:rPr lang="en-US" dirty="0" smtClean="0"/>
-              <a:t>Beware of the account name</a:t>
-            </a:r>
-            <a:endParaRPr lang="en-US" dirty="0"/>
-          </a:p>
-        </p:txBody>
-      </p:sp>
-      <p:sp>
-        <p:nvSpPr>
-          <p:cNvPr id="3" name="Content Placeholder 2"/>
-          <p:cNvSpPr>
-            <a:spLocks noGrp="1"/>
-          </p:cNvSpPr>
-          <p:nvPr>
-            <p:ph idx="1"/>
-          </p:nvPr>
-        </p:nvSpPr>
-        <p:spPr>
-          <a:xfrm>
-            <a:off x="609600" y="2420888"/>
-            <a:ext cx="10972800" cy="3705276"/>
-          </a:xfrm>
-        </p:spPr>
-        <p:txBody>
-          <a:bodyPr/>
-          <a:lstStyle/>
-          <a:p>
-            <a:pPr marL="0" indent="0">
-              <a:buNone/>
-            </a:pPr>
-            <a:r>
-              <a:rPr lang="en-US" dirty="0" smtClean="0"/>
-              <a:t>It is used to identify the account</a:t>
-            </a:r>
-          </a:p>
-          <a:p>
-            <a:pPr marL="457200" lvl="1" indent="0">
-              <a:buNone/>
-            </a:pPr>
-            <a:r>
-              <a:rPr lang="en-US" dirty="0" smtClean="0"/>
-              <a:t>Usually a username or </a:t>
-            </a:r>
-            <a:r>
-              <a:rPr lang="en-US" dirty="0" smtClean="0"/>
-              <a:t>email</a:t>
-            </a:r>
-            <a:endParaRPr lang="en-US" dirty="0" smtClean="0"/>
-          </a:p>
-          <a:p>
-            <a:pPr marL="0" indent="0">
-              <a:spcBef>
-                <a:spcPts val="3000"/>
-              </a:spcBef>
-              <a:buNone/>
-            </a:pPr>
-            <a:r>
-              <a:rPr lang="en-US" dirty="0" smtClean="0"/>
-              <a:t>It should </a:t>
-            </a:r>
-            <a:r>
-              <a:rPr lang="en-US" i="1" dirty="0" smtClean="0"/>
-              <a:t>not</a:t>
-            </a:r>
-            <a:r>
-              <a:rPr lang="en-US" dirty="0" smtClean="0"/>
-              <a:t> be localized!</a:t>
-            </a:r>
-          </a:p>
-          <a:p>
-            <a:pPr marL="457200" lvl="1" indent="0">
-              <a:buNone/>
-            </a:pPr>
-            <a:r>
-              <a:rPr lang="en-US" dirty="0"/>
-              <a:t>If the user switches locale, we would not </a:t>
-            </a:r>
-            <a:r>
-              <a:rPr lang="en-US" dirty="0" smtClean="0"/>
-              <a:t>be able </a:t>
-            </a:r>
-            <a:r>
-              <a:rPr lang="en-US" dirty="0"/>
-              <a:t>to locate the old account, and may erroneously register multiple </a:t>
-            </a:r>
-            <a:r>
-              <a:rPr lang="en-US" dirty="0" smtClean="0"/>
-              <a:t>accounts</a:t>
-            </a:r>
-            <a:endParaRPr lang="en-US" dirty="0"/>
-          </a:p>
-        </p:txBody>
-      </p:sp>
-      <p:sp>
-        <p:nvSpPr>
-          <p:cNvPr id="4" name="Rectangle 1"/>
-          <p:cNvSpPr>
-            <a:spLocks noChangeArrowheads="1"/>
-          </p:cNvSpPr>
-          <p:nvPr/>
-        </p:nvSpPr>
-        <p:spPr bwMode="auto">
-          <a:xfrm>
-            <a:off x="652500" y="1700808"/>
-            <a:ext cx="10887000" cy="648072"/>
-          </a:xfrm>
-          <a:prstGeom prst="rect">
-            <a:avLst/>
-          </a:prstGeom>
-          <a:solidFill>
-            <a:srgbClr val="2B2B2B"/>
-          </a:solidFill>
-          <a:ln>
-            <a:noFill/>
-          </a:ln>
-          <a:effectLst/>
-          <a:extLst/>
-        </p:spPr>
-        <p:txBody>
-          <a:bodyPr vert="horz" wrap="square" lIns="182880" tIns="182880" rIns="182880" bIns="182880" numCol="1" anchor="t" anchorCtr="0" compatLnSpc="1">
-            <a:prstTxWarp prst="textNoShape">
-              <a:avLst/>
-            </a:prstTxWarp>
-            <a:noAutofit/>
-          </a:bodyPr>
-          <a:lstStyle/>
-          <a:p>
-            <a:pPr lvl="0" eaLnBrk="0" fontAlgn="base" hangingPunct="0">
-              <a:spcBef>
-                <a:spcPct val="0"/>
-              </a:spcBef>
-              <a:spcAft>
-                <a:spcPct val="0"/>
-              </a:spcAft>
-            </a:pPr>
-            <a:r>
-              <a:rPr lang="en-US" altLang="en-US" sz="1600" dirty="0" smtClean="0">
-                <a:solidFill>
-                  <a:srgbClr val="CC7832"/>
-                </a:solidFill>
-                <a:latin typeface="Consolas" panose="020B0609020204030204" pitchFamily="49" charset="0"/>
-                <a:cs typeface="Courier New" panose="02070309020205020404" pitchFamily="49" charset="0"/>
-              </a:rPr>
-              <a:t>return </a:t>
-            </a:r>
-            <a:r>
-              <a:rPr lang="en-US" altLang="en-US" sz="1600" dirty="0" smtClean="0">
-                <a:solidFill>
-                  <a:srgbClr val="CC7832"/>
-                </a:solidFill>
-                <a:latin typeface="Consolas" panose="020B0609020204030204" pitchFamily="49" charset="0"/>
-                <a:cs typeface="Courier New" panose="02070309020205020404" pitchFamily="49" charset="0"/>
-              </a:rPr>
-              <a:t>new </a:t>
-            </a:r>
-            <a:r>
-              <a:rPr lang="en-US" altLang="en-US" sz="1600" dirty="0" smtClean="0">
-                <a:solidFill>
-                  <a:srgbClr val="A9B7C6"/>
-                </a:solidFill>
-                <a:latin typeface="Consolas" panose="020B0609020204030204" pitchFamily="49" charset="0"/>
-                <a:cs typeface="Courier New" panose="02070309020205020404" pitchFamily="49" charset="0"/>
-              </a:rPr>
-              <a:t>Account(</a:t>
-            </a:r>
-            <a:r>
-              <a:rPr lang="en-US" altLang="en-US" sz="1600" dirty="0" err="1" smtClean="0">
-                <a:solidFill>
-                  <a:srgbClr val="A9B7C6"/>
-                </a:solidFill>
-                <a:latin typeface="Consolas" panose="020B0609020204030204" pitchFamily="49" charset="0"/>
-                <a:cs typeface="Courier New" panose="02070309020205020404" pitchFamily="49" charset="0"/>
-              </a:rPr>
-              <a:t>accountName</a:t>
-            </a:r>
-            <a:r>
-              <a:rPr lang="en-US" altLang="en-US" sz="1600" dirty="0" smtClean="0">
-                <a:solidFill>
-                  <a:srgbClr val="CC7832"/>
-                </a:solidFill>
-                <a:latin typeface="Consolas" panose="020B0609020204030204" pitchFamily="49" charset="0"/>
-                <a:cs typeface="Courier New" panose="02070309020205020404" pitchFamily="49" charset="0"/>
-              </a:rPr>
-              <a:t>, </a:t>
-            </a:r>
-            <a:r>
-              <a:rPr lang="en-US" altLang="en-US" sz="1600" i="1" dirty="0" smtClean="0">
-                <a:solidFill>
-                  <a:srgbClr val="A9B7C6"/>
-                </a:solidFill>
-                <a:latin typeface="Consolas" panose="020B0609020204030204" pitchFamily="49" charset="0"/>
-                <a:cs typeface="Courier New" panose="02070309020205020404" pitchFamily="49" charset="0"/>
-              </a:rPr>
-              <a:t>ACCOUNT_TYPE</a:t>
-            </a:r>
-            <a:r>
-              <a:rPr lang="en-US" altLang="en-US" sz="1600" dirty="0" smtClean="0">
-                <a:solidFill>
-                  <a:srgbClr val="A9B7C6"/>
-                </a:solidFill>
-                <a:latin typeface="Consolas" panose="020B0609020204030204" pitchFamily="49" charset="0"/>
-                <a:cs typeface="Courier New" panose="02070309020205020404" pitchFamily="49" charset="0"/>
-              </a:rPr>
-              <a:t>)</a:t>
-            </a:r>
-            <a:r>
-              <a:rPr lang="en-US" altLang="en-US" sz="1600" dirty="0" smtClean="0">
-                <a:solidFill>
-                  <a:srgbClr val="CC7832"/>
-                </a:solidFill>
-                <a:latin typeface="Consolas" panose="020B0609020204030204" pitchFamily="49" charset="0"/>
-                <a:cs typeface="Courier New" panose="02070309020205020404" pitchFamily="49" charset="0"/>
-              </a:rPr>
-              <a:t>;</a:t>
-            </a:r>
-            <a:endParaRPr lang="en-US" altLang="en-US" sz="4000" dirty="0">
-              <a:latin typeface="Consolas" panose="020B0609020204030204" pitchFamily="49" charset="0"/>
-            </a:endParaRPr>
-          </a:p>
-        </p:txBody>
-      </p:sp>
-    </p:spTree>
-    <p:extLst>
-      <p:ext uri="{BB962C8B-B14F-4D97-AF65-F5344CB8AC3E}">
-        <p14:creationId xmlns:p14="http://schemas.microsoft.com/office/powerpoint/2010/main" val="2551493412"/>
       </p:ext>
     </p:extLst>
   </p:cSld>
@@ -41868,7 +42023,7 @@
           <a:p>
             <a:r>
               <a:rPr lang="en-US" dirty="0" smtClean="0"/>
-              <a:t>Recap</a:t>
+              <a:t>Beware of the account name</a:t>
             </a:r>
             <a:endParaRPr lang="en-US" dirty="0"/>
           </a:p>
@@ -41884,89 +42039,214 @@
             <p:ph idx="1"/>
           </p:nvPr>
         </p:nvSpPr>
-        <p:spPr/>
+        <p:spPr>
+          <a:xfrm>
+            <a:off x="609600" y="2420888"/>
+            <a:ext cx="10972800" cy="3705276"/>
+          </a:xfrm>
+        </p:spPr>
         <p:txBody>
-          <a:bodyPr>
-            <a:normAutofit/>
+          <a:bodyPr/>
+          <a:lstStyle/>
+          <a:p>
+            <a:pPr marL="0" indent="0">
+              <a:buNone/>
+            </a:pPr>
+            <a:r>
+              <a:rPr lang="en-US" dirty="0" smtClean="0"/>
+              <a:t>It is used to identify the account</a:t>
+            </a:r>
+          </a:p>
+          <a:p>
+            <a:pPr marL="457200" lvl="1" indent="0">
+              <a:buNone/>
+            </a:pPr>
+            <a:r>
+              <a:rPr lang="en-US" dirty="0" smtClean="0"/>
+              <a:t>Usually a username or </a:t>
+            </a:r>
+            <a:r>
+              <a:rPr lang="en-US" dirty="0" smtClean="0"/>
+              <a:t>email</a:t>
+            </a:r>
+            <a:endParaRPr lang="en-US" dirty="0" smtClean="0"/>
+          </a:p>
+          <a:p>
+            <a:pPr marL="0" indent="0">
+              <a:spcBef>
+                <a:spcPts val="3000"/>
+              </a:spcBef>
+              <a:buNone/>
+            </a:pPr>
+            <a:r>
+              <a:rPr lang="en-US" dirty="0" smtClean="0"/>
+              <a:t>It should </a:t>
+            </a:r>
+            <a:r>
+              <a:rPr lang="en-US" i="1" dirty="0" smtClean="0"/>
+              <a:t>not</a:t>
+            </a:r>
+            <a:r>
+              <a:rPr lang="en-US" dirty="0" smtClean="0"/>
+              <a:t> be localized!</a:t>
+            </a:r>
+          </a:p>
+          <a:p>
+            <a:pPr marL="457200" lvl="1" indent="0">
+              <a:buNone/>
+            </a:pPr>
+            <a:r>
+              <a:rPr lang="en-US" dirty="0"/>
+              <a:t>If the user switches locale, we would not </a:t>
+            </a:r>
+            <a:r>
+              <a:rPr lang="en-US" dirty="0" smtClean="0"/>
+              <a:t>be able </a:t>
+            </a:r>
+            <a:r>
+              <a:rPr lang="en-US" dirty="0"/>
+              <a:t>to locate the old account, and may erroneously register multiple </a:t>
+            </a:r>
+            <a:r>
+              <a:rPr lang="en-US" dirty="0" smtClean="0"/>
+              <a:t>accounts</a:t>
+            </a:r>
+            <a:endParaRPr lang="en-US" dirty="0"/>
+          </a:p>
+        </p:txBody>
+      </p:sp>
+      <p:sp>
+        <p:nvSpPr>
+          <p:cNvPr id="4" name="Rectangle 1"/>
+          <p:cNvSpPr>
+            <a:spLocks noChangeArrowheads="1"/>
+          </p:cNvSpPr>
+          <p:nvPr/>
+        </p:nvSpPr>
+        <p:spPr bwMode="auto">
+          <a:xfrm>
+            <a:off x="652500" y="1700808"/>
+            <a:ext cx="10887000" cy="648072"/>
+          </a:xfrm>
+          <a:prstGeom prst="rect">
+            <a:avLst/>
+          </a:prstGeom>
+          <a:solidFill>
+            <a:srgbClr val="2B2B2B"/>
+          </a:solidFill>
+          <a:ln>
+            <a:noFill/>
+          </a:ln>
+          <a:effectLst/>
+          <a:extLst/>
+        </p:spPr>
+        <p:txBody>
+          <a:bodyPr vert="horz" wrap="square" lIns="182880" tIns="182880" rIns="182880" bIns="182880" numCol="1" anchor="t" anchorCtr="0" compatLnSpc="1">
+            <a:prstTxWarp prst="textNoShape">
+              <a:avLst/>
+            </a:prstTxWarp>
+            <a:noAutofit/>
           </a:bodyPr>
           <a:lstStyle/>
           <a:p>
-            <a:r>
-              <a:rPr lang="en-US" dirty="0" err="1" smtClean="0"/>
-              <a:t>SyncAdapters</a:t>
-            </a:r>
-            <a:r>
-              <a:rPr lang="en-US" dirty="0" smtClean="0"/>
-              <a:t> can be used to:</a:t>
-            </a:r>
-          </a:p>
-          <a:p>
-            <a:pPr lvl="1"/>
-            <a:r>
-              <a:rPr lang="en-US" dirty="0" smtClean="0"/>
-              <a:t>Fetch </a:t>
-            </a:r>
-            <a:r>
-              <a:rPr lang="en-US" dirty="0"/>
-              <a:t>background data for an </a:t>
-            </a:r>
-            <a:r>
-              <a:rPr lang="en-US" dirty="0" smtClean="0"/>
-              <a:t>app</a:t>
-            </a:r>
-          </a:p>
-          <a:p>
-            <a:pPr lvl="1"/>
-            <a:r>
-              <a:rPr lang="en-US" dirty="0" smtClean="0"/>
-              <a:t>Execute </a:t>
-            </a:r>
-            <a:r>
-              <a:rPr lang="en-US" dirty="0"/>
-              <a:t>your data transfer </a:t>
-            </a:r>
-            <a:r>
-              <a:rPr lang="en-US" dirty="0" smtClean="0"/>
-              <a:t>code</a:t>
-            </a:r>
-          </a:p>
-          <a:p>
-            <a:pPr lvl="2"/>
-            <a:r>
-              <a:rPr lang="en-US" dirty="0" smtClean="0"/>
-              <a:t>at </a:t>
-            </a:r>
-            <a:r>
-              <a:rPr lang="en-US" dirty="0"/>
-              <a:t>configurable </a:t>
-            </a:r>
-            <a:r>
-              <a:rPr lang="en-US" dirty="0" smtClean="0"/>
-              <a:t>intervals</a:t>
-            </a:r>
-          </a:p>
-          <a:p>
-            <a:pPr lvl="2"/>
-            <a:r>
-              <a:rPr lang="en-US" dirty="0" smtClean="0"/>
-              <a:t>while </a:t>
-            </a:r>
-            <a:r>
-              <a:rPr lang="en-US" dirty="0"/>
-              <a:t>efficiently using battery and other system </a:t>
-            </a:r>
-            <a:r>
-              <a:rPr lang="en-US" dirty="0" smtClean="0"/>
-              <a:t>resources</a:t>
-            </a:r>
-            <a:endParaRPr lang="en-US" dirty="0"/>
+            <a:pPr lvl="0" eaLnBrk="0" fontAlgn="base" hangingPunct="0">
+              <a:spcBef>
+                <a:spcPct val="0"/>
+              </a:spcBef>
+              <a:spcAft>
+                <a:spcPct val="0"/>
+              </a:spcAft>
+            </a:pPr>
+            <a:r>
+              <a:rPr lang="en-US" altLang="en-US" sz="1600" dirty="0" smtClean="0">
+                <a:solidFill>
+                  <a:srgbClr val="CC7832"/>
+                </a:solidFill>
+                <a:latin typeface="Consolas" panose="020B0609020204030204" pitchFamily="49" charset="0"/>
+                <a:cs typeface="Courier New" panose="02070309020205020404" pitchFamily="49" charset="0"/>
+              </a:rPr>
+              <a:t>return </a:t>
+            </a:r>
+            <a:r>
+              <a:rPr lang="en-US" altLang="en-US" sz="1600" dirty="0" smtClean="0">
+                <a:solidFill>
+                  <a:srgbClr val="CC7832"/>
+                </a:solidFill>
+                <a:latin typeface="Consolas" panose="020B0609020204030204" pitchFamily="49" charset="0"/>
+                <a:cs typeface="Courier New" panose="02070309020205020404" pitchFamily="49" charset="0"/>
+              </a:rPr>
+              <a:t>new </a:t>
+            </a:r>
+            <a:r>
+              <a:rPr lang="en-US" altLang="en-US" sz="1600" dirty="0" smtClean="0">
+                <a:solidFill>
+                  <a:srgbClr val="A9B7C6"/>
+                </a:solidFill>
+                <a:latin typeface="Consolas" panose="020B0609020204030204" pitchFamily="49" charset="0"/>
+                <a:cs typeface="Courier New" panose="02070309020205020404" pitchFamily="49" charset="0"/>
+              </a:rPr>
+              <a:t>Account(</a:t>
+            </a:r>
+            <a:r>
+              <a:rPr lang="en-US" altLang="en-US" sz="1600" dirty="0" err="1" smtClean="0">
+                <a:solidFill>
+                  <a:srgbClr val="A9B7C6"/>
+                </a:solidFill>
+                <a:latin typeface="Consolas" panose="020B0609020204030204" pitchFamily="49" charset="0"/>
+                <a:cs typeface="Courier New" panose="02070309020205020404" pitchFamily="49" charset="0"/>
+              </a:rPr>
+              <a:t>accountName</a:t>
+            </a:r>
+            <a:r>
+              <a:rPr lang="en-US" altLang="en-US" sz="1600" dirty="0" smtClean="0">
+                <a:solidFill>
+                  <a:srgbClr val="CC7832"/>
+                </a:solidFill>
+                <a:latin typeface="Consolas" panose="020B0609020204030204" pitchFamily="49" charset="0"/>
+                <a:cs typeface="Courier New" panose="02070309020205020404" pitchFamily="49" charset="0"/>
+              </a:rPr>
+              <a:t>, </a:t>
+            </a:r>
+            <a:r>
+              <a:rPr lang="en-US" altLang="en-US" sz="1600" i="1" dirty="0" smtClean="0">
+                <a:solidFill>
+                  <a:srgbClr val="A9B7C6"/>
+                </a:solidFill>
+                <a:latin typeface="Consolas" panose="020B0609020204030204" pitchFamily="49" charset="0"/>
+                <a:cs typeface="Courier New" panose="02070309020205020404" pitchFamily="49" charset="0"/>
+              </a:rPr>
+              <a:t>ACCOUNT_TYPE</a:t>
+            </a:r>
+            <a:r>
+              <a:rPr lang="en-US" altLang="en-US" sz="1600" dirty="0" smtClean="0">
+                <a:solidFill>
+                  <a:srgbClr val="A9B7C6"/>
+                </a:solidFill>
+                <a:latin typeface="Consolas" panose="020B0609020204030204" pitchFamily="49" charset="0"/>
+                <a:cs typeface="Courier New" panose="02070309020205020404" pitchFamily="49" charset="0"/>
+              </a:rPr>
+              <a:t>)</a:t>
+            </a:r>
+            <a:r>
+              <a:rPr lang="en-US" altLang="en-US" sz="1600" dirty="0" smtClean="0">
+                <a:solidFill>
+                  <a:srgbClr val="CC7832"/>
+                </a:solidFill>
+                <a:latin typeface="Consolas" panose="020B0609020204030204" pitchFamily="49" charset="0"/>
+                <a:cs typeface="Courier New" panose="02070309020205020404" pitchFamily="49" charset="0"/>
+              </a:rPr>
+              <a:t>;</a:t>
+            </a:r>
+            <a:endParaRPr lang="en-US" altLang="en-US" sz="4000" dirty="0">
+              <a:latin typeface="Consolas" panose="020B0609020204030204" pitchFamily="49" charset="0"/>
+            </a:endParaRPr>
           </a:p>
         </p:txBody>
       </p:sp>
     </p:spTree>
     <p:extLst>
       <p:ext uri="{BB962C8B-B14F-4D97-AF65-F5344CB8AC3E}">
-        <p14:creationId xmlns:p14="http://schemas.microsoft.com/office/powerpoint/2010/main" val="2364295274"/>
+        <p14:creationId xmlns:p14="http://schemas.microsoft.com/office/powerpoint/2010/main" val="2551493412"/>
       </p:ext>
     </p:extLst>
   </p:cSld>
@@ -42053,6 +42333,167 @@
           <a:lstStyle/>
           <a:p>
             <a:r>
+              <a:rPr lang="en-US" dirty="0" err="1" smtClean="0"/>
+              <a:t>SyncAdapters</a:t>
+            </a:r>
+            <a:r>
+              <a:rPr lang="en-US" dirty="0" smtClean="0"/>
+              <a:t> can be used to:</a:t>
+            </a:r>
+          </a:p>
+          <a:p>
+            <a:pPr lvl="1"/>
+            <a:r>
+              <a:rPr lang="en-US" dirty="0" smtClean="0"/>
+              <a:t>Fetch </a:t>
+            </a:r>
+            <a:r>
+              <a:rPr lang="en-US" dirty="0"/>
+              <a:t>background data for an </a:t>
+            </a:r>
+            <a:r>
+              <a:rPr lang="en-US" dirty="0" smtClean="0"/>
+              <a:t>app</a:t>
+            </a:r>
+          </a:p>
+          <a:p>
+            <a:pPr lvl="1"/>
+            <a:r>
+              <a:rPr lang="en-US" dirty="0" smtClean="0"/>
+              <a:t>Execute </a:t>
+            </a:r>
+            <a:r>
+              <a:rPr lang="en-US" dirty="0"/>
+              <a:t>your data transfer </a:t>
+            </a:r>
+            <a:r>
+              <a:rPr lang="en-US" dirty="0" smtClean="0"/>
+              <a:t>code</a:t>
+            </a:r>
+          </a:p>
+          <a:p>
+            <a:pPr lvl="2"/>
+            <a:r>
+              <a:rPr lang="en-US" dirty="0" smtClean="0"/>
+              <a:t>at </a:t>
+            </a:r>
+            <a:r>
+              <a:rPr lang="en-US" dirty="0"/>
+              <a:t>configurable </a:t>
+            </a:r>
+            <a:r>
+              <a:rPr lang="en-US" dirty="0" smtClean="0"/>
+              <a:t>intervals</a:t>
+            </a:r>
+          </a:p>
+          <a:p>
+            <a:pPr lvl="2"/>
+            <a:r>
+              <a:rPr lang="en-US" dirty="0" smtClean="0"/>
+              <a:t>while </a:t>
+            </a:r>
+            <a:r>
+              <a:rPr lang="en-US" dirty="0"/>
+              <a:t>efficiently using battery and other system </a:t>
+            </a:r>
+            <a:r>
+              <a:rPr lang="en-US" dirty="0" smtClean="0"/>
+              <a:t>resources</a:t>
+            </a:r>
+            <a:endParaRPr lang="en-US" dirty="0"/>
+          </a:p>
+        </p:txBody>
+      </p:sp>
+    </p:spTree>
+    <p:extLst>
+      <p:ext uri="{BB962C8B-B14F-4D97-AF65-F5344CB8AC3E}">
+        <p14:creationId xmlns:p14="http://schemas.microsoft.com/office/powerpoint/2010/main" val="2364295274"/>
+      </p:ext>
+    </p:extLst>
+  </p:cSld>
+  <p:clrMapOvr>
+    <a:masterClrMapping/>
+  </p:clrMapOvr>
+  <mc:AlternateContent xmlns:mc="http://schemas.openxmlformats.org/markup-compatibility/2006" xmlns:p14="http://schemas.microsoft.com/office/powerpoint/2010/main">
+    <mc:Choice Requires="p14">
+      <p:transition p14:dur="250">
+        <p14:reveal/>
+      </p:transition>
+    </mc:Choice>
+    <mc:Fallback xmlns="">
+      <p:transition>
+        <p:fade/>
+      </p:transition>
+    </mc:Fallback>
+  </mc:AlternateContent>
+  <p:timing>
+    <p:tnLst>
+      <p:par>
+        <p:cTn id="1" dur="indefinite" restart="never" nodeType="tmRoot"/>
+      </p:par>
+    </p:tnLst>
+  </p:timing>
+</p:sld>
+</file>
+
+<file path=ppt/slides/slide44.xml><?xml version="1.0" encoding="utf-8"?>
+<p:sld xmlns:a="http://schemas.openxmlformats.org/drawingml/2006/main" xmlns:r="http://schemas.openxmlformats.org/officeDocument/2006/relationships" xmlns:p="http://schemas.openxmlformats.org/presentationml/2006/main">
+  <p:cSld>
+    <p:spTree>
+      <p:nvGrpSpPr>
+        <p:cNvPr id="1" name=""/>
+        <p:cNvGrpSpPr/>
+        <p:nvPr/>
+      </p:nvGrpSpPr>
+      <p:grpSpPr>
+        <a:xfrm>
+          <a:off x="0" y="0"/>
+          <a:ext cx="0" cy="0"/>
+          <a:chOff x="0" y="0"/>
+          <a:chExt cx="0" cy="0"/>
+        </a:xfrm>
+      </p:grpSpPr>
+      <p:sp>
+        <p:nvSpPr>
+          <p:cNvPr id="2" name="Title 1"/>
+          <p:cNvSpPr>
+            <a:spLocks noGrp="1"/>
+          </p:cNvSpPr>
+          <p:nvPr>
+            <p:ph type="title"/>
+          </p:nvPr>
+        </p:nvSpPr>
+        <p:spPr/>
+        <p:txBody>
+          <a:bodyPr/>
+          <a:lstStyle/>
+          <a:p>
+            <a:r>
+              <a:rPr lang="en-US" dirty="0" smtClean="0"/>
+              <a:t>Recap</a:t>
+            </a:r>
+            <a:endParaRPr lang="en-US" dirty="0"/>
+          </a:p>
+        </p:txBody>
+      </p:sp>
+      <p:sp>
+        <p:nvSpPr>
+          <p:cNvPr id="3" name="Content Placeholder 2"/>
+          <p:cNvSpPr>
+            <a:spLocks noGrp="1"/>
+          </p:cNvSpPr>
+          <p:nvPr>
+            <p:ph idx="1"/>
+          </p:nvPr>
+        </p:nvSpPr>
+        <p:spPr/>
+        <p:txBody>
+          <a:bodyPr>
+            <a:normAutofit/>
+          </a:bodyPr>
+          <a:lstStyle/>
+          <a:p>
+            <a:r>
               <a:rPr lang="en-US" dirty="0"/>
               <a:t>Elements of a sync </a:t>
             </a:r>
@@ -42217,7 +42658,7 @@
 </p:sld>
 </file>
 
-<file path=ppt/slides/slide44.xml><?xml version="1.0" encoding="utf-8"?>
+<file path=ppt/slides/slide45.xml><?xml version="1.0" encoding="utf-8"?>
 <p:sld xmlns:a="http://schemas.openxmlformats.org/drawingml/2006/main" xmlns:r="http://schemas.openxmlformats.org/officeDocument/2006/relationships" xmlns:p="http://schemas.openxmlformats.org/presentationml/2006/main">
   <p:cSld>
     <p:spTree>
@@ -43328,7 +43769,7 @@
 </p:sld>
 </file>
 
-<file path=ppt/slides/slide45.xml><?xml version="1.0" encoding="utf-8"?>
+<file path=ppt/slides/slide46.xml><?xml version="1.0" encoding="utf-8"?>
 <p:sld xmlns:a="http://schemas.openxmlformats.org/drawingml/2006/main" xmlns:r="http://schemas.openxmlformats.org/officeDocument/2006/relationships" xmlns:p="http://schemas.openxmlformats.org/presentationml/2006/main">
   <p:cSld>
     <p:spTree>
@@ -43538,7 +43979,7 @@
 </p:sld>
 </file>
 
-<file path=ppt/slides/slide46.xml><?xml version="1.0" encoding="utf-8"?>
+<file path=ppt/slides/slide47.xml><?xml version="1.0" encoding="utf-8"?>
 <p:sld xmlns:a="http://schemas.openxmlformats.org/drawingml/2006/main" xmlns:r="http://schemas.openxmlformats.org/officeDocument/2006/relationships" xmlns:p="http://schemas.openxmlformats.org/presentationml/2006/main">
   <p:cSld>
     <p:spTree>
@@ -43617,7 +44058,7 @@
 </p:sld>
 </file>
 
-<file path=ppt/slides/slide47.xml><?xml version="1.0" encoding="utf-8"?>
+<file path=ppt/slides/slide48.xml><?xml version="1.0" encoding="utf-8"?>
 <p:sld xmlns:a="http://schemas.openxmlformats.org/drawingml/2006/main" xmlns:r="http://schemas.openxmlformats.org/officeDocument/2006/relationships" xmlns:p="http://schemas.openxmlformats.org/presentationml/2006/main">
   <p:cSld>
     <p:spTree>
@@ -43700,7 +44141,7 @@
 </p:sld>
 </file>
 
-<file path=ppt/slides/slide48.xml><?xml version="1.0" encoding="utf-8"?>
+<file path=ppt/slides/slide49.xml><?xml version="1.0" encoding="utf-8"?>
 <p:sld xmlns:a="http://schemas.openxmlformats.org/drawingml/2006/main" xmlns:r="http://schemas.openxmlformats.org/officeDocument/2006/relationships" xmlns:p="http://schemas.openxmlformats.org/presentationml/2006/main" show="0">
   <p:cSld>
     <p:spTree>
@@ -43833,267 +44274,6 @@
     <p:extLst>
       <p:ext uri="{BB962C8B-B14F-4D97-AF65-F5344CB8AC3E}">
         <p14:creationId xmlns:p14="http://schemas.microsoft.com/office/powerpoint/2010/main" val="351412801"/>
-      </p:ext>
-    </p:extLst>
-  </p:cSld>
-  <p:clrMapOvr>
-    <a:masterClrMapping/>
-  </p:clrMapOvr>
-  <mc:AlternateContent xmlns:mc="http://schemas.openxmlformats.org/markup-compatibility/2006" xmlns:p14="http://schemas.microsoft.com/office/powerpoint/2010/main">
-    <mc:Choice Requires="p14">
-      <p:transition p14:dur="250">
-        <p14:reveal/>
-      </p:transition>
-    </mc:Choice>
-    <mc:Fallback xmlns="">
-      <p:transition>
-        <p:fade/>
-      </p:transition>
-    </mc:Fallback>
-  </mc:AlternateContent>
-  <p:timing>
-    <p:tnLst>
-      <p:par>
-        <p:cTn id="1" dur="indefinite" restart="never" nodeType="tmRoot"/>
-      </p:par>
-    </p:tnLst>
-  </p:timing>
-</p:sld>
-</file>
-
-<file path=ppt/slides/slide49.xml><?xml version="1.0" encoding="utf-8"?>
-<p:sld xmlns:a="http://schemas.openxmlformats.org/drawingml/2006/main" xmlns:r="http://schemas.openxmlformats.org/officeDocument/2006/relationships" xmlns:p="http://schemas.openxmlformats.org/presentationml/2006/main">
-  <p:cSld>
-    <p:spTree>
-      <p:nvGrpSpPr>
-        <p:cNvPr id="1" name=""/>
-        <p:cNvGrpSpPr/>
-        <p:nvPr/>
-      </p:nvGrpSpPr>
-      <p:grpSpPr>
-        <a:xfrm>
-          <a:off x="0" y="0"/>
-          <a:ext cx="0" cy="0"/>
-          <a:chOff x="0" y="0"/>
-          <a:chExt cx="0" cy="0"/>
-        </a:xfrm>
-      </p:grpSpPr>
-      <p:pic>
-        <p:nvPicPr>
-          <p:cNvPr id="6" name="Picture 5"/>
-          <p:cNvPicPr>
-            <a:picLocks noChangeAspect="1"/>
-          </p:cNvPicPr>
-          <p:nvPr/>
-        </p:nvPicPr>
-        <p:blipFill>
-          <a:blip r:embed="rId2">
-            <a:extLst>
-              <a:ext uri="{28A0092B-C50C-407E-A947-70E740481C1C}">
-                <a14:useLocalDpi xmlns:a14="http://schemas.microsoft.com/office/drawing/2010/main" val="0"/>
-              </a:ext>
-            </a:extLst>
-          </a:blip>
-          <a:stretch>
-            <a:fillRect/>
-          </a:stretch>
-        </p:blipFill>
-        <p:spPr>
-          <a:xfrm>
-            <a:off x="3935760" y="875373"/>
-            <a:ext cx="7767148" cy="3091591"/>
-          </a:xfrm>
-          <a:prstGeom prst="rect">
-            <a:avLst/>
-          </a:prstGeom>
-        </p:spPr>
-      </p:pic>
-      <p:pic>
-        <p:nvPicPr>
-          <p:cNvPr id="4" name="Picture 2" descr="C:\Users\Paul\Documents\My Dropbox\Pixplicity\Pictures\Paul_2012-06-04-square-600px.jpg"/>
-          <p:cNvPicPr>
-            <a:picLocks noChangeAspect="1" noChangeArrowheads="1"/>
-          </p:cNvPicPr>
-          <p:nvPr/>
-        </p:nvPicPr>
-        <p:blipFill>
-          <a:blip r:embed="rId3" cstate="print">
-            <a:extLst>
-              <a:ext uri="{28A0092B-C50C-407E-A947-70E740481C1C}">
-                <a14:useLocalDpi xmlns:a14="http://schemas.microsoft.com/office/drawing/2010/main" val="0"/>
-              </a:ext>
-            </a:extLst>
-          </a:blip>
-          <a:srcRect/>
-          <a:stretch>
-            <a:fillRect/>
-          </a:stretch>
-        </p:blipFill>
-        <p:spPr bwMode="auto">
-          <a:xfrm>
-            <a:off x="9800927" y="4541639"/>
-            <a:ext cx="1911697" cy="1911697"/>
-          </a:xfrm>
-          <a:prstGeom prst="rect">
-            <a:avLst/>
-          </a:prstGeom>
-          <a:solidFill>
-            <a:srgbClr val="FFFFFF">
-              <a:shade val="85000"/>
-            </a:srgbClr>
-          </a:solidFill>
-          <a:ln w="127000" cap="rnd">
-            <a:solidFill>
-              <a:srgbClr val="FFFFFF"/>
-            </a:solidFill>
-          </a:ln>
-          <a:effectLst>
-            <a:outerShdw blurRad="76200" dir="18900000" sy="23000" kx="-1200000" algn="bl" rotWithShape="0">
-              <a:prstClr val="black">
-                <a:alpha val="20000"/>
-              </a:prstClr>
-            </a:outerShdw>
-          </a:effectLst>
-          <a:scene3d>
-            <a:camera prst="perspectiveContrastingLeftFacing" fov="4800000">
-              <a:rot lat="540000" lon="900000" rev="0"/>
-            </a:camera>
-            <a:lightRig rig="soft" dir="t"/>
-          </a:scene3d>
-          <a:sp3d contourW="12700" prstMaterial="matte">
-            <a:bevelT w="63500" h="50800"/>
-            <a:contourClr>
-              <a:srgbClr val="C0C0C0"/>
-            </a:contourClr>
-          </a:sp3d>
-          <a:extLst/>
-        </p:spPr>
-      </p:pic>
-      <p:sp>
-        <p:nvSpPr>
-          <p:cNvPr id="5" name="TextBox 4"/>
-          <p:cNvSpPr txBox="1"/>
-          <p:nvPr/>
-        </p:nvSpPr>
-        <p:spPr>
-          <a:xfrm>
-            <a:off x="6560567" y="5591562"/>
-            <a:ext cx="3083740" cy="861774"/>
-          </a:xfrm>
-          <a:prstGeom prst="rect">
-            <a:avLst/>
-          </a:prstGeom>
-          <a:noFill/>
-        </p:spPr>
-        <p:txBody>
-          <a:bodyPr wrap="square" lIns="0" tIns="0" rIns="0" bIns="0" rtlCol="0">
-            <a:spAutoFit/>
-          </a:bodyPr>
-          <a:lstStyle/>
-          <a:p>
-            <a:pPr algn="r"/>
-            <a:r>
-              <a:rPr lang="en-US" sz="2800" b="1" dirty="0">
-                <a:solidFill>
-                  <a:schemeClr val="bg1">
-                    <a:lumMod val="65000"/>
-                  </a:schemeClr>
-                </a:solidFill>
-              </a:rPr>
-              <a:t>Paul </a:t>
-            </a:r>
-            <a:r>
-              <a:rPr lang="en-US" sz="2800" b="1" dirty="0" err="1">
-                <a:solidFill>
-                  <a:schemeClr val="bg1">
-                    <a:lumMod val="65000"/>
-                  </a:schemeClr>
-                </a:solidFill>
-              </a:rPr>
-              <a:t>Lammertsma</a:t>
-            </a:r>
-            <a:endParaRPr lang="en-US" sz="2800" b="1" dirty="0">
-              <a:solidFill>
-                <a:schemeClr val="bg1">
-                  <a:lumMod val="65000"/>
-                </a:schemeClr>
-              </a:solidFill>
-            </a:endParaRPr>
-          </a:p>
-          <a:p>
-            <a:pPr algn="r"/>
-            <a:r>
-              <a:rPr lang="en-US" sz="2800" dirty="0">
-                <a:solidFill>
-                  <a:schemeClr val="bg1">
-                    <a:lumMod val="65000"/>
-                  </a:schemeClr>
-                </a:solidFill>
-              </a:rPr>
-              <a:t>CTO, </a:t>
-            </a:r>
-            <a:r>
-              <a:rPr lang="en-US" sz="2800" dirty="0" err="1">
-                <a:solidFill>
-                  <a:schemeClr val="bg1">
-                    <a:lumMod val="65000"/>
-                  </a:schemeClr>
-                </a:solidFill>
-              </a:rPr>
-              <a:t>Pixplicity</a:t>
-            </a:r>
-            <a:endParaRPr lang="en-US" sz="2800" dirty="0">
-              <a:solidFill>
-                <a:schemeClr val="bg1">
-                  <a:lumMod val="65000"/>
-                </a:schemeClr>
-              </a:solidFill>
-            </a:endParaRPr>
-          </a:p>
-        </p:txBody>
-      </p:sp>
-      <p:sp>
-        <p:nvSpPr>
-          <p:cNvPr id="11" name="Title 10"/>
-          <p:cNvSpPr>
-            <a:spLocks noGrp="1"/>
-          </p:cNvSpPr>
-          <p:nvPr>
-            <p:ph type="ctrTitle"/>
-          </p:nvPr>
-        </p:nvSpPr>
-        <p:spPr>
-          <a:xfrm>
-            <a:off x="6168008" y="1268760"/>
-            <a:ext cx="5363964" cy="2880320"/>
-          </a:xfrm>
-        </p:spPr>
-        <p:txBody>
-          <a:bodyPr>
-            <a:normAutofit/>
-          </a:bodyPr>
-          <a:lstStyle/>
-          <a:p>
-            <a:r>
-              <a:rPr lang="en-US" sz="4400" dirty="0" smtClean="0">
-                <a:solidFill>
-                  <a:schemeClr val="tx1"/>
-                </a:solidFill>
-              </a:rPr>
-              <a:t>I’ve been doing some syncing…</a:t>
-            </a:r>
-            <a:endParaRPr lang="en-US" sz="4400" dirty="0">
-              <a:solidFill>
-                <a:schemeClr val="tx1"/>
-              </a:solidFill>
-            </a:endParaRPr>
-          </a:p>
-        </p:txBody>
-      </p:sp>
-    </p:spTree>
-    <p:extLst>
-      <p:ext uri="{BB962C8B-B14F-4D97-AF65-F5344CB8AC3E}">
-        <p14:creationId xmlns:p14="http://schemas.microsoft.com/office/powerpoint/2010/main" val="52973025"/>
       </p:ext>
     </p:extLst>
   </p:cSld>
@@ -45102,6 +45282,267 @@
       <p:bldP spid="21" grpId="0"/>
       <p:bldP spid="21" grpId="1"/>
     </p:bldLst>
+  </p:timing>
+</p:sld>
+</file>
+
+<file path=ppt/slides/slide50.xml><?xml version="1.0" encoding="utf-8"?>
+<p:sld xmlns:a="http://schemas.openxmlformats.org/drawingml/2006/main" xmlns:r="http://schemas.openxmlformats.org/officeDocument/2006/relationships" xmlns:p="http://schemas.openxmlformats.org/presentationml/2006/main">
+  <p:cSld>
+    <p:spTree>
+      <p:nvGrpSpPr>
+        <p:cNvPr id="1" name=""/>
+        <p:cNvGrpSpPr/>
+        <p:nvPr/>
+      </p:nvGrpSpPr>
+      <p:grpSpPr>
+        <a:xfrm>
+          <a:off x="0" y="0"/>
+          <a:ext cx="0" cy="0"/>
+          <a:chOff x="0" y="0"/>
+          <a:chExt cx="0" cy="0"/>
+        </a:xfrm>
+      </p:grpSpPr>
+      <p:pic>
+        <p:nvPicPr>
+          <p:cNvPr id="6" name="Picture 5"/>
+          <p:cNvPicPr>
+            <a:picLocks noChangeAspect="1"/>
+          </p:cNvPicPr>
+          <p:nvPr/>
+        </p:nvPicPr>
+        <p:blipFill>
+          <a:blip r:embed="rId2">
+            <a:extLst>
+              <a:ext uri="{28A0092B-C50C-407E-A947-70E740481C1C}">
+                <a14:useLocalDpi xmlns:a14="http://schemas.microsoft.com/office/drawing/2010/main" val="0"/>
+              </a:ext>
+            </a:extLst>
+          </a:blip>
+          <a:stretch>
+            <a:fillRect/>
+          </a:stretch>
+        </p:blipFill>
+        <p:spPr>
+          <a:xfrm>
+            <a:off x="3935760" y="875373"/>
+            <a:ext cx="7767148" cy="3091591"/>
+          </a:xfrm>
+          <a:prstGeom prst="rect">
+            <a:avLst/>
+          </a:prstGeom>
+        </p:spPr>
+      </p:pic>
+      <p:pic>
+        <p:nvPicPr>
+          <p:cNvPr id="4" name="Picture 2" descr="C:\Users\Paul\Documents\My Dropbox\Pixplicity\Pictures\Paul_2012-06-04-square-600px.jpg"/>
+          <p:cNvPicPr>
+            <a:picLocks noChangeAspect="1" noChangeArrowheads="1"/>
+          </p:cNvPicPr>
+          <p:nvPr/>
+        </p:nvPicPr>
+        <p:blipFill>
+          <a:blip r:embed="rId3" cstate="print">
+            <a:extLst>
+              <a:ext uri="{28A0092B-C50C-407E-A947-70E740481C1C}">
+                <a14:useLocalDpi xmlns:a14="http://schemas.microsoft.com/office/drawing/2010/main" val="0"/>
+              </a:ext>
+            </a:extLst>
+          </a:blip>
+          <a:srcRect/>
+          <a:stretch>
+            <a:fillRect/>
+          </a:stretch>
+        </p:blipFill>
+        <p:spPr bwMode="auto">
+          <a:xfrm>
+            <a:off x="9800927" y="4541639"/>
+            <a:ext cx="1911697" cy="1911697"/>
+          </a:xfrm>
+          <a:prstGeom prst="rect">
+            <a:avLst/>
+          </a:prstGeom>
+          <a:solidFill>
+            <a:srgbClr val="FFFFFF">
+              <a:shade val="85000"/>
+            </a:srgbClr>
+          </a:solidFill>
+          <a:ln w="127000" cap="rnd">
+            <a:solidFill>
+              <a:srgbClr val="FFFFFF"/>
+            </a:solidFill>
+          </a:ln>
+          <a:effectLst>
+            <a:outerShdw blurRad="76200" dir="18900000" sy="23000" kx="-1200000" algn="bl" rotWithShape="0">
+              <a:prstClr val="black">
+                <a:alpha val="20000"/>
+              </a:prstClr>
+            </a:outerShdw>
+          </a:effectLst>
+          <a:scene3d>
+            <a:camera prst="perspectiveContrastingLeftFacing" fov="4800000">
+              <a:rot lat="540000" lon="900000" rev="0"/>
+            </a:camera>
+            <a:lightRig rig="soft" dir="t"/>
+          </a:scene3d>
+          <a:sp3d contourW="12700" prstMaterial="matte">
+            <a:bevelT w="63500" h="50800"/>
+            <a:contourClr>
+              <a:srgbClr val="C0C0C0"/>
+            </a:contourClr>
+          </a:sp3d>
+          <a:extLst/>
+        </p:spPr>
+      </p:pic>
+      <p:sp>
+        <p:nvSpPr>
+          <p:cNvPr id="5" name="TextBox 4"/>
+          <p:cNvSpPr txBox="1"/>
+          <p:nvPr/>
+        </p:nvSpPr>
+        <p:spPr>
+          <a:xfrm>
+            <a:off x="6560567" y="5591562"/>
+            <a:ext cx="3083740" cy="861774"/>
+          </a:xfrm>
+          <a:prstGeom prst="rect">
+            <a:avLst/>
+          </a:prstGeom>
+          <a:noFill/>
+        </p:spPr>
+        <p:txBody>
+          <a:bodyPr wrap="square" lIns="0" tIns="0" rIns="0" bIns="0" rtlCol="0">
+            <a:spAutoFit/>
+          </a:bodyPr>
+          <a:lstStyle/>
+          <a:p>
+            <a:pPr algn="r"/>
+            <a:r>
+              <a:rPr lang="en-US" sz="2800" b="1" dirty="0">
+                <a:solidFill>
+                  <a:schemeClr val="bg1">
+                    <a:lumMod val="65000"/>
+                  </a:schemeClr>
+                </a:solidFill>
+              </a:rPr>
+              <a:t>Paul </a:t>
+            </a:r>
+            <a:r>
+              <a:rPr lang="en-US" sz="2800" b="1" dirty="0" err="1">
+                <a:solidFill>
+                  <a:schemeClr val="bg1">
+                    <a:lumMod val="65000"/>
+                  </a:schemeClr>
+                </a:solidFill>
+              </a:rPr>
+              <a:t>Lammertsma</a:t>
+            </a:r>
+            <a:endParaRPr lang="en-US" sz="2800" b="1" dirty="0">
+              <a:solidFill>
+                <a:schemeClr val="bg1">
+                  <a:lumMod val="65000"/>
+                </a:schemeClr>
+              </a:solidFill>
+            </a:endParaRPr>
+          </a:p>
+          <a:p>
+            <a:pPr algn="r"/>
+            <a:r>
+              <a:rPr lang="en-US" sz="2800" dirty="0">
+                <a:solidFill>
+                  <a:schemeClr val="bg1">
+                    <a:lumMod val="65000"/>
+                  </a:schemeClr>
+                </a:solidFill>
+              </a:rPr>
+              <a:t>CTO, </a:t>
+            </a:r>
+            <a:r>
+              <a:rPr lang="en-US" sz="2800" dirty="0" err="1">
+                <a:solidFill>
+                  <a:schemeClr val="bg1">
+                    <a:lumMod val="65000"/>
+                  </a:schemeClr>
+                </a:solidFill>
+              </a:rPr>
+              <a:t>Pixplicity</a:t>
+            </a:r>
+            <a:endParaRPr lang="en-US" sz="2800" dirty="0">
+              <a:solidFill>
+                <a:schemeClr val="bg1">
+                  <a:lumMod val="65000"/>
+                </a:schemeClr>
+              </a:solidFill>
+            </a:endParaRPr>
+          </a:p>
+        </p:txBody>
+      </p:sp>
+      <p:sp>
+        <p:nvSpPr>
+          <p:cNvPr id="11" name="Title 10"/>
+          <p:cNvSpPr>
+            <a:spLocks noGrp="1"/>
+          </p:cNvSpPr>
+          <p:nvPr>
+            <p:ph type="ctrTitle"/>
+          </p:nvPr>
+        </p:nvSpPr>
+        <p:spPr>
+          <a:xfrm>
+            <a:off x="6168008" y="1268760"/>
+            <a:ext cx="5363964" cy="2880320"/>
+          </a:xfrm>
+        </p:spPr>
+        <p:txBody>
+          <a:bodyPr>
+            <a:normAutofit/>
+          </a:bodyPr>
+          <a:lstStyle/>
+          <a:p>
+            <a:r>
+              <a:rPr lang="en-US" sz="4400" dirty="0" smtClean="0">
+                <a:solidFill>
+                  <a:schemeClr val="tx1"/>
+                </a:solidFill>
+              </a:rPr>
+              <a:t>I’ve been doing some syncing…</a:t>
+            </a:r>
+            <a:endParaRPr lang="en-US" sz="4400" dirty="0">
+              <a:solidFill>
+                <a:schemeClr val="tx1"/>
+              </a:solidFill>
+            </a:endParaRPr>
+          </a:p>
+        </p:txBody>
+      </p:sp>
+    </p:spTree>
+    <p:extLst>
+      <p:ext uri="{BB962C8B-B14F-4D97-AF65-F5344CB8AC3E}">
+        <p14:creationId xmlns:p14="http://schemas.microsoft.com/office/powerpoint/2010/main" val="52973025"/>
+      </p:ext>
+    </p:extLst>
+  </p:cSld>
+  <p:clrMapOvr>
+    <a:masterClrMapping/>
+  </p:clrMapOvr>
+  <mc:AlternateContent xmlns:mc="http://schemas.openxmlformats.org/markup-compatibility/2006" xmlns:p14="http://schemas.microsoft.com/office/powerpoint/2010/main">
+    <mc:Choice Requires="p14">
+      <p:transition p14:dur="250">
+        <p14:reveal/>
+      </p:transition>
+    </mc:Choice>
+    <mc:Fallback xmlns="">
+      <p:transition>
+        <p:fade/>
+      </p:transition>
+    </mc:Fallback>
+  </mc:AlternateContent>
+  <p:timing>
+    <p:tnLst>
+      <p:par>
+        <p:cTn id="1" dur="indefinite" restart="never" nodeType="tmRoot"/>
+      </p:par>
+    </p:tnLst>
   </p:timing>
 </p:sld>
 </file>

</xml_diff>

<commit_message>
super last minute extra emoji; cue laughs
</commit_message>
<xml_diff>
--- a/I've been doing some syncing.pptx
+++ b/I've been doing some syncing.pptx
@@ -40453,6 +40453,54 @@
           </a:p>
         </p:txBody>
       </p:sp>
+      <p:pic>
+        <p:nvPicPr>
+          <p:cNvPr id="5" name="Picture 2" descr="Unamused Face on Google Android 6.0.1"/>
+          <p:cNvPicPr>
+            <a:picLocks noChangeAspect="1" noChangeArrowheads="1"/>
+          </p:cNvPicPr>
+          <p:nvPr/>
+        </p:nvPicPr>
+        <p:blipFill>
+          <a:blip r:embed="rId2">
+            <a:extLst>
+              <a:ext uri="{28A0092B-C50C-407E-A947-70E740481C1C}">
+                <a14:useLocalDpi xmlns:a14="http://schemas.microsoft.com/office/drawing/2010/main" val="0"/>
+              </a:ext>
+            </a:extLst>
+          </a:blip>
+          <a:srcRect/>
+          <a:stretch>
+            <a:fillRect/>
+          </a:stretch>
+        </p:blipFill>
+        <p:spPr bwMode="auto">
+          <a:xfrm>
+            <a:off x="10086975" y="5373216"/>
+            <a:ext cx="1295400" cy="1219201"/>
+          </a:xfrm>
+          <a:prstGeom prst="rect">
+            <a:avLst/>
+          </a:prstGeom>
+          <a:noFill/>
+          <a:effectLst>
+            <a:outerShdw blurRad="50800" dist="38100" dir="5400000" algn="t" rotWithShape="0">
+              <a:prstClr val="black">
+                <a:alpha val="40000"/>
+              </a:prstClr>
+            </a:outerShdw>
+          </a:effectLst>
+          <a:extLst>
+            <a:ext uri="{909E8E84-426E-40DD-AFC4-6F175D3DCCD1}">
+              <a14:hiddenFill xmlns:a14="http://schemas.microsoft.com/office/drawing/2010/main">
+                <a:solidFill>
+                  <a:srgbClr val="FFFFFF"/>
+                </a:solidFill>
+              </a14:hiddenFill>
+            </a:ext>
+          </a:extLst>
+        </p:spPr>
+      </p:pic>
     </p:spTree>
     <p:extLst>
       <p:ext uri="{BB962C8B-B14F-4D97-AF65-F5344CB8AC3E}">
@@ -40518,6 +40566,97 @@
                                         </p:tgtEl>
                                       </p:cBhvr>
                                     </p:animEffect>
+                                  </p:childTnLst>
+                                </p:cTn>
+                              </p:par>
+                            </p:childTnLst>
+                          </p:cTn>
+                        </p:par>
+                      </p:childTnLst>
+                    </p:cTn>
+                  </p:par>
+                  <p:par>
+                    <p:cTn id="8" fill="hold">
+                      <p:stCondLst>
+                        <p:cond delay="indefinite"/>
+                      </p:stCondLst>
+                      <p:childTnLst>
+                        <p:par>
+                          <p:cTn id="9" fill="hold">
+                            <p:stCondLst>
+                              <p:cond delay="0"/>
+                            </p:stCondLst>
+                            <p:childTnLst>
+                              <p:par>
+                                <p:cTn id="10" presetID="2" presetClass="entr" presetSubtype="4" fill="hold" nodeType="clickEffect">
+                                  <p:stCondLst>
+                                    <p:cond delay="0"/>
+                                  </p:stCondLst>
+                                  <p:childTnLst>
+                                    <p:set>
+                                      <p:cBhvr>
+                                        <p:cTn id="11" dur="1" fill="hold">
+                                          <p:stCondLst>
+                                            <p:cond delay="0"/>
+                                          </p:stCondLst>
+                                        </p:cTn>
+                                        <p:tgtEl>
+                                          <p:spTgt spid="5"/>
+                                        </p:tgtEl>
+                                        <p:attrNameLst>
+                                          <p:attrName>style.visibility</p:attrName>
+                                        </p:attrNameLst>
+                                      </p:cBhvr>
+                                      <p:to>
+                                        <p:strVal val="visible"/>
+                                      </p:to>
+                                    </p:set>
+                                    <p:anim calcmode="lin" valueType="num">
+                                      <p:cBhvr additive="base">
+                                        <p:cTn id="12" dur="200" fill="hold"/>
+                                        <p:tgtEl>
+                                          <p:spTgt spid="5"/>
+                                        </p:tgtEl>
+                                        <p:attrNameLst>
+                                          <p:attrName>ppt_x</p:attrName>
+                                        </p:attrNameLst>
+                                      </p:cBhvr>
+                                      <p:tavLst>
+                                        <p:tav tm="0">
+                                          <p:val>
+                                            <p:strVal val="#ppt_x"/>
+                                          </p:val>
+                                        </p:tav>
+                                        <p:tav tm="100000">
+                                          <p:val>
+                                            <p:strVal val="#ppt_x"/>
+                                          </p:val>
+                                        </p:tav>
+                                      </p:tavLst>
+                                    </p:anim>
+                                    <p:anim calcmode="lin" valueType="num">
+                                      <p:cBhvr additive="base">
+                                        <p:cTn id="13" dur="200" fill="hold"/>
+                                        <p:tgtEl>
+                                          <p:spTgt spid="5"/>
+                                        </p:tgtEl>
+                                        <p:attrNameLst>
+                                          <p:attrName>ppt_y</p:attrName>
+                                        </p:attrNameLst>
+                                      </p:cBhvr>
+                                      <p:tavLst>
+                                        <p:tav tm="0">
+                                          <p:val>
+                                            <p:strVal val="1+#ppt_h/2"/>
+                                          </p:val>
+                                        </p:tav>
+                                        <p:tav tm="100000">
+                                          <p:val>
+                                            <p:strVal val="#ppt_y"/>
+                                          </p:val>
+                                        </p:tav>
+                                      </p:tavLst>
+                                    </p:anim>
                                   </p:childTnLst>
                                 </p:cTn>
                               </p:par>

</xml_diff>